<commit_message>
Atualização dos DFDs, Analise dos Eventos, Arquitetura de Negócio. Start Regras de Negócio
</commit_message>
<xml_diff>
--- a/Documentation/15._Arquitetura_de_Negócio_para_cada_Cenário.pptx
+++ b/Documentation/15._Arquitetura_de_Negócio_para_cada_Cenário.pptx
@@ -255,7 +255,7 @@
           <a:p>
             <a:fld id="{2E0DF6E3-1D5C-4094-B81B-572E3744A14B}" type="datetimeFigureOut">
               <a:rPr lang="pt-BR" smtClean="0"/>
-              <a:t>01/04/2021</a:t>
+              <a:t>03/04/2021</a:t>
             </a:fld>
             <a:endParaRPr lang="pt-BR"/>
           </a:p>
@@ -423,7 +423,7 @@
           <a:p>
             <a:fld id="{2E0DF6E3-1D5C-4094-B81B-572E3744A14B}" type="datetimeFigureOut">
               <a:rPr lang="pt-BR" smtClean="0"/>
-              <a:t>01/04/2021</a:t>
+              <a:t>03/04/2021</a:t>
             </a:fld>
             <a:endParaRPr lang="pt-BR"/>
           </a:p>
@@ -601,7 +601,7 @@
           <a:p>
             <a:fld id="{2E0DF6E3-1D5C-4094-B81B-572E3744A14B}" type="datetimeFigureOut">
               <a:rPr lang="pt-BR" smtClean="0"/>
-              <a:t>01/04/2021</a:t>
+              <a:t>03/04/2021</a:t>
             </a:fld>
             <a:endParaRPr lang="pt-BR"/>
           </a:p>
@@ -769,7 +769,7 @@
           <a:p>
             <a:fld id="{2E0DF6E3-1D5C-4094-B81B-572E3744A14B}" type="datetimeFigureOut">
               <a:rPr lang="pt-BR" smtClean="0"/>
-              <a:t>01/04/2021</a:t>
+              <a:t>03/04/2021</a:t>
             </a:fld>
             <a:endParaRPr lang="pt-BR"/>
           </a:p>
@@ -1014,7 +1014,7 @@
           <a:p>
             <a:fld id="{2E0DF6E3-1D5C-4094-B81B-572E3744A14B}" type="datetimeFigureOut">
               <a:rPr lang="pt-BR" smtClean="0"/>
-              <a:t>01/04/2021</a:t>
+              <a:t>03/04/2021</a:t>
             </a:fld>
             <a:endParaRPr lang="pt-BR"/>
           </a:p>
@@ -1243,7 +1243,7 @@
           <a:p>
             <a:fld id="{2E0DF6E3-1D5C-4094-B81B-572E3744A14B}" type="datetimeFigureOut">
               <a:rPr lang="pt-BR" smtClean="0"/>
-              <a:t>01/04/2021</a:t>
+              <a:t>03/04/2021</a:t>
             </a:fld>
             <a:endParaRPr lang="pt-BR"/>
           </a:p>
@@ -1607,7 +1607,7 @@
           <a:p>
             <a:fld id="{2E0DF6E3-1D5C-4094-B81B-572E3744A14B}" type="datetimeFigureOut">
               <a:rPr lang="pt-BR" smtClean="0"/>
-              <a:t>01/04/2021</a:t>
+              <a:t>03/04/2021</a:t>
             </a:fld>
             <a:endParaRPr lang="pt-BR"/>
           </a:p>
@@ -1724,7 +1724,7 @@
           <a:p>
             <a:fld id="{2E0DF6E3-1D5C-4094-B81B-572E3744A14B}" type="datetimeFigureOut">
               <a:rPr lang="pt-BR" smtClean="0"/>
-              <a:t>01/04/2021</a:t>
+              <a:t>03/04/2021</a:t>
             </a:fld>
             <a:endParaRPr lang="pt-BR"/>
           </a:p>
@@ -1819,7 +1819,7 @@
           <a:p>
             <a:fld id="{2E0DF6E3-1D5C-4094-B81B-572E3744A14B}" type="datetimeFigureOut">
               <a:rPr lang="pt-BR" smtClean="0"/>
-              <a:t>01/04/2021</a:t>
+              <a:t>03/04/2021</a:t>
             </a:fld>
             <a:endParaRPr lang="pt-BR"/>
           </a:p>
@@ -2094,7 +2094,7 @@
           <a:p>
             <a:fld id="{2E0DF6E3-1D5C-4094-B81B-572E3744A14B}" type="datetimeFigureOut">
               <a:rPr lang="pt-BR" smtClean="0"/>
-              <a:t>01/04/2021</a:t>
+              <a:t>03/04/2021</a:t>
             </a:fld>
             <a:endParaRPr lang="pt-BR"/>
           </a:p>
@@ -2346,7 +2346,7 @@
           <a:p>
             <a:fld id="{2E0DF6E3-1D5C-4094-B81B-572E3744A14B}" type="datetimeFigureOut">
               <a:rPr lang="pt-BR" smtClean="0"/>
-              <a:t>01/04/2021</a:t>
+              <a:t>03/04/2021</a:t>
             </a:fld>
             <a:endParaRPr lang="pt-BR"/>
           </a:p>
@@ -2557,7 +2557,7 @@
           <a:p>
             <a:fld id="{2E0DF6E3-1D5C-4094-B81B-572E3744A14B}" type="datetimeFigureOut">
               <a:rPr lang="pt-BR" smtClean="0"/>
-              <a:t>01/04/2021</a:t>
+              <a:t>03/04/2021</a:t>
             </a:fld>
             <a:endParaRPr lang="pt-BR"/>
           </a:p>
@@ -3355,7 +3355,10 @@
               <a:buAutoNum type="arabicPeriod" startAt="5"/>
             </a:pPr>
             <a:r>
-              <a:rPr lang="pt-BR" dirty="0"/>
+              <a:rPr lang="pt-BR" dirty="0">
+                <a:latin typeface="Arial" panose="020B0604020202020204" pitchFamily="34" charset="0"/>
+                <a:cs typeface="Arial" panose="020B0604020202020204" pitchFamily="34" charset="0"/>
+              </a:rPr>
               <a:t>Suprir produtos</a:t>
             </a:r>
           </a:p>
@@ -4635,7 +4638,7 @@
           <a:p>
             <a:pPr algn="ctr"/>
             <a:r>
-              <a:rPr lang="pt-BR" dirty="0">
+              <a:rPr lang="pt-BR" sz="1400" dirty="0">
                 <a:latin typeface="Arial" panose="020B0604020202020204" pitchFamily="34" charset="0"/>
                 <a:cs typeface="Arial" panose="020B0604020202020204" pitchFamily="34" charset="0"/>
               </a:rPr>
@@ -4741,7 +4744,21 @@
                 <a:latin typeface="Arial" panose="020B0604020202020204" pitchFamily="34" charset="0"/>
                 <a:cs typeface="Arial" panose="020B0604020202020204" pitchFamily="34" charset="0"/>
               </a:rPr>
-              <a:t>Criar pedido   </a:t>
+              <a:t>c</a:t>
+            </a:r>
+            <a:r>
+              <a:rPr lang="pt-BR" dirty="0" smtClean="0">
+                <a:latin typeface="Arial" panose="020B0604020202020204" pitchFamily="34" charset="0"/>
+                <a:cs typeface="Arial" panose="020B0604020202020204" pitchFamily="34" charset="0"/>
+              </a:rPr>
+              <a:t>riar </a:t>
+            </a:r>
+            <a:r>
+              <a:rPr lang="pt-BR" dirty="0">
+                <a:latin typeface="Arial" panose="020B0604020202020204" pitchFamily="34" charset="0"/>
+                <a:cs typeface="Arial" panose="020B0604020202020204" pitchFamily="34" charset="0"/>
+              </a:rPr>
+              <a:t>pedido   </a:t>
             </a:r>
           </a:p>
         </p:txBody>
@@ -5286,7 +5303,21 @@
                 <a:latin typeface="Arial" panose="020B0604020202020204" pitchFamily="34" charset="0"/>
                 <a:cs typeface="Arial" panose="020B0604020202020204" pitchFamily="34" charset="0"/>
               </a:rPr>
-              <a:t>Tratar devolução do pedido</a:t>
+              <a:t>t</a:t>
+            </a:r>
+            <a:r>
+              <a:rPr lang="pt-BR" dirty="0" smtClean="0">
+                <a:latin typeface="Arial" panose="020B0604020202020204" pitchFamily="34" charset="0"/>
+                <a:cs typeface="Arial" panose="020B0604020202020204" pitchFamily="34" charset="0"/>
+              </a:rPr>
+              <a:t>ratar </a:t>
+            </a:r>
+            <a:r>
+              <a:rPr lang="pt-BR" dirty="0">
+                <a:latin typeface="Arial" panose="020B0604020202020204" pitchFamily="34" charset="0"/>
+                <a:cs typeface="Arial" panose="020B0604020202020204" pitchFamily="34" charset="0"/>
+              </a:rPr>
+              <a:t>devolução do pedido</a:t>
             </a:r>
           </a:p>
         </p:txBody>
@@ -5544,7 +5575,7 @@
           <a:p>
             <a:pPr algn="ctr"/>
             <a:r>
-              <a:rPr lang="pt-BR" dirty="0">
+              <a:rPr lang="pt-BR" sz="1400" dirty="0">
                 <a:latin typeface="Arial" panose="020B0604020202020204" pitchFamily="34" charset="0"/>
                 <a:cs typeface="Arial" panose="020B0604020202020204" pitchFamily="34" charset="0"/>
               </a:rPr>
@@ -5650,7 +5681,21 @@
                 <a:latin typeface="Arial" panose="020B0604020202020204" pitchFamily="34" charset="0"/>
                 <a:cs typeface="Arial" panose="020B0604020202020204" pitchFamily="34" charset="0"/>
               </a:rPr>
-              <a:t>Abastecer produtos</a:t>
+              <a:t>a</a:t>
+            </a:r>
+            <a:r>
+              <a:rPr lang="pt-BR" dirty="0" smtClean="0">
+                <a:latin typeface="Arial" panose="020B0604020202020204" pitchFamily="34" charset="0"/>
+                <a:cs typeface="Arial" panose="020B0604020202020204" pitchFamily="34" charset="0"/>
+              </a:rPr>
+              <a:t>bastecer </a:t>
+            </a:r>
+            <a:r>
+              <a:rPr lang="pt-BR" dirty="0">
+                <a:latin typeface="Arial" panose="020B0604020202020204" pitchFamily="34" charset="0"/>
+                <a:cs typeface="Arial" panose="020B0604020202020204" pitchFamily="34" charset="0"/>
+              </a:rPr>
+              <a:t>produtos</a:t>
             </a:r>
           </a:p>
         </p:txBody>

</xml_diff>

<commit_message>
Modificações do 15 - 19
</commit_message>
<xml_diff>
--- a/Documentation/15._Arquitetura_de_Negócio_para_cada_Cenário.pptx
+++ b/Documentation/15._Arquitetura_de_Negócio_para_cada_Cenário.pptx
@@ -120,10 +120,150 @@
 <file path=ppt/revisionInfo.xml><?xml version="1.0" encoding="utf-8"?>
 <p1510:revInfo xmlns:a="http://schemas.openxmlformats.org/drawingml/2006/main" xmlns:r="http://schemas.openxmlformats.org/officeDocument/2006/relationships" xmlns:p1510="http://schemas.microsoft.com/office/powerpoint/2015/10/main">
   <p1510:revLst>
-    <p1510:client id="{63886680-FCDD-4E51-93B0-ED4D1FB90670}" v="2" dt="2021-02-26T02:05:11.903"/>
-    <p1510:client id="{E9194F02-3DCB-453D-928D-4FC038F4FD10}" v="13" dt="2021-02-26T00:07:08.106"/>
+    <p1510:client id="{E7C69A7C-A215-426B-8AAA-22D3B1BFACE3}" v="5" dt="2021-04-09T01:03:40.499"/>
   </p1510:revLst>
 </p1510:revInfo>
+</file>
+
+<file path=ppt/changesInfos/changesInfo1.xml><?xml version="1.0" encoding="utf-8"?>
+<pc:chgInfo xmlns:a="http://schemas.openxmlformats.org/drawingml/2006/main" xmlns:r="http://schemas.openxmlformats.org/officeDocument/2006/relationships" xmlns:ac="http://schemas.microsoft.com/office/drawing/2013/main/command" xmlns:pc="http://schemas.microsoft.com/office/powerpoint/2013/main/command">
+  <pc:docChgLst>
+    <pc:chgData name="Gyovane Souzza" userId="eed59d4ebf12600b" providerId="LiveId" clId="{E7C69A7C-A215-426B-8AAA-22D3B1BFACE3}"/>
+    <pc:docChg chg="undo custSel modSld">
+      <pc:chgData name="Gyovane Souzza" userId="eed59d4ebf12600b" providerId="LiveId" clId="{E7C69A7C-A215-426B-8AAA-22D3B1BFACE3}" dt="2021-04-09T01:03:55.745" v="39" actId="20577"/>
+      <pc:docMkLst>
+        <pc:docMk/>
+      </pc:docMkLst>
+      <pc:sldChg chg="addSp delSp modSp mod">
+        <pc:chgData name="Gyovane Souzza" userId="eed59d4ebf12600b" providerId="LiveId" clId="{E7C69A7C-A215-426B-8AAA-22D3B1BFACE3}" dt="2021-04-09T01:03:55.745" v="39" actId="20577"/>
+        <pc:sldMkLst>
+          <pc:docMk/>
+          <pc:sldMk cId="2367524892" sldId="259"/>
+        </pc:sldMkLst>
+        <pc:spChg chg="mod">
+          <ac:chgData name="Gyovane Souzza" userId="eed59d4ebf12600b" providerId="LiveId" clId="{E7C69A7C-A215-426B-8AAA-22D3B1BFACE3}" dt="2021-04-09T01:03:33.701" v="25" actId="14100"/>
+          <ac:spMkLst>
+            <pc:docMk/>
+            <pc:sldMk cId="2367524892" sldId="259"/>
+            <ac:spMk id="4" creationId="{00000000-0000-0000-0000-000000000000}"/>
+          </ac:spMkLst>
+        </pc:spChg>
+        <pc:spChg chg="mod">
+          <ac:chgData name="Gyovane Souzza" userId="eed59d4ebf12600b" providerId="LiveId" clId="{E7C69A7C-A215-426B-8AAA-22D3B1BFACE3}" dt="2021-04-09T01:02:25.871" v="11" actId="1076"/>
+          <ac:spMkLst>
+            <pc:docMk/>
+            <pc:sldMk cId="2367524892" sldId="259"/>
+            <ac:spMk id="5" creationId="{00000000-0000-0000-0000-000000000000}"/>
+          </ac:spMkLst>
+        </pc:spChg>
+        <pc:spChg chg="mod">
+          <ac:chgData name="Gyovane Souzza" userId="eed59d4ebf12600b" providerId="LiveId" clId="{E7C69A7C-A215-426B-8AAA-22D3B1BFACE3}" dt="2021-04-09T01:02:32.157" v="12" actId="14100"/>
+          <ac:spMkLst>
+            <pc:docMk/>
+            <pc:sldMk cId="2367524892" sldId="259"/>
+            <ac:spMk id="7" creationId="{00000000-0000-0000-0000-000000000000}"/>
+          </ac:spMkLst>
+        </pc:spChg>
+        <pc:spChg chg="mod">
+          <ac:chgData name="Gyovane Souzza" userId="eed59d4ebf12600b" providerId="LiveId" clId="{E7C69A7C-A215-426B-8AAA-22D3B1BFACE3}" dt="2021-04-09T01:02:25.871" v="11" actId="1076"/>
+          <ac:spMkLst>
+            <pc:docMk/>
+            <pc:sldMk cId="2367524892" sldId="259"/>
+            <ac:spMk id="8" creationId="{00000000-0000-0000-0000-000000000000}"/>
+          </ac:spMkLst>
+        </pc:spChg>
+        <pc:spChg chg="mod">
+          <ac:chgData name="Gyovane Souzza" userId="eed59d4ebf12600b" providerId="LiveId" clId="{E7C69A7C-A215-426B-8AAA-22D3B1BFACE3}" dt="2021-04-09T01:02:25.871" v="11" actId="1076"/>
+          <ac:spMkLst>
+            <pc:docMk/>
+            <pc:sldMk cId="2367524892" sldId="259"/>
+            <ac:spMk id="9" creationId="{00000000-0000-0000-0000-000000000000}"/>
+          </ac:spMkLst>
+        </pc:spChg>
+        <pc:spChg chg="mod">
+          <ac:chgData name="Gyovane Souzza" userId="eed59d4ebf12600b" providerId="LiveId" clId="{E7C69A7C-A215-426B-8AAA-22D3B1BFACE3}" dt="2021-04-09T01:02:34.498" v="13" actId="1076"/>
+          <ac:spMkLst>
+            <pc:docMk/>
+            <pc:sldMk cId="2367524892" sldId="259"/>
+            <ac:spMk id="10" creationId="{00000000-0000-0000-0000-000000000000}"/>
+          </ac:spMkLst>
+        </pc:spChg>
+        <pc:spChg chg="mod">
+          <ac:chgData name="Gyovane Souzza" userId="eed59d4ebf12600b" providerId="LiveId" clId="{E7C69A7C-A215-426B-8AAA-22D3B1BFACE3}" dt="2021-04-09T01:02:25.871" v="11" actId="1076"/>
+          <ac:spMkLst>
+            <pc:docMk/>
+            <pc:sldMk cId="2367524892" sldId="259"/>
+            <ac:spMk id="13" creationId="{E80196AD-6A41-4D1E-B413-2AD1E67D83DA}"/>
+          </ac:spMkLst>
+        </pc:spChg>
+        <pc:spChg chg="mod">
+          <ac:chgData name="Gyovane Souzza" userId="eed59d4ebf12600b" providerId="LiveId" clId="{E7C69A7C-A215-426B-8AAA-22D3B1BFACE3}" dt="2021-04-09T01:02:25.871" v="11" actId="1076"/>
+          <ac:spMkLst>
+            <pc:docMk/>
+            <pc:sldMk cId="2367524892" sldId="259"/>
+            <ac:spMk id="14" creationId="{E08A7210-0801-426D-BC7D-7B345C308957}"/>
+          </ac:spMkLst>
+        </pc:spChg>
+        <pc:spChg chg="add del mod">
+          <ac:chgData name="Gyovane Souzza" userId="eed59d4ebf12600b" providerId="LiveId" clId="{E7C69A7C-A215-426B-8AAA-22D3B1BFACE3}" dt="2021-04-09T01:03:36.765" v="27" actId="478"/>
+          <ac:spMkLst>
+            <pc:docMk/>
+            <pc:sldMk cId="2367524892" sldId="259"/>
+            <ac:spMk id="19" creationId="{E0A11D9F-60F8-4213-915F-992CD84E0C2E}"/>
+          </ac:spMkLst>
+        </pc:spChg>
+        <pc:spChg chg="add del mod">
+          <ac:chgData name="Gyovane Souzza" userId="eed59d4ebf12600b" providerId="LiveId" clId="{E7C69A7C-A215-426B-8AAA-22D3B1BFACE3}" dt="2021-04-09T01:03:26.802" v="22"/>
+          <ac:spMkLst>
+            <pc:docMk/>
+            <pc:sldMk cId="2367524892" sldId="259"/>
+            <ac:spMk id="20" creationId="{420CDE48-7727-4291-BED8-302961567FE8}"/>
+          </ac:spMkLst>
+        </pc:spChg>
+        <pc:spChg chg="add mod">
+          <ac:chgData name="Gyovane Souzza" userId="eed59d4ebf12600b" providerId="LiveId" clId="{E7C69A7C-A215-426B-8AAA-22D3B1BFACE3}" dt="2021-04-09T01:03:55.745" v="39" actId="20577"/>
+          <ac:spMkLst>
+            <pc:docMk/>
+            <pc:sldMk cId="2367524892" sldId="259"/>
+            <ac:spMk id="23" creationId="{A55927FF-5CCE-4580-97AD-62A4648F46D2}"/>
+          </ac:spMkLst>
+        </pc:spChg>
+        <pc:cxnChg chg="mod">
+          <ac:chgData name="Gyovane Souzza" userId="eed59d4ebf12600b" providerId="LiveId" clId="{E7C69A7C-A215-426B-8AAA-22D3B1BFACE3}" dt="2021-04-09T01:03:31.307" v="24" actId="14100"/>
+          <ac:cxnSpMkLst>
+            <pc:docMk/>
+            <pc:sldMk cId="2367524892" sldId="259"/>
+            <ac:cxnSpMk id="6" creationId="{00000000-0000-0000-0000-000000000000}"/>
+          </ac:cxnSpMkLst>
+        </pc:cxnChg>
+        <pc:cxnChg chg="mod">
+          <ac:chgData name="Gyovane Souzza" userId="eed59d4ebf12600b" providerId="LiveId" clId="{E7C69A7C-A215-426B-8AAA-22D3B1BFACE3}" dt="2021-04-09T01:02:34.498" v="13" actId="1076"/>
+          <ac:cxnSpMkLst>
+            <pc:docMk/>
+            <pc:sldMk cId="2367524892" sldId="259"/>
+            <ac:cxnSpMk id="12" creationId="{F1B6C749-6105-4250-9D96-3797FCC3AA4C}"/>
+          </ac:cxnSpMkLst>
+        </pc:cxnChg>
+        <pc:cxnChg chg="mod">
+          <ac:chgData name="Gyovane Souzza" userId="eed59d4ebf12600b" providerId="LiveId" clId="{E7C69A7C-A215-426B-8AAA-22D3B1BFACE3}" dt="2021-04-09T01:02:34.498" v="13" actId="1076"/>
+          <ac:cxnSpMkLst>
+            <pc:docMk/>
+            <pc:sldMk cId="2367524892" sldId="259"/>
+            <ac:cxnSpMk id="15" creationId="{296C4B52-6D73-4349-9414-E929A697FD84}"/>
+          </ac:cxnSpMkLst>
+        </pc:cxnChg>
+        <pc:cxnChg chg="add mod">
+          <ac:chgData name="Gyovane Souzza" userId="eed59d4ebf12600b" providerId="LiveId" clId="{E7C69A7C-A215-426B-8AAA-22D3B1BFACE3}" dt="2021-04-09T01:03:53.317" v="34" actId="1076"/>
+          <ac:cxnSpMkLst>
+            <pc:docMk/>
+            <pc:sldMk cId="2367524892" sldId="259"/>
+            <ac:cxnSpMk id="24" creationId="{BC6F058D-F013-4529-A509-591C143AB4F9}"/>
+          </ac:cxnSpMkLst>
+        </pc:cxnChg>
+      </pc:sldChg>
+    </pc:docChg>
+  </pc:docChgLst>
+</pc:chgInfo>
 </file>
 
 <file path=ppt/slideLayouts/slideLayout1.xml><?xml version="1.0" encoding="utf-8"?>
@@ -255,7 +395,7 @@
           <a:p>
             <a:fld id="{2E0DF6E3-1D5C-4094-B81B-572E3744A14B}" type="datetimeFigureOut">
               <a:rPr lang="pt-BR" smtClean="0"/>
-              <a:t>03/04/2021</a:t>
+              <a:t>08/04/2021</a:t>
             </a:fld>
             <a:endParaRPr lang="pt-BR"/>
           </a:p>
@@ -423,7 +563,7 @@
           <a:p>
             <a:fld id="{2E0DF6E3-1D5C-4094-B81B-572E3744A14B}" type="datetimeFigureOut">
               <a:rPr lang="pt-BR" smtClean="0"/>
-              <a:t>03/04/2021</a:t>
+              <a:t>08/04/2021</a:t>
             </a:fld>
             <a:endParaRPr lang="pt-BR"/>
           </a:p>
@@ -601,7 +741,7 @@
           <a:p>
             <a:fld id="{2E0DF6E3-1D5C-4094-B81B-572E3744A14B}" type="datetimeFigureOut">
               <a:rPr lang="pt-BR" smtClean="0"/>
-              <a:t>03/04/2021</a:t>
+              <a:t>08/04/2021</a:t>
             </a:fld>
             <a:endParaRPr lang="pt-BR"/>
           </a:p>
@@ -769,7 +909,7 @@
           <a:p>
             <a:fld id="{2E0DF6E3-1D5C-4094-B81B-572E3744A14B}" type="datetimeFigureOut">
               <a:rPr lang="pt-BR" smtClean="0"/>
-              <a:t>03/04/2021</a:t>
+              <a:t>08/04/2021</a:t>
             </a:fld>
             <a:endParaRPr lang="pt-BR"/>
           </a:p>
@@ -1014,7 +1154,7 @@
           <a:p>
             <a:fld id="{2E0DF6E3-1D5C-4094-B81B-572E3744A14B}" type="datetimeFigureOut">
               <a:rPr lang="pt-BR" smtClean="0"/>
-              <a:t>03/04/2021</a:t>
+              <a:t>08/04/2021</a:t>
             </a:fld>
             <a:endParaRPr lang="pt-BR"/>
           </a:p>
@@ -1243,7 +1383,7 @@
           <a:p>
             <a:fld id="{2E0DF6E3-1D5C-4094-B81B-572E3744A14B}" type="datetimeFigureOut">
               <a:rPr lang="pt-BR" smtClean="0"/>
-              <a:t>03/04/2021</a:t>
+              <a:t>08/04/2021</a:t>
             </a:fld>
             <a:endParaRPr lang="pt-BR"/>
           </a:p>
@@ -1607,7 +1747,7 @@
           <a:p>
             <a:fld id="{2E0DF6E3-1D5C-4094-B81B-572E3744A14B}" type="datetimeFigureOut">
               <a:rPr lang="pt-BR" smtClean="0"/>
-              <a:t>03/04/2021</a:t>
+              <a:t>08/04/2021</a:t>
             </a:fld>
             <a:endParaRPr lang="pt-BR"/>
           </a:p>
@@ -1724,7 +1864,7 @@
           <a:p>
             <a:fld id="{2E0DF6E3-1D5C-4094-B81B-572E3744A14B}" type="datetimeFigureOut">
               <a:rPr lang="pt-BR" smtClean="0"/>
-              <a:t>03/04/2021</a:t>
+              <a:t>08/04/2021</a:t>
             </a:fld>
             <a:endParaRPr lang="pt-BR"/>
           </a:p>
@@ -1819,7 +1959,7 @@
           <a:p>
             <a:fld id="{2E0DF6E3-1D5C-4094-B81B-572E3744A14B}" type="datetimeFigureOut">
               <a:rPr lang="pt-BR" smtClean="0"/>
-              <a:t>03/04/2021</a:t>
+              <a:t>08/04/2021</a:t>
             </a:fld>
             <a:endParaRPr lang="pt-BR"/>
           </a:p>
@@ -2094,7 +2234,7 @@
           <a:p>
             <a:fld id="{2E0DF6E3-1D5C-4094-B81B-572E3744A14B}" type="datetimeFigureOut">
               <a:rPr lang="pt-BR" smtClean="0"/>
-              <a:t>03/04/2021</a:t>
+              <a:t>08/04/2021</a:t>
             </a:fld>
             <a:endParaRPr lang="pt-BR"/>
           </a:p>
@@ -2346,7 +2486,7 @@
           <a:p>
             <a:fld id="{2E0DF6E3-1D5C-4094-B81B-572E3744A14B}" type="datetimeFigureOut">
               <a:rPr lang="pt-BR" smtClean="0"/>
-              <a:t>03/04/2021</a:t>
+              <a:t>08/04/2021</a:t>
             </a:fld>
             <a:endParaRPr lang="pt-BR"/>
           </a:p>
@@ -2557,7 +2697,7 @@
           <a:p>
             <a:fld id="{2E0DF6E3-1D5C-4094-B81B-572E3744A14B}" type="datetimeFigureOut">
               <a:rPr lang="pt-BR" smtClean="0"/>
-              <a:t>03/04/2021</a:t>
+              <a:t>08/04/2021</a:t>
             </a:fld>
             <a:endParaRPr lang="pt-BR"/>
           </a:p>
@@ -4445,8 +4585,8 @@
         </p:nvSpPr>
         <p:spPr>
           <a:xfrm>
-            <a:off x="2018523" y="3218327"/>
-            <a:ext cx="1617784" cy="1177374"/>
+            <a:off x="638909" y="3346695"/>
+            <a:ext cx="1598940" cy="1034494"/>
           </a:xfrm>
           <a:prstGeom prst="rect">
             <a:avLst/>
@@ -4491,7 +4631,7 @@
         </p:nvSpPr>
         <p:spPr>
           <a:xfrm>
-            <a:off x="7030050" y="2178660"/>
+            <a:off x="4216511" y="2149636"/>
             <a:ext cx="4264271" cy="400110"/>
           </a:xfrm>
           <a:prstGeom prst="rect">
@@ -4521,15 +4661,14 @@
           <p:cNvPr id="6" name="Conector reto 5"/>
           <p:cNvCxnSpPr>
             <a:cxnSpLocks/>
-            <a:stCxn id="4" idx="3"/>
             <a:endCxn id="8" idx="2"/>
           </p:cNvCxnSpPr>
           <p:nvPr/>
         </p:nvCxnSpPr>
         <p:spPr>
           <a:xfrm>
-            <a:off x="3636307" y="3807014"/>
-            <a:ext cx="3393743" cy="46221"/>
+            <a:off x="1868624" y="3792502"/>
+            <a:ext cx="2347887" cy="31709"/>
           </a:xfrm>
           <a:prstGeom prst="line">
             <a:avLst/>
@@ -4558,8 +4697,8 @@
         </p:nvSpPr>
         <p:spPr>
           <a:xfrm>
-            <a:off x="6570784" y="1954153"/>
-            <a:ext cx="5386754" cy="3827188"/>
+            <a:off x="3757245" y="1925129"/>
+            <a:ext cx="5237286" cy="3749430"/>
           </a:xfrm>
           <a:prstGeom prst="roundRect">
             <a:avLst/>
@@ -4609,7 +4748,7 @@
         </p:nvSpPr>
         <p:spPr>
           <a:xfrm>
-            <a:off x="7030050" y="3218327"/>
+            <a:off x="4216511" y="3189303"/>
             <a:ext cx="2272899" cy="1015853"/>
           </a:xfrm>
           <a:prstGeom prst="cube">
@@ -4655,7 +4794,7 @@
         </p:nvSpPr>
         <p:spPr>
           <a:xfrm>
-            <a:off x="7196400" y="3910751"/>
+            <a:off x="4382861" y="3881727"/>
             <a:ext cx="1745991" cy="338554"/>
           </a:xfrm>
           <a:prstGeom prst="rect">
@@ -4687,7 +4826,7 @@
         </p:nvSpPr>
         <p:spPr>
           <a:xfrm>
-            <a:off x="8378801" y="4789183"/>
+            <a:off x="5565262" y="4622738"/>
             <a:ext cx="1741054" cy="914400"/>
           </a:xfrm>
           <a:prstGeom prst="roundRect">
@@ -4744,21 +4883,7 @@
                 <a:latin typeface="Arial" panose="020B0604020202020204" pitchFamily="34" charset="0"/>
                 <a:cs typeface="Arial" panose="020B0604020202020204" pitchFamily="34" charset="0"/>
               </a:rPr>
-              <a:t>c</a:t>
-            </a:r>
-            <a:r>
-              <a:rPr lang="pt-BR" dirty="0" smtClean="0">
-                <a:latin typeface="Arial" panose="020B0604020202020204" pitchFamily="34" charset="0"/>
-                <a:cs typeface="Arial" panose="020B0604020202020204" pitchFamily="34" charset="0"/>
-              </a:rPr>
-              <a:t>riar </a:t>
-            </a:r>
-            <a:r>
-              <a:rPr lang="pt-BR" dirty="0">
-                <a:latin typeface="Arial" panose="020B0604020202020204" pitchFamily="34" charset="0"/>
-                <a:cs typeface="Arial" panose="020B0604020202020204" pitchFamily="34" charset="0"/>
-              </a:rPr>
-              <a:t>pedido   </a:t>
+              <a:t>Tratar pedido   </a:t>
             </a:r>
           </a:p>
         </p:txBody>
@@ -4781,8 +4906,8 @@
         </p:nvCxnSpPr>
         <p:spPr>
           <a:xfrm>
-            <a:off x="8069396" y="4249305"/>
-            <a:ext cx="1179932" cy="539878"/>
+            <a:off x="5255857" y="4220281"/>
+            <a:ext cx="1179932" cy="402457"/>
           </a:xfrm>
           <a:prstGeom prst="line">
             <a:avLst/>
@@ -4817,7 +4942,7 @@
         </p:nvSpPr>
         <p:spPr>
           <a:xfrm>
-            <a:off x="9249328" y="3218327"/>
+            <a:off x="6435789" y="3189303"/>
             <a:ext cx="2272899" cy="1015853"/>
           </a:xfrm>
           <a:prstGeom prst="cube">
@@ -4869,7 +4994,7 @@
         </p:nvSpPr>
         <p:spPr>
           <a:xfrm>
-            <a:off x="9415678" y="3910751"/>
+            <a:off x="6602139" y="3881727"/>
             <a:ext cx="1745991" cy="338554"/>
           </a:xfrm>
           <a:prstGeom prst="rect">
@@ -4911,8 +5036,100 @@
         </p:nvCxnSpPr>
         <p:spPr>
           <a:xfrm flipH="1">
-            <a:off x="9249328" y="4249305"/>
-            <a:ext cx="1039346" cy="539878"/>
+            <a:off x="6435789" y="4220281"/>
+            <a:ext cx="1039346" cy="402457"/>
+          </a:xfrm>
+          <a:prstGeom prst="line">
+            <a:avLst/>
+          </a:prstGeom>
+        </p:spPr>
+        <p:style>
+          <a:lnRef idx="1">
+            <a:schemeClr val="accent1"/>
+          </a:lnRef>
+          <a:fillRef idx="0">
+            <a:schemeClr val="accent1"/>
+          </a:fillRef>
+          <a:effectRef idx="0">
+            <a:schemeClr val="accent1"/>
+          </a:effectRef>
+          <a:fontRef idx="minor">
+            <a:schemeClr val="tx1"/>
+          </a:fontRef>
+        </p:style>
+      </p:cxnSp>
+      <p:sp>
+        <p:nvSpPr>
+          <p:cNvPr id="23" name="Retângulo 22">
+            <a:extLst>
+              <a:ext uri="{FF2B5EF4-FFF2-40B4-BE49-F238E27FC236}">
+                <a16:creationId xmlns:a16="http://schemas.microsoft.com/office/drawing/2014/main" id="{A55927FF-5CCE-4580-97AD-62A4648F46D2}"/>
+              </a:ext>
+            </a:extLst>
+          </p:cNvPr>
+          <p:cNvSpPr/>
+          <p:nvPr/>
+        </p:nvSpPr>
+        <p:spPr>
+          <a:xfrm>
+            <a:off x="10128496" y="3082739"/>
+            <a:ext cx="1598940" cy="1034494"/>
+          </a:xfrm>
+          <a:prstGeom prst="rect">
+            <a:avLst/>
+          </a:prstGeom>
+        </p:spPr>
+        <p:style>
+          <a:lnRef idx="2">
+            <a:schemeClr val="accent1">
+              <a:shade val="50000"/>
+            </a:schemeClr>
+          </a:lnRef>
+          <a:fillRef idx="1">
+            <a:schemeClr val="accent1"/>
+          </a:fillRef>
+          <a:effectRef idx="0">
+            <a:schemeClr val="accent1"/>
+          </a:effectRef>
+          <a:fontRef idx="minor">
+            <a:schemeClr val="lt1"/>
+          </a:fontRef>
+        </p:style>
+        <p:txBody>
+          <a:bodyPr rtlCol="0" anchor="ctr"/>
+          <a:lstStyle/>
+          <a:p>
+            <a:pPr algn="ctr"/>
+            <a:r>
+              <a:rPr lang="pt-BR" dirty="0">
+                <a:latin typeface="Arial" panose="020B0604020202020204" pitchFamily="34" charset="0"/>
+                <a:cs typeface="Arial" panose="020B0604020202020204" pitchFamily="34" charset="0"/>
+              </a:rPr>
+              <a:t>Banco </a:t>
+            </a:r>
+          </a:p>
+        </p:txBody>
+      </p:sp>
+      <p:cxnSp>
+        <p:nvCxnSpPr>
+          <p:cNvPr id="24" name="Conector reto 23">
+            <a:extLst>
+              <a:ext uri="{FF2B5EF4-FFF2-40B4-BE49-F238E27FC236}">
+                <a16:creationId xmlns:a16="http://schemas.microsoft.com/office/drawing/2014/main" id="{BC6F058D-F013-4529-A509-591C143AB4F9}"/>
+              </a:ext>
+            </a:extLst>
+          </p:cNvPr>
+          <p:cNvCxnSpPr>
+            <a:cxnSpLocks/>
+            <a:stCxn id="13" idx="5"/>
+            <a:endCxn id="23" idx="1"/>
+          </p:cNvCxnSpPr>
+          <p:nvPr/>
+        </p:nvCxnSpPr>
+        <p:spPr>
+          <a:xfrm>
+            <a:off x="8708688" y="3570248"/>
+            <a:ext cx="1419808" cy="29738"/>
           </a:xfrm>
           <a:prstGeom prst="line">
             <a:avLst/>
@@ -5303,21 +5520,7 @@
                 <a:latin typeface="Arial" panose="020B0604020202020204" pitchFamily="34" charset="0"/>
                 <a:cs typeface="Arial" panose="020B0604020202020204" pitchFamily="34" charset="0"/>
               </a:rPr>
-              <a:t>t</a:t>
-            </a:r>
-            <a:r>
-              <a:rPr lang="pt-BR" dirty="0" smtClean="0">
-                <a:latin typeface="Arial" panose="020B0604020202020204" pitchFamily="34" charset="0"/>
-                <a:cs typeface="Arial" panose="020B0604020202020204" pitchFamily="34" charset="0"/>
-              </a:rPr>
-              <a:t>ratar </a:t>
-            </a:r>
-            <a:r>
-              <a:rPr lang="pt-BR" dirty="0">
-                <a:latin typeface="Arial" panose="020B0604020202020204" pitchFamily="34" charset="0"/>
-                <a:cs typeface="Arial" panose="020B0604020202020204" pitchFamily="34" charset="0"/>
-              </a:rPr>
-              <a:t>devolução do pedido</a:t>
+              <a:t>tratar devolução do pedido</a:t>
             </a:r>
           </a:p>
         </p:txBody>
@@ -5681,21 +5884,7 @@
                 <a:latin typeface="Arial" panose="020B0604020202020204" pitchFamily="34" charset="0"/>
                 <a:cs typeface="Arial" panose="020B0604020202020204" pitchFamily="34" charset="0"/>
               </a:rPr>
-              <a:t>a</a:t>
-            </a:r>
-            <a:r>
-              <a:rPr lang="pt-BR" dirty="0" smtClean="0">
-                <a:latin typeface="Arial" panose="020B0604020202020204" pitchFamily="34" charset="0"/>
-                <a:cs typeface="Arial" panose="020B0604020202020204" pitchFamily="34" charset="0"/>
-              </a:rPr>
-              <a:t>bastecer </a:t>
-            </a:r>
-            <a:r>
-              <a:rPr lang="pt-BR" dirty="0">
-                <a:latin typeface="Arial" panose="020B0604020202020204" pitchFamily="34" charset="0"/>
-                <a:cs typeface="Arial" panose="020B0604020202020204" pitchFamily="34" charset="0"/>
-              </a:rPr>
-              <a:t>produtos</a:t>
+              <a:t>abastecer produtos</a:t>
             </a:r>
           </a:p>
         </p:txBody>

</xml_diff>

<commit_message>
rev. 15 - 19 completa
</commit_message>
<xml_diff>
--- a/Documentation/15._Arquitetura_de_Negócio_para_cada_Cenário.pptx
+++ b/Documentation/15._Arquitetura_de_Negócio_para_cada_Cenário.pptx
@@ -120,7 +120,7 @@
 <file path=ppt/revisionInfo.xml><?xml version="1.0" encoding="utf-8"?>
 <p1510:revInfo xmlns:a="http://schemas.openxmlformats.org/drawingml/2006/main" xmlns:r="http://schemas.openxmlformats.org/officeDocument/2006/relationships" xmlns:p1510="http://schemas.microsoft.com/office/powerpoint/2015/10/main">
   <p1510:revLst>
-    <p1510:client id="{E7C69A7C-A215-426B-8AAA-22D3B1BFACE3}" v="5" dt="2021-04-09T01:03:40.499"/>
+    <p1510:client id="{E7C69A7C-A215-426B-8AAA-22D3B1BFACE3}" v="7" dt="2021-04-09T23:26:11.040"/>
   </p1510:revLst>
 </p1510:revInfo>
 </file>
@@ -130,12 +130,12 @@
   <pc:docChgLst>
     <pc:chgData name="Gyovane Souzza" userId="eed59d4ebf12600b" providerId="LiveId" clId="{E7C69A7C-A215-426B-8AAA-22D3B1BFACE3}"/>
     <pc:docChg chg="undo custSel modSld">
-      <pc:chgData name="Gyovane Souzza" userId="eed59d4ebf12600b" providerId="LiveId" clId="{E7C69A7C-A215-426B-8AAA-22D3B1BFACE3}" dt="2021-04-09T01:03:55.745" v="39" actId="20577"/>
+      <pc:chgData name="Gyovane Souzza" userId="eed59d4ebf12600b" providerId="LiveId" clId="{E7C69A7C-A215-426B-8AAA-22D3B1BFACE3}" dt="2021-04-09T23:26:21.154" v="55" actId="1076"/>
       <pc:docMkLst>
         <pc:docMk/>
       </pc:docMkLst>
       <pc:sldChg chg="addSp delSp modSp mod">
-        <pc:chgData name="Gyovane Souzza" userId="eed59d4ebf12600b" providerId="LiveId" clId="{E7C69A7C-A215-426B-8AAA-22D3B1BFACE3}" dt="2021-04-09T01:03:55.745" v="39" actId="20577"/>
+        <pc:chgData name="Gyovane Souzza" userId="eed59d4ebf12600b" providerId="LiveId" clId="{E7C69A7C-A215-426B-8AAA-22D3B1BFACE3}" dt="2021-04-09T23:26:11.040" v="54"/>
         <pc:sldMkLst>
           <pc:docMk/>
           <pc:sldMk cId="2367524892" sldId="259"/>
@@ -189,7 +189,7 @@
           </ac:spMkLst>
         </pc:spChg>
         <pc:spChg chg="mod">
-          <ac:chgData name="Gyovane Souzza" userId="eed59d4ebf12600b" providerId="LiveId" clId="{E7C69A7C-A215-426B-8AAA-22D3B1BFACE3}" dt="2021-04-09T01:02:25.871" v="11" actId="1076"/>
+          <ac:chgData name="Gyovane Souzza" userId="eed59d4ebf12600b" providerId="LiveId" clId="{E7C69A7C-A215-426B-8AAA-22D3B1BFACE3}" dt="2021-04-09T23:25:55.001" v="42" actId="1076"/>
           <ac:spMkLst>
             <pc:docMk/>
             <pc:sldMk cId="2367524892" sldId="259"/>
@@ -252,12 +252,43 @@
             <ac:cxnSpMk id="15" creationId="{296C4B52-6D73-4349-9414-E929A697FD84}"/>
           </ac:cxnSpMkLst>
         </pc:cxnChg>
+        <pc:cxnChg chg="add del mod">
+          <ac:chgData name="Gyovane Souzza" userId="eed59d4ebf12600b" providerId="LiveId" clId="{E7C69A7C-A215-426B-8AAA-22D3B1BFACE3}" dt="2021-04-09T23:26:11.040" v="54"/>
+          <ac:cxnSpMkLst>
+            <pc:docMk/>
+            <pc:sldMk cId="2367524892" sldId="259"/>
+            <ac:cxnSpMk id="19" creationId="{923BF198-01F9-4CA5-A549-DD656189D3DA}"/>
+          </ac:cxnSpMkLst>
+        </pc:cxnChg>
         <pc:cxnChg chg="add mod">
-          <ac:chgData name="Gyovane Souzza" userId="eed59d4ebf12600b" providerId="LiveId" clId="{E7C69A7C-A215-426B-8AAA-22D3B1BFACE3}" dt="2021-04-09T01:03:53.317" v="34" actId="1076"/>
+          <ac:chgData name="Gyovane Souzza" userId="eed59d4ebf12600b" providerId="LiveId" clId="{E7C69A7C-A215-426B-8AAA-22D3B1BFACE3}" dt="2021-04-09T23:26:10.434" v="53" actId="1076"/>
           <ac:cxnSpMkLst>
             <pc:docMk/>
             <pc:sldMk cId="2367524892" sldId="259"/>
             <ac:cxnSpMk id="24" creationId="{BC6F058D-F013-4529-A509-591C143AB4F9}"/>
+          </ac:cxnSpMkLst>
+        </pc:cxnChg>
+      </pc:sldChg>
+      <pc:sldChg chg="modSp mod">
+        <pc:chgData name="Gyovane Souzza" userId="eed59d4ebf12600b" providerId="LiveId" clId="{E7C69A7C-A215-426B-8AAA-22D3B1BFACE3}" dt="2021-04-09T23:26:21.154" v="55" actId="1076"/>
+        <pc:sldMkLst>
+          <pc:docMk/>
+          <pc:sldMk cId="226422873" sldId="264"/>
+        </pc:sldMkLst>
+        <pc:spChg chg="mod">
+          <ac:chgData name="Gyovane Souzza" userId="eed59d4ebf12600b" providerId="LiveId" clId="{E7C69A7C-A215-426B-8AAA-22D3B1BFACE3}" dt="2021-04-09T23:26:21.154" v="55" actId="1076"/>
+          <ac:spMkLst>
+            <pc:docMk/>
+            <pc:sldMk cId="226422873" sldId="264"/>
+            <ac:spMk id="13" creationId="{092E5AF6-1F3B-42C0-8997-B4B0787C12CB}"/>
+          </ac:spMkLst>
+        </pc:spChg>
+        <pc:cxnChg chg="mod">
+          <ac:chgData name="Gyovane Souzza" userId="eed59d4ebf12600b" providerId="LiveId" clId="{E7C69A7C-A215-426B-8AAA-22D3B1BFACE3}" dt="2021-04-09T23:26:21.154" v="55" actId="1076"/>
+          <ac:cxnSpMkLst>
+            <pc:docMk/>
+            <pc:sldMk cId="226422873" sldId="264"/>
+            <ac:cxnSpMk id="19" creationId="{8C1F429A-FB78-4A88-AC8F-86D6FB395FC4}"/>
           </ac:cxnSpMkLst>
         </pc:cxnChg>
       </pc:sldChg>
@@ -395,7 +426,7 @@
           <a:p>
             <a:fld id="{2E0DF6E3-1D5C-4094-B81B-572E3744A14B}" type="datetimeFigureOut">
               <a:rPr lang="pt-BR" smtClean="0"/>
-              <a:t>08/04/2021</a:t>
+              <a:t>09/04/2021</a:t>
             </a:fld>
             <a:endParaRPr lang="pt-BR"/>
           </a:p>
@@ -563,7 +594,7 @@
           <a:p>
             <a:fld id="{2E0DF6E3-1D5C-4094-B81B-572E3744A14B}" type="datetimeFigureOut">
               <a:rPr lang="pt-BR" smtClean="0"/>
-              <a:t>08/04/2021</a:t>
+              <a:t>09/04/2021</a:t>
             </a:fld>
             <a:endParaRPr lang="pt-BR"/>
           </a:p>
@@ -741,7 +772,7 @@
           <a:p>
             <a:fld id="{2E0DF6E3-1D5C-4094-B81B-572E3744A14B}" type="datetimeFigureOut">
               <a:rPr lang="pt-BR" smtClean="0"/>
-              <a:t>08/04/2021</a:t>
+              <a:t>09/04/2021</a:t>
             </a:fld>
             <a:endParaRPr lang="pt-BR"/>
           </a:p>
@@ -909,7 +940,7 @@
           <a:p>
             <a:fld id="{2E0DF6E3-1D5C-4094-B81B-572E3744A14B}" type="datetimeFigureOut">
               <a:rPr lang="pt-BR" smtClean="0"/>
-              <a:t>08/04/2021</a:t>
+              <a:t>09/04/2021</a:t>
             </a:fld>
             <a:endParaRPr lang="pt-BR"/>
           </a:p>
@@ -1154,7 +1185,7 @@
           <a:p>
             <a:fld id="{2E0DF6E3-1D5C-4094-B81B-572E3744A14B}" type="datetimeFigureOut">
               <a:rPr lang="pt-BR" smtClean="0"/>
-              <a:t>08/04/2021</a:t>
+              <a:t>09/04/2021</a:t>
             </a:fld>
             <a:endParaRPr lang="pt-BR"/>
           </a:p>
@@ -1383,7 +1414,7 @@
           <a:p>
             <a:fld id="{2E0DF6E3-1D5C-4094-B81B-572E3744A14B}" type="datetimeFigureOut">
               <a:rPr lang="pt-BR" smtClean="0"/>
-              <a:t>08/04/2021</a:t>
+              <a:t>09/04/2021</a:t>
             </a:fld>
             <a:endParaRPr lang="pt-BR"/>
           </a:p>
@@ -1747,7 +1778,7 @@
           <a:p>
             <a:fld id="{2E0DF6E3-1D5C-4094-B81B-572E3744A14B}" type="datetimeFigureOut">
               <a:rPr lang="pt-BR" smtClean="0"/>
-              <a:t>08/04/2021</a:t>
+              <a:t>09/04/2021</a:t>
             </a:fld>
             <a:endParaRPr lang="pt-BR"/>
           </a:p>
@@ -1864,7 +1895,7 @@
           <a:p>
             <a:fld id="{2E0DF6E3-1D5C-4094-B81B-572E3744A14B}" type="datetimeFigureOut">
               <a:rPr lang="pt-BR" smtClean="0"/>
-              <a:t>08/04/2021</a:t>
+              <a:t>09/04/2021</a:t>
             </a:fld>
             <a:endParaRPr lang="pt-BR"/>
           </a:p>
@@ -1959,7 +1990,7 @@
           <a:p>
             <a:fld id="{2E0DF6E3-1D5C-4094-B81B-572E3744A14B}" type="datetimeFigureOut">
               <a:rPr lang="pt-BR" smtClean="0"/>
-              <a:t>08/04/2021</a:t>
+              <a:t>09/04/2021</a:t>
             </a:fld>
             <a:endParaRPr lang="pt-BR"/>
           </a:p>
@@ -2234,7 +2265,7 @@
           <a:p>
             <a:fld id="{2E0DF6E3-1D5C-4094-B81B-572E3744A14B}" type="datetimeFigureOut">
               <a:rPr lang="pt-BR" smtClean="0"/>
-              <a:t>08/04/2021</a:t>
+              <a:t>09/04/2021</a:t>
             </a:fld>
             <a:endParaRPr lang="pt-BR"/>
           </a:p>
@@ -2486,7 +2517,7 @@
           <a:p>
             <a:fld id="{2E0DF6E3-1D5C-4094-B81B-572E3744A14B}" type="datetimeFigureOut">
               <a:rPr lang="pt-BR" smtClean="0"/>
-              <a:t>08/04/2021</a:t>
+              <a:t>09/04/2021</a:t>
             </a:fld>
             <a:endParaRPr lang="pt-BR"/>
           </a:p>
@@ -2697,7 +2728,7 @@
           <a:p>
             <a:fld id="{2E0DF6E3-1D5C-4094-B81B-572E3744A14B}" type="datetimeFigureOut">
               <a:rPr lang="pt-BR" smtClean="0"/>
-              <a:t>08/04/2021</a:t>
+              <a:t>09/04/2021</a:t>
             </a:fld>
             <a:endParaRPr lang="pt-BR"/>
           </a:p>
@@ -4942,7 +4973,7 @@
         </p:nvSpPr>
         <p:spPr>
           <a:xfrm>
-            <a:off x="6435789" y="3189303"/>
+            <a:off x="6435789" y="3196865"/>
             <a:ext cx="2272899" cy="1015853"/>
           </a:xfrm>
           <a:prstGeom prst="cube">
@@ -5128,8 +5159,8 @@
         </p:nvCxnSpPr>
         <p:spPr>
           <a:xfrm>
-            <a:off x="8708688" y="3570248"/>
-            <a:ext cx="1419808" cy="29738"/>
+            <a:off x="8708688" y="3577810"/>
+            <a:ext cx="1419808" cy="22176"/>
           </a:xfrm>
           <a:prstGeom prst="line">
             <a:avLst/>
@@ -5993,7 +6024,7 @@
         </p:nvSpPr>
         <p:spPr>
           <a:xfrm>
-            <a:off x="8417149" y="3160493"/>
+            <a:off x="8338274" y="3151701"/>
             <a:ext cx="2272899" cy="1015853"/>
           </a:xfrm>
           <a:prstGeom prst="cube">
@@ -6086,7 +6117,7 @@
         </p:nvCxnSpPr>
         <p:spPr>
           <a:xfrm>
-            <a:off x="8250908" y="3795401"/>
+            <a:off x="8172033" y="3786609"/>
             <a:ext cx="166241" cy="0"/>
           </a:xfrm>
           <a:prstGeom prst="line">

</xml_diff>

<commit_message>
[ATUALIZAÇÂO] - Art 15.
</commit_message>
<xml_diff>
--- a/Documentation/15._Arquitetura_de_Negócio_para_cada_Cenário.pptx
+++ b/Documentation/15._Arquitetura_de_Negócio_para_cada_Cenário.pptx
@@ -8,9 +8,10 @@
     <p:sldId id="257" r:id="rId2"/>
     <p:sldId id="258" r:id="rId3"/>
     <p:sldId id="266" r:id="rId4"/>
-    <p:sldId id="259" r:id="rId5"/>
-    <p:sldId id="262" r:id="rId6"/>
-    <p:sldId id="264" r:id="rId7"/>
+    <p:sldId id="268" r:id="rId5"/>
+    <p:sldId id="269" r:id="rId6"/>
+    <p:sldId id="262" r:id="rId7"/>
+    <p:sldId id="264" r:id="rId8"/>
   </p:sldIdLst>
   <p:sldSz cx="12192000" cy="6858000"/>
   <p:notesSz cx="6858000" cy="9144000"/>
@@ -120,7 +121,7 @@
 <file path=ppt/revisionInfo.xml><?xml version="1.0" encoding="utf-8"?>
 <p1510:revInfo xmlns:a="http://schemas.openxmlformats.org/drawingml/2006/main" xmlns:r="http://schemas.openxmlformats.org/officeDocument/2006/relationships" xmlns:p1510="http://schemas.microsoft.com/office/powerpoint/2015/10/main">
   <p1510:revLst>
-    <p1510:client id="{E7C69A7C-A215-426B-8AAA-22D3B1BFACE3}" v="7" dt="2021-04-09T23:26:11.040"/>
+    <p1510:client id="{E7C69A7C-A215-426B-8AAA-22D3B1BFACE3}" v="21" dt="2021-04-16T23:14:36.853"/>
   </p1510:revLst>
 </p1510:revInfo>
 </file>
@@ -129,13 +130,115 @@
 <pc:chgInfo xmlns:a="http://schemas.openxmlformats.org/drawingml/2006/main" xmlns:r="http://schemas.openxmlformats.org/officeDocument/2006/relationships" xmlns:ac="http://schemas.microsoft.com/office/drawing/2013/main/command" xmlns:pc="http://schemas.microsoft.com/office/powerpoint/2013/main/command">
   <pc:docChgLst>
     <pc:chgData name="Gyovane Souzza" userId="eed59d4ebf12600b" providerId="LiveId" clId="{E7C69A7C-A215-426B-8AAA-22D3B1BFACE3}"/>
-    <pc:docChg chg="undo custSel modSld">
-      <pc:chgData name="Gyovane Souzza" userId="eed59d4ebf12600b" providerId="LiveId" clId="{E7C69A7C-A215-426B-8AAA-22D3B1BFACE3}" dt="2021-04-09T23:26:21.154" v="55" actId="1076"/>
+    <pc:docChg chg="undo custSel addSld delSld modSld">
+      <pc:chgData name="Gyovane Souzza" userId="eed59d4ebf12600b" providerId="LiveId" clId="{E7C69A7C-A215-426B-8AAA-22D3B1BFACE3}" dt="2021-04-16T23:21:49.552" v="412" actId="20577"/>
       <pc:docMkLst>
         <pc:docMk/>
       </pc:docMkLst>
-      <pc:sldChg chg="addSp delSp modSp mod">
-        <pc:chgData name="Gyovane Souzza" userId="eed59d4ebf12600b" providerId="LiveId" clId="{E7C69A7C-A215-426B-8AAA-22D3B1BFACE3}" dt="2021-04-09T23:26:11.040" v="54"/>
+      <pc:sldChg chg="modSp mod">
+        <pc:chgData name="Gyovane Souzza" userId="eed59d4ebf12600b" providerId="LiveId" clId="{E7C69A7C-A215-426B-8AAA-22D3B1BFACE3}" dt="2021-04-16T23:01:32.404" v="230" actId="11"/>
+        <pc:sldMkLst>
+          <pc:docMk/>
+          <pc:sldMk cId="2438810021" sldId="257"/>
+        </pc:sldMkLst>
+        <pc:spChg chg="mod">
+          <ac:chgData name="Gyovane Souzza" userId="eed59d4ebf12600b" providerId="LiveId" clId="{E7C69A7C-A215-426B-8AAA-22D3B1BFACE3}" dt="2021-04-16T23:01:15.041" v="229" actId="20577"/>
+          <ac:spMkLst>
+            <pc:docMk/>
+            <pc:sldMk cId="2438810021" sldId="257"/>
+            <ac:spMk id="9" creationId="{00000000-0000-0000-0000-000000000000}"/>
+          </ac:spMkLst>
+        </pc:spChg>
+        <pc:spChg chg="mod">
+          <ac:chgData name="Gyovane Souzza" userId="eed59d4ebf12600b" providerId="LiveId" clId="{E7C69A7C-A215-426B-8AAA-22D3B1BFACE3}" dt="2021-04-16T23:01:32.404" v="230" actId="11"/>
+          <ac:spMkLst>
+            <pc:docMk/>
+            <pc:sldMk cId="2438810021" sldId="257"/>
+            <ac:spMk id="26" creationId="{26F71C42-1B20-414B-B329-B7287F5EA813}"/>
+          </ac:spMkLst>
+        </pc:spChg>
+      </pc:sldChg>
+      <pc:sldChg chg="modSp mod">
+        <pc:chgData name="Gyovane Souzza" userId="eed59d4ebf12600b" providerId="LiveId" clId="{E7C69A7C-A215-426B-8AAA-22D3B1BFACE3}" dt="2021-04-16T23:00:46.125" v="201" actId="1076"/>
+        <pc:sldMkLst>
+          <pc:docMk/>
+          <pc:sldMk cId="36374222" sldId="258"/>
+        </pc:sldMkLst>
+        <pc:spChg chg="mod">
+          <ac:chgData name="Gyovane Souzza" userId="eed59d4ebf12600b" providerId="LiveId" clId="{E7C69A7C-A215-426B-8AAA-22D3B1BFACE3}" dt="2021-04-16T23:00:43.736" v="199" actId="1076"/>
+          <ac:spMkLst>
+            <pc:docMk/>
+            <pc:sldMk cId="36374222" sldId="258"/>
+            <ac:spMk id="4" creationId="{00000000-0000-0000-0000-000000000000}"/>
+          </ac:spMkLst>
+        </pc:spChg>
+        <pc:spChg chg="mod">
+          <ac:chgData name="Gyovane Souzza" userId="eed59d4ebf12600b" providerId="LiveId" clId="{E7C69A7C-A215-426B-8AAA-22D3B1BFACE3}" dt="2021-04-16T23:00:43.920" v="200" actId="14100"/>
+          <ac:spMkLst>
+            <pc:docMk/>
+            <pc:sldMk cId="36374222" sldId="258"/>
+            <ac:spMk id="8" creationId="{00000000-0000-0000-0000-000000000000}"/>
+          </ac:spMkLst>
+        </pc:spChg>
+        <pc:spChg chg="mod">
+          <ac:chgData name="Gyovane Souzza" userId="eed59d4ebf12600b" providerId="LiveId" clId="{E7C69A7C-A215-426B-8AAA-22D3B1BFACE3}" dt="2021-04-16T23:00:43.559" v="198" actId="1076"/>
+          <ac:spMkLst>
+            <pc:docMk/>
+            <pc:sldMk cId="36374222" sldId="258"/>
+            <ac:spMk id="9" creationId="{00000000-0000-0000-0000-000000000000}"/>
+          </ac:spMkLst>
+        </pc:spChg>
+        <pc:spChg chg="mod">
+          <ac:chgData name="Gyovane Souzza" userId="eed59d4ebf12600b" providerId="LiveId" clId="{E7C69A7C-A215-426B-8AAA-22D3B1BFACE3}" dt="2021-04-16T23:00:43.390" v="197" actId="1076"/>
+          <ac:spMkLst>
+            <pc:docMk/>
+            <pc:sldMk cId="36374222" sldId="258"/>
+            <ac:spMk id="10" creationId="{00000000-0000-0000-0000-000000000000}"/>
+          </ac:spMkLst>
+        </pc:spChg>
+        <pc:spChg chg="mod">
+          <ac:chgData name="Gyovane Souzza" userId="eed59d4ebf12600b" providerId="LiveId" clId="{E7C69A7C-A215-426B-8AAA-22D3B1BFACE3}" dt="2021-04-16T23:00:42.975" v="195" actId="1076"/>
+          <ac:spMkLst>
+            <pc:docMk/>
+            <pc:sldMk cId="36374222" sldId="258"/>
+            <ac:spMk id="11" creationId="{00000000-0000-0000-0000-000000000000}"/>
+          </ac:spMkLst>
+        </pc:spChg>
+        <pc:spChg chg="mod">
+          <ac:chgData name="Gyovane Souzza" userId="eed59d4ebf12600b" providerId="LiveId" clId="{E7C69A7C-A215-426B-8AAA-22D3B1BFACE3}" dt="2021-04-16T23:00:46.125" v="201" actId="1076"/>
+          <ac:spMkLst>
+            <pc:docMk/>
+            <pc:sldMk cId="36374222" sldId="258"/>
+            <ac:spMk id="13" creationId="{E3E67662-C3FD-4F8F-ADD1-2A0C86B9BE6B}"/>
+          </ac:spMkLst>
+        </pc:spChg>
+        <pc:cxnChg chg="mod">
+          <ac:chgData name="Gyovane Souzza" userId="eed59d4ebf12600b" providerId="LiveId" clId="{E7C69A7C-A215-426B-8AAA-22D3B1BFACE3}" dt="2021-04-16T23:00:43.736" v="199" actId="1076"/>
+          <ac:cxnSpMkLst>
+            <pc:docMk/>
+            <pc:sldMk cId="36374222" sldId="258"/>
+            <ac:cxnSpMk id="6" creationId="{00000000-0000-0000-0000-000000000000}"/>
+          </ac:cxnSpMkLst>
+        </pc:cxnChg>
+        <pc:cxnChg chg="mod">
+          <ac:chgData name="Gyovane Souzza" userId="eed59d4ebf12600b" providerId="LiveId" clId="{E7C69A7C-A215-426B-8AAA-22D3B1BFACE3}" dt="2021-04-16T23:00:43.229" v="196" actId="14100"/>
+          <ac:cxnSpMkLst>
+            <pc:docMk/>
+            <pc:sldMk cId="36374222" sldId="258"/>
+            <ac:cxnSpMk id="12" creationId="{D6D97585-FEBD-4088-B098-D1962D7BDFF8}"/>
+          </ac:cxnSpMkLst>
+        </pc:cxnChg>
+        <pc:cxnChg chg="mod">
+          <ac:chgData name="Gyovane Souzza" userId="eed59d4ebf12600b" providerId="LiveId" clId="{E7C69A7C-A215-426B-8AAA-22D3B1BFACE3}" dt="2021-04-16T23:00:46.125" v="201" actId="1076"/>
+          <ac:cxnSpMkLst>
+            <pc:docMk/>
+            <pc:sldMk cId="36374222" sldId="258"/>
+            <ac:cxnSpMk id="14" creationId="{C7A17231-7243-4E52-9D87-70EB20CD9B3B}"/>
+          </ac:cxnSpMkLst>
+        </pc:cxnChg>
+      </pc:sldChg>
+      <pc:sldChg chg="addSp delSp modSp del mod">
+        <pc:chgData name="Gyovane Souzza" userId="eed59d4ebf12600b" providerId="LiveId" clId="{E7C69A7C-A215-426B-8AAA-22D3B1BFACE3}" dt="2021-04-16T23:17:20.688" v="398" actId="47"/>
         <pc:sldMkLst>
           <pc:docMk/>
           <pc:sldMk cId="2367524892" sldId="259"/>
@@ -165,7 +268,7 @@
           </ac:spMkLst>
         </pc:spChg>
         <pc:spChg chg="mod">
-          <ac:chgData name="Gyovane Souzza" userId="eed59d4ebf12600b" providerId="LiveId" clId="{E7C69A7C-A215-426B-8AAA-22D3B1BFACE3}" dt="2021-04-09T01:02:25.871" v="11" actId="1076"/>
+          <ac:chgData name="Gyovane Souzza" userId="eed59d4ebf12600b" providerId="LiveId" clId="{E7C69A7C-A215-426B-8AAA-22D3B1BFACE3}" dt="2021-04-16T22:52:50.444" v="60" actId="1076"/>
           <ac:spMkLst>
             <pc:docMk/>
             <pc:sldMk cId="2367524892" sldId="259"/>
@@ -181,7 +284,7 @@
           </ac:spMkLst>
         </pc:spChg>
         <pc:spChg chg="mod">
-          <ac:chgData name="Gyovane Souzza" userId="eed59d4ebf12600b" providerId="LiveId" clId="{E7C69A7C-A215-426B-8AAA-22D3B1BFACE3}" dt="2021-04-09T01:02:34.498" v="13" actId="1076"/>
+          <ac:chgData name="Gyovane Souzza" userId="eed59d4ebf12600b" providerId="LiveId" clId="{E7C69A7C-A215-426B-8AAA-22D3B1BFACE3}" dt="2021-04-16T22:51:40.329" v="57" actId="1076"/>
           <ac:spMkLst>
             <pc:docMk/>
             <pc:sldMk cId="2367524892" sldId="259"/>
@@ -189,7 +292,7 @@
           </ac:spMkLst>
         </pc:spChg>
         <pc:spChg chg="mod">
-          <ac:chgData name="Gyovane Souzza" userId="eed59d4ebf12600b" providerId="LiveId" clId="{E7C69A7C-A215-426B-8AAA-22D3B1BFACE3}" dt="2021-04-09T23:25:55.001" v="42" actId="1076"/>
+          <ac:chgData name="Gyovane Souzza" userId="eed59d4ebf12600b" providerId="LiveId" clId="{E7C69A7C-A215-426B-8AAA-22D3B1BFACE3}" dt="2021-04-16T22:54:52.675" v="84" actId="1076"/>
           <ac:spMkLst>
             <pc:docMk/>
             <pc:sldMk cId="2367524892" sldId="259"/>
@@ -202,6 +305,14 @@
             <pc:docMk/>
             <pc:sldMk cId="2367524892" sldId="259"/>
             <ac:spMk id="14" creationId="{E08A7210-0801-426D-BC7D-7B345C308957}"/>
+          </ac:spMkLst>
+        </pc:spChg>
+        <pc:spChg chg="add mod">
+          <ac:chgData name="Gyovane Souzza" userId="eed59d4ebf12600b" providerId="LiveId" clId="{E7C69A7C-A215-426B-8AAA-22D3B1BFACE3}" dt="2021-04-16T22:54:43.387" v="83" actId="1076"/>
+          <ac:spMkLst>
+            <pc:docMk/>
+            <pc:sldMk cId="2367524892" sldId="259"/>
+            <ac:spMk id="17" creationId="{59C2518D-BE03-4C45-BB4B-D6EF1E892629}"/>
           </ac:spMkLst>
         </pc:spChg>
         <pc:spChg chg="add del mod">
@@ -229,7 +340,7 @@
           </ac:spMkLst>
         </pc:spChg>
         <pc:cxnChg chg="mod">
-          <ac:chgData name="Gyovane Souzza" userId="eed59d4ebf12600b" providerId="LiveId" clId="{E7C69A7C-A215-426B-8AAA-22D3B1BFACE3}" dt="2021-04-09T01:03:31.307" v="24" actId="14100"/>
+          <ac:chgData name="Gyovane Souzza" userId="eed59d4ebf12600b" providerId="LiveId" clId="{E7C69A7C-A215-426B-8AAA-22D3B1BFACE3}" dt="2021-04-16T22:52:50.444" v="60" actId="1076"/>
           <ac:cxnSpMkLst>
             <pc:docMk/>
             <pc:sldMk cId="2367524892" sldId="259"/>
@@ -237,15 +348,15 @@
           </ac:cxnSpMkLst>
         </pc:cxnChg>
         <pc:cxnChg chg="mod">
-          <ac:chgData name="Gyovane Souzza" userId="eed59d4ebf12600b" providerId="LiveId" clId="{E7C69A7C-A215-426B-8AAA-22D3B1BFACE3}" dt="2021-04-09T01:02:34.498" v="13" actId="1076"/>
+          <ac:chgData name="Gyovane Souzza" userId="eed59d4ebf12600b" providerId="LiveId" clId="{E7C69A7C-A215-426B-8AAA-22D3B1BFACE3}" dt="2021-04-16T22:51:40.329" v="57" actId="1076"/>
           <ac:cxnSpMkLst>
             <pc:docMk/>
             <pc:sldMk cId="2367524892" sldId="259"/>
             <ac:cxnSpMk id="12" creationId="{F1B6C749-6105-4250-9D96-3797FCC3AA4C}"/>
           </ac:cxnSpMkLst>
         </pc:cxnChg>
-        <pc:cxnChg chg="mod">
-          <ac:chgData name="Gyovane Souzza" userId="eed59d4ebf12600b" providerId="LiveId" clId="{E7C69A7C-A215-426B-8AAA-22D3B1BFACE3}" dt="2021-04-09T01:02:34.498" v="13" actId="1076"/>
+        <pc:cxnChg chg="del mod">
+          <ac:chgData name="Gyovane Souzza" userId="eed59d4ebf12600b" providerId="LiveId" clId="{E7C69A7C-A215-426B-8AAA-22D3B1BFACE3}" dt="2021-04-16T22:51:36.494" v="56" actId="478"/>
           <ac:cxnSpMkLst>
             <pc:docMk/>
             <pc:sldMk cId="2367524892" sldId="259"/>
@@ -261,7 +372,15 @@
           </ac:cxnSpMkLst>
         </pc:cxnChg>
         <pc:cxnChg chg="add mod">
-          <ac:chgData name="Gyovane Souzza" userId="eed59d4ebf12600b" providerId="LiveId" clId="{E7C69A7C-A215-426B-8AAA-22D3B1BFACE3}" dt="2021-04-09T23:26:10.434" v="53" actId="1076"/>
+          <ac:chgData name="Gyovane Souzza" userId="eed59d4ebf12600b" providerId="LiveId" clId="{E7C69A7C-A215-426B-8AAA-22D3B1BFACE3}" dt="2021-04-16T22:55:04.042" v="88" actId="14100"/>
+          <ac:cxnSpMkLst>
+            <pc:docMk/>
+            <pc:sldMk cId="2367524892" sldId="259"/>
+            <ac:cxnSpMk id="20" creationId="{D7E0D70D-5C69-4F74-B808-E63E1825C7D5}"/>
+          </ac:cxnSpMkLst>
+        </pc:cxnChg>
+        <pc:cxnChg chg="add mod">
+          <ac:chgData name="Gyovane Souzza" userId="eed59d4ebf12600b" providerId="LiveId" clId="{E7C69A7C-A215-426B-8AAA-22D3B1BFACE3}" dt="2021-04-16T22:54:55.393" v="85" actId="14100"/>
           <ac:cxnSpMkLst>
             <pc:docMk/>
             <pc:sldMk cId="2367524892" sldId="259"/>
@@ -269,12 +388,20 @@
           </ac:cxnSpMkLst>
         </pc:cxnChg>
       </pc:sldChg>
-      <pc:sldChg chg="modSp mod">
-        <pc:chgData name="Gyovane Souzza" userId="eed59d4ebf12600b" providerId="LiveId" clId="{E7C69A7C-A215-426B-8AAA-22D3B1BFACE3}" dt="2021-04-09T23:26:21.154" v="55" actId="1076"/>
+      <pc:sldChg chg="addSp delSp modSp mod">
+        <pc:chgData name="Gyovane Souzza" userId="eed59d4ebf12600b" providerId="LiveId" clId="{E7C69A7C-A215-426B-8AAA-22D3B1BFACE3}" dt="2021-04-16T22:58:03.588" v="187" actId="20577"/>
         <pc:sldMkLst>
           <pc:docMk/>
           <pc:sldMk cId="226422873" sldId="264"/>
         </pc:sldMkLst>
+        <pc:spChg chg="mod">
+          <ac:chgData name="Gyovane Souzza" userId="eed59d4ebf12600b" providerId="LiveId" clId="{E7C69A7C-A215-426B-8AAA-22D3B1BFACE3}" dt="2021-04-16T22:57:22.701" v="127" actId="20577"/>
+          <ac:spMkLst>
+            <pc:docMk/>
+            <pc:sldMk cId="226422873" sldId="264"/>
+            <ac:spMk id="10" creationId="{00000000-0000-0000-0000-000000000000}"/>
+          </ac:spMkLst>
+        </pc:spChg>
         <pc:spChg chg="mod">
           <ac:chgData name="Gyovane Souzza" userId="eed59d4ebf12600b" providerId="LiveId" clId="{E7C69A7C-A215-426B-8AAA-22D3B1BFACE3}" dt="2021-04-09T23:26:21.154" v="55" actId="1076"/>
           <ac:spMkLst>
@@ -283,12 +410,280 @@
             <ac:spMk id="13" creationId="{092E5AF6-1F3B-42C0-8997-B4B0787C12CB}"/>
           </ac:spMkLst>
         </pc:spChg>
-        <pc:cxnChg chg="mod">
-          <ac:chgData name="Gyovane Souzza" userId="eed59d4ebf12600b" providerId="LiveId" clId="{E7C69A7C-A215-426B-8AAA-22D3B1BFACE3}" dt="2021-04-09T23:26:21.154" v="55" actId="1076"/>
+        <pc:spChg chg="add mod">
+          <ac:chgData name="Gyovane Souzza" userId="eed59d4ebf12600b" providerId="LiveId" clId="{E7C69A7C-A215-426B-8AAA-22D3B1BFACE3}" dt="2021-04-16T22:58:03.588" v="187" actId="20577"/>
+          <ac:spMkLst>
+            <pc:docMk/>
+            <pc:sldMk cId="226422873" sldId="264"/>
+            <ac:spMk id="17" creationId="{6B9319FF-DD73-4E36-9A7B-8677DBC4A2EE}"/>
+          </ac:spMkLst>
+        </pc:spChg>
+        <pc:cxnChg chg="mod ord">
+          <ac:chgData name="Gyovane Souzza" userId="eed59d4ebf12600b" providerId="LiveId" clId="{E7C69A7C-A215-426B-8AAA-22D3B1BFACE3}" dt="2021-04-16T22:56:43.028" v="99" actId="167"/>
+          <ac:cxnSpMkLst>
+            <pc:docMk/>
+            <pc:sldMk cId="226422873" sldId="264"/>
+            <ac:cxnSpMk id="12" creationId="{F1B6C749-6105-4250-9D96-3797FCC3AA4C}"/>
+          </ac:cxnSpMkLst>
+        </pc:cxnChg>
+        <pc:cxnChg chg="add mod ord">
+          <ac:chgData name="Gyovane Souzza" userId="eed59d4ebf12600b" providerId="LiveId" clId="{E7C69A7C-A215-426B-8AAA-22D3B1BFACE3}" dt="2021-04-16T22:57:52.181" v="152" actId="1076"/>
+          <ac:cxnSpMkLst>
+            <pc:docMk/>
+            <pc:sldMk cId="226422873" sldId="264"/>
+            <ac:cxnSpMk id="18" creationId="{E7044505-B8A8-4D07-A667-D4658ECAF6CB}"/>
+          </ac:cxnSpMkLst>
+        </pc:cxnChg>
+        <pc:cxnChg chg="del mod">
+          <ac:chgData name="Gyovane Souzza" userId="eed59d4ebf12600b" providerId="LiveId" clId="{E7C69A7C-A215-426B-8AAA-22D3B1BFACE3}" dt="2021-04-16T22:57:28.501" v="128" actId="478"/>
           <ac:cxnSpMkLst>
             <pc:docMk/>
             <pc:sldMk cId="226422873" sldId="264"/>
             <ac:cxnSpMk id="19" creationId="{8C1F429A-FB78-4A88-AC8F-86D6FB395FC4}"/>
+          </ac:cxnSpMkLst>
+        </pc:cxnChg>
+        <pc:cxnChg chg="del mod">
+          <ac:chgData name="Gyovane Souzza" userId="eed59d4ebf12600b" providerId="LiveId" clId="{E7C69A7C-A215-426B-8AAA-22D3B1BFACE3}" dt="2021-04-16T22:55:52.197" v="89" actId="478"/>
+          <ac:cxnSpMkLst>
+            <pc:docMk/>
+            <pc:sldMk cId="226422873" sldId="264"/>
+            <ac:cxnSpMk id="25" creationId="{23488C96-5271-4CFF-8470-435097279F3E}"/>
+          </ac:cxnSpMkLst>
+        </pc:cxnChg>
+      </pc:sldChg>
+      <pc:sldChg chg="add del">
+        <pc:chgData name="Gyovane Souzza" userId="eed59d4ebf12600b" providerId="LiveId" clId="{E7C69A7C-A215-426B-8AAA-22D3B1BFACE3}" dt="2021-04-16T23:13:39.444" v="388" actId="47"/>
+        <pc:sldMkLst>
+          <pc:docMk/>
+          <pc:sldMk cId="260196215" sldId="267"/>
+        </pc:sldMkLst>
+      </pc:sldChg>
+      <pc:sldChg chg="addSp delSp modSp add mod">
+        <pc:chgData name="Gyovane Souzza" userId="eed59d4ebf12600b" providerId="LiveId" clId="{E7C69A7C-A215-426B-8AAA-22D3B1BFACE3}" dt="2021-04-16T23:14:42.598" v="397" actId="20577"/>
+        <pc:sldMkLst>
+          <pc:docMk/>
+          <pc:sldMk cId="2545260601" sldId="268"/>
+        </pc:sldMkLst>
+        <pc:spChg chg="mod">
+          <ac:chgData name="Gyovane Souzza" userId="eed59d4ebf12600b" providerId="LiveId" clId="{E7C69A7C-A215-426B-8AAA-22D3B1BFACE3}" dt="2021-04-16T23:14:42.598" v="397" actId="20577"/>
+          <ac:spMkLst>
+            <pc:docMk/>
+            <pc:sldMk cId="2545260601" sldId="268"/>
+            <ac:spMk id="2" creationId="{00000000-0000-0000-0000-000000000000}"/>
+          </ac:spMkLst>
+        </pc:spChg>
+        <pc:spChg chg="mod">
+          <ac:chgData name="Gyovane Souzza" userId="eed59d4ebf12600b" providerId="LiveId" clId="{E7C69A7C-A215-426B-8AAA-22D3B1BFACE3}" dt="2021-04-16T23:14:19.538" v="393" actId="1076"/>
+          <ac:spMkLst>
+            <pc:docMk/>
+            <pc:sldMk cId="2545260601" sldId="268"/>
+            <ac:spMk id="4" creationId="{00000000-0000-0000-0000-000000000000}"/>
+          </ac:spMkLst>
+        </pc:spChg>
+        <pc:spChg chg="mod">
+          <ac:chgData name="Gyovane Souzza" userId="eed59d4ebf12600b" providerId="LiveId" clId="{E7C69A7C-A215-426B-8AAA-22D3B1BFACE3}" dt="2021-04-16T23:11:14.840" v="384" actId="14100"/>
+          <ac:spMkLst>
+            <pc:docMk/>
+            <pc:sldMk cId="2545260601" sldId="268"/>
+            <ac:spMk id="5" creationId="{00000000-0000-0000-0000-000000000000}"/>
+          </ac:spMkLst>
+        </pc:spChg>
+        <pc:spChg chg="mod">
+          <ac:chgData name="Gyovane Souzza" userId="eed59d4ebf12600b" providerId="LiveId" clId="{E7C69A7C-A215-426B-8AAA-22D3B1BFACE3}" dt="2021-04-16T23:08:35.855" v="305" actId="14100"/>
+          <ac:spMkLst>
+            <pc:docMk/>
+            <pc:sldMk cId="2545260601" sldId="268"/>
+            <ac:spMk id="7" creationId="{00000000-0000-0000-0000-000000000000}"/>
+          </ac:spMkLst>
+        </pc:spChg>
+        <pc:spChg chg="mod">
+          <ac:chgData name="Gyovane Souzza" userId="eed59d4ebf12600b" providerId="LiveId" clId="{E7C69A7C-A215-426B-8AAA-22D3B1BFACE3}" dt="2021-04-16T23:09:23.639" v="319" actId="1076"/>
+          <ac:spMkLst>
+            <pc:docMk/>
+            <pc:sldMk cId="2545260601" sldId="268"/>
+            <ac:spMk id="8" creationId="{00000000-0000-0000-0000-000000000000}"/>
+          </ac:spMkLst>
+        </pc:spChg>
+        <pc:spChg chg="mod">
+          <ac:chgData name="Gyovane Souzza" userId="eed59d4ebf12600b" providerId="LiveId" clId="{E7C69A7C-A215-426B-8AAA-22D3B1BFACE3}" dt="2021-04-16T23:09:26.373" v="320" actId="1076"/>
+          <ac:spMkLst>
+            <pc:docMk/>
+            <pc:sldMk cId="2545260601" sldId="268"/>
+            <ac:spMk id="9" creationId="{00000000-0000-0000-0000-000000000000}"/>
+          </ac:spMkLst>
+        </pc:spChg>
+        <pc:spChg chg="mod">
+          <ac:chgData name="Gyovane Souzza" userId="eed59d4ebf12600b" providerId="LiveId" clId="{E7C69A7C-A215-426B-8AAA-22D3B1BFACE3}" dt="2021-04-16T23:09:28.200" v="321" actId="1076"/>
+          <ac:spMkLst>
+            <pc:docMk/>
+            <pc:sldMk cId="2545260601" sldId="268"/>
+            <ac:spMk id="10" creationId="{00000000-0000-0000-0000-000000000000}"/>
+          </ac:spMkLst>
+        </pc:spChg>
+        <pc:spChg chg="add del mod">
+          <ac:chgData name="Gyovane Souzza" userId="eed59d4ebf12600b" providerId="LiveId" clId="{E7C69A7C-A215-426B-8AAA-22D3B1BFACE3}" dt="2021-04-16T23:10:47.681" v="376" actId="1076"/>
+          <ac:spMkLst>
+            <pc:docMk/>
+            <pc:sldMk cId="2545260601" sldId="268"/>
+            <ac:spMk id="13" creationId="{E80196AD-6A41-4D1E-B413-2AD1E67D83DA}"/>
+          </ac:spMkLst>
+        </pc:spChg>
+        <pc:spChg chg="mod">
+          <ac:chgData name="Gyovane Souzza" userId="eed59d4ebf12600b" providerId="LiveId" clId="{E7C69A7C-A215-426B-8AAA-22D3B1BFACE3}" dt="2021-04-16T23:10:55.056" v="380" actId="404"/>
+          <ac:spMkLst>
+            <pc:docMk/>
+            <pc:sldMk cId="2545260601" sldId="268"/>
+            <ac:spMk id="14" creationId="{E08A7210-0801-426D-BC7D-7B345C308957}"/>
+          </ac:spMkLst>
+        </pc:spChg>
+        <pc:spChg chg="mod">
+          <ac:chgData name="Gyovane Souzza" userId="eed59d4ebf12600b" providerId="LiveId" clId="{E7C69A7C-A215-426B-8AAA-22D3B1BFACE3}" dt="2021-04-16T23:13:32.272" v="386" actId="14100"/>
+          <ac:spMkLst>
+            <pc:docMk/>
+            <pc:sldMk cId="2545260601" sldId="268"/>
+            <ac:spMk id="17" creationId="{59C2518D-BE03-4C45-BB4B-D6EF1E892629}"/>
+          </ac:spMkLst>
+        </pc:spChg>
+        <pc:spChg chg="mod">
+          <ac:chgData name="Gyovane Souzza" userId="eed59d4ebf12600b" providerId="LiveId" clId="{E7C69A7C-A215-426B-8AAA-22D3B1BFACE3}" dt="2021-04-16T23:14:22.236" v="394" actId="1076"/>
+          <ac:spMkLst>
+            <pc:docMk/>
+            <pc:sldMk cId="2545260601" sldId="268"/>
+            <ac:spMk id="23" creationId="{A55927FF-5CCE-4580-97AD-62A4648F46D2}"/>
+          </ac:spMkLst>
+        </pc:spChg>
+        <pc:spChg chg="add mod">
+          <ac:chgData name="Gyovane Souzza" userId="eed59d4ebf12600b" providerId="LiveId" clId="{E7C69A7C-A215-426B-8AAA-22D3B1BFACE3}" dt="2021-04-16T23:10:06.282" v="348" actId="1076"/>
+          <ac:spMkLst>
+            <pc:docMk/>
+            <pc:sldMk cId="2545260601" sldId="268"/>
+            <ac:spMk id="26" creationId="{726AA524-F4CF-470F-BBBD-01356B9C9900}"/>
+          </ac:spMkLst>
+        </pc:spChg>
+        <pc:spChg chg="add mod">
+          <ac:chgData name="Gyovane Souzza" userId="eed59d4ebf12600b" providerId="LiveId" clId="{E7C69A7C-A215-426B-8AAA-22D3B1BFACE3}" dt="2021-04-16T23:10:24.553" v="371" actId="1076"/>
+          <ac:spMkLst>
+            <pc:docMk/>
+            <pc:sldMk cId="2545260601" sldId="268"/>
+            <ac:spMk id="42" creationId="{530C8E99-B939-4769-A4B3-176418E20FBD}"/>
+          </ac:spMkLst>
+        </pc:spChg>
+        <pc:spChg chg="add mod">
+          <ac:chgData name="Gyovane Souzza" userId="eed59d4ebf12600b" providerId="LiveId" clId="{E7C69A7C-A215-426B-8AAA-22D3B1BFACE3}" dt="2021-04-16T23:10:38.071" v="375" actId="313"/>
+          <ac:spMkLst>
+            <pc:docMk/>
+            <pc:sldMk cId="2545260601" sldId="268"/>
+            <ac:spMk id="65" creationId="{85BC9B38-54EA-4D53-AF3B-CBA65691CEBD}"/>
+          </ac:spMkLst>
+        </pc:spChg>
+        <pc:cxnChg chg="mod">
+          <ac:chgData name="Gyovane Souzza" userId="eed59d4ebf12600b" providerId="LiveId" clId="{E7C69A7C-A215-426B-8AAA-22D3B1BFACE3}" dt="2021-04-16T23:14:19.538" v="393" actId="1076"/>
+          <ac:cxnSpMkLst>
+            <pc:docMk/>
+            <pc:sldMk cId="2545260601" sldId="268"/>
+            <ac:cxnSpMk id="6" creationId="{00000000-0000-0000-0000-000000000000}"/>
+          </ac:cxnSpMkLst>
+        </pc:cxnChg>
+        <pc:cxnChg chg="mod">
+          <ac:chgData name="Gyovane Souzza" userId="eed59d4ebf12600b" providerId="LiveId" clId="{E7C69A7C-A215-426B-8AAA-22D3B1BFACE3}" dt="2021-04-16T23:09:28.200" v="321" actId="1076"/>
+          <ac:cxnSpMkLst>
+            <pc:docMk/>
+            <pc:sldMk cId="2545260601" sldId="268"/>
+            <ac:cxnSpMk id="12" creationId="{F1B6C749-6105-4250-9D96-3797FCC3AA4C}"/>
+          </ac:cxnSpMkLst>
+        </pc:cxnChg>
+        <pc:cxnChg chg="mod">
+          <ac:chgData name="Gyovane Souzza" userId="eed59d4ebf12600b" providerId="LiveId" clId="{E7C69A7C-A215-426B-8AAA-22D3B1BFACE3}" dt="2021-04-16T23:13:32.272" v="386" actId="14100"/>
+          <ac:cxnSpMkLst>
+            <pc:docMk/>
+            <pc:sldMk cId="2545260601" sldId="268"/>
+            <ac:cxnSpMk id="20" creationId="{D7E0D70D-5C69-4F74-B808-E63E1825C7D5}"/>
+          </ac:cxnSpMkLst>
+        </pc:cxnChg>
+        <pc:cxnChg chg="mod ord">
+          <ac:chgData name="Gyovane Souzza" userId="eed59d4ebf12600b" providerId="LiveId" clId="{E7C69A7C-A215-426B-8AAA-22D3B1BFACE3}" dt="2021-04-16T23:14:22.236" v="394" actId="1076"/>
+          <ac:cxnSpMkLst>
+            <pc:docMk/>
+            <pc:sldMk cId="2545260601" sldId="268"/>
+            <ac:cxnSpMk id="24" creationId="{BC6F058D-F013-4529-A509-591C143AB4F9}"/>
+          </ac:cxnSpMkLst>
+        </pc:cxnChg>
+        <pc:cxnChg chg="add mod">
+          <ac:chgData name="Gyovane Souzza" userId="eed59d4ebf12600b" providerId="LiveId" clId="{E7C69A7C-A215-426B-8AAA-22D3B1BFACE3}" dt="2021-04-16T23:10:06.282" v="348" actId="1076"/>
+          <ac:cxnSpMkLst>
+            <pc:docMk/>
+            <pc:sldMk cId="2545260601" sldId="268"/>
+            <ac:cxnSpMk id="32" creationId="{A894244B-57F7-4A61-8C54-7C20CC40DE80}"/>
+          </ac:cxnSpMkLst>
+        </pc:cxnChg>
+        <pc:cxnChg chg="add mod">
+          <ac:chgData name="Gyovane Souzza" userId="eed59d4ebf12600b" providerId="LiveId" clId="{E7C69A7C-A215-426B-8AAA-22D3B1BFACE3}" dt="2021-04-16T23:10:24.553" v="371" actId="1076"/>
+          <ac:cxnSpMkLst>
+            <pc:docMk/>
+            <pc:sldMk cId="2545260601" sldId="268"/>
+            <ac:cxnSpMk id="57" creationId="{CD4A593F-9C95-4800-9B7B-958B442C96F7}"/>
+          </ac:cxnSpMkLst>
+        </pc:cxnChg>
+        <pc:cxnChg chg="add mod">
+          <ac:chgData name="Gyovane Souzza" userId="eed59d4ebf12600b" providerId="LiveId" clId="{E7C69A7C-A215-426B-8AAA-22D3B1BFACE3}" dt="2021-04-16T23:10:34.957" v="374" actId="14100"/>
+          <ac:cxnSpMkLst>
+            <pc:docMk/>
+            <pc:sldMk cId="2545260601" sldId="268"/>
+            <ac:cxnSpMk id="67" creationId="{3624F9F1-ADF8-48D2-B891-B344D8F92E1F}"/>
+          </ac:cxnSpMkLst>
+        </pc:cxnChg>
+      </pc:sldChg>
+      <pc:sldChg chg="add del">
+        <pc:chgData name="Gyovane Souzza" userId="eed59d4ebf12600b" providerId="LiveId" clId="{E7C69A7C-A215-426B-8AAA-22D3B1BFACE3}" dt="2021-04-16T23:14:35.522" v="395" actId="47"/>
+        <pc:sldMkLst>
+          <pc:docMk/>
+          <pc:sldMk cId="703555007" sldId="269"/>
+        </pc:sldMkLst>
+      </pc:sldChg>
+      <pc:sldChg chg="delSp modSp add mod">
+        <pc:chgData name="Gyovane Souzza" userId="eed59d4ebf12600b" providerId="LiveId" clId="{E7C69A7C-A215-426B-8AAA-22D3B1BFACE3}" dt="2021-04-16T23:21:49.552" v="412" actId="20577"/>
+        <pc:sldMkLst>
+          <pc:docMk/>
+          <pc:sldMk cId="2060403710" sldId="269"/>
+        </pc:sldMkLst>
+        <pc:spChg chg="del">
+          <ac:chgData name="Gyovane Souzza" userId="eed59d4ebf12600b" providerId="LiveId" clId="{E7C69A7C-A215-426B-8AAA-22D3B1BFACE3}" dt="2021-04-16T23:21:31.092" v="399" actId="478"/>
+          <ac:spMkLst>
+            <pc:docMk/>
+            <pc:sldMk cId="2060403710" sldId="269"/>
+            <ac:spMk id="13" creationId="{E80196AD-6A41-4D1E-B413-2AD1E67D83DA}"/>
+          </ac:spMkLst>
+        </pc:spChg>
+        <pc:spChg chg="del">
+          <ac:chgData name="Gyovane Souzza" userId="eed59d4ebf12600b" providerId="LiveId" clId="{E7C69A7C-A215-426B-8AAA-22D3B1BFACE3}" dt="2021-04-16T23:21:33.326" v="400" actId="478"/>
+          <ac:spMkLst>
+            <pc:docMk/>
+            <pc:sldMk cId="2060403710" sldId="269"/>
+            <ac:spMk id="14" creationId="{E08A7210-0801-426D-BC7D-7B345C308957}"/>
+          </ac:spMkLst>
+        </pc:spChg>
+        <pc:spChg chg="del">
+          <ac:chgData name="Gyovane Souzza" userId="eed59d4ebf12600b" providerId="LiveId" clId="{E7C69A7C-A215-426B-8AAA-22D3B1BFACE3}" dt="2021-04-16T23:21:37.717" v="402" actId="478"/>
+          <ac:spMkLst>
+            <pc:docMk/>
+            <pc:sldMk cId="2060403710" sldId="269"/>
+            <ac:spMk id="17" creationId="{59C2518D-BE03-4C45-BB4B-D6EF1E892629}"/>
+          </ac:spMkLst>
+        </pc:spChg>
+        <pc:spChg chg="mod">
+          <ac:chgData name="Gyovane Souzza" userId="eed59d4ebf12600b" providerId="LiveId" clId="{E7C69A7C-A215-426B-8AAA-22D3B1BFACE3}" dt="2021-04-16T23:21:49.552" v="412" actId="20577"/>
+          <ac:spMkLst>
+            <pc:docMk/>
+            <pc:sldMk cId="2060403710" sldId="269"/>
+            <ac:spMk id="23" creationId="{A55927FF-5CCE-4580-97AD-62A4648F46D2}"/>
+          </ac:spMkLst>
+        </pc:spChg>
+        <pc:cxnChg chg="del mod">
+          <ac:chgData name="Gyovane Souzza" userId="eed59d4ebf12600b" providerId="LiveId" clId="{E7C69A7C-A215-426B-8AAA-22D3B1BFACE3}" dt="2021-04-16T23:21:34.094" v="401" actId="478"/>
+          <ac:cxnSpMkLst>
+            <pc:docMk/>
+            <pc:sldMk cId="2060403710" sldId="269"/>
+            <ac:cxnSpMk id="20" creationId="{D7E0D70D-5C69-4F74-B808-E63E1825C7D5}"/>
           </ac:cxnSpMkLst>
         </pc:cxnChg>
       </pc:sldChg>
@@ -426,7 +821,7 @@
           <a:p>
             <a:fld id="{2E0DF6E3-1D5C-4094-B81B-572E3744A14B}" type="datetimeFigureOut">
               <a:rPr lang="pt-BR" smtClean="0"/>
-              <a:t>09/04/2021</a:t>
+              <a:t>16/04/2021</a:t>
             </a:fld>
             <a:endParaRPr lang="pt-BR"/>
           </a:p>
@@ -594,7 +989,7 @@
           <a:p>
             <a:fld id="{2E0DF6E3-1D5C-4094-B81B-572E3744A14B}" type="datetimeFigureOut">
               <a:rPr lang="pt-BR" smtClean="0"/>
-              <a:t>09/04/2021</a:t>
+              <a:t>16/04/2021</a:t>
             </a:fld>
             <a:endParaRPr lang="pt-BR"/>
           </a:p>
@@ -772,7 +1167,7 @@
           <a:p>
             <a:fld id="{2E0DF6E3-1D5C-4094-B81B-572E3744A14B}" type="datetimeFigureOut">
               <a:rPr lang="pt-BR" smtClean="0"/>
-              <a:t>09/04/2021</a:t>
+              <a:t>16/04/2021</a:t>
             </a:fld>
             <a:endParaRPr lang="pt-BR"/>
           </a:p>
@@ -940,7 +1335,7 @@
           <a:p>
             <a:fld id="{2E0DF6E3-1D5C-4094-B81B-572E3744A14B}" type="datetimeFigureOut">
               <a:rPr lang="pt-BR" smtClean="0"/>
-              <a:t>09/04/2021</a:t>
+              <a:t>16/04/2021</a:t>
             </a:fld>
             <a:endParaRPr lang="pt-BR"/>
           </a:p>
@@ -1185,7 +1580,7 @@
           <a:p>
             <a:fld id="{2E0DF6E3-1D5C-4094-B81B-572E3744A14B}" type="datetimeFigureOut">
               <a:rPr lang="pt-BR" smtClean="0"/>
-              <a:t>09/04/2021</a:t>
+              <a:t>16/04/2021</a:t>
             </a:fld>
             <a:endParaRPr lang="pt-BR"/>
           </a:p>
@@ -1414,7 +1809,7 @@
           <a:p>
             <a:fld id="{2E0DF6E3-1D5C-4094-B81B-572E3744A14B}" type="datetimeFigureOut">
               <a:rPr lang="pt-BR" smtClean="0"/>
-              <a:t>09/04/2021</a:t>
+              <a:t>16/04/2021</a:t>
             </a:fld>
             <a:endParaRPr lang="pt-BR"/>
           </a:p>
@@ -1778,7 +2173,7 @@
           <a:p>
             <a:fld id="{2E0DF6E3-1D5C-4094-B81B-572E3744A14B}" type="datetimeFigureOut">
               <a:rPr lang="pt-BR" smtClean="0"/>
-              <a:t>09/04/2021</a:t>
+              <a:t>16/04/2021</a:t>
             </a:fld>
             <a:endParaRPr lang="pt-BR"/>
           </a:p>
@@ -1895,7 +2290,7 @@
           <a:p>
             <a:fld id="{2E0DF6E3-1D5C-4094-B81B-572E3744A14B}" type="datetimeFigureOut">
               <a:rPr lang="pt-BR" smtClean="0"/>
-              <a:t>09/04/2021</a:t>
+              <a:t>16/04/2021</a:t>
             </a:fld>
             <a:endParaRPr lang="pt-BR"/>
           </a:p>
@@ -1990,7 +2385,7 @@
           <a:p>
             <a:fld id="{2E0DF6E3-1D5C-4094-B81B-572E3744A14B}" type="datetimeFigureOut">
               <a:rPr lang="pt-BR" smtClean="0"/>
-              <a:t>09/04/2021</a:t>
+              <a:t>16/04/2021</a:t>
             </a:fld>
             <a:endParaRPr lang="pt-BR"/>
           </a:p>
@@ -2265,7 +2660,7 @@
           <a:p>
             <a:fld id="{2E0DF6E3-1D5C-4094-B81B-572E3744A14B}" type="datetimeFigureOut">
               <a:rPr lang="pt-BR" smtClean="0"/>
-              <a:t>09/04/2021</a:t>
+              <a:t>16/04/2021</a:t>
             </a:fld>
             <a:endParaRPr lang="pt-BR"/>
           </a:p>
@@ -2517,7 +2912,7 @@
           <a:p>
             <a:fld id="{2E0DF6E3-1D5C-4094-B81B-572E3744A14B}" type="datetimeFigureOut">
               <a:rPr lang="pt-BR" smtClean="0"/>
-              <a:t>09/04/2021</a:t>
+              <a:t>16/04/2021</a:t>
             </a:fld>
             <a:endParaRPr lang="pt-BR"/>
           </a:p>
@@ -2728,7 +3123,7 @@
           <a:p>
             <a:fld id="{2E0DF6E3-1D5C-4094-B81B-572E3744A14B}" type="datetimeFigureOut">
               <a:rPr lang="pt-BR" smtClean="0"/>
-              <a:t>09/04/2021</a:t>
+              <a:t>16/04/2021</a:t>
             </a:fld>
             <a:endParaRPr lang="pt-BR"/>
           </a:p>
@@ -3303,7 +3698,7 @@
         <p:spPr>
           <a:xfrm>
             <a:off x="2300654" y="1608286"/>
-            <a:ext cx="5447567" cy="1477328"/>
+            <a:ext cx="5447567" cy="1754326"/>
           </a:xfrm>
           <a:prstGeom prst="rect">
             <a:avLst/>
@@ -3349,6 +3744,18 @@
                 <a:cs typeface="Arial" panose="020B0604020202020204" pitchFamily="34" charset="0"/>
               </a:rPr>
               <a:t>Realizar pedido</a:t>
+            </a:r>
+          </a:p>
+          <a:p>
+            <a:pPr marL="342900" indent="-342900">
+              <a:buAutoNum type="arabicPeriod"/>
+            </a:pPr>
+            <a:r>
+              <a:rPr lang="pt-BR" dirty="0">
+                <a:latin typeface="Arial" panose="020B0604020202020204" pitchFamily="34" charset="0"/>
+                <a:cs typeface="Arial" panose="020B0604020202020204" pitchFamily="34" charset="0"/>
+              </a:rPr>
+              <a:t>Realizar pedido sob medida</a:t>
             </a:r>
           </a:p>
           <a:p>
@@ -3523,7 +3930,7 @@
           <a:p>
             <a:pPr marL="342900" indent="-342900">
               <a:buFont typeface="+mj-lt"/>
-              <a:buAutoNum type="arabicPeriod" startAt="5"/>
+              <a:buAutoNum type="arabicPeriod" startAt="6"/>
             </a:pPr>
             <a:r>
               <a:rPr lang="pt-BR" dirty="0">
@@ -4575,6 +4982,46 @@
           <a:chExt cx="0" cy="0"/>
         </a:xfrm>
       </p:grpSpPr>
+      <p:cxnSp>
+        <p:nvCxnSpPr>
+          <p:cNvPr id="24" name="Conector reto 23">
+            <a:extLst>
+              <a:ext uri="{FF2B5EF4-FFF2-40B4-BE49-F238E27FC236}">
+                <a16:creationId xmlns:a16="http://schemas.microsoft.com/office/drawing/2014/main" id="{BC6F058D-F013-4529-A509-591C143AB4F9}"/>
+              </a:ext>
+            </a:extLst>
+          </p:cNvPr>
+          <p:cNvCxnSpPr>
+            <a:cxnSpLocks/>
+            <a:stCxn id="8" idx="5"/>
+            <a:endCxn id="23" idx="1"/>
+          </p:cNvCxnSpPr>
+          <p:nvPr/>
+        </p:nvCxnSpPr>
+        <p:spPr>
+          <a:xfrm>
+            <a:off x="6241827" y="3350454"/>
+            <a:ext cx="4213962" cy="140121"/>
+          </a:xfrm>
+          <a:prstGeom prst="line">
+            <a:avLst/>
+          </a:prstGeom>
+        </p:spPr>
+        <p:style>
+          <a:lnRef idx="1">
+            <a:schemeClr val="accent1"/>
+          </a:lnRef>
+          <a:fillRef idx="0">
+            <a:schemeClr val="accent1"/>
+          </a:fillRef>
+          <a:effectRef idx="0">
+            <a:schemeClr val="accent1"/>
+          </a:effectRef>
+          <a:fontRef idx="minor">
+            <a:schemeClr val="tx1"/>
+          </a:fontRef>
+        </p:style>
+      </p:cxnSp>
       <p:sp>
         <p:nvSpPr>
           <p:cNvPr id="2" name="Título 1"/>
@@ -4616,7 +5063,7 @@
         </p:nvSpPr>
         <p:spPr>
           <a:xfrm>
-            <a:off x="638909" y="3346695"/>
+            <a:off x="169627" y="2973328"/>
             <a:ext cx="1598940" cy="1034494"/>
           </a:xfrm>
           <a:prstGeom prst="rect">
@@ -4662,8 +5109,8 @@
         </p:nvSpPr>
         <p:spPr>
           <a:xfrm>
-            <a:off x="4216511" y="2149636"/>
-            <a:ext cx="4264271" cy="400110"/>
+            <a:off x="2875085" y="1443520"/>
+            <a:ext cx="6846277" cy="400110"/>
           </a:xfrm>
           <a:prstGeom prst="rect">
             <a:avLst/>
@@ -4692,14 +5139,15 @@
           <p:cNvPr id="6" name="Conector reto 5"/>
           <p:cNvCxnSpPr>
             <a:cxnSpLocks/>
+            <a:stCxn id="4" idx="3"/>
             <a:endCxn id="8" idx="2"/>
           </p:cNvCxnSpPr>
           <p:nvPr/>
         </p:nvCxnSpPr>
         <p:spPr>
           <a:xfrm>
-            <a:off x="1868624" y="3792502"/>
-            <a:ext cx="2347887" cy="31709"/>
+            <a:off x="1768567" y="3490575"/>
+            <a:ext cx="2200361" cy="113842"/>
           </a:xfrm>
           <a:prstGeom prst="line">
             <a:avLst/>
@@ -4728,8 +5176,8 @@
         </p:nvSpPr>
         <p:spPr>
           <a:xfrm>
-            <a:off x="3757245" y="1925129"/>
-            <a:ext cx="5237286" cy="3749430"/>
+            <a:off x="2470638" y="1359810"/>
+            <a:ext cx="7702062" cy="4314749"/>
           </a:xfrm>
           <a:prstGeom prst="roundRect">
             <a:avLst/>
@@ -4779,7 +5227,7 @@
         </p:nvSpPr>
         <p:spPr>
           <a:xfrm>
-            <a:off x="4216511" y="3189303"/>
+            <a:off x="3968928" y="2969509"/>
             <a:ext cx="2272899" cy="1015853"/>
           </a:xfrm>
           <a:prstGeom prst="cube">
@@ -4825,8 +5273,8 @@
         </p:nvSpPr>
         <p:spPr>
           <a:xfrm>
-            <a:off x="4382861" y="3881727"/>
-            <a:ext cx="1745991" cy="338554"/>
+            <a:off x="4199018" y="3677585"/>
+            <a:ext cx="1547218" cy="307777"/>
           </a:xfrm>
           <a:prstGeom prst="rect">
             <a:avLst/>
@@ -4840,7 +5288,7 @@
           <a:lstStyle/>
           <a:p>
             <a:r>
-              <a:rPr lang="pt-BR" sz="1600" dirty="0">
+              <a:rPr lang="pt-BR" sz="1400" dirty="0">
                 <a:latin typeface="Arial" panose="020B0604020202020204" pitchFamily="34" charset="0"/>
                 <a:cs typeface="Arial" panose="020B0604020202020204" pitchFamily="34" charset="0"/>
               </a:rPr>
@@ -4857,8 +5305,8 @@
         </p:nvSpPr>
         <p:spPr>
           <a:xfrm>
-            <a:off x="5565262" y="4622738"/>
-            <a:ext cx="1741054" cy="914400"/>
+            <a:off x="2703606" y="4559276"/>
+            <a:ext cx="1031798" cy="631146"/>
           </a:xfrm>
           <a:prstGeom prst="roundRect">
             <a:avLst/>
@@ -4910,7 +5358,7 @@
           <a:p>
             <a:pPr algn="ctr"/>
             <a:r>
-              <a:rPr lang="pt-BR" dirty="0">
+              <a:rPr lang="pt-BR" sz="1400" dirty="0">
                 <a:latin typeface="Arial" panose="020B0604020202020204" pitchFamily="34" charset="0"/>
                 <a:cs typeface="Arial" panose="020B0604020202020204" pitchFamily="34" charset="0"/>
               </a:rPr>
@@ -4936,9 +5384,9 @@
           <p:nvPr/>
         </p:nvCxnSpPr>
         <p:spPr>
-          <a:xfrm>
-            <a:off x="5255857" y="4220281"/>
-            <a:ext cx="1179932" cy="402457"/>
+          <a:xfrm flipH="1">
+            <a:off x="3219505" y="3985362"/>
+            <a:ext cx="1753122" cy="573914"/>
           </a:xfrm>
           <a:prstGeom prst="line">
             <a:avLst/>
@@ -4973,7 +5421,7 @@
         </p:nvSpPr>
         <p:spPr>
           <a:xfrm>
-            <a:off x="6435789" y="3196865"/>
+            <a:off x="7588696" y="2969508"/>
             <a:ext cx="2272899" cy="1015853"/>
           </a:xfrm>
           <a:prstGeom prst="cube">
@@ -5025,8 +5473,8 @@
         </p:nvSpPr>
         <p:spPr>
           <a:xfrm>
-            <a:off x="6602139" y="3881727"/>
-            <a:ext cx="1745991" cy="338554"/>
+            <a:off x="7751766" y="3700045"/>
+            <a:ext cx="1407758" cy="307777"/>
           </a:xfrm>
           <a:prstGeom prst="rect">
             <a:avLst/>
@@ -5040,55 +5488,29 @@
           <a:lstStyle/>
           <a:p>
             <a:r>
-              <a:rPr lang="pt-BR" sz="1600" dirty="0">
+              <a:rPr lang="pt-BR" sz="1400" dirty="0">
                 <a:latin typeface="Arial" panose="020B0604020202020204" pitchFamily="34" charset="0"/>
                 <a:cs typeface="Arial" panose="020B0604020202020204" pitchFamily="34" charset="0"/>
               </a:rPr>
-              <a:t>(Nó Operacional)</a:t>
-            </a:r>
-          </a:p>
-        </p:txBody>
-      </p:sp>
-      <p:cxnSp>
-        <p:nvCxnSpPr>
-          <p:cNvPr id="15" name="Conector reto 14">
-            <a:extLst>
-              <a:ext uri="{FF2B5EF4-FFF2-40B4-BE49-F238E27FC236}">
-                <a16:creationId xmlns:a16="http://schemas.microsoft.com/office/drawing/2014/main" id="{296C4B52-6D73-4349-9414-E929A697FD84}"/>
-              </a:ext>
-            </a:extLst>
-          </p:cNvPr>
-          <p:cNvCxnSpPr>
-            <a:cxnSpLocks/>
-            <a:stCxn id="14" idx="2"/>
-            <a:endCxn id="10" idx="0"/>
-          </p:cNvCxnSpPr>
-          <p:nvPr/>
-        </p:nvCxnSpPr>
-        <p:spPr>
-          <a:xfrm flipH="1">
-            <a:off x="6435789" y="4220281"/>
-            <a:ext cx="1039346" cy="402457"/>
-          </a:xfrm>
-          <a:prstGeom prst="line">
-            <a:avLst/>
-          </a:prstGeom>
-        </p:spPr>
-        <p:style>
-          <a:lnRef idx="1">
-            <a:schemeClr val="accent1"/>
-          </a:lnRef>
-          <a:fillRef idx="0">
-            <a:schemeClr val="accent1"/>
-          </a:fillRef>
-          <a:effectRef idx="0">
-            <a:schemeClr val="accent1"/>
-          </a:effectRef>
-          <a:fontRef idx="minor">
-            <a:schemeClr val="tx1"/>
-          </a:fontRef>
-        </p:style>
-      </p:cxnSp>
+              <a:t>(Nó </a:t>
+            </a:r>
+            <a:r>
+              <a:rPr lang="pt-BR" sz="1200" dirty="0">
+                <a:latin typeface="Arial" panose="020B0604020202020204" pitchFamily="34" charset="0"/>
+                <a:cs typeface="Arial" panose="020B0604020202020204" pitchFamily="34" charset="0"/>
+              </a:rPr>
+              <a:t>Operacional</a:t>
+            </a:r>
+            <a:r>
+              <a:rPr lang="pt-BR" sz="1400" dirty="0">
+                <a:latin typeface="Arial" panose="020B0604020202020204" pitchFamily="34" charset="0"/>
+                <a:cs typeface="Arial" panose="020B0604020202020204" pitchFamily="34" charset="0"/>
+              </a:rPr>
+              <a:t>)</a:t>
+            </a:r>
+          </a:p>
+        </p:txBody>
+      </p:sp>
       <p:sp>
         <p:nvSpPr>
           <p:cNvPr id="23" name="Retângulo 22">
@@ -5103,7 +5525,7 @@
         </p:nvSpPr>
         <p:spPr>
           <a:xfrm>
-            <a:off x="10128496" y="3082739"/>
+            <a:off x="10455789" y="2973328"/>
             <a:ext cx="1598940" cy="1034494"/>
           </a:xfrm>
           <a:prstGeom prst="rect">
@@ -5141,26 +5563,450 @@
           </a:p>
         </p:txBody>
       </p:sp>
+      <p:sp>
+        <p:nvSpPr>
+          <p:cNvPr id="17" name="Retângulo Arredondado 9">
+            <a:extLst>
+              <a:ext uri="{FF2B5EF4-FFF2-40B4-BE49-F238E27FC236}">
+                <a16:creationId xmlns:a16="http://schemas.microsoft.com/office/drawing/2014/main" id="{59C2518D-BE03-4C45-BB4B-D6EF1E892629}"/>
+              </a:ext>
+            </a:extLst>
+          </p:cNvPr>
+          <p:cNvSpPr/>
+          <p:nvPr/>
+        </p:nvSpPr>
+        <p:spPr>
+          <a:xfrm>
+            <a:off x="8001887" y="4555846"/>
+            <a:ext cx="1859708" cy="612464"/>
+          </a:xfrm>
+          <a:prstGeom prst="roundRect">
+            <a:avLst/>
+          </a:prstGeom>
+          <a:gradFill flip="none" rotWithShape="1">
+            <a:gsLst>
+              <a:gs pos="0">
+                <a:schemeClr val="accent6">
+                  <a:lumMod val="67000"/>
+                </a:schemeClr>
+              </a:gs>
+              <a:gs pos="48000">
+                <a:schemeClr val="accent6">
+                  <a:lumMod val="97000"/>
+                  <a:lumOff val="3000"/>
+                </a:schemeClr>
+              </a:gs>
+              <a:gs pos="100000">
+                <a:schemeClr val="accent6">
+                  <a:lumMod val="60000"/>
+                  <a:lumOff val="40000"/>
+                </a:schemeClr>
+              </a:gs>
+            </a:gsLst>
+            <a:lin ang="16200000" scaled="1"/>
+            <a:tileRect/>
+          </a:gradFill>
+          <a:ln>
+            <a:noFill/>
+          </a:ln>
+        </p:spPr>
+        <p:style>
+          <a:lnRef idx="0">
+            <a:scrgbClr r="0" g="0" b="0"/>
+          </a:lnRef>
+          <a:fillRef idx="0">
+            <a:scrgbClr r="0" g="0" b="0"/>
+          </a:fillRef>
+          <a:effectRef idx="0">
+            <a:scrgbClr r="0" g="0" b="0"/>
+          </a:effectRef>
+          <a:fontRef idx="minor">
+            <a:schemeClr val="lt1"/>
+          </a:fontRef>
+        </p:style>
+        <p:txBody>
+          <a:bodyPr rtlCol="0" anchor="ctr"/>
+          <a:lstStyle/>
+          <a:p>
+            <a:pPr algn="ctr"/>
+            <a:r>
+              <a:rPr lang="pt-BR" sz="1400" dirty="0">
+                <a:latin typeface="Arial" panose="020B0604020202020204" pitchFamily="34" charset="0"/>
+                <a:cs typeface="Arial" panose="020B0604020202020204" pitchFamily="34" charset="0"/>
+              </a:rPr>
+              <a:t>Tratar empacotamento   </a:t>
+            </a:r>
+          </a:p>
+        </p:txBody>
+      </p:sp>
       <p:cxnSp>
         <p:nvCxnSpPr>
-          <p:cNvPr id="24" name="Conector reto 23">
+          <p:cNvPr id="20" name="Conector reto 19">
             <a:extLst>
               <a:ext uri="{FF2B5EF4-FFF2-40B4-BE49-F238E27FC236}">
-                <a16:creationId xmlns:a16="http://schemas.microsoft.com/office/drawing/2014/main" id="{BC6F058D-F013-4529-A509-591C143AB4F9}"/>
+                <a16:creationId xmlns:a16="http://schemas.microsoft.com/office/drawing/2014/main" id="{D7E0D70D-5C69-4F74-B808-E63E1825C7D5}"/>
               </a:ext>
             </a:extLst>
           </p:cNvPr>
           <p:cNvCxnSpPr>
             <a:cxnSpLocks/>
-            <a:stCxn id="13" idx="5"/>
-            <a:endCxn id="23" idx="1"/>
+            <a:stCxn id="13" idx="3"/>
+            <a:endCxn id="17" idx="0"/>
           </p:cNvCxnSpPr>
           <p:nvPr/>
         </p:nvCxnSpPr>
         <p:spPr>
           <a:xfrm>
-            <a:off x="8708688" y="3577810"/>
-            <a:ext cx="1419808" cy="22176"/>
+            <a:off x="8598164" y="3985361"/>
+            <a:ext cx="333577" cy="570485"/>
+          </a:xfrm>
+          <a:prstGeom prst="line">
+            <a:avLst/>
+          </a:prstGeom>
+        </p:spPr>
+        <p:style>
+          <a:lnRef idx="1">
+            <a:schemeClr val="accent1"/>
+          </a:lnRef>
+          <a:fillRef idx="0">
+            <a:schemeClr val="accent1"/>
+          </a:fillRef>
+          <a:effectRef idx="0">
+            <a:schemeClr val="accent1"/>
+          </a:effectRef>
+          <a:fontRef idx="minor">
+            <a:schemeClr val="tx1"/>
+          </a:fontRef>
+        </p:style>
+      </p:cxnSp>
+      <p:sp>
+        <p:nvSpPr>
+          <p:cNvPr id="26" name="Retângulo Arredondado 9">
+            <a:extLst>
+              <a:ext uri="{FF2B5EF4-FFF2-40B4-BE49-F238E27FC236}">
+                <a16:creationId xmlns:a16="http://schemas.microsoft.com/office/drawing/2014/main" id="{726AA524-F4CF-470F-BBBD-01356B9C9900}"/>
+              </a:ext>
+            </a:extLst>
+          </p:cNvPr>
+          <p:cNvSpPr/>
+          <p:nvPr/>
+        </p:nvSpPr>
+        <p:spPr>
+          <a:xfrm>
+            <a:off x="3847051" y="4559276"/>
+            <a:ext cx="1302803" cy="612464"/>
+          </a:xfrm>
+          <a:prstGeom prst="roundRect">
+            <a:avLst/>
+          </a:prstGeom>
+          <a:gradFill flip="none" rotWithShape="1">
+            <a:gsLst>
+              <a:gs pos="0">
+                <a:schemeClr val="accent6">
+                  <a:lumMod val="67000"/>
+                </a:schemeClr>
+              </a:gs>
+              <a:gs pos="48000">
+                <a:schemeClr val="accent6">
+                  <a:lumMod val="97000"/>
+                  <a:lumOff val="3000"/>
+                </a:schemeClr>
+              </a:gs>
+              <a:gs pos="100000">
+                <a:schemeClr val="accent6">
+                  <a:lumMod val="60000"/>
+                  <a:lumOff val="40000"/>
+                </a:schemeClr>
+              </a:gs>
+            </a:gsLst>
+            <a:lin ang="16200000" scaled="1"/>
+            <a:tileRect/>
+          </a:gradFill>
+          <a:ln>
+            <a:noFill/>
+          </a:ln>
+        </p:spPr>
+        <p:style>
+          <a:lnRef idx="0">
+            <a:scrgbClr r="0" g="0" b="0"/>
+          </a:lnRef>
+          <a:fillRef idx="0">
+            <a:scrgbClr r="0" g="0" b="0"/>
+          </a:fillRef>
+          <a:effectRef idx="0">
+            <a:scrgbClr r="0" g="0" b="0"/>
+          </a:effectRef>
+          <a:fontRef idx="minor">
+            <a:schemeClr val="lt1"/>
+          </a:fontRef>
+        </p:style>
+        <p:txBody>
+          <a:bodyPr rtlCol="0" anchor="ctr"/>
+          <a:lstStyle/>
+          <a:p>
+            <a:pPr algn="ctr"/>
+            <a:r>
+              <a:rPr lang="pt-BR" sz="1400" dirty="0">
+                <a:latin typeface="Arial" panose="020B0604020202020204" pitchFamily="34" charset="0"/>
+                <a:cs typeface="Arial" panose="020B0604020202020204" pitchFamily="34" charset="0"/>
+              </a:rPr>
+              <a:t>Tratar pagamento em dinheiro   </a:t>
+            </a:r>
+          </a:p>
+        </p:txBody>
+      </p:sp>
+      <p:cxnSp>
+        <p:nvCxnSpPr>
+          <p:cNvPr id="32" name="Conector reto 31">
+            <a:extLst>
+              <a:ext uri="{FF2B5EF4-FFF2-40B4-BE49-F238E27FC236}">
+                <a16:creationId xmlns:a16="http://schemas.microsoft.com/office/drawing/2014/main" id="{A894244B-57F7-4A61-8C54-7C20CC40DE80}"/>
+              </a:ext>
+            </a:extLst>
+          </p:cNvPr>
+          <p:cNvCxnSpPr>
+            <a:cxnSpLocks/>
+            <a:stCxn id="9" idx="2"/>
+            <a:endCxn id="26" idx="0"/>
+          </p:cNvCxnSpPr>
+          <p:nvPr/>
+        </p:nvCxnSpPr>
+        <p:spPr>
+          <a:xfrm flipH="1">
+            <a:off x="4498453" y="3985362"/>
+            <a:ext cx="474174" cy="573914"/>
+          </a:xfrm>
+          <a:prstGeom prst="line">
+            <a:avLst/>
+          </a:prstGeom>
+        </p:spPr>
+        <p:style>
+          <a:lnRef idx="1">
+            <a:schemeClr val="accent1"/>
+          </a:lnRef>
+          <a:fillRef idx="0">
+            <a:schemeClr val="accent1"/>
+          </a:fillRef>
+          <a:effectRef idx="0">
+            <a:schemeClr val="accent1"/>
+          </a:effectRef>
+          <a:fontRef idx="minor">
+            <a:schemeClr val="tx1"/>
+          </a:fontRef>
+        </p:style>
+      </p:cxnSp>
+      <p:sp>
+        <p:nvSpPr>
+          <p:cNvPr id="42" name="Retângulo Arredondado 9">
+            <a:extLst>
+              <a:ext uri="{FF2B5EF4-FFF2-40B4-BE49-F238E27FC236}">
+                <a16:creationId xmlns:a16="http://schemas.microsoft.com/office/drawing/2014/main" id="{530C8E99-B939-4769-A4B3-176418E20FBD}"/>
+              </a:ext>
+            </a:extLst>
+          </p:cNvPr>
+          <p:cNvSpPr/>
+          <p:nvPr/>
+        </p:nvSpPr>
+        <p:spPr>
+          <a:xfrm>
+            <a:off x="5196948" y="4559276"/>
+            <a:ext cx="1302803" cy="612464"/>
+          </a:xfrm>
+          <a:prstGeom prst="roundRect">
+            <a:avLst/>
+          </a:prstGeom>
+          <a:gradFill flip="none" rotWithShape="1">
+            <a:gsLst>
+              <a:gs pos="0">
+                <a:schemeClr val="accent6">
+                  <a:lumMod val="67000"/>
+                </a:schemeClr>
+              </a:gs>
+              <a:gs pos="48000">
+                <a:schemeClr val="accent6">
+                  <a:lumMod val="97000"/>
+                  <a:lumOff val="3000"/>
+                </a:schemeClr>
+              </a:gs>
+              <a:gs pos="100000">
+                <a:schemeClr val="accent6">
+                  <a:lumMod val="60000"/>
+                  <a:lumOff val="40000"/>
+                </a:schemeClr>
+              </a:gs>
+            </a:gsLst>
+            <a:lin ang="16200000" scaled="1"/>
+            <a:tileRect/>
+          </a:gradFill>
+          <a:ln>
+            <a:noFill/>
+          </a:ln>
+        </p:spPr>
+        <p:style>
+          <a:lnRef idx="0">
+            <a:scrgbClr r="0" g="0" b="0"/>
+          </a:lnRef>
+          <a:fillRef idx="0">
+            <a:scrgbClr r="0" g="0" b="0"/>
+          </a:fillRef>
+          <a:effectRef idx="0">
+            <a:scrgbClr r="0" g="0" b="0"/>
+          </a:effectRef>
+          <a:fontRef idx="minor">
+            <a:schemeClr val="lt1"/>
+          </a:fontRef>
+        </p:style>
+        <p:txBody>
+          <a:bodyPr rtlCol="0" anchor="ctr"/>
+          <a:lstStyle/>
+          <a:p>
+            <a:pPr algn="ctr"/>
+            <a:r>
+              <a:rPr lang="pt-BR" sz="1400" dirty="0">
+                <a:latin typeface="Arial" panose="020B0604020202020204" pitchFamily="34" charset="0"/>
+                <a:cs typeface="Arial" panose="020B0604020202020204" pitchFamily="34" charset="0"/>
+              </a:rPr>
+              <a:t>Tratar pagamento em cartão   </a:t>
+            </a:r>
+          </a:p>
+        </p:txBody>
+      </p:sp>
+      <p:cxnSp>
+        <p:nvCxnSpPr>
+          <p:cNvPr id="57" name="Conector reto 56">
+            <a:extLst>
+              <a:ext uri="{FF2B5EF4-FFF2-40B4-BE49-F238E27FC236}">
+                <a16:creationId xmlns:a16="http://schemas.microsoft.com/office/drawing/2014/main" id="{CD4A593F-9C95-4800-9B7B-958B442C96F7}"/>
+              </a:ext>
+            </a:extLst>
+          </p:cNvPr>
+          <p:cNvCxnSpPr>
+            <a:cxnSpLocks/>
+            <a:stCxn id="9" idx="2"/>
+            <a:endCxn id="42" idx="0"/>
+          </p:cNvCxnSpPr>
+          <p:nvPr/>
+        </p:nvCxnSpPr>
+        <p:spPr>
+          <a:xfrm>
+            <a:off x="4972627" y="3985362"/>
+            <a:ext cx="875723" cy="573914"/>
+          </a:xfrm>
+          <a:prstGeom prst="line">
+            <a:avLst/>
+          </a:prstGeom>
+        </p:spPr>
+        <p:style>
+          <a:lnRef idx="1">
+            <a:schemeClr val="accent1"/>
+          </a:lnRef>
+          <a:fillRef idx="0">
+            <a:schemeClr val="accent1"/>
+          </a:fillRef>
+          <a:effectRef idx="0">
+            <a:schemeClr val="accent1"/>
+          </a:effectRef>
+          <a:fontRef idx="minor">
+            <a:schemeClr val="tx1"/>
+          </a:fontRef>
+        </p:style>
+      </p:cxnSp>
+      <p:sp>
+        <p:nvSpPr>
+          <p:cNvPr id="65" name="Retângulo Arredondado 9">
+            <a:extLst>
+              <a:ext uri="{FF2B5EF4-FFF2-40B4-BE49-F238E27FC236}">
+                <a16:creationId xmlns:a16="http://schemas.microsoft.com/office/drawing/2014/main" id="{85BC9B38-54EA-4D53-AF3B-CBA65691CEBD}"/>
+              </a:ext>
+            </a:extLst>
+          </p:cNvPr>
+          <p:cNvSpPr/>
+          <p:nvPr/>
+        </p:nvSpPr>
+        <p:spPr>
+          <a:xfrm>
+            <a:off x="6626190" y="4555846"/>
+            <a:ext cx="1302803" cy="612464"/>
+          </a:xfrm>
+          <a:prstGeom prst="roundRect">
+            <a:avLst/>
+          </a:prstGeom>
+          <a:gradFill flip="none" rotWithShape="1">
+            <a:gsLst>
+              <a:gs pos="0">
+                <a:schemeClr val="accent6">
+                  <a:lumMod val="67000"/>
+                </a:schemeClr>
+              </a:gs>
+              <a:gs pos="48000">
+                <a:schemeClr val="accent6">
+                  <a:lumMod val="97000"/>
+                  <a:lumOff val="3000"/>
+                </a:schemeClr>
+              </a:gs>
+              <a:gs pos="100000">
+                <a:schemeClr val="accent6">
+                  <a:lumMod val="60000"/>
+                  <a:lumOff val="40000"/>
+                </a:schemeClr>
+              </a:gs>
+            </a:gsLst>
+            <a:lin ang="16200000" scaled="1"/>
+            <a:tileRect/>
+          </a:gradFill>
+          <a:ln>
+            <a:noFill/>
+          </a:ln>
+        </p:spPr>
+        <p:style>
+          <a:lnRef idx="0">
+            <a:scrgbClr r="0" g="0" b="0"/>
+          </a:lnRef>
+          <a:fillRef idx="0">
+            <a:scrgbClr r="0" g="0" b="0"/>
+          </a:fillRef>
+          <a:effectRef idx="0">
+            <a:scrgbClr r="0" g="0" b="0"/>
+          </a:effectRef>
+          <a:fontRef idx="minor">
+            <a:schemeClr val="lt1"/>
+          </a:fontRef>
+        </p:style>
+        <p:txBody>
+          <a:bodyPr rtlCol="0" anchor="ctr"/>
+          <a:lstStyle/>
+          <a:p>
+            <a:pPr algn="ctr"/>
+            <a:r>
+              <a:rPr lang="pt-BR" sz="1400" dirty="0">
+                <a:latin typeface="Arial" panose="020B0604020202020204" pitchFamily="34" charset="0"/>
+                <a:cs typeface="Arial" panose="020B0604020202020204" pitchFamily="34" charset="0"/>
+              </a:rPr>
+              <a:t>Tratar pagamento em Pix   </a:t>
+            </a:r>
+          </a:p>
+        </p:txBody>
+      </p:sp>
+      <p:cxnSp>
+        <p:nvCxnSpPr>
+          <p:cNvPr id="67" name="Conector reto 66">
+            <a:extLst>
+              <a:ext uri="{FF2B5EF4-FFF2-40B4-BE49-F238E27FC236}">
+                <a16:creationId xmlns:a16="http://schemas.microsoft.com/office/drawing/2014/main" id="{3624F9F1-ADF8-48D2-B891-B344D8F92E1F}"/>
+              </a:ext>
+            </a:extLst>
+          </p:cNvPr>
+          <p:cNvCxnSpPr>
+            <a:cxnSpLocks/>
+            <a:stCxn id="9" idx="2"/>
+            <a:endCxn id="65" idx="0"/>
+          </p:cNvCxnSpPr>
+          <p:nvPr/>
+        </p:nvCxnSpPr>
+        <p:spPr>
+          <a:xfrm>
+            <a:off x="4972627" y="3985362"/>
+            <a:ext cx="2304965" cy="570484"/>
           </a:xfrm>
           <a:prstGeom prst="line">
             <a:avLst/>
@@ -5184,7 +6030,7 @@
     </p:spTree>
     <p:extLst>
       <p:ext uri="{BB962C8B-B14F-4D97-AF65-F5344CB8AC3E}">
-        <p14:creationId xmlns:p14="http://schemas.microsoft.com/office/powerpoint/2010/main" val="2367524892"/>
+        <p14:creationId xmlns:p14="http://schemas.microsoft.com/office/powerpoint/2010/main" val="2545260601"/>
       </p:ext>
     </p:extLst>
   </p:cSld>
@@ -5211,6 +6057,46 @@
           <a:chExt cx="0" cy="0"/>
         </a:xfrm>
       </p:grpSpPr>
+      <p:cxnSp>
+        <p:nvCxnSpPr>
+          <p:cNvPr id="24" name="Conector reto 23">
+            <a:extLst>
+              <a:ext uri="{FF2B5EF4-FFF2-40B4-BE49-F238E27FC236}">
+                <a16:creationId xmlns:a16="http://schemas.microsoft.com/office/drawing/2014/main" id="{BC6F058D-F013-4529-A509-591C143AB4F9}"/>
+              </a:ext>
+            </a:extLst>
+          </p:cNvPr>
+          <p:cNvCxnSpPr>
+            <a:cxnSpLocks/>
+            <a:stCxn id="8" idx="5"/>
+            <a:endCxn id="23" idx="1"/>
+          </p:cNvCxnSpPr>
+          <p:nvPr/>
+        </p:nvCxnSpPr>
+        <p:spPr>
+          <a:xfrm>
+            <a:off x="6241827" y="3350454"/>
+            <a:ext cx="4213962" cy="140121"/>
+          </a:xfrm>
+          <a:prstGeom prst="line">
+            <a:avLst/>
+          </a:prstGeom>
+        </p:spPr>
+        <p:style>
+          <a:lnRef idx="1">
+            <a:schemeClr val="accent1"/>
+          </a:lnRef>
+          <a:fillRef idx="0">
+            <a:schemeClr val="accent1"/>
+          </a:fillRef>
+          <a:effectRef idx="0">
+            <a:schemeClr val="accent1"/>
+          </a:effectRef>
+          <a:fontRef idx="minor">
+            <a:schemeClr val="tx1"/>
+          </a:fontRef>
+        </p:style>
+      </p:cxnSp>
       <p:sp>
         <p:nvSpPr>
           <p:cNvPr id="2" name="Título 1"/>
@@ -5223,8 +6109,8 @@
         </p:nvSpPr>
         <p:spPr>
           <a:xfrm>
-            <a:off x="254977" y="313372"/>
-            <a:ext cx="11728938" cy="1034826"/>
+            <a:off x="342900" y="325316"/>
+            <a:ext cx="11010900" cy="1034494"/>
           </a:xfrm>
         </p:spPr>
         <p:txBody>
@@ -5239,7 +6125,7 @@
                 <a:ea typeface="+mn-ea"/>
                 <a:cs typeface="Arial" panose="020B0604020202020204" pitchFamily="34" charset="0"/>
               </a:rPr>
-              <a:t>Cenário: Solicitar devolução do pedido de formas padrão</a:t>
+              <a:t>Cenário: Realizar pedido sob medida</a:t>
             </a:r>
           </a:p>
         </p:txBody>
@@ -5252,8 +6138,8 @@
         </p:nvSpPr>
         <p:spPr>
           <a:xfrm>
-            <a:off x="2018523" y="3218327"/>
-            <a:ext cx="1617784" cy="1177374"/>
+            <a:off x="169627" y="2973328"/>
+            <a:ext cx="1598940" cy="1034494"/>
           </a:xfrm>
           <a:prstGeom prst="rect">
             <a:avLst/>
@@ -5298,8 +6184,8 @@
         </p:nvSpPr>
         <p:spPr>
           <a:xfrm>
-            <a:off x="6901960" y="2575293"/>
-            <a:ext cx="4264271" cy="400110"/>
+            <a:off x="2875085" y="1443520"/>
+            <a:ext cx="6846277" cy="400110"/>
           </a:xfrm>
           <a:prstGeom prst="rect">
             <a:avLst/>
@@ -5334,9 +6220,9 @@
           <p:nvPr/>
         </p:nvCxnSpPr>
         <p:spPr>
-          <a:xfrm flipV="1">
-            <a:off x="3636307" y="3795401"/>
-            <a:ext cx="4264271" cy="11613"/>
+          <a:xfrm>
+            <a:off x="1768567" y="3490575"/>
+            <a:ext cx="2200361" cy="113842"/>
           </a:xfrm>
           <a:prstGeom prst="line">
             <a:avLst/>
@@ -5365,8 +6251,8 @@
         </p:nvSpPr>
         <p:spPr>
           <a:xfrm>
-            <a:off x="6623540" y="2378717"/>
-            <a:ext cx="4826977" cy="3402623"/>
+            <a:off x="2470638" y="1359810"/>
+            <a:ext cx="7702062" cy="4314749"/>
           </a:xfrm>
           <a:prstGeom prst="roundRect">
             <a:avLst/>
@@ -5416,7 +6302,7 @@
         </p:nvSpPr>
         <p:spPr>
           <a:xfrm>
-            <a:off x="7900578" y="3160493"/>
+            <a:off x="3968928" y="2969509"/>
             <a:ext cx="2272899" cy="1015853"/>
           </a:xfrm>
           <a:prstGeom prst="cube">
@@ -5445,7 +6331,7 @@
           <a:p>
             <a:pPr algn="ctr"/>
             <a:r>
-              <a:rPr lang="pt-BR" dirty="0">
+              <a:rPr lang="pt-BR" sz="1400" dirty="0">
                 <a:latin typeface="Arial" panose="020B0604020202020204" pitchFamily="34" charset="0"/>
                 <a:cs typeface="Arial" panose="020B0604020202020204" pitchFamily="34" charset="0"/>
               </a:rPr>
@@ -5462,8 +6348,8 @@
         </p:nvSpPr>
         <p:spPr>
           <a:xfrm>
-            <a:off x="8166500" y="3843708"/>
-            <a:ext cx="1745991" cy="338554"/>
+            <a:off x="4199018" y="3677585"/>
+            <a:ext cx="1547218" cy="307777"/>
           </a:xfrm>
           <a:prstGeom prst="rect">
             <a:avLst/>
@@ -5477,7 +6363,7 @@
           <a:lstStyle/>
           <a:p>
             <a:r>
-              <a:rPr lang="pt-BR" sz="1600" dirty="0">
+              <a:rPr lang="pt-BR" sz="1400" dirty="0">
                 <a:latin typeface="Arial" panose="020B0604020202020204" pitchFamily="34" charset="0"/>
                 <a:cs typeface="Arial" panose="020B0604020202020204" pitchFamily="34" charset="0"/>
               </a:rPr>
@@ -5494,8 +6380,8 @@
         </p:nvSpPr>
         <p:spPr>
           <a:xfrm>
-            <a:off x="8030606" y="4749665"/>
-            <a:ext cx="2006977" cy="914400"/>
+            <a:off x="2703606" y="4559276"/>
+            <a:ext cx="1031798" cy="631146"/>
           </a:xfrm>
           <a:prstGeom prst="roundRect">
             <a:avLst/>
@@ -5547,11 +6433,11 @@
           <a:p>
             <a:pPr algn="ctr"/>
             <a:r>
-              <a:rPr lang="pt-BR" dirty="0">
+              <a:rPr lang="pt-BR" sz="1400" dirty="0">
                 <a:latin typeface="Arial" panose="020B0604020202020204" pitchFamily="34" charset="0"/>
                 <a:cs typeface="Arial" panose="020B0604020202020204" pitchFamily="34" charset="0"/>
               </a:rPr>
-              <a:t>tratar devolução do pedido</a:t>
+              <a:t>Tratar pedido   </a:t>
             </a:r>
           </a:p>
         </p:txBody>
@@ -5574,8 +6460,408 @@
         </p:nvCxnSpPr>
         <p:spPr>
           <a:xfrm flipH="1">
-            <a:off x="9034095" y="4182262"/>
-            <a:ext cx="5401" cy="567403"/>
+            <a:off x="3219505" y="3985362"/>
+            <a:ext cx="1753122" cy="573914"/>
+          </a:xfrm>
+          <a:prstGeom prst="line">
+            <a:avLst/>
+          </a:prstGeom>
+        </p:spPr>
+        <p:style>
+          <a:lnRef idx="1">
+            <a:schemeClr val="accent1"/>
+          </a:lnRef>
+          <a:fillRef idx="0">
+            <a:schemeClr val="accent1"/>
+          </a:fillRef>
+          <a:effectRef idx="0">
+            <a:schemeClr val="accent1"/>
+          </a:effectRef>
+          <a:fontRef idx="minor">
+            <a:schemeClr val="tx1"/>
+          </a:fontRef>
+        </p:style>
+      </p:cxnSp>
+      <p:sp>
+        <p:nvSpPr>
+          <p:cNvPr id="23" name="Retângulo 22">
+            <a:extLst>
+              <a:ext uri="{FF2B5EF4-FFF2-40B4-BE49-F238E27FC236}">
+                <a16:creationId xmlns:a16="http://schemas.microsoft.com/office/drawing/2014/main" id="{A55927FF-5CCE-4580-97AD-62A4648F46D2}"/>
+              </a:ext>
+            </a:extLst>
+          </p:cNvPr>
+          <p:cNvSpPr/>
+          <p:nvPr/>
+        </p:nvSpPr>
+        <p:spPr>
+          <a:xfrm>
+            <a:off x="10455789" y="2973328"/>
+            <a:ext cx="1598940" cy="1034494"/>
+          </a:xfrm>
+          <a:prstGeom prst="rect">
+            <a:avLst/>
+          </a:prstGeom>
+        </p:spPr>
+        <p:style>
+          <a:lnRef idx="2">
+            <a:schemeClr val="accent1">
+              <a:shade val="50000"/>
+            </a:schemeClr>
+          </a:lnRef>
+          <a:fillRef idx="1">
+            <a:schemeClr val="accent1"/>
+          </a:fillRef>
+          <a:effectRef idx="0">
+            <a:schemeClr val="accent1"/>
+          </a:effectRef>
+          <a:fontRef idx="minor">
+            <a:schemeClr val="lt1"/>
+          </a:fontRef>
+        </p:style>
+        <p:txBody>
+          <a:bodyPr rtlCol="0" anchor="ctr"/>
+          <a:lstStyle/>
+          <a:p>
+            <a:pPr algn="ctr"/>
+            <a:r>
+              <a:rPr lang="pt-BR" dirty="0">
+                <a:latin typeface="Arial" panose="020B0604020202020204" pitchFamily="34" charset="0"/>
+                <a:cs typeface="Arial" panose="020B0604020202020204" pitchFamily="34" charset="0"/>
+              </a:rPr>
+              <a:t>Fabricante </a:t>
+            </a:r>
+          </a:p>
+        </p:txBody>
+      </p:sp>
+      <p:sp>
+        <p:nvSpPr>
+          <p:cNvPr id="26" name="Retângulo Arredondado 9">
+            <a:extLst>
+              <a:ext uri="{FF2B5EF4-FFF2-40B4-BE49-F238E27FC236}">
+                <a16:creationId xmlns:a16="http://schemas.microsoft.com/office/drawing/2014/main" id="{726AA524-F4CF-470F-BBBD-01356B9C9900}"/>
+              </a:ext>
+            </a:extLst>
+          </p:cNvPr>
+          <p:cNvSpPr/>
+          <p:nvPr/>
+        </p:nvSpPr>
+        <p:spPr>
+          <a:xfrm>
+            <a:off x="3847051" y="4559276"/>
+            <a:ext cx="1302803" cy="612464"/>
+          </a:xfrm>
+          <a:prstGeom prst="roundRect">
+            <a:avLst/>
+          </a:prstGeom>
+          <a:gradFill flip="none" rotWithShape="1">
+            <a:gsLst>
+              <a:gs pos="0">
+                <a:schemeClr val="accent6">
+                  <a:lumMod val="67000"/>
+                </a:schemeClr>
+              </a:gs>
+              <a:gs pos="48000">
+                <a:schemeClr val="accent6">
+                  <a:lumMod val="97000"/>
+                  <a:lumOff val="3000"/>
+                </a:schemeClr>
+              </a:gs>
+              <a:gs pos="100000">
+                <a:schemeClr val="accent6">
+                  <a:lumMod val="60000"/>
+                  <a:lumOff val="40000"/>
+                </a:schemeClr>
+              </a:gs>
+            </a:gsLst>
+            <a:lin ang="16200000" scaled="1"/>
+            <a:tileRect/>
+          </a:gradFill>
+          <a:ln>
+            <a:noFill/>
+          </a:ln>
+        </p:spPr>
+        <p:style>
+          <a:lnRef idx="0">
+            <a:scrgbClr r="0" g="0" b="0"/>
+          </a:lnRef>
+          <a:fillRef idx="0">
+            <a:scrgbClr r="0" g="0" b="0"/>
+          </a:fillRef>
+          <a:effectRef idx="0">
+            <a:scrgbClr r="0" g="0" b="0"/>
+          </a:effectRef>
+          <a:fontRef idx="minor">
+            <a:schemeClr val="lt1"/>
+          </a:fontRef>
+        </p:style>
+        <p:txBody>
+          <a:bodyPr rtlCol="0" anchor="ctr"/>
+          <a:lstStyle/>
+          <a:p>
+            <a:pPr algn="ctr"/>
+            <a:r>
+              <a:rPr lang="pt-BR" sz="1400" dirty="0">
+                <a:latin typeface="Arial" panose="020B0604020202020204" pitchFamily="34" charset="0"/>
+                <a:cs typeface="Arial" panose="020B0604020202020204" pitchFamily="34" charset="0"/>
+              </a:rPr>
+              <a:t>Tratar pagamento em dinheiro   </a:t>
+            </a:r>
+          </a:p>
+        </p:txBody>
+      </p:sp>
+      <p:cxnSp>
+        <p:nvCxnSpPr>
+          <p:cNvPr id="32" name="Conector reto 31">
+            <a:extLst>
+              <a:ext uri="{FF2B5EF4-FFF2-40B4-BE49-F238E27FC236}">
+                <a16:creationId xmlns:a16="http://schemas.microsoft.com/office/drawing/2014/main" id="{A894244B-57F7-4A61-8C54-7C20CC40DE80}"/>
+              </a:ext>
+            </a:extLst>
+          </p:cNvPr>
+          <p:cNvCxnSpPr>
+            <a:cxnSpLocks/>
+            <a:stCxn id="9" idx="2"/>
+            <a:endCxn id="26" idx="0"/>
+          </p:cNvCxnSpPr>
+          <p:nvPr/>
+        </p:nvCxnSpPr>
+        <p:spPr>
+          <a:xfrm flipH="1">
+            <a:off x="4498453" y="3985362"/>
+            <a:ext cx="474174" cy="573914"/>
+          </a:xfrm>
+          <a:prstGeom prst="line">
+            <a:avLst/>
+          </a:prstGeom>
+        </p:spPr>
+        <p:style>
+          <a:lnRef idx="1">
+            <a:schemeClr val="accent1"/>
+          </a:lnRef>
+          <a:fillRef idx="0">
+            <a:schemeClr val="accent1"/>
+          </a:fillRef>
+          <a:effectRef idx="0">
+            <a:schemeClr val="accent1"/>
+          </a:effectRef>
+          <a:fontRef idx="minor">
+            <a:schemeClr val="tx1"/>
+          </a:fontRef>
+        </p:style>
+      </p:cxnSp>
+      <p:sp>
+        <p:nvSpPr>
+          <p:cNvPr id="42" name="Retângulo Arredondado 9">
+            <a:extLst>
+              <a:ext uri="{FF2B5EF4-FFF2-40B4-BE49-F238E27FC236}">
+                <a16:creationId xmlns:a16="http://schemas.microsoft.com/office/drawing/2014/main" id="{530C8E99-B939-4769-A4B3-176418E20FBD}"/>
+              </a:ext>
+            </a:extLst>
+          </p:cNvPr>
+          <p:cNvSpPr/>
+          <p:nvPr/>
+        </p:nvSpPr>
+        <p:spPr>
+          <a:xfrm>
+            <a:off x="5196948" y="4559276"/>
+            <a:ext cx="1302803" cy="612464"/>
+          </a:xfrm>
+          <a:prstGeom prst="roundRect">
+            <a:avLst/>
+          </a:prstGeom>
+          <a:gradFill flip="none" rotWithShape="1">
+            <a:gsLst>
+              <a:gs pos="0">
+                <a:schemeClr val="accent6">
+                  <a:lumMod val="67000"/>
+                </a:schemeClr>
+              </a:gs>
+              <a:gs pos="48000">
+                <a:schemeClr val="accent6">
+                  <a:lumMod val="97000"/>
+                  <a:lumOff val="3000"/>
+                </a:schemeClr>
+              </a:gs>
+              <a:gs pos="100000">
+                <a:schemeClr val="accent6">
+                  <a:lumMod val="60000"/>
+                  <a:lumOff val="40000"/>
+                </a:schemeClr>
+              </a:gs>
+            </a:gsLst>
+            <a:lin ang="16200000" scaled="1"/>
+            <a:tileRect/>
+          </a:gradFill>
+          <a:ln>
+            <a:noFill/>
+          </a:ln>
+        </p:spPr>
+        <p:style>
+          <a:lnRef idx="0">
+            <a:scrgbClr r="0" g="0" b="0"/>
+          </a:lnRef>
+          <a:fillRef idx="0">
+            <a:scrgbClr r="0" g="0" b="0"/>
+          </a:fillRef>
+          <a:effectRef idx="0">
+            <a:scrgbClr r="0" g="0" b="0"/>
+          </a:effectRef>
+          <a:fontRef idx="minor">
+            <a:schemeClr val="lt1"/>
+          </a:fontRef>
+        </p:style>
+        <p:txBody>
+          <a:bodyPr rtlCol="0" anchor="ctr"/>
+          <a:lstStyle/>
+          <a:p>
+            <a:pPr algn="ctr"/>
+            <a:r>
+              <a:rPr lang="pt-BR" sz="1400" dirty="0">
+                <a:latin typeface="Arial" panose="020B0604020202020204" pitchFamily="34" charset="0"/>
+                <a:cs typeface="Arial" panose="020B0604020202020204" pitchFamily="34" charset="0"/>
+              </a:rPr>
+              <a:t>Tratar pagamento em cartão   </a:t>
+            </a:r>
+          </a:p>
+        </p:txBody>
+      </p:sp>
+      <p:cxnSp>
+        <p:nvCxnSpPr>
+          <p:cNvPr id="57" name="Conector reto 56">
+            <a:extLst>
+              <a:ext uri="{FF2B5EF4-FFF2-40B4-BE49-F238E27FC236}">
+                <a16:creationId xmlns:a16="http://schemas.microsoft.com/office/drawing/2014/main" id="{CD4A593F-9C95-4800-9B7B-958B442C96F7}"/>
+              </a:ext>
+            </a:extLst>
+          </p:cNvPr>
+          <p:cNvCxnSpPr>
+            <a:cxnSpLocks/>
+            <a:stCxn id="9" idx="2"/>
+            <a:endCxn id="42" idx="0"/>
+          </p:cNvCxnSpPr>
+          <p:nvPr/>
+        </p:nvCxnSpPr>
+        <p:spPr>
+          <a:xfrm>
+            <a:off x="4972627" y="3985362"/>
+            <a:ext cx="875723" cy="573914"/>
+          </a:xfrm>
+          <a:prstGeom prst="line">
+            <a:avLst/>
+          </a:prstGeom>
+        </p:spPr>
+        <p:style>
+          <a:lnRef idx="1">
+            <a:schemeClr val="accent1"/>
+          </a:lnRef>
+          <a:fillRef idx="0">
+            <a:schemeClr val="accent1"/>
+          </a:fillRef>
+          <a:effectRef idx="0">
+            <a:schemeClr val="accent1"/>
+          </a:effectRef>
+          <a:fontRef idx="minor">
+            <a:schemeClr val="tx1"/>
+          </a:fontRef>
+        </p:style>
+      </p:cxnSp>
+      <p:sp>
+        <p:nvSpPr>
+          <p:cNvPr id="65" name="Retângulo Arredondado 9">
+            <a:extLst>
+              <a:ext uri="{FF2B5EF4-FFF2-40B4-BE49-F238E27FC236}">
+                <a16:creationId xmlns:a16="http://schemas.microsoft.com/office/drawing/2014/main" id="{85BC9B38-54EA-4D53-AF3B-CBA65691CEBD}"/>
+              </a:ext>
+            </a:extLst>
+          </p:cNvPr>
+          <p:cNvSpPr/>
+          <p:nvPr/>
+        </p:nvSpPr>
+        <p:spPr>
+          <a:xfrm>
+            <a:off x="6626190" y="4555846"/>
+            <a:ext cx="1302803" cy="612464"/>
+          </a:xfrm>
+          <a:prstGeom prst="roundRect">
+            <a:avLst/>
+          </a:prstGeom>
+          <a:gradFill flip="none" rotWithShape="1">
+            <a:gsLst>
+              <a:gs pos="0">
+                <a:schemeClr val="accent6">
+                  <a:lumMod val="67000"/>
+                </a:schemeClr>
+              </a:gs>
+              <a:gs pos="48000">
+                <a:schemeClr val="accent6">
+                  <a:lumMod val="97000"/>
+                  <a:lumOff val="3000"/>
+                </a:schemeClr>
+              </a:gs>
+              <a:gs pos="100000">
+                <a:schemeClr val="accent6">
+                  <a:lumMod val="60000"/>
+                  <a:lumOff val="40000"/>
+                </a:schemeClr>
+              </a:gs>
+            </a:gsLst>
+            <a:lin ang="16200000" scaled="1"/>
+            <a:tileRect/>
+          </a:gradFill>
+          <a:ln>
+            <a:noFill/>
+          </a:ln>
+        </p:spPr>
+        <p:style>
+          <a:lnRef idx="0">
+            <a:scrgbClr r="0" g="0" b="0"/>
+          </a:lnRef>
+          <a:fillRef idx="0">
+            <a:scrgbClr r="0" g="0" b="0"/>
+          </a:fillRef>
+          <a:effectRef idx="0">
+            <a:scrgbClr r="0" g="0" b="0"/>
+          </a:effectRef>
+          <a:fontRef idx="minor">
+            <a:schemeClr val="lt1"/>
+          </a:fontRef>
+        </p:style>
+        <p:txBody>
+          <a:bodyPr rtlCol="0" anchor="ctr"/>
+          <a:lstStyle/>
+          <a:p>
+            <a:pPr algn="ctr"/>
+            <a:r>
+              <a:rPr lang="pt-BR" sz="1400" dirty="0">
+                <a:latin typeface="Arial" panose="020B0604020202020204" pitchFamily="34" charset="0"/>
+                <a:cs typeface="Arial" panose="020B0604020202020204" pitchFamily="34" charset="0"/>
+              </a:rPr>
+              <a:t>Tratar pagamento em Pix   </a:t>
+            </a:r>
+          </a:p>
+        </p:txBody>
+      </p:sp>
+      <p:cxnSp>
+        <p:nvCxnSpPr>
+          <p:cNvPr id="67" name="Conector reto 66">
+            <a:extLst>
+              <a:ext uri="{FF2B5EF4-FFF2-40B4-BE49-F238E27FC236}">
+                <a16:creationId xmlns:a16="http://schemas.microsoft.com/office/drawing/2014/main" id="{3624F9F1-ADF8-48D2-B891-B344D8F92E1F}"/>
+              </a:ext>
+            </a:extLst>
+          </p:cNvPr>
+          <p:cNvCxnSpPr>
+            <a:cxnSpLocks/>
+            <a:stCxn id="9" idx="2"/>
+            <a:endCxn id="65" idx="0"/>
+          </p:cNvCxnSpPr>
+          <p:nvPr/>
+        </p:nvCxnSpPr>
+        <p:spPr>
+          <a:xfrm>
+            <a:off x="4972627" y="3985362"/>
+            <a:ext cx="2304965" cy="570484"/>
           </a:xfrm>
           <a:prstGeom prst="line">
             <a:avLst/>
@@ -5599,7 +6885,7 @@
     </p:spTree>
     <p:extLst>
       <p:ext uri="{BB962C8B-B14F-4D97-AF65-F5344CB8AC3E}">
-        <p14:creationId xmlns:p14="http://schemas.microsoft.com/office/powerpoint/2010/main" val="742500691"/>
+        <p14:creationId xmlns:p14="http://schemas.microsoft.com/office/powerpoint/2010/main" val="2060403710"/>
       </p:ext>
     </p:extLst>
   </p:cSld>
@@ -5636,7 +6922,12 @@
             <p:ph type="title"/>
           </p:nvPr>
         </p:nvSpPr>
-        <p:spPr/>
+        <p:spPr>
+          <a:xfrm>
+            <a:off x="254977" y="313372"/>
+            <a:ext cx="11728938" cy="1034826"/>
+          </a:xfrm>
+        </p:spPr>
         <p:txBody>
           <a:bodyPr>
             <a:normAutofit/>
@@ -5649,7 +6940,53 @@
                 <a:ea typeface="+mn-ea"/>
                 <a:cs typeface="Arial" panose="020B0604020202020204" pitchFamily="34" charset="0"/>
               </a:rPr>
-              <a:t>Cenário: Suprir produtos</a:t>
+              <a:t>Cenário: Solicitar devolução do pedido de formas padrão</a:t>
+            </a:r>
+          </a:p>
+        </p:txBody>
+      </p:sp>
+      <p:sp>
+        <p:nvSpPr>
+          <p:cNvPr id="4" name="Retângulo 3"/>
+          <p:cNvSpPr/>
+          <p:nvPr/>
+        </p:nvSpPr>
+        <p:spPr>
+          <a:xfrm>
+            <a:off x="2018523" y="3218327"/>
+            <a:ext cx="1617784" cy="1177374"/>
+          </a:xfrm>
+          <a:prstGeom prst="rect">
+            <a:avLst/>
+          </a:prstGeom>
+        </p:spPr>
+        <p:style>
+          <a:lnRef idx="2">
+            <a:schemeClr val="accent1">
+              <a:shade val="50000"/>
+            </a:schemeClr>
+          </a:lnRef>
+          <a:fillRef idx="1">
+            <a:schemeClr val="accent1"/>
+          </a:fillRef>
+          <a:effectRef idx="0">
+            <a:schemeClr val="accent1"/>
+          </a:effectRef>
+          <a:fontRef idx="minor">
+            <a:schemeClr val="lt1"/>
+          </a:fontRef>
+        </p:style>
+        <p:txBody>
+          <a:bodyPr rtlCol="0" anchor="ctr"/>
+          <a:lstStyle/>
+          <a:p>
+            <a:pPr algn="ctr"/>
+            <a:r>
+              <a:rPr lang="pt-BR" dirty="0">
+                <a:latin typeface="Arial" panose="020B0604020202020204" pitchFamily="34" charset="0"/>
+                <a:cs typeface="Arial" panose="020B0604020202020204" pitchFamily="34" charset="0"/>
+              </a:rPr>
+              <a:t>Cliente </a:t>
             </a:r>
           </a:p>
         </p:txBody>
@@ -5662,8 +6999,8 @@
         </p:nvSpPr>
         <p:spPr>
           <a:xfrm>
-            <a:off x="5638780" y="2466040"/>
-            <a:ext cx="5556738" cy="400110"/>
+            <a:off x="6901960" y="2575293"/>
+            <a:ext cx="4264271" cy="400110"/>
           </a:xfrm>
           <a:prstGeom prst="rect">
             <a:avLst/>
@@ -5692,15 +7029,15 @@
           <p:cNvPr id="6" name="Conector reto 5"/>
           <p:cNvCxnSpPr>
             <a:cxnSpLocks/>
-            <a:stCxn id="11" idx="3"/>
+            <a:stCxn id="4" idx="3"/>
             <a:endCxn id="8" idx="2"/>
           </p:cNvCxnSpPr>
           <p:nvPr/>
         </p:nvCxnSpPr>
         <p:spPr>
-          <a:xfrm>
-            <a:off x="3612497" y="3795401"/>
-            <a:ext cx="2365512" cy="0"/>
+          <a:xfrm flipV="1">
+            <a:off x="3636307" y="3795401"/>
+            <a:ext cx="4264271" cy="11613"/>
           </a:xfrm>
           <a:prstGeom prst="line">
             <a:avLst/>
@@ -5729,8 +7066,8 @@
         </p:nvSpPr>
         <p:spPr>
           <a:xfrm>
-            <a:off x="5433646" y="2233247"/>
-            <a:ext cx="6016871" cy="3548094"/>
+            <a:off x="6623540" y="2378717"/>
+            <a:ext cx="4826977" cy="3402623"/>
           </a:xfrm>
           <a:prstGeom prst="roundRect">
             <a:avLst/>
@@ -5780,7 +7117,7 @@
         </p:nvSpPr>
         <p:spPr>
           <a:xfrm>
-            <a:off x="5978009" y="3160493"/>
+            <a:off x="7900578" y="3160493"/>
             <a:ext cx="2272899" cy="1015853"/>
           </a:xfrm>
           <a:prstGeom prst="cube">
@@ -5809,11 +7146,11 @@
           <a:p>
             <a:pPr algn="ctr"/>
             <a:r>
-              <a:rPr lang="pt-BR" sz="1400" dirty="0">
+              <a:rPr lang="pt-BR" dirty="0">
                 <a:latin typeface="Arial" panose="020B0604020202020204" pitchFamily="34" charset="0"/>
                 <a:cs typeface="Arial" panose="020B0604020202020204" pitchFamily="34" charset="0"/>
               </a:rPr>
-              <a:t>Setor de compras </a:t>
+              <a:t>Setor de vendas</a:t>
             </a:r>
           </a:p>
         </p:txBody>
@@ -5826,7 +7163,7 @@
         </p:nvSpPr>
         <p:spPr>
           <a:xfrm>
-            <a:off x="6065375" y="3843708"/>
+            <a:off x="8166500" y="3843708"/>
             <a:ext cx="1745991" cy="338554"/>
           </a:xfrm>
           <a:prstGeom prst="rect">
@@ -5858,8 +7195,8 @@
         </p:nvSpPr>
         <p:spPr>
           <a:xfrm>
-            <a:off x="7114458" y="4757405"/>
-            <a:ext cx="1741054" cy="914400"/>
+            <a:off x="8030606" y="4749665"/>
+            <a:ext cx="2006977" cy="914400"/>
           </a:xfrm>
           <a:prstGeom prst="roundRect">
             <a:avLst/>
@@ -5915,7 +7252,7 @@
                 <a:latin typeface="Arial" panose="020B0604020202020204" pitchFamily="34" charset="0"/>
                 <a:cs typeface="Arial" panose="020B0604020202020204" pitchFamily="34" charset="0"/>
               </a:rPr>
-              <a:t>abastecer produtos</a:t>
+              <a:t>tratar devolução do pedido</a:t>
             </a:r>
           </a:p>
         </p:txBody>
@@ -5937,9 +7274,9 @@
           <p:nvPr/>
         </p:nvCxnSpPr>
         <p:spPr>
-          <a:xfrm>
-            <a:off x="6938371" y="4182262"/>
-            <a:ext cx="1046614" cy="575143"/>
+          <a:xfrm flipH="1">
+            <a:off x="9034095" y="4182262"/>
+            <a:ext cx="5401" cy="567403"/>
           </a:xfrm>
           <a:prstGeom prst="line">
             <a:avLst/>
@@ -5960,36 +7297,244 @@
           </a:fontRef>
         </p:style>
       </p:cxnSp>
-      <p:sp>
-        <p:nvSpPr>
-          <p:cNvPr id="11" name="Retângulo 10">
+    </p:spTree>
+    <p:extLst>
+      <p:ext uri="{BB962C8B-B14F-4D97-AF65-F5344CB8AC3E}">
+        <p14:creationId xmlns:p14="http://schemas.microsoft.com/office/powerpoint/2010/main" val="742500691"/>
+      </p:ext>
+    </p:extLst>
+  </p:cSld>
+  <p:clrMapOvr>
+    <a:masterClrMapping/>
+  </p:clrMapOvr>
+</p:sld>
+</file>
+
+<file path=ppt/slides/slide7.xml><?xml version="1.0" encoding="utf-8"?>
+<p:sld xmlns:a="http://schemas.openxmlformats.org/drawingml/2006/main" xmlns:r="http://schemas.openxmlformats.org/officeDocument/2006/relationships" xmlns:p="http://schemas.openxmlformats.org/presentationml/2006/main">
+  <p:cSld>
+    <p:spTree>
+      <p:nvGrpSpPr>
+        <p:cNvPr id="1" name=""/>
+        <p:cNvGrpSpPr/>
+        <p:nvPr/>
+      </p:nvGrpSpPr>
+      <p:grpSpPr>
+        <a:xfrm>
+          <a:off x="0" y="0"/>
+          <a:ext cx="0" cy="0"/>
+          <a:chOff x="0" y="0"/>
+          <a:chExt cx="0" cy="0"/>
+        </a:xfrm>
+      </p:grpSpPr>
+      <p:cxnSp>
+        <p:nvCxnSpPr>
+          <p:cNvPr id="12" name="Conector reto 11">
             <a:extLst>
               <a:ext uri="{FF2B5EF4-FFF2-40B4-BE49-F238E27FC236}">
-                <a16:creationId xmlns:a16="http://schemas.microsoft.com/office/drawing/2014/main" id="{6E71F2E2-516E-4CCE-83DA-8CD7102E4646}"/>
+                <a16:creationId xmlns:a16="http://schemas.microsoft.com/office/drawing/2014/main" id="{F1B6C749-6105-4250-9D96-3797FCC3AA4C}"/>
               </a:ext>
             </a:extLst>
           </p:cNvPr>
-          <p:cNvSpPr/>
-          <p:nvPr/>
-        </p:nvSpPr>
-        <p:spPr>
-          <a:xfrm>
-            <a:off x="1994713" y="3206714"/>
-            <a:ext cx="1617784" cy="1177374"/>
-          </a:xfrm>
-          <a:prstGeom prst="rect">
+          <p:cNvCxnSpPr>
+            <a:cxnSpLocks/>
+            <a:endCxn id="10" idx="0"/>
+          </p:cNvCxnSpPr>
+          <p:nvPr/>
+        </p:nvCxnSpPr>
+        <p:spPr>
+          <a:xfrm>
+            <a:off x="6935902" y="3843708"/>
+            <a:ext cx="0" cy="913697"/>
+          </a:xfrm>
+          <a:prstGeom prst="line">
             <a:avLst/>
           </a:prstGeom>
         </p:spPr>
         <p:style>
           <a:lnRef idx="1">
-            <a:schemeClr val="accent4"/>
+            <a:schemeClr val="accent1"/>
           </a:lnRef>
-          <a:fillRef idx="2">
-            <a:schemeClr val="accent4"/>
+          <a:fillRef idx="0">
+            <a:schemeClr val="accent1"/>
           </a:fillRef>
-          <a:effectRef idx="1">
-            <a:schemeClr val="accent4"/>
+          <a:effectRef idx="0">
+            <a:schemeClr val="accent1"/>
+          </a:effectRef>
+          <a:fontRef idx="minor">
+            <a:schemeClr val="tx1"/>
+          </a:fontRef>
+        </p:style>
+      </p:cxnSp>
+      <p:cxnSp>
+        <p:nvCxnSpPr>
+          <p:cNvPr id="18" name="Conector reto 17">
+            <a:extLst>
+              <a:ext uri="{FF2B5EF4-FFF2-40B4-BE49-F238E27FC236}">
+                <a16:creationId xmlns:a16="http://schemas.microsoft.com/office/drawing/2014/main" id="{E7044505-B8A8-4D07-A667-D4658ECAF6CB}"/>
+              </a:ext>
+            </a:extLst>
+          </p:cNvPr>
+          <p:cNvCxnSpPr>
+            <a:cxnSpLocks/>
+            <a:stCxn id="16" idx="0"/>
+            <a:endCxn id="17" idx="0"/>
+          </p:cNvCxnSpPr>
+          <p:nvPr/>
+        </p:nvCxnSpPr>
+        <p:spPr>
+          <a:xfrm>
+            <a:off x="9324292" y="3870541"/>
+            <a:ext cx="30477" cy="886864"/>
+          </a:xfrm>
+          <a:prstGeom prst="line">
+            <a:avLst/>
+          </a:prstGeom>
+        </p:spPr>
+        <p:style>
+          <a:lnRef idx="1">
+            <a:schemeClr val="accent1"/>
+          </a:lnRef>
+          <a:fillRef idx="0">
+            <a:schemeClr val="accent1"/>
+          </a:fillRef>
+          <a:effectRef idx="0">
+            <a:schemeClr val="accent1"/>
+          </a:effectRef>
+          <a:fontRef idx="minor">
+            <a:schemeClr val="tx1"/>
+          </a:fontRef>
+        </p:style>
+      </p:cxnSp>
+      <p:sp>
+        <p:nvSpPr>
+          <p:cNvPr id="2" name="Título 1"/>
+          <p:cNvSpPr>
+            <a:spLocks noGrp="1"/>
+          </p:cNvSpPr>
+          <p:nvPr>
+            <p:ph type="title"/>
+          </p:nvPr>
+        </p:nvSpPr>
+        <p:spPr/>
+        <p:txBody>
+          <a:bodyPr>
+            <a:normAutofit/>
+          </a:bodyPr>
+          <a:lstStyle/>
+          <a:p>
+            <a:r>
+              <a:rPr lang="pt-BR" sz="3600" dirty="0">
+                <a:latin typeface="Arial" panose="020B0604020202020204" pitchFamily="34" charset="0"/>
+                <a:ea typeface="+mn-ea"/>
+                <a:cs typeface="Arial" panose="020B0604020202020204" pitchFamily="34" charset="0"/>
+              </a:rPr>
+              <a:t>Cenário: Suprir produtos</a:t>
+            </a:r>
+          </a:p>
+        </p:txBody>
+      </p:sp>
+      <p:sp>
+        <p:nvSpPr>
+          <p:cNvPr id="5" name="CaixaDeTexto 4"/>
+          <p:cNvSpPr txBox="1"/>
+          <p:nvPr/>
+        </p:nvSpPr>
+        <p:spPr>
+          <a:xfrm>
+            <a:off x="5638780" y="2466040"/>
+            <a:ext cx="5556738" cy="400110"/>
+          </a:xfrm>
+          <a:prstGeom prst="rect">
+            <a:avLst/>
+          </a:prstGeom>
+          <a:noFill/>
+        </p:spPr>
+        <p:txBody>
+          <a:bodyPr wrap="square" lIns="91440" tIns="45720" rIns="91440" bIns="45720" rtlCol="0" anchor="t">
+            <a:spAutoFit/>
+          </a:bodyPr>
+          <a:lstStyle/>
+          <a:p>
+            <a:pPr algn="ctr"/>
+            <a:r>
+              <a:rPr lang="pt-BR" sz="2000" dirty="0">
+                <a:latin typeface="Arial" panose="020B0604020202020204" pitchFamily="34" charset="0"/>
+                <a:cs typeface="Arial" panose="020B0604020202020204" pitchFamily="34" charset="0"/>
+              </a:rPr>
+              <a:t>Silpan</a:t>
+            </a:r>
+          </a:p>
+        </p:txBody>
+      </p:sp>
+      <p:cxnSp>
+        <p:nvCxnSpPr>
+          <p:cNvPr id="6" name="Conector reto 5"/>
+          <p:cNvCxnSpPr>
+            <a:cxnSpLocks/>
+            <a:stCxn id="11" idx="3"/>
+            <a:endCxn id="8" idx="2"/>
+          </p:cNvCxnSpPr>
+          <p:nvPr/>
+        </p:nvCxnSpPr>
+        <p:spPr>
+          <a:xfrm>
+            <a:off x="3612497" y="3795401"/>
+            <a:ext cx="2365512" cy="0"/>
+          </a:xfrm>
+          <a:prstGeom prst="line">
+            <a:avLst/>
+          </a:prstGeom>
+        </p:spPr>
+        <p:style>
+          <a:lnRef idx="1">
+            <a:schemeClr val="accent1"/>
+          </a:lnRef>
+          <a:fillRef idx="0">
+            <a:schemeClr val="accent1"/>
+          </a:fillRef>
+          <a:effectRef idx="0">
+            <a:schemeClr val="accent1"/>
+          </a:effectRef>
+          <a:fontRef idx="minor">
+            <a:schemeClr val="tx1"/>
+          </a:fontRef>
+        </p:style>
+      </p:cxnSp>
+      <p:sp>
+        <p:nvSpPr>
+          <p:cNvPr id="7" name="Retângulo Arredondado 6"/>
+          <p:cNvSpPr/>
+          <p:nvPr/>
+        </p:nvSpPr>
+        <p:spPr>
+          <a:xfrm>
+            <a:off x="5433646" y="2233247"/>
+            <a:ext cx="6016871" cy="3548094"/>
+          </a:xfrm>
+          <a:prstGeom prst="roundRect">
+            <a:avLst/>
+          </a:prstGeom>
+          <a:noFill/>
+          <a:ln w="9525" cap="flat" cmpd="sng" algn="ctr">
+            <a:solidFill>
+              <a:schemeClr val="dk1"/>
+            </a:solidFill>
+            <a:prstDash val="solid"/>
+            <a:round/>
+            <a:headEnd type="none" w="med" len="med"/>
+            <a:tailEnd type="none" w="med" len="med"/>
+          </a:ln>
+        </p:spPr>
+        <p:style>
+          <a:lnRef idx="0">
+            <a:scrgbClr r="0" g="0" b="0"/>
+          </a:lnRef>
+          <a:fillRef idx="0">
+            <a:scrgbClr r="0" g="0" b="0"/>
+          </a:fillRef>
+          <a:effectRef idx="0">
+            <a:scrgbClr r="0" g="0" b="0"/>
           </a:effectRef>
           <a:fontRef idx="minor">
             <a:schemeClr val="dk1"/>
@@ -6000,31 +7545,22 @@
           <a:lstStyle/>
           <a:p>
             <a:pPr algn="ctr"/>
-            <a:r>
-              <a:rPr lang="pt-BR" dirty="0">
-                <a:latin typeface="Arial" panose="020B0604020202020204" pitchFamily="34" charset="0"/>
-                <a:cs typeface="Arial" panose="020B0604020202020204" pitchFamily="34" charset="0"/>
-              </a:rPr>
-              <a:t>Fabricante  </a:t>
-            </a:r>
-          </a:p>
-        </p:txBody>
-      </p:sp>
-      <p:sp>
-        <p:nvSpPr>
-          <p:cNvPr id="13" name="Cubo 12">
-            <a:extLst>
-              <a:ext uri="{FF2B5EF4-FFF2-40B4-BE49-F238E27FC236}">
-                <a16:creationId xmlns:a16="http://schemas.microsoft.com/office/drawing/2014/main" id="{092E5AF6-1F3B-42C0-8997-B4B0787C12CB}"/>
-              </a:ext>
-            </a:extLst>
-          </p:cNvPr>
+            <a:endParaRPr lang="pt-BR">
+              <a:latin typeface="Arial" panose="020B0604020202020204" pitchFamily="34" charset="0"/>
+              <a:cs typeface="Arial" panose="020B0604020202020204" pitchFamily="34" charset="0"/>
+            </a:endParaRPr>
+          </a:p>
+        </p:txBody>
+      </p:sp>
+      <p:sp>
+        <p:nvSpPr>
+          <p:cNvPr id="8" name="Cubo 7"/>
           <p:cNvSpPr/>
           <p:nvPr/>
         </p:nvSpPr>
         <p:spPr>
           <a:xfrm>
-            <a:off x="8338274" y="3151701"/>
+            <a:off x="5978009" y="3160493"/>
             <a:ext cx="2272899" cy="1015853"/>
           </a:xfrm>
           <a:prstGeom prst="cube">
@@ -6057,6 +7593,210 @@
                 <a:latin typeface="Arial" panose="020B0604020202020204" pitchFamily="34" charset="0"/>
                 <a:cs typeface="Arial" panose="020B0604020202020204" pitchFamily="34" charset="0"/>
               </a:rPr>
+              <a:t>Setor de compras </a:t>
+            </a:r>
+          </a:p>
+        </p:txBody>
+      </p:sp>
+      <p:sp>
+        <p:nvSpPr>
+          <p:cNvPr id="9" name="CaixaDeTexto 8"/>
+          <p:cNvSpPr txBox="1"/>
+          <p:nvPr/>
+        </p:nvSpPr>
+        <p:spPr>
+          <a:xfrm>
+            <a:off x="6065375" y="3843708"/>
+            <a:ext cx="1745991" cy="338554"/>
+          </a:xfrm>
+          <a:prstGeom prst="rect">
+            <a:avLst/>
+          </a:prstGeom>
+          <a:noFill/>
+        </p:spPr>
+        <p:txBody>
+          <a:bodyPr wrap="none" rtlCol="0">
+            <a:spAutoFit/>
+          </a:bodyPr>
+          <a:lstStyle/>
+          <a:p>
+            <a:r>
+              <a:rPr lang="pt-BR" sz="1600" dirty="0">
+                <a:latin typeface="Arial" panose="020B0604020202020204" pitchFamily="34" charset="0"/>
+                <a:cs typeface="Arial" panose="020B0604020202020204" pitchFamily="34" charset="0"/>
+              </a:rPr>
+              <a:t>(Nó Operacional)</a:t>
+            </a:r>
+          </a:p>
+        </p:txBody>
+      </p:sp>
+      <p:sp>
+        <p:nvSpPr>
+          <p:cNvPr id="10" name="Retângulo Arredondado 9"/>
+          <p:cNvSpPr/>
+          <p:nvPr/>
+        </p:nvSpPr>
+        <p:spPr>
+          <a:xfrm>
+            <a:off x="6065375" y="4757405"/>
+            <a:ext cx="1741054" cy="914400"/>
+          </a:xfrm>
+          <a:prstGeom prst="roundRect">
+            <a:avLst/>
+          </a:prstGeom>
+          <a:gradFill flip="none" rotWithShape="1">
+            <a:gsLst>
+              <a:gs pos="0">
+                <a:schemeClr val="accent6">
+                  <a:lumMod val="67000"/>
+                </a:schemeClr>
+              </a:gs>
+              <a:gs pos="48000">
+                <a:schemeClr val="accent6">
+                  <a:lumMod val="97000"/>
+                  <a:lumOff val="3000"/>
+                </a:schemeClr>
+              </a:gs>
+              <a:gs pos="100000">
+                <a:schemeClr val="accent6">
+                  <a:lumMod val="60000"/>
+                  <a:lumOff val="40000"/>
+                </a:schemeClr>
+              </a:gs>
+            </a:gsLst>
+            <a:lin ang="16200000" scaled="1"/>
+            <a:tileRect/>
+          </a:gradFill>
+          <a:ln>
+            <a:noFill/>
+          </a:ln>
+        </p:spPr>
+        <p:style>
+          <a:lnRef idx="0">
+            <a:scrgbClr r="0" g="0" b="0"/>
+          </a:lnRef>
+          <a:fillRef idx="0">
+            <a:scrgbClr r="0" g="0" b="0"/>
+          </a:fillRef>
+          <a:effectRef idx="0">
+            <a:scrgbClr r="0" g="0" b="0"/>
+          </a:effectRef>
+          <a:fontRef idx="minor">
+            <a:schemeClr val="lt1"/>
+          </a:fontRef>
+        </p:style>
+        <p:txBody>
+          <a:bodyPr rtlCol="0" anchor="ctr"/>
+          <a:lstStyle/>
+          <a:p>
+            <a:pPr algn="ctr"/>
+            <a:r>
+              <a:rPr lang="pt-BR" dirty="0">
+                <a:latin typeface="Arial" panose="020B0604020202020204" pitchFamily="34" charset="0"/>
+                <a:cs typeface="Arial" panose="020B0604020202020204" pitchFamily="34" charset="0"/>
+              </a:rPr>
+              <a:t>Tratar compra de produtos</a:t>
+            </a:r>
+          </a:p>
+        </p:txBody>
+      </p:sp>
+      <p:sp>
+        <p:nvSpPr>
+          <p:cNvPr id="11" name="Retângulo 10">
+            <a:extLst>
+              <a:ext uri="{FF2B5EF4-FFF2-40B4-BE49-F238E27FC236}">
+                <a16:creationId xmlns:a16="http://schemas.microsoft.com/office/drawing/2014/main" id="{6E71F2E2-516E-4CCE-83DA-8CD7102E4646}"/>
+              </a:ext>
+            </a:extLst>
+          </p:cNvPr>
+          <p:cNvSpPr/>
+          <p:nvPr/>
+        </p:nvSpPr>
+        <p:spPr>
+          <a:xfrm>
+            <a:off x="1994713" y="3206714"/>
+            <a:ext cx="1617784" cy="1177374"/>
+          </a:xfrm>
+          <a:prstGeom prst="rect">
+            <a:avLst/>
+          </a:prstGeom>
+        </p:spPr>
+        <p:style>
+          <a:lnRef idx="1">
+            <a:schemeClr val="accent4"/>
+          </a:lnRef>
+          <a:fillRef idx="2">
+            <a:schemeClr val="accent4"/>
+          </a:fillRef>
+          <a:effectRef idx="1">
+            <a:schemeClr val="accent4"/>
+          </a:effectRef>
+          <a:fontRef idx="minor">
+            <a:schemeClr val="dk1"/>
+          </a:fontRef>
+        </p:style>
+        <p:txBody>
+          <a:bodyPr rtlCol="0" anchor="ctr"/>
+          <a:lstStyle/>
+          <a:p>
+            <a:pPr algn="ctr"/>
+            <a:r>
+              <a:rPr lang="pt-BR" dirty="0">
+                <a:latin typeface="Arial" panose="020B0604020202020204" pitchFamily="34" charset="0"/>
+                <a:cs typeface="Arial" panose="020B0604020202020204" pitchFamily="34" charset="0"/>
+              </a:rPr>
+              <a:t>Fabricante  </a:t>
+            </a:r>
+          </a:p>
+        </p:txBody>
+      </p:sp>
+      <p:sp>
+        <p:nvSpPr>
+          <p:cNvPr id="13" name="Cubo 12">
+            <a:extLst>
+              <a:ext uri="{FF2B5EF4-FFF2-40B4-BE49-F238E27FC236}">
+                <a16:creationId xmlns:a16="http://schemas.microsoft.com/office/drawing/2014/main" id="{092E5AF6-1F3B-42C0-8997-B4B0787C12CB}"/>
+              </a:ext>
+            </a:extLst>
+          </p:cNvPr>
+          <p:cNvSpPr/>
+          <p:nvPr/>
+        </p:nvSpPr>
+        <p:spPr>
+          <a:xfrm>
+            <a:off x="8338274" y="3151701"/>
+            <a:ext cx="2272899" cy="1015853"/>
+          </a:xfrm>
+          <a:prstGeom prst="cube">
+            <a:avLst/>
+          </a:prstGeom>
+        </p:spPr>
+        <p:style>
+          <a:lnRef idx="2">
+            <a:schemeClr val="accent4">
+              <a:shade val="50000"/>
+            </a:schemeClr>
+          </a:lnRef>
+          <a:fillRef idx="1">
+            <a:schemeClr val="accent4"/>
+          </a:fillRef>
+          <a:effectRef idx="0">
+            <a:schemeClr val="accent4"/>
+          </a:effectRef>
+          <a:fontRef idx="minor">
+            <a:schemeClr val="lt1"/>
+          </a:fontRef>
+        </p:style>
+        <p:txBody>
+          <a:bodyPr rtlCol="0" anchor="ctr"/>
+          <a:lstStyle/>
+          <a:p>
+            <a:pPr algn="ctr"/>
+            <a:r>
+              <a:rPr lang="pt-BR" sz="1400" dirty="0">
+                <a:latin typeface="Arial" panose="020B0604020202020204" pitchFamily="34" charset="0"/>
+                <a:cs typeface="Arial" panose="020B0604020202020204" pitchFamily="34" charset="0"/>
+              </a:rPr>
               <a:t>Setor de Almoxarifado </a:t>
             </a:r>
           </a:p>
@@ -6100,85 +7840,82 @@
           </a:p>
         </p:txBody>
       </p:sp>
-      <p:cxnSp>
-        <p:nvCxnSpPr>
-          <p:cNvPr id="19" name="Conector reto 18">
+      <p:sp>
+        <p:nvSpPr>
+          <p:cNvPr id="17" name="Retângulo Arredondado 9">
             <a:extLst>
               <a:ext uri="{FF2B5EF4-FFF2-40B4-BE49-F238E27FC236}">
-                <a16:creationId xmlns:a16="http://schemas.microsoft.com/office/drawing/2014/main" id="{8C1F429A-FB78-4A88-AC8F-86D6FB395FC4}"/>
+                <a16:creationId xmlns:a16="http://schemas.microsoft.com/office/drawing/2014/main" id="{6B9319FF-DD73-4E36-9A7B-8677DBC4A2EE}"/>
               </a:ext>
             </a:extLst>
           </p:cNvPr>
-          <p:cNvCxnSpPr>
-            <a:cxnSpLocks/>
-            <a:endCxn id="13" idx="2"/>
-          </p:cNvCxnSpPr>
-          <p:nvPr/>
-        </p:nvCxnSpPr>
-        <p:spPr>
-          <a:xfrm>
-            <a:off x="8172033" y="3786609"/>
-            <a:ext cx="166241" cy="0"/>
-          </a:xfrm>
-          <a:prstGeom prst="line">
-            <a:avLst/>
-          </a:prstGeom>
+          <p:cNvSpPr/>
+          <p:nvPr/>
+        </p:nvSpPr>
+        <p:spPr>
+          <a:xfrm>
+            <a:off x="8338274" y="4757405"/>
+            <a:ext cx="2032990" cy="914400"/>
+          </a:xfrm>
+          <a:prstGeom prst="roundRect">
+            <a:avLst/>
+          </a:prstGeom>
+          <a:gradFill flip="none" rotWithShape="1">
+            <a:gsLst>
+              <a:gs pos="0">
+                <a:schemeClr val="accent6">
+                  <a:lumMod val="67000"/>
+                </a:schemeClr>
+              </a:gs>
+              <a:gs pos="48000">
+                <a:schemeClr val="accent6">
+                  <a:lumMod val="97000"/>
+                  <a:lumOff val="3000"/>
+                </a:schemeClr>
+              </a:gs>
+              <a:gs pos="100000">
+                <a:schemeClr val="accent6">
+                  <a:lumMod val="60000"/>
+                  <a:lumOff val="40000"/>
+                </a:schemeClr>
+              </a:gs>
+            </a:gsLst>
+            <a:lin ang="16200000" scaled="1"/>
+            <a:tileRect/>
+          </a:gradFill>
+          <a:ln>
+            <a:noFill/>
+          </a:ln>
         </p:spPr>
         <p:style>
-          <a:lnRef idx="1">
-            <a:schemeClr val="accent1"/>
+          <a:lnRef idx="0">
+            <a:scrgbClr r="0" g="0" b="0"/>
           </a:lnRef>
           <a:fillRef idx="0">
-            <a:schemeClr val="accent1"/>
+            <a:scrgbClr r="0" g="0" b="0"/>
           </a:fillRef>
           <a:effectRef idx="0">
-            <a:schemeClr val="accent1"/>
+            <a:scrgbClr r="0" g="0" b="0"/>
           </a:effectRef>
           <a:fontRef idx="minor">
-            <a:schemeClr val="tx1"/>
+            <a:schemeClr val="lt1"/>
           </a:fontRef>
         </p:style>
-      </p:cxnSp>
-      <p:cxnSp>
-        <p:nvCxnSpPr>
-          <p:cNvPr id="25" name="Conector reto 24">
-            <a:extLst>
-              <a:ext uri="{FF2B5EF4-FFF2-40B4-BE49-F238E27FC236}">
-                <a16:creationId xmlns:a16="http://schemas.microsoft.com/office/drawing/2014/main" id="{23488C96-5271-4CFF-8470-435097279F3E}"/>
-              </a:ext>
-            </a:extLst>
-          </p:cNvPr>
-          <p:cNvCxnSpPr>
-            <a:cxnSpLocks/>
-            <a:stCxn id="16" idx="2"/>
-            <a:endCxn id="10" idx="0"/>
-          </p:cNvCxnSpPr>
-          <p:nvPr/>
-        </p:nvCxnSpPr>
-        <p:spPr>
-          <a:xfrm flipH="1">
-            <a:off x="7984985" y="4209095"/>
-            <a:ext cx="1339307" cy="548310"/>
-          </a:xfrm>
-          <a:prstGeom prst="line">
-            <a:avLst/>
-          </a:prstGeom>
-        </p:spPr>
-        <p:style>
-          <a:lnRef idx="1">
-            <a:schemeClr val="accent1"/>
-          </a:lnRef>
-          <a:fillRef idx="0">
-            <a:schemeClr val="accent1"/>
-          </a:fillRef>
-          <a:effectRef idx="0">
-            <a:schemeClr val="accent1"/>
-          </a:effectRef>
-          <a:fontRef idx="minor">
-            <a:schemeClr val="tx1"/>
-          </a:fontRef>
-        </p:style>
-      </p:cxnSp>
+        <p:txBody>
+          <a:bodyPr rtlCol="0" anchor="ctr"/>
+          <a:lstStyle/>
+          <a:p>
+            <a:pPr algn="ctr"/>
+            <a:r>
+              <a:rPr lang="pt-BR" dirty="0">
+                <a:latin typeface="Arial" panose="020B0604020202020204" pitchFamily="34" charset="0"/>
+                <a:cs typeface="Arial" panose="020B0604020202020204" pitchFamily="34" charset="0"/>
+              </a:rPr>
+              <a:t>Abastecer estoque</a:t>
+            </a:r>
+          </a:p>
+        </p:txBody>
+      </p:sp>
     </p:spTree>
     <p:extLst>
       <p:ext uri="{BB962C8B-B14F-4D97-AF65-F5344CB8AC3E}">

</xml_diff>

<commit_message>
[ATUALIZAÇÂO] - Art 15. 17.
</commit_message>
<xml_diff>
--- a/Documentation/15._Arquitetura_de_Negócio_para_cada_Cenário.pptx
+++ b/Documentation/15._Arquitetura_de_Negócio_para_cada_Cenário.pptx
@@ -121,7 +121,7 @@
 <file path=ppt/revisionInfo.xml><?xml version="1.0" encoding="utf-8"?>
 <p1510:revInfo xmlns:a="http://schemas.openxmlformats.org/drawingml/2006/main" xmlns:r="http://schemas.openxmlformats.org/officeDocument/2006/relationships" xmlns:p1510="http://schemas.microsoft.com/office/powerpoint/2015/10/main">
   <p1510:revLst>
-    <p1510:client id="{E7C69A7C-A215-426B-8AAA-22D3B1BFACE3}" v="21" dt="2021-04-16T23:14:36.853"/>
+    <p1510:client id="{18C074D4-1E9F-42B9-A51D-65B4F691BFB6}" v="6" dt="2021-04-17T01:37:57.338"/>
   </p1510:revLst>
 </p1510:revInfo>
 </file>
@@ -129,563 +129,58 @@
 <file path=ppt/changesInfos/changesInfo1.xml><?xml version="1.0" encoding="utf-8"?>
 <pc:chgInfo xmlns:a="http://schemas.openxmlformats.org/drawingml/2006/main" xmlns:r="http://schemas.openxmlformats.org/officeDocument/2006/relationships" xmlns:ac="http://schemas.microsoft.com/office/drawing/2013/main/command" xmlns:pc="http://schemas.microsoft.com/office/powerpoint/2013/main/command">
   <pc:docChgLst>
-    <pc:chgData name="Gyovane Souzza" userId="eed59d4ebf12600b" providerId="LiveId" clId="{E7C69A7C-A215-426B-8AAA-22D3B1BFACE3}"/>
-    <pc:docChg chg="undo custSel addSld delSld modSld">
-      <pc:chgData name="Gyovane Souzza" userId="eed59d4ebf12600b" providerId="LiveId" clId="{E7C69A7C-A215-426B-8AAA-22D3B1BFACE3}" dt="2021-04-16T23:21:49.552" v="412" actId="20577"/>
+    <pc:chgData name="Deivison Andrade Souza" userId="bc490d82787b51a2" providerId="LiveId" clId="{18C074D4-1E9F-42B9-A51D-65B4F691BFB6}"/>
+    <pc:docChg chg="undo custSel modSld">
+      <pc:chgData name="Deivison Andrade Souza" userId="bc490d82787b51a2" providerId="LiveId" clId="{18C074D4-1E9F-42B9-A51D-65B4F691BFB6}" dt="2021-04-17T01:38:46.129" v="67" actId="1076"/>
       <pc:docMkLst>
         <pc:docMk/>
       </pc:docMkLst>
-      <pc:sldChg chg="modSp mod">
-        <pc:chgData name="Gyovane Souzza" userId="eed59d4ebf12600b" providerId="LiveId" clId="{E7C69A7C-A215-426B-8AAA-22D3B1BFACE3}" dt="2021-04-16T23:01:32.404" v="230" actId="11"/>
-        <pc:sldMkLst>
-          <pc:docMk/>
-          <pc:sldMk cId="2438810021" sldId="257"/>
-        </pc:sldMkLst>
-        <pc:spChg chg="mod">
-          <ac:chgData name="Gyovane Souzza" userId="eed59d4ebf12600b" providerId="LiveId" clId="{E7C69A7C-A215-426B-8AAA-22D3B1BFACE3}" dt="2021-04-16T23:01:15.041" v="229" actId="20577"/>
-          <ac:spMkLst>
-            <pc:docMk/>
-            <pc:sldMk cId="2438810021" sldId="257"/>
-            <ac:spMk id="9" creationId="{00000000-0000-0000-0000-000000000000}"/>
-          </ac:spMkLst>
-        </pc:spChg>
-        <pc:spChg chg="mod">
-          <ac:chgData name="Gyovane Souzza" userId="eed59d4ebf12600b" providerId="LiveId" clId="{E7C69A7C-A215-426B-8AAA-22D3B1BFACE3}" dt="2021-04-16T23:01:32.404" v="230" actId="11"/>
-          <ac:spMkLst>
-            <pc:docMk/>
-            <pc:sldMk cId="2438810021" sldId="257"/>
-            <ac:spMk id="26" creationId="{26F71C42-1B20-414B-B329-B7287F5EA813}"/>
-          </ac:spMkLst>
-        </pc:spChg>
-      </pc:sldChg>
-      <pc:sldChg chg="modSp mod">
-        <pc:chgData name="Gyovane Souzza" userId="eed59d4ebf12600b" providerId="LiveId" clId="{E7C69A7C-A215-426B-8AAA-22D3B1BFACE3}" dt="2021-04-16T23:00:46.125" v="201" actId="1076"/>
-        <pc:sldMkLst>
-          <pc:docMk/>
-          <pc:sldMk cId="36374222" sldId="258"/>
-        </pc:sldMkLst>
-        <pc:spChg chg="mod">
-          <ac:chgData name="Gyovane Souzza" userId="eed59d4ebf12600b" providerId="LiveId" clId="{E7C69A7C-A215-426B-8AAA-22D3B1BFACE3}" dt="2021-04-16T23:00:43.736" v="199" actId="1076"/>
-          <ac:spMkLst>
-            <pc:docMk/>
-            <pc:sldMk cId="36374222" sldId="258"/>
-            <ac:spMk id="4" creationId="{00000000-0000-0000-0000-000000000000}"/>
-          </ac:spMkLst>
-        </pc:spChg>
-        <pc:spChg chg="mod">
-          <ac:chgData name="Gyovane Souzza" userId="eed59d4ebf12600b" providerId="LiveId" clId="{E7C69A7C-A215-426B-8AAA-22D3B1BFACE3}" dt="2021-04-16T23:00:43.920" v="200" actId="14100"/>
-          <ac:spMkLst>
-            <pc:docMk/>
-            <pc:sldMk cId="36374222" sldId="258"/>
-            <ac:spMk id="8" creationId="{00000000-0000-0000-0000-000000000000}"/>
-          </ac:spMkLst>
-        </pc:spChg>
-        <pc:spChg chg="mod">
-          <ac:chgData name="Gyovane Souzza" userId="eed59d4ebf12600b" providerId="LiveId" clId="{E7C69A7C-A215-426B-8AAA-22D3B1BFACE3}" dt="2021-04-16T23:00:43.559" v="198" actId="1076"/>
-          <ac:spMkLst>
-            <pc:docMk/>
-            <pc:sldMk cId="36374222" sldId="258"/>
-            <ac:spMk id="9" creationId="{00000000-0000-0000-0000-000000000000}"/>
-          </ac:spMkLst>
-        </pc:spChg>
-        <pc:spChg chg="mod">
-          <ac:chgData name="Gyovane Souzza" userId="eed59d4ebf12600b" providerId="LiveId" clId="{E7C69A7C-A215-426B-8AAA-22D3B1BFACE3}" dt="2021-04-16T23:00:43.390" v="197" actId="1076"/>
-          <ac:spMkLst>
-            <pc:docMk/>
-            <pc:sldMk cId="36374222" sldId="258"/>
-            <ac:spMk id="10" creationId="{00000000-0000-0000-0000-000000000000}"/>
-          </ac:spMkLst>
-        </pc:spChg>
-        <pc:spChg chg="mod">
-          <ac:chgData name="Gyovane Souzza" userId="eed59d4ebf12600b" providerId="LiveId" clId="{E7C69A7C-A215-426B-8AAA-22D3B1BFACE3}" dt="2021-04-16T23:00:42.975" v="195" actId="1076"/>
-          <ac:spMkLst>
-            <pc:docMk/>
-            <pc:sldMk cId="36374222" sldId="258"/>
-            <ac:spMk id="11" creationId="{00000000-0000-0000-0000-000000000000}"/>
-          </ac:spMkLst>
-        </pc:spChg>
-        <pc:spChg chg="mod">
-          <ac:chgData name="Gyovane Souzza" userId="eed59d4ebf12600b" providerId="LiveId" clId="{E7C69A7C-A215-426B-8AAA-22D3B1BFACE3}" dt="2021-04-16T23:00:46.125" v="201" actId="1076"/>
-          <ac:spMkLst>
-            <pc:docMk/>
-            <pc:sldMk cId="36374222" sldId="258"/>
-            <ac:spMk id="13" creationId="{E3E67662-C3FD-4F8F-ADD1-2A0C86B9BE6B}"/>
-          </ac:spMkLst>
-        </pc:spChg>
-        <pc:cxnChg chg="mod">
-          <ac:chgData name="Gyovane Souzza" userId="eed59d4ebf12600b" providerId="LiveId" clId="{E7C69A7C-A215-426B-8AAA-22D3B1BFACE3}" dt="2021-04-16T23:00:43.736" v="199" actId="1076"/>
-          <ac:cxnSpMkLst>
-            <pc:docMk/>
-            <pc:sldMk cId="36374222" sldId="258"/>
-            <ac:cxnSpMk id="6" creationId="{00000000-0000-0000-0000-000000000000}"/>
-          </ac:cxnSpMkLst>
-        </pc:cxnChg>
-        <pc:cxnChg chg="mod">
-          <ac:chgData name="Gyovane Souzza" userId="eed59d4ebf12600b" providerId="LiveId" clId="{E7C69A7C-A215-426B-8AAA-22D3B1BFACE3}" dt="2021-04-16T23:00:43.229" v="196" actId="14100"/>
-          <ac:cxnSpMkLst>
-            <pc:docMk/>
-            <pc:sldMk cId="36374222" sldId="258"/>
-            <ac:cxnSpMk id="12" creationId="{D6D97585-FEBD-4088-B098-D1962D7BDFF8}"/>
-          </ac:cxnSpMkLst>
-        </pc:cxnChg>
-        <pc:cxnChg chg="mod">
-          <ac:chgData name="Gyovane Souzza" userId="eed59d4ebf12600b" providerId="LiveId" clId="{E7C69A7C-A215-426B-8AAA-22D3B1BFACE3}" dt="2021-04-16T23:00:46.125" v="201" actId="1076"/>
-          <ac:cxnSpMkLst>
-            <pc:docMk/>
-            <pc:sldMk cId="36374222" sldId="258"/>
-            <ac:cxnSpMk id="14" creationId="{C7A17231-7243-4E52-9D87-70EB20CD9B3B}"/>
-          </ac:cxnSpMkLst>
-        </pc:cxnChg>
-      </pc:sldChg>
-      <pc:sldChg chg="addSp delSp modSp del mod">
-        <pc:chgData name="Gyovane Souzza" userId="eed59d4ebf12600b" providerId="LiveId" clId="{E7C69A7C-A215-426B-8AAA-22D3B1BFACE3}" dt="2021-04-16T23:17:20.688" v="398" actId="47"/>
-        <pc:sldMkLst>
-          <pc:docMk/>
-          <pc:sldMk cId="2367524892" sldId="259"/>
-        </pc:sldMkLst>
-        <pc:spChg chg="mod">
-          <ac:chgData name="Gyovane Souzza" userId="eed59d4ebf12600b" providerId="LiveId" clId="{E7C69A7C-A215-426B-8AAA-22D3B1BFACE3}" dt="2021-04-09T01:03:33.701" v="25" actId="14100"/>
-          <ac:spMkLst>
-            <pc:docMk/>
-            <pc:sldMk cId="2367524892" sldId="259"/>
-            <ac:spMk id="4" creationId="{00000000-0000-0000-0000-000000000000}"/>
-          </ac:spMkLst>
-        </pc:spChg>
-        <pc:spChg chg="mod">
-          <ac:chgData name="Gyovane Souzza" userId="eed59d4ebf12600b" providerId="LiveId" clId="{E7C69A7C-A215-426B-8AAA-22D3B1BFACE3}" dt="2021-04-09T01:02:25.871" v="11" actId="1076"/>
-          <ac:spMkLst>
-            <pc:docMk/>
-            <pc:sldMk cId="2367524892" sldId="259"/>
-            <ac:spMk id="5" creationId="{00000000-0000-0000-0000-000000000000}"/>
-          </ac:spMkLst>
-        </pc:spChg>
-        <pc:spChg chg="mod">
-          <ac:chgData name="Gyovane Souzza" userId="eed59d4ebf12600b" providerId="LiveId" clId="{E7C69A7C-A215-426B-8AAA-22D3B1BFACE3}" dt="2021-04-09T01:02:32.157" v="12" actId="14100"/>
-          <ac:spMkLst>
-            <pc:docMk/>
-            <pc:sldMk cId="2367524892" sldId="259"/>
-            <ac:spMk id="7" creationId="{00000000-0000-0000-0000-000000000000}"/>
-          </ac:spMkLst>
-        </pc:spChg>
-        <pc:spChg chg="mod">
-          <ac:chgData name="Gyovane Souzza" userId="eed59d4ebf12600b" providerId="LiveId" clId="{E7C69A7C-A215-426B-8AAA-22D3B1BFACE3}" dt="2021-04-16T22:52:50.444" v="60" actId="1076"/>
-          <ac:spMkLst>
-            <pc:docMk/>
-            <pc:sldMk cId="2367524892" sldId="259"/>
-            <ac:spMk id="8" creationId="{00000000-0000-0000-0000-000000000000}"/>
-          </ac:spMkLst>
-        </pc:spChg>
-        <pc:spChg chg="mod">
-          <ac:chgData name="Gyovane Souzza" userId="eed59d4ebf12600b" providerId="LiveId" clId="{E7C69A7C-A215-426B-8AAA-22D3B1BFACE3}" dt="2021-04-09T01:02:25.871" v="11" actId="1076"/>
-          <ac:spMkLst>
-            <pc:docMk/>
-            <pc:sldMk cId="2367524892" sldId="259"/>
-            <ac:spMk id="9" creationId="{00000000-0000-0000-0000-000000000000}"/>
-          </ac:spMkLst>
-        </pc:spChg>
-        <pc:spChg chg="mod">
-          <ac:chgData name="Gyovane Souzza" userId="eed59d4ebf12600b" providerId="LiveId" clId="{E7C69A7C-A215-426B-8AAA-22D3B1BFACE3}" dt="2021-04-16T22:51:40.329" v="57" actId="1076"/>
-          <ac:spMkLst>
-            <pc:docMk/>
-            <pc:sldMk cId="2367524892" sldId="259"/>
-            <ac:spMk id="10" creationId="{00000000-0000-0000-0000-000000000000}"/>
-          </ac:spMkLst>
-        </pc:spChg>
-        <pc:spChg chg="mod">
-          <ac:chgData name="Gyovane Souzza" userId="eed59d4ebf12600b" providerId="LiveId" clId="{E7C69A7C-A215-426B-8AAA-22D3B1BFACE3}" dt="2021-04-16T22:54:52.675" v="84" actId="1076"/>
-          <ac:spMkLst>
-            <pc:docMk/>
-            <pc:sldMk cId="2367524892" sldId="259"/>
-            <ac:spMk id="13" creationId="{E80196AD-6A41-4D1E-B413-2AD1E67D83DA}"/>
-          </ac:spMkLst>
-        </pc:spChg>
-        <pc:spChg chg="mod">
-          <ac:chgData name="Gyovane Souzza" userId="eed59d4ebf12600b" providerId="LiveId" clId="{E7C69A7C-A215-426B-8AAA-22D3B1BFACE3}" dt="2021-04-09T01:02:25.871" v="11" actId="1076"/>
-          <ac:spMkLst>
-            <pc:docMk/>
-            <pc:sldMk cId="2367524892" sldId="259"/>
-            <ac:spMk id="14" creationId="{E08A7210-0801-426D-BC7D-7B345C308957}"/>
-          </ac:spMkLst>
-        </pc:spChg>
-        <pc:spChg chg="add mod">
-          <ac:chgData name="Gyovane Souzza" userId="eed59d4ebf12600b" providerId="LiveId" clId="{E7C69A7C-A215-426B-8AAA-22D3B1BFACE3}" dt="2021-04-16T22:54:43.387" v="83" actId="1076"/>
-          <ac:spMkLst>
-            <pc:docMk/>
-            <pc:sldMk cId="2367524892" sldId="259"/>
-            <ac:spMk id="17" creationId="{59C2518D-BE03-4C45-BB4B-D6EF1E892629}"/>
-          </ac:spMkLst>
-        </pc:spChg>
-        <pc:spChg chg="add del mod">
-          <ac:chgData name="Gyovane Souzza" userId="eed59d4ebf12600b" providerId="LiveId" clId="{E7C69A7C-A215-426B-8AAA-22D3B1BFACE3}" dt="2021-04-09T01:03:36.765" v="27" actId="478"/>
-          <ac:spMkLst>
-            <pc:docMk/>
-            <pc:sldMk cId="2367524892" sldId="259"/>
-            <ac:spMk id="19" creationId="{E0A11D9F-60F8-4213-915F-992CD84E0C2E}"/>
-          </ac:spMkLst>
-        </pc:spChg>
-        <pc:spChg chg="add del mod">
-          <ac:chgData name="Gyovane Souzza" userId="eed59d4ebf12600b" providerId="LiveId" clId="{E7C69A7C-A215-426B-8AAA-22D3B1BFACE3}" dt="2021-04-09T01:03:26.802" v="22"/>
-          <ac:spMkLst>
-            <pc:docMk/>
-            <pc:sldMk cId="2367524892" sldId="259"/>
-            <ac:spMk id="20" creationId="{420CDE48-7727-4291-BED8-302961567FE8}"/>
-          </ac:spMkLst>
-        </pc:spChg>
-        <pc:spChg chg="add mod">
-          <ac:chgData name="Gyovane Souzza" userId="eed59d4ebf12600b" providerId="LiveId" clId="{E7C69A7C-A215-426B-8AAA-22D3B1BFACE3}" dt="2021-04-09T01:03:55.745" v="39" actId="20577"/>
-          <ac:spMkLst>
-            <pc:docMk/>
-            <pc:sldMk cId="2367524892" sldId="259"/>
-            <ac:spMk id="23" creationId="{A55927FF-5CCE-4580-97AD-62A4648F46D2}"/>
-          </ac:spMkLst>
-        </pc:spChg>
-        <pc:cxnChg chg="mod">
-          <ac:chgData name="Gyovane Souzza" userId="eed59d4ebf12600b" providerId="LiveId" clId="{E7C69A7C-A215-426B-8AAA-22D3B1BFACE3}" dt="2021-04-16T22:52:50.444" v="60" actId="1076"/>
-          <ac:cxnSpMkLst>
-            <pc:docMk/>
-            <pc:sldMk cId="2367524892" sldId="259"/>
-            <ac:cxnSpMk id="6" creationId="{00000000-0000-0000-0000-000000000000}"/>
-          </ac:cxnSpMkLst>
-        </pc:cxnChg>
-        <pc:cxnChg chg="mod">
-          <ac:chgData name="Gyovane Souzza" userId="eed59d4ebf12600b" providerId="LiveId" clId="{E7C69A7C-A215-426B-8AAA-22D3B1BFACE3}" dt="2021-04-16T22:51:40.329" v="57" actId="1076"/>
-          <ac:cxnSpMkLst>
-            <pc:docMk/>
-            <pc:sldMk cId="2367524892" sldId="259"/>
-            <ac:cxnSpMk id="12" creationId="{F1B6C749-6105-4250-9D96-3797FCC3AA4C}"/>
-          </ac:cxnSpMkLst>
-        </pc:cxnChg>
-        <pc:cxnChg chg="del mod">
-          <ac:chgData name="Gyovane Souzza" userId="eed59d4ebf12600b" providerId="LiveId" clId="{E7C69A7C-A215-426B-8AAA-22D3B1BFACE3}" dt="2021-04-16T22:51:36.494" v="56" actId="478"/>
-          <ac:cxnSpMkLst>
-            <pc:docMk/>
-            <pc:sldMk cId="2367524892" sldId="259"/>
-            <ac:cxnSpMk id="15" creationId="{296C4B52-6D73-4349-9414-E929A697FD84}"/>
-          </ac:cxnSpMkLst>
-        </pc:cxnChg>
-        <pc:cxnChg chg="add del mod">
-          <ac:chgData name="Gyovane Souzza" userId="eed59d4ebf12600b" providerId="LiveId" clId="{E7C69A7C-A215-426B-8AAA-22D3B1BFACE3}" dt="2021-04-09T23:26:11.040" v="54"/>
-          <ac:cxnSpMkLst>
-            <pc:docMk/>
-            <pc:sldMk cId="2367524892" sldId="259"/>
-            <ac:cxnSpMk id="19" creationId="{923BF198-01F9-4CA5-A549-DD656189D3DA}"/>
-          </ac:cxnSpMkLst>
-        </pc:cxnChg>
-        <pc:cxnChg chg="add mod">
-          <ac:chgData name="Gyovane Souzza" userId="eed59d4ebf12600b" providerId="LiveId" clId="{E7C69A7C-A215-426B-8AAA-22D3B1BFACE3}" dt="2021-04-16T22:55:04.042" v="88" actId="14100"/>
-          <ac:cxnSpMkLst>
-            <pc:docMk/>
-            <pc:sldMk cId="2367524892" sldId="259"/>
-            <ac:cxnSpMk id="20" creationId="{D7E0D70D-5C69-4F74-B808-E63E1825C7D5}"/>
-          </ac:cxnSpMkLst>
-        </pc:cxnChg>
-        <pc:cxnChg chg="add mod">
-          <ac:chgData name="Gyovane Souzza" userId="eed59d4ebf12600b" providerId="LiveId" clId="{E7C69A7C-A215-426B-8AAA-22D3B1BFACE3}" dt="2021-04-16T22:54:55.393" v="85" actId="14100"/>
-          <ac:cxnSpMkLst>
-            <pc:docMk/>
-            <pc:sldMk cId="2367524892" sldId="259"/>
-            <ac:cxnSpMk id="24" creationId="{BC6F058D-F013-4529-A509-591C143AB4F9}"/>
-          </ac:cxnSpMkLst>
-        </pc:cxnChg>
-      </pc:sldChg>
       <pc:sldChg chg="addSp delSp modSp mod">
-        <pc:chgData name="Gyovane Souzza" userId="eed59d4ebf12600b" providerId="LiveId" clId="{E7C69A7C-A215-426B-8AAA-22D3B1BFACE3}" dt="2021-04-16T22:58:03.588" v="187" actId="20577"/>
-        <pc:sldMkLst>
-          <pc:docMk/>
-          <pc:sldMk cId="226422873" sldId="264"/>
-        </pc:sldMkLst>
-        <pc:spChg chg="mod">
-          <ac:chgData name="Gyovane Souzza" userId="eed59d4ebf12600b" providerId="LiveId" clId="{E7C69A7C-A215-426B-8AAA-22D3B1BFACE3}" dt="2021-04-16T22:57:22.701" v="127" actId="20577"/>
-          <ac:spMkLst>
-            <pc:docMk/>
-            <pc:sldMk cId="226422873" sldId="264"/>
-            <ac:spMk id="10" creationId="{00000000-0000-0000-0000-000000000000}"/>
-          </ac:spMkLst>
-        </pc:spChg>
-        <pc:spChg chg="mod">
-          <ac:chgData name="Gyovane Souzza" userId="eed59d4ebf12600b" providerId="LiveId" clId="{E7C69A7C-A215-426B-8AAA-22D3B1BFACE3}" dt="2021-04-09T23:26:21.154" v="55" actId="1076"/>
-          <ac:spMkLst>
-            <pc:docMk/>
-            <pc:sldMk cId="226422873" sldId="264"/>
-            <ac:spMk id="13" creationId="{092E5AF6-1F3B-42C0-8997-B4B0787C12CB}"/>
-          </ac:spMkLst>
-        </pc:spChg>
-        <pc:spChg chg="add mod">
-          <ac:chgData name="Gyovane Souzza" userId="eed59d4ebf12600b" providerId="LiveId" clId="{E7C69A7C-A215-426B-8AAA-22D3B1BFACE3}" dt="2021-04-16T22:58:03.588" v="187" actId="20577"/>
-          <ac:spMkLst>
-            <pc:docMk/>
-            <pc:sldMk cId="226422873" sldId="264"/>
-            <ac:spMk id="17" creationId="{6B9319FF-DD73-4E36-9A7B-8677DBC4A2EE}"/>
-          </ac:spMkLst>
-        </pc:spChg>
-        <pc:cxnChg chg="mod ord">
-          <ac:chgData name="Gyovane Souzza" userId="eed59d4ebf12600b" providerId="LiveId" clId="{E7C69A7C-A215-426B-8AAA-22D3B1BFACE3}" dt="2021-04-16T22:56:43.028" v="99" actId="167"/>
-          <ac:cxnSpMkLst>
-            <pc:docMk/>
-            <pc:sldMk cId="226422873" sldId="264"/>
-            <ac:cxnSpMk id="12" creationId="{F1B6C749-6105-4250-9D96-3797FCC3AA4C}"/>
-          </ac:cxnSpMkLst>
-        </pc:cxnChg>
-        <pc:cxnChg chg="add mod ord">
-          <ac:chgData name="Gyovane Souzza" userId="eed59d4ebf12600b" providerId="LiveId" clId="{E7C69A7C-A215-426B-8AAA-22D3B1BFACE3}" dt="2021-04-16T22:57:52.181" v="152" actId="1076"/>
-          <ac:cxnSpMkLst>
-            <pc:docMk/>
-            <pc:sldMk cId="226422873" sldId="264"/>
-            <ac:cxnSpMk id="18" creationId="{E7044505-B8A8-4D07-A667-D4658ECAF6CB}"/>
-          </ac:cxnSpMkLst>
-        </pc:cxnChg>
-        <pc:cxnChg chg="del mod">
-          <ac:chgData name="Gyovane Souzza" userId="eed59d4ebf12600b" providerId="LiveId" clId="{E7C69A7C-A215-426B-8AAA-22D3B1BFACE3}" dt="2021-04-16T22:57:28.501" v="128" actId="478"/>
-          <ac:cxnSpMkLst>
-            <pc:docMk/>
-            <pc:sldMk cId="226422873" sldId="264"/>
-            <ac:cxnSpMk id="19" creationId="{8C1F429A-FB78-4A88-AC8F-86D6FB395FC4}"/>
-          </ac:cxnSpMkLst>
-        </pc:cxnChg>
-        <pc:cxnChg chg="del mod">
-          <ac:chgData name="Gyovane Souzza" userId="eed59d4ebf12600b" providerId="LiveId" clId="{E7C69A7C-A215-426B-8AAA-22D3B1BFACE3}" dt="2021-04-16T22:55:52.197" v="89" actId="478"/>
-          <ac:cxnSpMkLst>
-            <pc:docMk/>
-            <pc:sldMk cId="226422873" sldId="264"/>
-            <ac:cxnSpMk id="25" creationId="{23488C96-5271-4CFF-8470-435097279F3E}"/>
-          </ac:cxnSpMkLst>
-        </pc:cxnChg>
-      </pc:sldChg>
-      <pc:sldChg chg="add del">
-        <pc:chgData name="Gyovane Souzza" userId="eed59d4ebf12600b" providerId="LiveId" clId="{E7C69A7C-A215-426B-8AAA-22D3B1BFACE3}" dt="2021-04-16T23:13:39.444" v="388" actId="47"/>
-        <pc:sldMkLst>
-          <pc:docMk/>
-          <pc:sldMk cId="260196215" sldId="267"/>
-        </pc:sldMkLst>
-      </pc:sldChg>
-      <pc:sldChg chg="addSp delSp modSp add mod">
-        <pc:chgData name="Gyovane Souzza" userId="eed59d4ebf12600b" providerId="LiveId" clId="{E7C69A7C-A215-426B-8AAA-22D3B1BFACE3}" dt="2021-04-16T23:14:42.598" v="397" actId="20577"/>
+        <pc:chgData name="Deivison Andrade Souza" userId="bc490d82787b51a2" providerId="LiveId" clId="{18C074D4-1E9F-42B9-A51D-65B4F691BFB6}" dt="2021-04-17T01:38:46.129" v="67" actId="1076"/>
         <pc:sldMkLst>
           <pc:docMk/>
           <pc:sldMk cId="2545260601" sldId="268"/>
         </pc:sldMkLst>
-        <pc:spChg chg="mod">
-          <ac:chgData name="Gyovane Souzza" userId="eed59d4ebf12600b" providerId="LiveId" clId="{E7C69A7C-A215-426B-8AAA-22D3B1BFACE3}" dt="2021-04-16T23:14:42.598" v="397" actId="20577"/>
-          <ac:spMkLst>
-            <pc:docMk/>
-            <pc:sldMk cId="2545260601" sldId="268"/>
-            <ac:spMk id="2" creationId="{00000000-0000-0000-0000-000000000000}"/>
-          </ac:spMkLst>
-        </pc:spChg>
-        <pc:spChg chg="mod">
-          <ac:chgData name="Gyovane Souzza" userId="eed59d4ebf12600b" providerId="LiveId" clId="{E7C69A7C-A215-426B-8AAA-22D3B1BFACE3}" dt="2021-04-16T23:14:19.538" v="393" actId="1076"/>
-          <ac:spMkLst>
-            <pc:docMk/>
-            <pc:sldMk cId="2545260601" sldId="268"/>
-            <ac:spMk id="4" creationId="{00000000-0000-0000-0000-000000000000}"/>
-          </ac:spMkLst>
-        </pc:spChg>
-        <pc:spChg chg="mod">
-          <ac:chgData name="Gyovane Souzza" userId="eed59d4ebf12600b" providerId="LiveId" clId="{E7C69A7C-A215-426B-8AAA-22D3B1BFACE3}" dt="2021-04-16T23:11:14.840" v="384" actId="14100"/>
-          <ac:spMkLst>
-            <pc:docMk/>
-            <pc:sldMk cId="2545260601" sldId="268"/>
-            <ac:spMk id="5" creationId="{00000000-0000-0000-0000-000000000000}"/>
-          </ac:spMkLst>
-        </pc:spChg>
-        <pc:spChg chg="mod">
-          <ac:chgData name="Gyovane Souzza" userId="eed59d4ebf12600b" providerId="LiveId" clId="{E7C69A7C-A215-426B-8AAA-22D3B1BFACE3}" dt="2021-04-16T23:08:35.855" v="305" actId="14100"/>
-          <ac:spMkLst>
-            <pc:docMk/>
-            <pc:sldMk cId="2545260601" sldId="268"/>
-            <ac:spMk id="7" creationId="{00000000-0000-0000-0000-000000000000}"/>
-          </ac:spMkLst>
-        </pc:spChg>
-        <pc:spChg chg="mod">
-          <ac:chgData name="Gyovane Souzza" userId="eed59d4ebf12600b" providerId="LiveId" clId="{E7C69A7C-A215-426B-8AAA-22D3B1BFACE3}" dt="2021-04-16T23:09:23.639" v="319" actId="1076"/>
-          <ac:spMkLst>
-            <pc:docMk/>
-            <pc:sldMk cId="2545260601" sldId="268"/>
-            <ac:spMk id="8" creationId="{00000000-0000-0000-0000-000000000000}"/>
-          </ac:spMkLst>
-        </pc:spChg>
-        <pc:spChg chg="mod">
-          <ac:chgData name="Gyovane Souzza" userId="eed59d4ebf12600b" providerId="LiveId" clId="{E7C69A7C-A215-426B-8AAA-22D3B1BFACE3}" dt="2021-04-16T23:09:26.373" v="320" actId="1076"/>
-          <ac:spMkLst>
-            <pc:docMk/>
-            <pc:sldMk cId="2545260601" sldId="268"/>
-            <ac:spMk id="9" creationId="{00000000-0000-0000-0000-000000000000}"/>
-          </ac:spMkLst>
-        </pc:spChg>
-        <pc:spChg chg="mod">
-          <ac:chgData name="Gyovane Souzza" userId="eed59d4ebf12600b" providerId="LiveId" clId="{E7C69A7C-A215-426B-8AAA-22D3B1BFACE3}" dt="2021-04-16T23:09:28.200" v="321" actId="1076"/>
-          <ac:spMkLst>
-            <pc:docMk/>
-            <pc:sldMk cId="2545260601" sldId="268"/>
-            <ac:spMk id="10" creationId="{00000000-0000-0000-0000-000000000000}"/>
-          </ac:spMkLst>
-        </pc:spChg>
-        <pc:spChg chg="add del mod">
-          <ac:chgData name="Gyovane Souzza" userId="eed59d4ebf12600b" providerId="LiveId" clId="{E7C69A7C-A215-426B-8AAA-22D3B1BFACE3}" dt="2021-04-16T23:10:47.681" v="376" actId="1076"/>
-          <ac:spMkLst>
-            <pc:docMk/>
-            <pc:sldMk cId="2545260601" sldId="268"/>
-            <ac:spMk id="13" creationId="{E80196AD-6A41-4D1E-B413-2AD1E67D83DA}"/>
-          </ac:spMkLst>
-        </pc:spChg>
-        <pc:spChg chg="mod">
-          <ac:chgData name="Gyovane Souzza" userId="eed59d4ebf12600b" providerId="LiveId" clId="{E7C69A7C-A215-426B-8AAA-22D3B1BFACE3}" dt="2021-04-16T23:10:55.056" v="380" actId="404"/>
+        <pc:spChg chg="mod ord">
+          <ac:chgData name="Deivison Andrade Souza" userId="bc490d82787b51a2" providerId="LiveId" clId="{18C074D4-1E9F-42B9-A51D-65B4F691BFB6}" dt="2021-04-17T01:38:46.129" v="67" actId="1076"/>
           <ac:spMkLst>
             <pc:docMk/>
             <pc:sldMk cId="2545260601" sldId="268"/>
             <ac:spMk id="14" creationId="{E08A7210-0801-426D-BC7D-7B345C308957}"/>
           </ac:spMkLst>
         </pc:spChg>
-        <pc:spChg chg="mod">
-          <ac:chgData name="Gyovane Souzza" userId="eed59d4ebf12600b" providerId="LiveId" clId="{E7C69A7C-A215-426B-8AAA-22D3B1BFACE3}" dt="2021-04-16T23:13:32.272" v="386" actId="14100"/>
+        <pc:spChg chg="add mod">
+          <ac:chgData name="Deivison Andrade Souza" userId="bc490d82787b51a2" providerId="LiveId" clId="{18C074D4-1E9F-42B9-A51D-65B4F691BFB6}" dt="2021-04-17T01:37:21.376" v="57" actId="20577"/>
           <ac:spMkLst>
             <pc:docMk/>
             <pc:sldMk cId="2545260601" sldId="268"/>
-            <ac:spMk id="17" creationId="{59C2518D-BE03-4C45-BB4B-D6EF1E892629}"/>
+            <ac:spMk id="33" creationId="{071D06C6-5DE7-417C-8F38-D2E3DA94DC2B}"/>
           </ac:spMkLst>
         </pc:spChg>
-        <pc:spChg chg="mod">
-          <ac:chgData name="Gyovane Souzza" userId="eed59d4ebf12600b" providerId="LiveId" clId="{E7C69A7C-A215-426B-8AAA-22D3B1BFACE3}" dt="2021-04-16T23:14:22.236" v="394" actId="1076"/>
+        <pc:spChg chg="add del mod">
+          <ac:chgData name="Deivison Andrade Souza" userId="bc490d82787b51a2" providerId="LiveId" clId="{18C074D4-1E9F-42B9-A51D-65B4F691BFB6}" dt="2021-04-17T01:37:35.791" v="59"/>
           <ac:spMkLst>
             <pc:docMk/>
             <pc:sldMk cId="2545260601" sldId="268"/>
-            <ac:spMk id="23" creationId="{A55927FF-5CCE-4580-97AD-62A4648F46D2}"/>
+            <ac:spMk id="34" creationId="{3901C803-4B6B-4534-B8C4-AD0221B365A3}"/>
+          </ac:spMkLst>
+        </pc:spChg>
+        <pc:spChg chg="add del mod">
+          <ac:chgData name="Deivison Andrade Souza" userId="bc490d82787b51a2" providerId="LiveId" clId="{18C074D4-1E9F-42B9-A51D-65B4F691BFB6}" dt="2021-04-17T01:37:49.449" v="62"/>
+          <ac:spMkLst>
+            <pc:docMk/>
+            <pc:sldMk cId="2545260601" sldId="268"/>
+            <ac:spMk id="35" creationId="{691C766C-9209-4F3A-AA9C-450010C41268}"/>
           </ac:spMkLst>
         </pc:spChg>
         <pc:spChg chg="add mod">
-          <ac:chgData name="Gyovane Souzza" userId="eed59d4ebf12600b" providerId="LiveId" clId="{E7C69A7C-A215-426B-8AAA-22D3B1BFACE3}" dt="2021-04-16T23:10:06.282" v="348" actId="1076"/>
+          <ac:chgData name="Deivison Andrade Souza" userId="bc490d82787b51a2" providerId="LiveId" clId="{18C074D4-1E9F-42B9-A51D-65B4F691BFB6}" dt="2021-04-17T01:38:13.803" v="65" actId="1076"/>
           <ac:spMkLst>
             <pc:docMk/>
             <pc:sldMk cId="2545260601" sldId="268"/>
-            <ac:spMk id="26" creationId="{726AA524-F4CF-470F-BBBD-01356B9C9900}"/>
+            <ac:spMk id="36" creationId="{E47DB1F1-C7E7-422C-83CB-4DA85D64E794}"/>
           </ac:spMkLst>
         </pc:spChg>
-        <pc:spChg chg="add mod">
-          <ac:chgData name="Gyovane Souzza" userId="eed59d4ebf12600b" providerId="LiveId" clId="{E7C69A7C-A215-426B-8AAA-22D3B1BFACE3}" dt="2021-04-16T23:10:24.553" v="371" actId="1076"/>
-          <ac:spMkLst>
-            <pc:docMk/>
-            <pc:sldMk cId="2545260601" sldId="268"/>
-            <ac:spMk id="42" creationId="{530C8E99-B939-4769-A4B3-176418E20FBD}"/>
-          </ac:spMkLst>
-        </pc:spChg>
-        <pc:spChg chg="add mod">
-          <ac:chgData name="Gyovane Souzza" userId="eed59d4ebf12600b" providerId="LiveId" clId="{E7C69A7C-A215-426B-8AAA-22D3B1BFACE3}" dt="2021-04-16T23:10:38.071" v="375" actId="313"/>
-          <ac:spMkLst>
-            <pc:docMk/>
-            <pc:sldMk cId="2545260601" sldId="268"/>
-            <ac:spMk id="65" creationId="{85BC9B38-54EA-4D53-AF3B-CBA65691CEBD}"/>
-          </ac:spMkLst>
-        </pc:spChg>
-        <pc:cxnChg chg="mod">
-          <ac:chgData name="Gyovane Souzza" userId="eed59d4ebf12600b" providerId="LiveId" clId="{E7C69A7C-A215-426B-8AAA-22D3B1BFACE3}" dt="2021-04-16T23:14:19.538" v="393" actId="1076"/>
-          <ac:cxnSpMkLst>
-            <pc:docMk/>
-            <pc:sldMk cId="2545260601" sldId="268"/>
-            <ac:cxnSpMk id="6" creationId="{00000000-0000-0000-0000-000000000000}"/>
-          </ac:cxnSpMkLst>
-        </pc:cxnChg>
-        <pc:cxnChg chg="mod">
-          <ac:chgData name="Gyovane Souzza" userId="eed59d4ebf12600b" providerId="LiveId" clId="{E7C69A7C-A215-426B-8AAA-22D3B1BFACE3}" dt="2021-04-16T23:09:28.200" v="321" actId="1076"/>
-          <ac:cxnSpMkLst>
-            <pc:docMk/>
-            <pc:sldMk cId="2545260601" sldId="268"/>
-            <ac:cxnSpMk id="12" creationId="{F1B6C749-6105-4250-9D96-3797FCC3AA4C}"/>
-          </ac:cxnSpMkLst>
-        </pc:cxnChg>
-        <pc:cxnChg chg="mod">
-          <ac:chgData name="Gyovane Souzza" userId="eed59d4ebf12600b" providerId="LiveId" clId="{E7C69A7C-A215-426B-8AAA-22D3B1BFACE3}" dt="2021-04-16T23:13:32.272" v="386" actId="14100"/>
-          <ac:cxnSpMkLst>
-            <pc:docMk/>
-            <pc:sldMk cId="2545260601" sldId="268"/>
-            <ac:cxnSpMk id="20" creationId="{D7E0D70D-5C69-4F74-B808-E63E1825C7D5}"/>
-          </ac:cxnSpMkLst>
-        </pc:cxnChg>
-        <pc:cxnChg chg="mod ord">
-          <ac:chgData name="Gyovane Souzza" userId="eed59d4ebf12600b" providerId="LiveId" clId="{E7C69A7C-A215-426B-8AAA-22D3B1BFACE3}" dt="2021-04-16T23:14:22.236" v="394" actId="1076"/>
-          <ac:cxnSpMkLst>
-            <pc:docMk/>
-            <pc:sldMk cId="2545260601" sldId="268"/>
-            <ac:cxnSpMk id="24" creationId="{BC6F058D-F013-4529-A509-591C143AB4F9}"/>
-          </ac:cxnSpMkLst>
-        </pc:cxnChg>
-        <pc:cxnChg chg="add mod">
-          <ac:chgData name="Gyovane Souzza" userId="eed59d4ebf12600b" providerId="LiveId" clId="{E7C69A7C-A215-426B-8AAA-22D3B1BFACE3}" dt="2021-04-16T23:10:06.282" v="348" actId="1076"/>
-          <ac:cxnSpMkLst>
-            <pc:docMk/>
-            <pc:sldMk cId="2545260601" sldId="268"/>
-            <ac:cxnSpMk id="32" creationId="{A894244B-57F7-4A61-8C54-7C20CC40DE80}"/>
-          </ac:cxnSpMkLst>
-        </pc:cxnChg>
-        <pc:cxnChg chg="add mod">
-          <ac:chgData name="Gyovane Souzza" userId="eed59d4ebf12600b" providerId="LiveId" clId="{E7C69A7C-A215-426B-8AAA-22D3B1BFACE3}" dt="2021-04-16T23:10:24.553" v="371" actId="1076"/>
-          <ac:cxnSpMkLst>
-            <pc:docMk/>
-            <pc:sldMk cId="2545260601" sldId="268"/>
-            <ac:cxnSpMk id="57" creationId="{CD4A593F-9C95-4800-9B7B-958B442C96F7}"/>
-          </ac:cxnSpMkLst>
-        </pc:cxnChg>
-        <pc:cxnChg chg="add mod">
-          <ac:chgData name="Gyovane Souzza" userId="eed59d4ebf12600b" providerId="LiveId" clId="{E7C69A7C-A215-426B-8AAA-22D3B1BFACE3}" dt="2021-04-16T23:10:34.957" v="374" actId="14100"/>
-          <ac:cxnSpMkLst>
-            <pc:docMk/>
-            <pc:sldMk cId="2545260601" sldId="268"/>
-            <ac:cxnSpMk id="67" creationId="{3624F9F1-ADF8-48D2-B891-B344D8F92E1F}"/>
-          </ac:cxnSpMkLst>
-        </pc:cxnChg>
-      </pc:sldChg>
-      <pc:sldChg chg="add del">
-        <pc:chgData name="Gyovane Souzza" userId="eed59d4ebf12600b" providerId="LiveId" clId="{E7C69A7C-A215-426B-8AAA-22D3B1BFACE3}" dt="2021-04-16T23:14:35.522" v="395" actId="47"/>
-        <pc:sldMkLst>
-          <pc:docMk/>
-          <pc:sldMk cId="703555007" sldId="269"/>
-        </pc:sldMkLst>
-      </pc:sldChg>
-      <pc:sldChg chg="delSp modSp add mod">
-        <pc:chgData name="Gyovane Souzza" userId="eed59d4ebf12600b" providerId="LiveId" clId="{E7C69A7C-A215-426B-8AAA-22D3B1BFACE3}" dt="2021-04-16T23:21:49.552" v="412" actId="20577"/>
-        <pc:sldMkLst>
-          <pc:docMk/>
-          <pc:sldMk cId="2060403710" sldId="269"/>
-        </pc:sldMkLst>
-        <pc:spChg chg="del">
-          <ac:chgData name="Gyovane Souzza" userId="eed59d4ebf12600b" providerId="LiveId" clId="{E7C69A7C-A215-426B-8AAA-22D3B1BFACE3}" dt="2021-04-16T23:21:31.092" v="399" actId="478"/>
-          <ac:spMkLst>
-            <pc:docMk/>
-            <pc:sldMk cId="2060403710" sldId="269"/>
-            <ac:spMk id="13" creationId="{E80196AD-6A41-4D1E-B413-2AD1E67D83DA}"/>
-          </ac:spMkLst>
-        </pc:spChg>
-        <pc:spChg chg="del">
-          <ac:chgData name="Gyovane Souzza" userId="eed59d4ebf12600b" providerId="LiveId" clId="{E7C69A7C-A215-426B-8AAA-22D3B1BFACE3}" dt="2021-04-16T23:21:33.326" v="400" actId="478"/>
-          <ac:spMkLst>
-            <pc:docMk/>
-            <pc:sldMk cId="2060403710" sldId="269"/>
-            <ac:spMk id="14" creationId="{E08A7210-0801-426D-BC7D-7B345C308957}"/>
-          </ac:spMkLst>
-        </pc:spChg>
-        <pc:spChg chg="del">
-          <ac:chgData name="Gyovane Souzza" userId="eed59d4ebf12600b" providerId="LiveId" clId="{E7C69A7C-A215-426B-8AAA-22D3B1BFACE3}" dt="2021-04-16T23:21:37.717" v="402" actId="478"/>
-          <ac:spMkLst>
-            <pc:docMk/>
-            <pc:sldMk cId="2060403710" sldId="269"/>
-            <ac:spMk id="17" creationId="{59C2518D-BE03-4C45-BB4B-D6EF1E892629}"/>
-          </ac:spMkLst>
-        </pc:spChg>
-        <pc:spChg chg="mod">
-          <ac:chgData name="Gyovane Souzza" userId="eed59d4ebf12600b" providerId="LiveId" clId="{E7C69A7C-A215-426B-8AAA-22D3B1BFACE3}" dt="2021-04-16T23:21:49.552" v="412" actId="20577"/>
-          <ac:spMkLst>
-            <pc:docMk/>
-            <pc:sldMk cId="2060403710" sldId="269"/>
-            <ac:spMk id="23" creationId="{A55927FF-5CCE-4580-97AD-62A4648F46D2}"/>
-          </ac:spMkLst>
-        </pc:spChg>
-        <pc:cxnChg chg="del mod">
-          <ac:chgData name="Gyovane Souzza" userId="eed59d4ebf12600b" providerId="LiveId" clId="{E7C69A7C-A215-426B-8AAA-22D3B1BFACE3}" dt="2021-04-16T23:21:34.094" v="401" actId="478"/>
-          <ac:cxnSpMkLst>
-            <pc:docMk/>
-            <pc:sldMk cId="2060403710" sldId="269"/>
-            <ac:cxnSpMk id="20" creationId="{D7E0D70D-5C69-4F74-B808-E63E1825C7D5}"/>
-          </ac:cxnSpMkLst>
-        </pc:cxnChg>
       </pc:sldChg>
     </pc:docChg>
   </pc:docChgLst>
@@ -5461,58 +4956,6 @@
       </p:sp>
       <p:sp>
         <p:nvSpPr>
-          <p:cNvPr id="14" name="CaixaDeTexto 13">
-            <a:extLst>
-              <a:ext uri="{FF2B5EF4-FFF2-40B4-BE49-F238E27FC236}">
-                <a16:creationId xmlns:a16="http://schemas.microsoft.com/office/drawing/2014/main" id="{E08A7210-0801-426D-BC7D-7B345C308957}"/>
-              </a:ext>
-            </a:extLst>
-          </p:cNvPr>
-          <p:cNvSpPr txBox="1"/>
-          <p:nvPr/>
-        </p:nvSpPr>
-        <p:spPr>
-          <a:xfrm>
-            <a:off x="7751766" y="3700045"/>
-            <a:ext cx="1407758" cy="307777"/>
-          </a:xfrm>
-          <a:prstGeom prst="rect">
-            <a:avLst/>
-          </a:prstGeom>
-          <a:noFill/>
-        </p:spPr>
-        <p:txBody>
-          <a:bodyPr wrap="none" rtlCol="0">
-            <a:spAutoFit/>
-          </a:bodyPr>
-          <a:lstStyle/>
-          <a:p>
-            <a:r>
-              <a:rPr lang="pt-BR" sz="1400" dirty="0">
-                <a:latin typeface="Arial" panose="020B0604020202020204" pitchFamily="34" charset="0"/>
-                <a:cs typeface="Arial" panose="020B0604020202020204" pitchFamily="34" charset="0"/>
-              </a:rPr>
-              <a:t>(Nó </a:t>
-            </a:r>
-            <a:r>
-              <a:rPr lang="pt-BR" sz="1200" dirty="0">
-                <a:latin typeface="Arial" panose="020B0604020202020204" pitchFamily="34" charset="0"/>
-                <a:cs typeface="Arial" panose="020B0604020202020204" pitchFamily="34" charset="0"/>
-              </a:rPr>
-              <a:t>Operacional</a:t>
-            </a:r>
-            <a:r>
-              <a:rPr lang="pt-BR" sz="1400" dirty="0">
-                <a:latin typeface="Arial" panose="020B0604020202020204" pitchFamily="34" charset="0"/>
-                <a:cs typeface="Arial" panose="020B0604020202020204" pitchFamily="34" charset="0"/>
-              </a:rPr>
-              <a:t>)</a:t>
-            </a:r>
-          </a:p>
-        </p:txBody>
-      </p:sp>
-      <p:sp>
-        <p:nvSpPr>
           <p:cNvPr id="23" name="Retângulo 22">
             <a:extLst>
               <a:ext uri="{FF2B5EF4-FFF2-40B4-BE49-F238E27FC236}">
@@ -6027,6 +5470,169 @@
           </a:fontRef>
         </p:style>
       </p:cxnSp>
+      <p:sp>
+        <p:nvSpPr>
+          <p:cNvPr id="33" name="Cubo 32">
+            <a:extLst>
+              <a:ext uri="{FF2B5EF4-FFF2-40B4-BE49-F238E27FC236}">
+                <a16:creationId xmlns:a16="http://schemas.microsoft.com/office/drawing/2014/main" id="{071D06C6-5DE7-417C-8F38-D2E3DA94DC2B}"/>
+              </a:ext>
+            </a:extLst>
+          </p:cNvPr>
+          <p:cNvSpPr/>
+          <p:nvPr/>
+        </p:nvSpPr>
+        <p:spPr>
+          <a:xfrm>
+            <a:off x="7362813" y="1659019"/>
+            <a:ext cx="2272899" cy="1015853"/>
+          </a:xfrm>
+          <a:prstGeom prst="cube">
+            <a:avLst/>
+          </a:prstGeom>
+        </p:spPr>
+        <p:style>
+          <a:lnRef idx="2">
+            <a:schemeClr val="accent4">
+              <a:shade val="50000"/>
+            </a:schemeClr>
+          </a:lnRef>
+          <a:fillRef idx="1">
+            <a:schemeClr val="accent4"/>
+          </a:fillRef>
+          <a:effectRef idx="0">
+            <a:schemeClr val="accent4"/>
+          </a:effectRef>
+          <a:fontRef idx="minor">
+            <a:schemeClr val="lt1"/>
+          </a:fontRef>
+        </p:style>
+        <p:txBody>
+          <a:bodyPr rtlCol="0" anchor="ctr"/>
+          <a:lstStyle/>
+          <a:p>
+            <a:pPr algn="ctr"/>
+            <a:r>
+              <a:rPr lang="pt-BR" sz="1400" dirty="0">
+                <a:latin typeface="Arial" panose="020B0604020202020204" pitchFamily="34" charset="0"/>
+                <a:cs typeface="Arial" panose="020B0604020202020204" pitchFamily="34" charset="0"/>
+              </a:rPr>
+              <a:t>Setor de  caixa(financeiro)</a:t>
+            </a:r>
+          </a:p>
+          <a:p>
+            <a:pPr algn="ctr"/>
+            <a:endParaRPr lang="pt-BR" sz="1400" dirty="0">
+              <a:latin typeface="Arial" panose="020B0604020202020204" pitchFamily="34" charset="0"/>
+              <a:cs typeface="Arial" panose="020B0604020202020204" pitchFamily="34" charset="0"/>
+            </a:endParaRPr>
+          </a:p>
+        </p:txBody>
+      </p:sp>
+      <p:sp>
+        <p:nvSpPr>
+          <p:cNvPr id="36" name="CaixaDeTexto 35">
+            <a:extLst>
+              <a:ext uri="{FF2B5EF4-FFF2-40B4-BE49-F238E27FC236}">
+                <a16:creationId xmlns:a16="http://schemas.microsoft.com/office/drawing/2014/main" id="{E47DB1F1-C7E7-422C-83CB-4DA85D64E794}"/>
+              </a:ext>
+            </a:extLst>
+          </p:cNvPr>
+          <p:cNvSpPr txBox="1"/>
+          <p:nvPr/>
+        </p:nvSpPr>
+        <p:spPr>
+          <a:xfrm>
+            <a:off x="7928993" y="3730822"/>
+            <a:ext cx="1407758" cy="307777"/>
+          </a:xfrm>
+          <a:prstGeom prst="rect">
+            <a:avLst/>
+          </a:prstGeom>
+          <a:noFill/>
+        </p:spPr>
+        <p:txBody>
+          <a:bodyPr wrap="none" rtlCol="0">
+            <a:spAutoFit/>
+          </a:bodyPr>
+          <a:lstStyle/>
+          <a:p>
+            <a:r>
+              <a:rPr lang="pt-BR" sz="1400" dirty="0">
+                <a:latin typeface="Arial" panose="020B0604020202020204" pitchFamily="34" charset="0"/>
+                <a:cs typeface="Arial" panose="020B0604020202020204" pitchFamily="34" charset="0"/>
+              </a:rPr>
+              <a:t>(Nó </a:t>
+            </a:r>
+            <a:r>
+              <a:rPr lang="pt-BR" sz="1200" dirty="0">
+                <a:latin typeface="Arial" panose="020B0604020202020204" pitchFamily="34" charset="0"/>
+                <a:cs typeface="Arial" panose="020B0604020202020204" pitchFamily="34" charset="0"/>
+              </a:rPr>
+              <a:t>Operacional</a:t>
+            </a:r>
+            <a:r>
+              <a:rPr lang="pt-BR" sz="1400" dirty="0">
+                <a:latin typeface="Arial" panose="020B0604020202020204" pitchFamily="34" charset="0"/>
+                <a:cs typeface="Arial" panose="020B0604020202020204" pitchFamily="34" charset="0"/>
+              </a:rPr>
+              <a:t>)</a:t>
+            </a:r>
+          </a:p>
+        </p:txBody>
+      </p:sp>
+      <p:sp>
+        <p:nvSpPr>
+          <p:cNvPr id="14" name="CaixaDeTexto 13">
+            <a:extLst>
+              <a:ext uri="{FF2B5EF4-FFF2-40B4-BE49-F238E27FC236}">
+                <a16:creationId xmlns:a16="http://schemas.microsoft.com/office/drawing/2014/main" id="{E08A7210-0801-426D-BC7D-7B345C308957}"/>
+              </a:ext>
+            </a:extLst>
+          </p:cNvPr>
+          <p:cNvSpPr txBox="1"/>
+          <p:nvPr/>
+        </p:nvSpPr>
+        <p:spPr>
+          <a:xfrm>
+            <a:off x="7665620" y="2367095"/>
+            <a:ext cx="1407758" cy="307777"/>
+          </a:xfrm>
+          <a:prstGeom prst="rect">
+            <a:avLst/>
+          </a:prstGeom>
+          <a:noFill/>
+        </p:spPr>
+        <p:txBody>
+          <a:bodyPr wrap="none" rtlCol="0">
+            <a:spAutoFit/>
+          </a:bodyPr>
+          <a:lstStyle/>
+          <a:p>
+            <a:r>
+              <a:rPr lang="pt-BR" sz="1400" dirty="0">
+                <a:latin typeface="Arial" panose="020B0604020202020204" pitchFamily="34" charset="0"/>
+                <a:cs typeface="Arial" panose="020B0604020202020204" pitchFamily="34" charset="0"/>
+              </a:rPr>
+              <a:t>(Nó </a:t>
+            </a:r>
+            <a:r>
+              <a:rPr lang="pt-BR" sz="1200" dirty="0">
+                <a:latin typeface="Arial" panose="020B0604020202020204" pitchFamily="34" charset="0"/>
+                <a:cs typeface="Arial" panose="020B0604020202020204" pitchFamily="34" charset="0"/>
+              </a:rPr>
+              <a:t>Operacional</a:t>
+            </a:r>
+            <a:r>
+              <a:rPr lang="pt-BR" sz="1400" dirty="0">
+                <a:latin typeface="Arial" panose="020B0604020202020204" pitchFamily="34" charset="0"/>
+                <a:cs typeface="Arial" panose="020B0604020202020204" pitchFamily="34" charset="0"/>
+              </a:rPr>
+              <a:t>)</a:t>
+            </a:r>
+          </a:p>
+        </p:txBody>
+      </p:sp>
     </p:spTree>
     <p:extLst>
       <p:ext uri="{BB962C8B-B14F-4D97-AF65-F5344CB8AC3E}">
@@ -6074,9 +5680,9 @@
           <p:nvPr/>
         </p:nvCxnSpPr>
         <p:spPr>
-          <a:xfrm>
-            <a:off x="6241827" y="3350454"/>
-            <a:ext cx="4213962" cy="140121"/>
+          <a:xfrm flipV="1">
+            <a:off x="6241827" y="2452262"/>
+            <a:ext cx="4181606" cy="898192"/>
           </a:xfrm>
           <a:prstGeom prst="line">
             <a:avLst/>
@@ -6496,7 +6102,7 @@
         </p:nvSpPr>
         <p:spPr>
           <a:xfrm>
-            <a:off x="10455789" y="2973328"/>
+            <a:off x="10423433" y="1935015"/>
             <a:ext cx="1598940" cy="1034494"/>
           </a:xfrm>
           <a:prstGeom prst="rect">
@@ -6862,6 +6468,97 @@
           <a:xfrm>
             <a:off x="4972627" y="3985362"/>
             <a:ext cx="2304965" cy="570484"/>
+          </a:xfrm>
+          <a:prstGeom prst="line">
+            <a:avLst/>
+          </a:prstGeom>
+        </p:spPr>
+        <p:style>
+          <a:lnRef idx="1">
+            <a:schemeClr val="accent1"/>
+          </a:lnRef>
+          <a:fillRef idx="0">
+            <a:schemeClr val="accent1"/>
+          </a:fillRef>
+          <a:effectRef idx="0">
+            <a:schemeClr val="accent1"/>
+          </a:effectRef>
+          <a:fontRef idx="minor">
+            <a:schemeClr val="tx1"/>
+          </a:fontRef>
+        </p:style>
+      </p:cxnSp>
+      <p:sp>
+        <p:nvSpPr>
+          <p:cNvPr id="19" name="Retângulo 18">
+            <a:extLst>
+              <a:ext uri="{FF2B5EF4-FFF2-40B4-BE49-F238E27FC236}">
+                <a16:creationId xmlns:a16="http://schemas.microsoft.com/office/drawing/2014/main" id="{BE0A355C-7422-4996-8EF7-35BA6DD90936}"/>
+              </a:ext>
+            </a:extLst>
+          </p:cNvPr>
+          <p:cNvSpPr/>
+          <p:nvPr/>
+        </p:nvSpPr>
+        <p:spPr>
+          <a:xfrm>
+            <a:off x="10449322" y="3604417"/>
+            <a:ext cx="1598940" cy="1034494"/>
+          </a:xfrm>
+          <a:prstGeom prst="rect">
+            <a:avLst/>
+          </a:prstGeom>
+        </p:spPr>
+        <p:style>
+          <a:lnRef idx="2">
+            <a:schemeClr val="accent1">
+              <a:shade val="50000"/>
+            </a:schemeClr>
+          </a:lnRef>
+          <a:fillRef idx="1">
+            <a:schemeClr val="accent1"/>
+          </a:fillRef>
+          <a:effectRef idx="0">
+            <a:schemeClr val="accent1"/>
+          </a:effectRef>
+          <a:fontRef idx="minor">
+            <a:schemeClr val="lt1"/>
+          </a:fontRef>
+        </p:style>
+        <p:txBody>
+          <a:bodyPr rtlCol="0" anchor="ctr"/>
+          <a:lstStyle/>
+          <a:p>
+            <a:pPr algn="ctr"/>
+            <a:r>
+              <a:rPr lang="pt-BR" dirty="0">
+                <a:latin typeface="Arial" panose="020B0604020202020204" pitchFamily="34" charset="0"/>
+                <a:cs typeface="Arial" panose="020B0604020202020204" pitchFamily="34" charset="0"/>
+              </a:rPr>
+              <a:t>Banco </a:t>
+            </a:r>
+          </a:p>
+        </p:txBody>
+      </p:sp>
+      <p:cxnSp>
+        <p:nvCxnSpPr>
+          <p:cNvPr id="22" name="Conector reto 21">
+            <a:extLst>
+              <a:ext uri="{FF2B5EF4-FFF2-40B4-BE49-F238E27FC236}">
+                <a16:creationId xmlns:a16="http://schemas.microsoft.com/office/drawing/2014/main" id="{C22207A9-7ABE-49BF-93F5-8354E08A7D8C}"/>
+              </a:ext>
+            </a:extLst>
+          </p:cNvPr>
+          <p:cNvCxnSpPr>
+            <a:cxnSpLocks/>
+            <a:endCxn id="19" idx="1"/>
+          </p:cNvCxnSpPr>
+          <p:nvPr/>
+        </p:nvCxnSpPr>
+        <p:spPr>
+          <a:xfrm>
+            <a:off x="6241827" y="3547496"/>
+            <a:ext cx="4207495" cy="574168"/>
           </a:xfrm>
           <a:prstGeom prst="line">
             <a:avLst/>

</xml_diff>

<commit_message>
[ATUALIZAÇÃO] - Art 15.
</commit_message>
<xml_diff>
--- a/Documentation/15._Arquitetura_de_Negócio_para_cada_Cenário.pptx
+++ b/Documentation/15._Arquitetura_de_Negócio_para_cada_Cenário.pptx
@@ -9,7 +9,7 @@
     <p:sldId id="258" r:id="rId3"/>
     <p:sldId id="266" r:id="rId4"/>
     <p:sldId id="268" r:id="rId5"/>
-    <p:sldId id="269" r:id="rId6"/>
+    <p:sldId id="270" r:id="rId6"/>
     <p:sldId id="262" r:id="rId7"/>
     <p:sldId id="264" r:id="rId8"/>
   </p:sldIdLst>
@@ -121,7 +121,7 @@
 <file path=ppt/revisionInfo.xml><?xml version="1.0" encoding="utf-8"?>
 <p1510:revInfo xmlns:a="http://schemas.openxmlformats.org/drawingml/2006/main" xmlns:r="http://schemas.openxmlformats.org/officeDocument/2006/relationships" xmlns:p1510="http://schemas.microsoft.com/office/powerpoint/2015/10/main">
   <p1510:revLst>
-    <p1510:client id="{18C074D4-1E9F-42B9-A51D-65B4F691BFB6}" v="6" dt="2021-04-17T01:37:57.338"/>
+    <p1510:client id="{E7C69A7C-A215-426B-8AAA-22D3B1BFACE3}" v="27" dt="2021-04-19T14:32:25.668"/>
   </p1510:revLst>
 </p1510:revInfo>
 </file>
@@ -184,6 +184,602 @@
       </pc:sldChg>
     </pc:docChg>
   </pc:docChgLst>
+  <pc:docChgLst>
+    <pc:chgData name="Gyovane Souzza" userId="eed59d4ebf12600b" providerId="LiveId" clId="{E7C69A7C-A215-426B-8AAA-22D3B1BFACE3}"/>
+    <pc:docChg chg="undo custSel addSld delSld modSld">
+      <pc:chgData name="Gyovane Souzza" userId="eed59d4ebf12600b" providerId="LiveId" clId="{E7C69A7C-A215-426B-8AAA-22D3B1BFACE3}" dt="2021-04-19T15:43:30.511" v="238"/>
+      <pc:docMkLst>
+        <pc:docMk/>
+      </pc:docMkLst>
+      <pc:sldChg chg="addSp delSp modSp mod">
+        <pc:chgData name="Gyovane Souzza" userId="eed59d4ebf12600b" providerId="LiveId" clId="{E7C69A7C-A215-426B-8AAA-22D3B1BFACE3}" dt="2021-04-19T15:43:30.511" v="238"/>
+        <pc:sldMkLst>
+          <pc:docMk/>
+          <pc:sldMk cId="742500691" sldId="262"/>
+        </pc:sldMkLst>
+        <pc:spChg chg="mod">
+          <ac:chgData name="Gyovane Souzza" userId="eed59d4ebf12600b" providerId="LiveId" clId="{E7C69A7C-A215-426B-8AAA-22D3B1BFACE3}" dt="2021-04-19T14:32:08.058" v="206" actId="1076"/>
+          <ac:spMkLst>
+            <pc:docMk/>
+            <pc:sldMk cId="742500691" sldId="262"/>
+            <ac:spMk id="4" creationId="{00000000-0000-0000-0000-000000000000}"/>
+          </ac:spMkLst>
+        </pc:spChg>
+        <pc:spChg chg="mod">
+          <ac:chgData name="Gyovane Souzza" userId="eed59d4ebf12600b" providerId="LiveId" clId="{E7C69A7C-A215-426B-8AAA-22D3B1BFACE3}" dt="2021-04-19T14:31:24.525" v="191" actId="1076"/>
+          <ac:spMkLst>
+            <pc:docMk/>
+            <pc:sldMk cId="742500691" sldId="262"/>
+            <ac:spMk id="5" creationId="{00000000-0000-0000-0000-000000000000}"/>
+          </ac:spMkLst>
+        </pc:spChg>
+        <pc:spChg chg="mod">
+          <ac:chgData name="Gyovane Souzza" userId="eed59d4ebf12600b" providerId="LiveId" clId="{E7C69A7C-A215-426B-8AAA-22D3B1BFACE3}" dt="2021-04-19T14:32:15.159" v="209" actId="1076"/>
+          <ac:spMkLst>
+            <pc:docMk/>
+            <pc:sldMk cId="742500691" sldId="262"/>
+            <ac:spMk id="7" creationId="{00000000-0000-0000-0000-000000000000}"/>
+          </ac:spMkLst>
+        </pc:spChg>
+        <pc:spChg chg="mod">
+          <ac:chgData name="Gyovane Souzza" userId="eed59d4ebf12600b" providerId="LiveId" clId="{E7C69A7C-A215-426B-8AAA-22D3B1BFACE3}" dt="2021-04-19T14:31:29.698" v="193" actId="1076"/>
+          <ac:spMkLst>
+            <pc:docMk/>
+            <pc:sldMk cId="742500691" sldId="262"/>
+            <ac:spMk id="8" creationId="{00000000-0000-0000-0000-000000000000}"/>
+          </ac:spMkLst>
+        </pc:spChg>
+        <pc:spChg chg="mod">
+          <ac:chgData name="Gyovane Souzza" userId="eed59d4ebf12600b" providerId="LiveId" clId="{E7C69A7C-A215-426B-8AAA-22D3B1BFACE3}" dt="2021-04-19T14:31:34.831" v="195" actId="1076"/>
+          <ac:spMkLst>
+            <pc:docMk/>
+            <pc:sldMk cId="742500691" sldId="262"/>
+            <ac:spMk id="9" creationId="{00000000-0000-0000-0000-000000000000}"/>
+          </ac:spMkLst>
+        </pc:spChg>
+        <pc:spChg chg="del mod">
+          <ac:chgData name="Gyovane Souzza" userId="eed59d4ebf12600b" providerId="LiveId" clId="{E7C69A7C-A215-426B-8AAA-22D3B1BFACE3}" dt="2021-04-19T14:24:33.263" v="153" actId="478"/>
+          <ac:spMkLst>
+            <pc:docMk/>
+            <pc:sldMk cId="742500691" sldId="262"/>
+            <ac:spMk id="10" creationId="{00000000-0000-0000-0000-000000000000}"/>
+          </ac:spMkLst>
+        </pc:spChg>
+        <pc:spChg chg="add del mod">
+          <ac:chgData name="Gyovane Souzza" userId="eed59d4ebf12600b" providerId="LiveId" clId="{E7C69A7C-A215-426B-8AAA-22D3B1BFACE3}" dt="2021-04-19T14:24:43.554" v="160" actId="478"/>
+          <ac:spMkLst>
+            <pc:docMk/>
+            <pc:sldMk cId="742500691" sldId="262"/>
+            <ac:spMk id="13" creationId="{978A49E9-891D-413B-9A39-136D2D39EF1A}"/>
+          </ac:spMkLst>
+        </pc:spChg>
+        <pc:spChg chg="mod topLvl">
+          <ac:chgData name="Gyovane Souzza" userId="eed59d4ebf12600b" providerId="LiveId" clId="{E7C69A7C-A215-426B-8AAA-22D3B1BFACE3}" dt="2021-04-19T14:26:18.638" v="181" actId="164"/>
+          <ac:spMkLst>
+            <pc:docMk/>
+            <pc:sldMk cId="742500691" sldId="262"/>
+            <ac:spMk id="18" creationId="{CE2FAD5C-CAD8-47DC-A6B6-919B585D2C42}"/>
+          </ac:spMkLst>
+        </pc:spChg>
+        <pc:spChg chg="mod topLvl">
+          <ac:chgData name="Gyovane Souzza" userId="eed59d4ebf12600b" providerId="LiveId" clId="{E7C69A7C-A215-426B-8AAA-22D3B1BFACE3}" dt="2021-04-19T14:26:18.638" v="181" actId="164"/>
+          <ac:spMkLst>
+            <pc:docMk/>
+            <pc:sldMk cId="742500691" sldId="262"/>
+            <ac:spMk id="19" creationId="{CADFC7F1-FBA7-42FC-816D-D9A8DB2E89DC}"/>
+          </ac:spMkLst>
+        </pc:spChg>
+        <pc:spChg chg="mod">
+          <ac:chgData name="Gyovane Souzza" userId="eed59d4ebf12600b" providerId="LiveId" clId="{E7C69A7C-A215-426B-8AAA-22D3B1BFACE3}" dt="2021-04-19T14:24:16.253" v="146"/>
+          <ac:spMkLst>
+            <pc:docMk/>
+            <pc:sldMk cId="742500691" sldId="262"/>
+            <ac:spMk id="21" creationId="{E26EDF5F-BE68-4EC7-BC4D-EA0C54BDEB18}"/>
+          </ac:spMkLst>
+        </pc:spChg>
+        <pc:spChg chg="mod">
+          <ac:chgData name="Gyovane Souzza" userId="eed59d4ebf12600b" providerId="LiveId" clId="{E7C69A7C-A215-426B-8AAA-22D3B1BFACE3}" dt="2021-04-19T14:24:16.253" v="146"/>
+          <ac:spMkLst>
+            <pc:docMk/>
+            <pc:sldMk cId="742500691" sldId="262"/>
+            <ac:spMk id="22" creationId="{AFEA169C-0D35-48A1-AA45-40FBE11546C5}"/>
+          </ac:spMkLst>
+        </pc:spChg>
+        <pc:spChg chg="add mod">
+          <ac:chgData name="Gyovane Souzza" userId="eed59d4ebf12600b" providerId="LiveId" clId="{E7C69A7C-A215-426B-8AAA-22D3B1BFACE3}" dt="2021-04-19T14:32:15.159" v="209" actId="1076"/>
+          <ac:spMkLst>
+            <pc:docMk/>
+            <pc:sldMk cId="742500691" sldId="262"/>
+            <ac:spMk id="23" creationId="{91A4513E-4A84-482A-A480-3FD53E09D0F5}"/>
+          </ac:spMkLst>
+        </pc:spChg>
+        <pc:spChg chg="add mod">
+          <ac:chgData name="Gyovane Souzza" userId="eed59d4ebf12600b" providerId="LiveId" clId="{E7C69A7C-A215-426B-8AAA-22D3B1BFACE3}" dt="2021-04-19T15:43:30.511" v="238"/>
+          <ac:spMkLst>
+            <pc:docMk/>
+            <pc:sldMk cId="742500691" sldId="262"/>
+            <ac:spMk id="24" creationId="{689AD128-9B12-4797-AAEC-0B16D4392271}"/>
+          </ac:spMkLst>
+        </pc:spChg>
+        <pc:spChg chg="add mod">
+          <ac:chgData name="Gyovane Souzza" userId="eed59d4ebf12600b" providerId="LiveId" clId="{E7C69A7C-A215-426B-8AAA-22D3B1BFACE3}" dt="2021-04-19T14:32:15.159" v="209" actId="1076"/>
+          <ac:spMkLst>
+            <pc:docMk/>
+            <pc:sldMk cId="742500691" sldId="262"/>
+            <ac:spMk id="25" creationId="{222ED160-844E-4B81-B39A-12364B59AA9F}"/>
+          </ac:spMkLst>
+        </pc:spChg>
+        <pc:spChg chg="add mod">
+          <ac:chgData name="Gyovane Souzza" userId="eed59d4ebf12600b" providerId="LiveId" clId="{E7C69A7C-A215-426B-8AAA-22D3B1BFACE3}" dt="2021-04-19T14:32:23.223" v="219" actId="1076"/>
+          <ac:spMkLst>
+            <pc:docMk/>
+            <pc:sldMk cId="742500691" sldId="262"/>
+            <ac:spMk id="46" creationId="{BD3F2132-48B4-4FC7-A9D7-99AC790C9D01}"/>
+          </ac:spMkLst>
+        </pc:spChg>
+        <pc:grpChg chg="add mod">
+          <ac:chgData name="Gyovane Souzza" userId="eed59d4ebf12600b" providerId="LiveId" clId="{E7C69A7C-A215-426B-8AAA-22D3B1BFACE3}" dt="2021-04-19T14:32:15.159" v="209" actId="1076"/>
+          <ac:grpSpMkLst>
+            <pc:docMk/>
+            <pc:sldMk cId="742500691" sldId="262"/>
+            <ac:grpSpMk id="16" creationId="{06EA8452-20C2-4DD1-A28E-9219B3645C37}"/>
+          </ac:grpSpMkLst>
+        </pc:grpChg>
+        <pc:grpChg chg="add del mod">
+          <ac:chgData name="Gyovane Souzza" userId="eed59d4ebf12600b" providerId="LiveId" clId="{E7C69A7C-A215-426B-8AAA-22D3B1BFACE3}" dt="2021-04-19T14:26:13.234" v="180" actId="165"/>
+          <ac:grpSpMkLst>
+            <pc:docMk/>
+            <pc:sldMk cId="742500691" sldId="262"/>
+            <ac:grpSpMk id="17" creationId="{51463E8D-1BA4-4F9D-BED6-8013171DDA2B}"/>
+          </ac:grpSpMkLst>
+        </pc:grpChg>
+        <pc:grpChg chg="add del mod">
+          <ac:chgData name="Gyovane Souzza" userId="eed59d4ebf12600b" providerId="LiveId" clId="{E7C69A7C-A215-426B-8AAA-22D3B1BFACE3}" dt="2021-04-19T14:24:17.216" v="147"/>
+          <ac:grpSpMkLst>
+            <pc:docMk/>
+            <pc:sldMk cId="742500691" sldId="262"/>
+            <ac:grpSpMk id="20" creationId="{12D17674-C0E2-439B-A6AF-2ABD8AB09FA6}"/>
+          </ac:grpSpMkLst>
+        </pc:grpChg>
+        <pc:grpChg chg="add mod">
+          <ac:chgData name="Gyovane Souzza" userId="eed59d4ebf12600b" providerId="LiveId" clId="{E7C69A7C-A215-426B-8AAA-22D3B1BFACE3}" dt="2021-04-19T14:32:15.159" v="209" actId="1076"/>
+          <ac:grpSpMkLst>
+            <pc:docMk/>
+            <pc:sldMk cId="742500691" sldId="262"/>
+            <ac:grpSpMk id="37" creationId="{EFFF5F30-E090-4221-A39E-642479BC267F}"/>
+          </ac:grpSpMkLst>
+        </pc:grpChg>
+        <pc:cxnChg chg="del mod">
+          <ac:chgData name="Gyovane Souzza" userId="eed59d4ebf12600b" providerId="LiveId" clId="{E7C69A7C-A215-426B-8AAA-22D3B1BFACE3}" dt="2021-04-19T14:22:20.820" v="121" actId="478"/>
+          <ac:cxnSpMkLst>
+            <pc:docMk/>
+            <pc:sldMk cId="742500691" sldId="262"/>
+            <ac:cxnSpMk id="6" creationId="{00000000-0000-0000-0000-000000000000}"/>
+          </ac:cxnSpMkLst>
+        </pc:cxnChg>
+        <pc:cxnChg chg="del mod">
+          <ac:chgData name="Gyovane Souzza" userId="eed59d4ebf12600b" providerId="LiveId" clId="{E7C69A7C-A215-426B-8AAA-22D3B1BFACE3}" dt="2021-04-19T14:22:27.991" v="125" actId="478"/>
+          <ac:cxnSpMkLst>
+            <pc:docMk/>
+            <pc:sldMk cId="742500691" sldId="262"/>
+            <ac:cxnSpMk id="12" creationId="{F1B6C749-6105-4250-9D96-3797FCC3AA4C}"/>
+          </ac:cxnSpMkLst>
+        </pc:cxnChg>
+        <pc:cxnChg chg="add mod ord">
+          <ac:chgData name="Gyovane Souzza" userId="eed59d4ebf12600b" providerId="LiveId" clId="{E7C69A7C-A215-426B-8AAA-22D3B1BFACE3}" dt="2021-04-19T14:32:15.159" v="209" actId="1076"/>
+          <ac:cxnSpMkLst>
+            <pc:docMk/>
+            <pc:sldMk cId="742500691" sldId="262"/>
+            <ac:cxnSpMk id="27" creationId="{F084CB31-F216-4FC9-AE3F-95BC31694D48}"/>
+          </ac:cxnSpMkLst>
+        </pc:cxnChg>
+        <pc:cxnChg chg="add mod ord">
+          <ac:chgData name="Gyovane Souzza" userId="eed59d4ebf12600b" providerId="LiveId" clId="{E7C69A7C-A215-426B-8AAA-22D3B1BFACE3}" dt="2021-04-19T14:32:15.159" v="209" actId="1076"/>
+          <ac:cxnSpMkLst>
+            <pc:docMk/>
+            <pc:sldMk cId="742500691" sldId="262"/>
+            <ac:cxnSpMk id="28" creationId="{980E8476-A5ED-4F40-8F20-FCB9AF6F1C8E}"/>
+          </ac:cxnSpMkLst>
+        </pc:cxnChg>
+        <pc:cxnChg chg="add mod ord">
+          <ac:chgData name="Gyovane Souzza" userId="eed59d4ebf12600b" providerId="LiveId" clId="{E7C69A7C-A215-426B-8AAA-22D3B1BFACE3}" dt="2021-04-19T14:32:15.159" v="209" actId="1076"/>
+          <ac:cxnSpMkLst>
+            <pc:docMk/>
+            <pc:sldMk cId="742500691" sldId="262"/>
+            <ac:cxnSpMk id="34" creationId="{4FB7E432-1D20-4AC7-B749-284D62324249}"/>
+          </ac:cxnSpMkLst>
+        </pc:cxnChg>
+        <pc:cxnChg chg="add mod ord">
+          <ac:chgData name="Gyovane Souzza" userId="eed59d4ebf12600b" providerId="LiveId" clId="{E7C69A7C-A215-426B-8AAA-22D3B1BFACE3}" dt="2021-04-19T14:32:34.174" v="223" actId="167"/>
+          <ac:cxnSpMkLst>
+            <pc:docMk/>
+            <pc:sldMk cId="742500691" sldId="262"/>
+            <ac:cxnSpMk id="47" creationId="{55D8F0B3-47BD-4548-B5E0-A34EA95FCBD8}"/>
+          </ac:cxnSpMkLst>
+        </pc:cxnChg>
+      </pc:sldChg>
+      <pc:sldChg chg="modSp mod">
+        <pc:chgData name="Gyovane Souzza" userId="eed59d4ebf12600b" providerId="LiveId" clId="{E7C69A7C-A215-426B-8AAA-22D3B1BFACE3}" dt="2021-04-19T15:30:06.875" v="234" actId="1076"/>
+        <pc:sldMkLst>
+          <pc:docMk/>
+          <pc:sldMk cId="226422873" sldId="264"/>
+        </pc:sldMkLst>
+        <pc:spChg chg="mod">
+          <ac:chgData name="Gyovane Souzza" userId="eed59d4ebf12600b" providerId="LiveId" clId="{E7C69A7C-A215-426B-8AAA-22D3B1BFACE3}" dt="2021-04-19T14:34:59.386" v="231" actId="255"/>
+          <ac:spMkLst>
+            <pc:docMk/>
+            <pc:sldMk cId="226422873" sldId="264"/>
+            <ac:spMk id="8" creationId="{00000000-0000-0000-0000-000000000000}"/>
+          </ac:spMkLst>
+        </pc:spChg>
+        <pc:spChg chg="mod">
+          <ac:chgData name="Gyovane Souzza" userId="eed59d4ebf12600b" providerId="LiveId" clId="{E7C69A7C-A215-426B-8AAA-22D3B1BFACE3}" dt="2021-04-19T14:35:03.161" v="232" actId="1076"/>
+          <ac:spMkLst>
+            <pc:docMk/>
+            <pc:sldMk cId="226422873" sldId="264"/>
+            <ac:spMk id="9" creationId="{00000000-0000-0000-0000-000000000000}"/>
+          </ac:spMkLst>
+        </pc:spChg>
+        <pc:spChg chg="mod">
+          <ac:chgData name="Gyovane Souzza" userId="eed59d4ebf12600b" providerId="LiveId" clId="{E7C69A7C-A215-426B-8AAA-22D3B1BFACE3}" dt="2021-04-19T14:34:59.386" v="231" actId="255"/>
+          <ac:spMkLst>
+            <pc:docMk/>
+            <pc:sldMk cId="226422873" sldId="264"/>
+            <ac:spMk id="13" creationId="{092E5AF6-1F3B-42C0-8997-B4B0787C12CB}"/>
+          </ac:spMkLst>
+        </pc:spChg>
+        <pc:spChg chg="mod">
+          <ac:chgData name="Gyovane Souzza" userId="eed59d4ebf12600b" providerId="LiveId" clId="{E7C69A7C-A215-426B-8AAA-22D3B1BFACE3}" dt="2021-04-19T14:35:05.231" v="233" actId="1076"/>
+          <ac:spMkLst>
+            <pc:docMk/>
+            <pc:sldMk cId="226422873" sldId="264"/>
+            <ac:spMk id="16" creationId="{CD898677-365E-409D-8533-71E889B84FC0}"/>
+          </ac:spMkLst>
+        </pc:spChg>
+        <pc:spChg chg="mod">
+          <ac:chgData name="Gyovane Souzza" userId="eed59d4ebf12600b" providerId="LiveId" clId="{E7C69A7C-A215-426B-8AAA-22D3B1BFACE3}" dt="2021-04-19T15:30:06.875" v="234" actId="1076"/>
+          <ac:spMkLst>
+            <pc:docMk/>
+            <pc:sldMk cId="226422873" sldId="264"/>
+            <ac:spMk id="17" creationId="{6B9319FF-DD73-4E36-9A7B-8677DBC4A2EE}"/>
+          </ac:spMkLst>
+        </pc:spChg>
+        <pc:cxnChg chg="mod">
+          <ac:chgData name="Gyovane Souzza" userId="eed59d4ebf12600b" providerId="LiveId" clId="{E7C69A7C-A215-426B-8AAA-22D3B1BFACE3}" dt="2021-04-19T14:34:44.723" v="227" actId="1076"/>
+          <ac:cxnSpMkLst>
+            <pc:docMk/>
+            <pc:sldMk cId="226422873" sldId="264"/>
+            <ac:cxnSpMk id="6" creationId="{00000000-0000-0000-0000-000000000000}"/>
+          </ac:cxnSpMkLst>
+        </pc:cxnChg>
+        <pc:cxnChg chg="mod">
+          <ac:chgData name="Gyovane Souzza" userId="eed59d4ebf12600b" providerId="LiveId" clId="{E7C69A7C-A215-426B-8AAA-22D3B1BFACE3}" dt="2021-04-19T15:30:06.875" v="234" actId="1076"/>
+          <ac:cxnSpMkLst>
+            <pc:docMk/>
+            <pc:sldMk cId="226422873" sldId="264"/>
+            <ac:cxnSpMk id="18" creationId="{E7044505-B8A8-4D07-A667-D4658ECAF6CB}"/>
+          </ac:cxnSpMkLst>
+        </pc:cxnChg>
+      </pc:sldChg>
+      <pc:sldChg chg="addSp delSp modSp mod">
+        <pc:chgData name="Gyovane Souzza" userId="eed59d4ebf12600b" providerId="LiveId" clId="{E7C69A7C-A215-426B-8AAA-22D3B1BFACE3}" dt="2021-04-19T14:10:45.702" v="53" actId="167"/>
+        <pc:sldMkLst>
+          <pc:docMk/>
+          <pc:sldMk cId="2545260601" sldId="268"/>
+        </pc:sldMkLst>
+        <pc:spChg chg="mod">
+          <ac:chgData name="Gyovane Souzza" userId="eed59d4ebf12600b" providerId="LiveId" clId="{E7C69A7C-A215-426B-8AAA-22D3B1BFACE3}" dt="2021-04-19T14:08:29.576" v="32" actId="1076"/>
+          <ac:spMkLst>
+            <pc:docMk/>
+            <pc:sldMk cId="2545260601" sldId="268"/>
+            <ac:spMk id="4" creationId="{00000000-0000-0000-0000-000000000000}"/>
+          </ac:spMkLst>
+        </pc:spChg>
+        <pc:spChg chg="mod">
+          <ac:chgData name="Gyovane Souzza" userId="eed59d4ebf12600b" providerId="LiveId" clId="{E7C69A7C-A215-426B-8AAA-22D3B1BFACE3}" dt="2021-04-19T14:07:16.805" v="3" actId="164"/>
+          <ac:spMkLst>
+            <pc:docMk/>
+            <pc:sldMk cId="2545260601" sldId="268"/>
+            <ac:spMk id="8" creationId="{00000000-0000-0000-0000-000000000000}"/>
+          </ac:spMkLst>
+        </pc:spChg>
+        <pc:spChg chg="mod">
+          <ac:chgData name="Gyovane Souzza" userId="eed59d4ebf12600b" providerId="LiveId" clId="{E7C69A7C-A215-426B-8AAA-22D3B1BFACE3}" dt="2021-04-19T14:07:16.805" v="3" actId="164"/>
+          <ac:spMkLst>
+            <pc:docMk/>
+            <pc:sldMk cId="2545260601" sldId="268"/>
+            <ac:spMk id="9" creationId="{00000000-0000-0000-0000-000000000000}"/>
+          </ac:spMkLst>
+        </pc:spChg>
+        <pc:spChg chg="mod">
+          <ac:chgData name="Gyovane Souzza" userId="eed59d4ebf12600b" providerId="LiveId" clId="{E7C69A7C-A215-426B-8AAA-22D3B1BFACE3}" dt="2021-04-19T14:07:29.530" v="6" actId="164"/>
+          <ac:spMkLst>
+            <pc:docMk/>
+            <pc:sldMk cId="2545260601" sldId="268"/>
+            <ac:spMk id="13" creationId="{E80196AD-6A41-4D1E-B413-2AD1E67D83DA}"/>
+          </ac:spMkLst>
+        </pc:spChg>
+        <pc:spChg chg="mod topLvl">
+          <ac:chgData name="Gyovane Souzza" userId="eed59d4ebf12600b" providerId="LiveId" clId="{E7C69A7C-A215-426B-8AAA-22D3B1BFACE3}" dt="2021-04-19T14:07:51.727" v="18" actId="164"/>
+          <ac:spMkLst>
+            <pc:docMk/>
+            <pc:sldMk cId="2545260601" sldId="268"/>
+            <ac:spMk id="14" creationId="{E08A7210-0801-426D-BC7D-7B345C308957}"/>
+          </ac:spMkLst>
+        </pc:spChg>
+        <pc:spChg chg="mod">
+          <ac:chgData name="Gyovane Souzza" userId="eed59d4ebf12600b" providerId="LiveId" clId="{E7C69A7C-A215-426B-8AAA-22D3B1BFACE3}" dt="2021-04-19T14:08:35.049" v="33" actId="1076"/>
+          <ac:spMkLst>
+            <pc:docMk/>
+            <pc:sldMk cId="2545260601" sldId="268"/>
+            <ac:spMk id="23" creationId="{A55927FF-5CCE-4580-97AD-62A4648F46D2}"/>
+          </ac:spMkLst>
+        </pc:spChg>
+        <pc:spChg chg="mod topLvl">
+          <ac:chgData name="Gyovane Souzza" userId="eed59d4ebf12600b" providerId="LiveId" clId="{E7C69A7C-A215-426B-8AAA-22D3B1BFACE3}" dt="2021-04-19T14:07:51.727" v="18" actId="164"/>
+          <ac:spMkLst>
+            <pc:docMk/>
+            <pc:sldMk cId="2545260601" sldId="268"/>
+            <ac:spMk id="33" creationId="{071D06C6-5DE7-417C-8F38-D2E3DA94DC2B}"/>
+          </ac:spMkLst>
+        </pc:spChg>
+        <pc:spChg chg="mod">
+          <ac:chgData name="Gyovane Souzza" userId="eed59d4ebf12600b" providerId="LiveId" clId="{E7C69A7C-A215-426B-8AAA-22D3B1BFACE3}" dt="2021-04-19T14:07:29.530" v="6" actId="164"/>
+          <ac:spMkLst>
+            <pc:docMk/>
+            <pc:sldMk cId="2545260601" sldId="268"/>
+            <ac:spMk id="36" creationId="{E47DB1F1-C7E7-422C-83CB-4DA85D64E794}"/>
+          </ac:spMkLst>
+        </pc:spChg>
+        <pc:grpChg chg="add mod">
+          <ac:chgData name="Gyovane Souzza" userId="eed59d4ebf12600b" providerId="LiveId" clId="{E7C69A7C-A215-426B-8AAA-22D3B1BFACE3}" dt="2021-04-19T14:07:59.788" v="22" actId="1076"/>
+          <ac:grpSpMkLst>
+            <pc:docMk/>
+            <pc:sldMk cId="2545260601" sldId="268"/>
+            <ac:grpSpMk id="25" creationId="{CF9B7922-EE00-4EEB-9228-EA21BFE6FEF8}"/>
+          </ac:grpSpMkLst>
+        </pc:grpChg>
+        <pc:grpChg chg="add del mod">
+          <ac:chgData name="Gyovane Souzza" userId="eed59d4ebf12600b" providerId="LiveId" clId="{E7C69A7C-A215-426B-8AAA-22D3B1BFACE3}" dt="2021-04-19T14:07:46.695" v="17" actId="165"/>
+          <ac:grpSpMkLst>
+            <pc:docMk/>
+            <pc:sldMk cId="2545260601" sldId="268"/>
+            <ac:grpSpMk id="27" creationId="{7D86D88E-C41B-4796-BBAF-FB6173894DD6}"/>
+          </ac:grpSpMkLst>
+        </pc:grpChg>
+        <pc:grpChg chg="add mod">
+          <ac:chgData name="Gyovane Souzza" userId="eed59d4ebf12600b" providerId="LiveId" clId="{E7C69A7C-A215-426B-8AAA-22D3B1BFACE3}" dt="2021-04-19T14:08:23.773" v="30" actId="1076"/>
+          <ac:grpSpMkLst>
+            <pc:docMk/>
+            <pc:sldMk cId="2545260601" sldId="268"/>
+            <ac:grpSpMk id="28" creationId="{978A4ADE-1EFB-4382-89BB-FC6DE20742FA}"/>
+          </ac:grpSpMkLst>
+        </pc:grpChg>
+        <pc:grpChg chg="add mod">
+          <ac:chgData name="Gyovane Souzza" userId="eed59d4ebf12600b" providerId="LiveId" clId="{E7C69A7C-A215-426B-8AAA-22D3B1BFACE3}" dt="2021-04-19T14:08:06.058" v="25" actId="1076"/>
+          <ac:grpSpMkLst>
+            <pc:docMk/>
+            <pc:sldMk cId="2545260601" sldId="268"/>
+            <ac:grpSpMk id="29" creationId="{1F84ECEB-0827-4E04-BB52-FF918D5EAE96}"/>
+          </ac:grpSpMkLst>
+        </pc:grpChg>
+        <pc:cxnChg chg="mod">
+          <ac:chgData name="Gyovane Souzza" userId="eed59d4ebf12600b" providerId="LiveId" clId="{E7C69A7C-A215-426B-8AAA-22D3B1BFACE3}" dt="2021-04-19T14:08:37.111" v="34" actId="1076"/>
+          <ac:cxnSpMkLst>
+            <pc:docMk/>
+            <pc:sldMk cId="2545260601" sldId="268"/>
+            <ac:cxnSpMk id="6" creationId="{00000000-0000-0000-0000-000000000000}"/>
+          </ac:cxnSpMkLst>
+        </pc:cxnChg>
+        <pc:cxnChg chg="del mod">
+          <ac:chgData name="Gyovane Souzza" userId="eed59d4ebf12600b" providerId="LiveId" clId="{E7C69A7C-A215-426B-8AAA-22D3B1BFACE3}" dt="2021-04-19T14:07:33.740" v="9" actId="478"/>
+          <ac:cxnSpMkLst>
+            <pc:docMk/>
+            <pc:sldMk cId="2545260601" sldId="268"/>
+            <ac:cxnSpMk id="12" creationId="{F1B6C749-6105-4250-9D96-3797FCC3AA4C}"/>
+          </ac:cxnSpMkLst>
+        </pc:cxnChg>
+        <pc:cxnChg chg="del mod">
+          <ac:chgData name="Gyovane Souzza" userId="eed59d4ebf12600b" providerId="LiveId" clId="{E7C69A7C-A215-426B-8AAA-22D3B1BFACE3}" dt="2021-04-19T14:07:35.796" v="12" actId="478"/>
+          <ac:cxnSpMkLst>
+            <pc:docMk/>
+            <pc:sldMk cId="2545260601" sldId="268"/>
+            <ac:cxnSpMk id="20" creationId="{D7E0D70D-5C69-4F74-B808-E63E1825C7D5}"/>
+          </ac:cxnSpMkLst>
+        </pc:cxnChg>
+        <pc:cxnChg chg="add del mod">
+          <ac:chgData name="Gyovane Souzza" userId="eed59d4ebf12600b" providerId="LiveId" clId="{E7C69A7C-A215-426B-8AAA-22D3B1BFACE3}" dt="2021-04-19T14:07:54.986" v="20" actId="478"/>
+          <ac:cxnSpMkLst>
+            <pc:docMk/>
+            <pc:sldMk cId="2545260601" sldId="268"/>
+            <ac:cxnSpMk id="24" creationId="{BC6F058D-F013-4529-A509-591C143AB4F9}"/>
+          </ac:cxnSpMkLst>
+        </pc:cxnChg>
+        <pc:cxnChg chg="del mod">
+          <ac:chgData name="Gyovane Souzza" userId="eed59d4ebf12600b" providerId="LiveId" clId="{E7C69A7C-A215-426B-8AAA-22D3B1BFACE3}" dt="2021-04-19T14:07:33.366" v="8" actId="478"/>
+          <ac:cxnSpMkLst>
+            <pc:docMk/>
+            <pc:sldMk cId="2545260601" sldId="268"/>
+            <ac:cxnSpMk id="32" creationId="{A894244B-57F7-4A61-8C54-7C20CC40DE80}"/>
+          </ac:cxnSpMkLst>
+        </pc:cxnChg>
+        <pc:cxnChg chg="add mod ord">
+          <ac:chgData name="Gyovane Souzza" userId="eed59d4ebf12600b" providerId="LiveId" clId="{E7C69A7C-A215-426B-8AAA-22D3B1BFACE3}" dt="2021-04-19T14:10:32.666" v="49" actId="167"/>
+          <ac:cxnSpMkLst>
+            <pc:docMk/>
+            <pc:sldMk cId="2545260601" sldId="268"/>
+            <ac:cxnSpMk id="35" creationId="{4481DBF3-1968-460F-8349-4AAB8CA937E9}"/>
+          </ac:cxnSpMkLst>
+        </pc:cxnChg>
+        <pc:cxnChg chg="add mod ord">
+          <ac:chgData name="Gyovane Souzza" userId="eed59d4ebf12600b" providerId="LiveId" clId="{E7C69A7C-A215-426B-8AAA-22D3B1BFACE3}" dt="2021-04-19T14:10:32.666" v="49" actId="167"/>
+          <ac:cxnSpMkLst>
+            <pc:docMk/>
+            <pc:sldMk cId="2545260601" sldId="268"/>
+            <ac:cxnSpMk id="43" creationId="{26A8CE40-4A13-44A5-9998-B6EF1679CF4A}"/>
+          </ac:cxnSpMkLst>
+        </pc:cxnChg>
+        <pc:cxnChg chg="add mod ord">
+          <ac:chgData name="Gyovane Souzza" userId="eed59d4ebf12600b" providerId="LiveId" clId="{E7C69A7C-A215-426B-8AAA-22D3B1BFACE3}" dt="2021-04-19T14:10:32.666" v="49" actId="167"/>
+          <ac:cxnSpMkLst>
+            <pc:docMk/>
+            <pc:sldMk cId="2545260601" sldId="268"/>
+            <ac:cxnSpMk id="45" creationId="{FA9A69FC-7B3F-4FC2-AAE2-A4CB89130EBA}"/>
+          </ac:cxnSpMkLst>
+        </pc:cxnChg>
+        <pc:cxnChg chg="add mod ord">
+          <ac:chgData name="Gyovane Souzza" userId="eed59d4ebf12600b" providerId="LiveId" clId="{E7C69A7C-A215-426B-8AAA-22D3B1BFACE3}" dt="2021-04-19T14:10:32.666" v="49" actId="167"/>
+          <ac:cxnSpMkLst>
+            <pc:docMk/>
+            <pc:sldMk cId="2545260601" sldId="268"/>
+            <ac:cxnSpMk id="48" creationId="{A12A400F-D876-4EE7-8194-6A324F468B25}"/>
+          </ac:cxnSpMkLst>
+        </pc:cxnChg>
+        <pc:cxnChg chg="add mod ord">
+          <ac:chgData name="Gyovane Souzza" userId="eed59d4ebf12600b" providerId="LiveId" clId="{E7C69A7C-A215-426B-8AAA-22D3B1BFACE3}" dt="2021-04-19T14:10:32.666" v="49" actId="167"/>
+          <ac:cxnSpMkLst>
+            <pc:docMk/>
+            <pc:sldMk cId="2545260601" sldId="268"/>
+            <ac:cxnSpMk id="51" creationId="{DD812855-0820-4BDA-BC1F-8C190E9D1031}"/>
+          </ac:cxnSpMkLst>
+        </pc:cxnChg>
+        <pc:cxnChg chg="add mod ord">
+          <ac:chgData name="Gyovane Souzza" userId="eed59d4ebf12600b" providerId="LiveId" clId="{E7C69A7C-A215-426B-8AAA-22D3B1BFACE3}" dt="2021-04-19T14:10:45.702" v="53" actId="167"/>
+          <ac:cxnSpMkLst>
+            <pc:docMk/>
+            <pc:sldMk cId="2545260601" sldId="268"/>
+            <ac:cxnSpMk id="54" creationId="{47D02D32-6D79-4F81-839E-0114FD8879FF}"/>
+          </ac:cxnSpMkLst>
+        </pc:cxnChg>
+        <pc:cxnChg chg="del mod">
+          <ac:chgData name="Gyovane Souzza" userId="eed59d4ebf12600b" providerId="LiveId" clId="{E7C69A7C-A215-426B-8AAA-22D3B1BFACE3}" dt="2021-04-19T14:07:34.106" v="10" actId="478"/>
+          <ac:cxnSpMkLst>
+            <pc:docMk/>
+            <pc:sldMk cId="2545260601" sldId="268"/>
+            <ac:cxnSpMk id="57" creationId="{CD4A593F-9C95-4800-9B7B-958B442C96F7}"/>
+          </ac:cxnSpMkLst>
+        </pc:cxnChg>
+        <pc:cxnChg chg="del mod">
+          <ac:chgData name="Gyovane Souzza" userId="eed59d4ebf12600b" providerId="LiveId" clId="{E7C69A7C-A215-426B-8AAA-22D3B1BFACE3}" dt="2021-04-19T14:07:34.543" v="11" actId="478"/>
+          <ac:cxnSpMkLst>
+            <pc:docMk/>
+            <pc:sldMk cId="2545260601" sldId="268"/>
+            <ac:cxnSpMk id="67" creationId="{3624F9F1-ADF8-48D2-B891-B344D8F92E1F}"/>
+          </ac:cxnSpMkLst>
+        </pc:cxnChg>
+      </pc:sldChg>
+      <pc:sldChg chg="del">
+        <pc:chgData name="Gyovane Souzza" userId="eed59d4ebf12600b" providerId="LiveId" clId="{E7C69A7C-A215-426B-8AAA-22D3B1BFACE3}" dt="2021-04-19T14:18:42.685" v="113" actId="47"/>
+        <pc:sldMkLst>
+          <pc:docMk/>
+          <pc:sldMk cId="2060403710" sldId="269"/>
+        </pc:sldMkLst>
+      </pc:sldChg>
+      <pc:sldChg chg="addSp delSp modSp add mod">
+        <pc:chgData name="Gyovane Souzza" userId="eed59d4ebf12600b" providerId="LiveId" clId="{E7C69A7C-A215-426B-8AAA-22D3B1BFACE3}" dt="2021-04-19T15:43:09.524" v="237" actId="1076"/>
+        <pc:sldMkLst>
+          <pc:docMk/>
+          <pc:sldMk cId="910407705" sldId="270"/>
+        </pc:sldMkLst>
+        <pc:spChg chg="mod">
+          <ac:chgData name="Gyovane Souzza" userId="eed59d4ebf12600b" providerId="LiveId" clId="{E7C69A7C-A215-426B-8AAA-22D3B1BFACE3}" dt="2021-04-19T14:12:04.796" v="55"/>
+          <ac:spMkLst>
+            <pc:docMk/>
+            <pc:sldMk cId="910407705" sldId="270"/>
+            <ac:spMk id="2" creationId="{00000000-0000-0000-0000-000000000000}"/>
+          </ac:spMkLst>
+        </pc:spChg>
+        <pc:spChg chg="mod">
+          <ac:chgData name="Gyovane Souzza" userId="eed59d4ebf12600b" providerId="LiveId" clId="{E7C69A7C-A215-426B-8AAA-22D3B1BFACE3}" dt="2021-04-19T15:43:09.524" v="237" actId="1076"/>
+          <ac:spMkLst>
+            <pc:docMk/>
+            <pc:sldMk cId="910407705" sldId="270"/>
+            <ac:spMk id="4" creationId="{00000000-0000-0000-0000-000000000000}"/>
+          </ac:spMkLst>
+        </pc:spChg>
+        <pc:spChg chg="add del">
+          <ac:chgData name="Gyovane Souzza" userId="eed59d4ebf12600b" providerId="LiveId" clId="{E7C69A7C-A215-426B-8AAA-22D3B1BFACE3}" dt="2021-04-19T14:13:27.804" v="74" actId="11529"/>
+          <ac:spMkLst>
+            <pc:docMk/>
+            <pc:sldMk cId="910407705" sldId="270"/>
+            <ac:spMk id="19" creationId="{134899A9-6359-4A43-AF39-6BE7A697151A}"/>
+          </ac:spMkLst>
+        </pc:spChg>
+        <pc:spChg chg="mod">
+          <ac:chgData name="Gyovane Souzza" userId="eed59d4ebf12600b" providerId="LiveId" clId="{E7C69A7C-A215-426B-8AAA-22D3B1BFACE3}" dt="2021-04-19T14:15:28.767" v="81" actId="1076"/>
+          <ac:spMkLst>
+            <pc:docMk/>
+            <pc:sldMk cId="910407705" sldId="270"/>
+            <ac:spMk id="23" creationId="{A55927FF-5CCE-4580-97AD-62A4648F46D2}"/>
+          </ac:spMkLst>
+        </pc:spChg>
+        <pc:spChg chg="add mod">
+          <ac:chgData name="Gyovane Souzza" userId="eed59d4ebf12600b" providerId="LiveId" clId="{E7C69A7C-A215-426B-8AAA-22D3B1BFACE3}" dt="2021-04-19T14:12:16.282" v="56"/>
+          <ac:spMkLst>
+            <pc:docMk/>
+            <pc:sldMk cId="910407705" sldId="270"/>
+            <ac:spMk id="30" creationId="{BB764A1B-41E9-4DF3-A30E-C0ECAAA03AAC}"/>
+          </ac:spMkLst>
+        </pc:spChg>
+        <pc:cxnChg chg="mod">
+          <ac:chgData name="Gyovane Souzza" userId="eed59d4ebf12600b" providerId="LiveId" clId="{E7C69A7C-A215-426B-8AAA-22D3B1BFACE3}" dt="2021-04-19T15:43:09.524" v="237" actId="1076"/>
+          <ac:cxnSpMkLst>
+            <pc:docMk/>
+            <pc:sldMk cId="910407705" sldId="270"/>
+            <ac:cxnSpMk id="6" creationId="{00000000-0000-0000-0000-000000000000}"/>
+          </ac:cxnSpMkLst>
+        </pc:cxnChg>
+        <pc:cxnChg chg="add del mod">
+          <ac:chgData name="Gyovane Souzza" userId="eed59d4ebf12600b" providerId="LiveId" clId="{E7C69A7C-A215-426B-8AAA-22D3B1BFACE3}" dt="2021-04-19T14:13:09.010" v="72" actId="11529"/>
+          <ac:cxnSpMkLst>
+            <pc:docMk/>
+            <pc:sldMk cId="910407705" sldId="270"/>
+            <ac:cxnSpMk id="12" creationId="{C14A2D5C-545F-4DEC-B860-90384CF46A53}"/>
+          </ac:cxnSpMkLst>
+        </pc:cxnChg>
+        <pc:cxnChg chg="add mod ord">
+          <ac:chgData name="Gyovane Souzza" userId="eed59d4ebf12600b" providerId="LiveId" clId="{E7C69A7C-A215-426B-8AAA-22D3B1BFACE3}" dt="2021-04-19T14:16:41.485" v="103" actId="167"/>
+          <ac:cxnSpMkLst>
+            <pc:docMk/>
+            <pc:sldMk cId="910407705" sldId="270"/>
+            <ac:cxnSpMk id="21" creationId="{A3E608CC-4F9E-44AF-B8B8-DC7D11EE4CCD}"/>
+          </ac:cxnSpMkLst>
+        </pc:cxnChg>
+        <pc:cxnChg chg="add del mod">
+          <ac:chgData name="Gyovane Souzza" userId="eed59d4ebf12600b" providerId="LiveId" clId="{E7C69A7C-A215-426B-8AAA-22D3B1BFACE3}" dt="2021-04-19T14:16:10.544" v="97" actId="478"/>
+          <ac:cxnSpMkLst>
+            <pc:docMk/>
+            <pc:sldMk cId="910407705" sldId="270"/>
+            <ac:cxnSpMk id="47" creationId="{D367A990-CD9E-4C30-AE75-D22C2FF2B867}"/>
+          </ac:cxnSpMkLst>
+        </pc:cxnChg>
+        <pc:cxnChg chg="add del mod">
+          <ac:chgData name="Gyovane Souzza" userId="eed59d4ebf12600b" providerId="LiveId" clId="{E7C69A7C-A215-426B-8AAA-22D3B1BFACE3}" dt="2021-04-19T14:16:35.441" v="101" actId="478"/>
+          <ac:cxnSpMkLst>
+            <pc:docMk/>
+            <pc:sldMk cId="910407705" sldId="270"/>
+            <ac:cxnSpMk id="50" creationId="{44B12ED2-D844-462D-B8A5-EB5FC300E849}"/>
+          </ac:cxnSpMkLst>
+        </pc:cxnChg>
+        <pc:cxnChg chg="del mod">
+          <ac:chgData name="Gyovane Souzza" userId="eed59d4ebf12600b" providerId="LiveId" clId="{E7C69A7C-A215-426B-8AAA-22D3B1BFACE3}" dt="2021-04-19T14:12:24.147" v="60" actId="478"/>
+          <ac:cxnSpMkLst>
+            <pc:docMk/>
+            <pc:sldMk cId="910407705" sldId="270"/>
+            <ac:cxnSpMk id="54" creationId="{47D02D32-6D79-4F81-839E-0114FD8879FF}"/>
+          </ac:cxnSpMkLst>
+        </pc:cxnChg>
+        <pc:cxnChg chg="add mod ord">
+          <ac:chgData name="Gyovane Souzza" userId="eed59d4ebf12600b" providerId="LiveId" clId="{E7C69A7C-A215-426B-8AAA-22D3B1BFACE3}" dt="2021-04-19T14:17:20.805" v="112" actId="167"/>
+          <ac:cxnSpMkLst>
+            <pc:docMk/>
+            <pc:sldMk cId="910407705" sldId="270"/>
+            <ac:cxnSpMk id="55" creationId="{6270E2DF-B01A-4345-B3BA-3B7D71E07620}"/>
+          </ac:cxnSpMkLst>
+        </pc:cxnChg>
+      </pc:sldChg>
+    </pc:docChg>
+  </pc:docChgLst>
 </pc:chgInfo>
 </file>
 
@@ -316,7 +912,7 @@
           <a:p>
             <a:fld id="{2E0DF6E3-1D5C-4094-B81B-572E3744A14B}" type="datetimeFigureOut">
               <a:rPr lang="pt-BR" smtClean="0"/>
-              <a:t>16/04/2021</a:t>
+              <a:t>19/04/2021</a:t>
             </a:fld>
             <a:endParaRPr lang="pt-BR"/>
           </a:p>
@@ -484,7 +1080,7 @@
           <a:p>
             <a:fld id="{2E0DF6E3-1D5C-4094-B81B-572E3744A14B}" type="datetimeFigureOut">
               <a:rPr lang="pt-BR" smtClean="0"/>
-              <a:t>16/04/2021</a:t>
+              <a:t>19/04/2021</a:t>
             </a:fld>
             <a:endParaRPr lang="pt-BR"/>
           </a:p>
@@ -662,7 +1258,7 @@
           <a:p>
             <a:fld id="{2E0DF6E3-1D5C-4094-B81B-572E3744A14B}" type="datetimeFigureOut">
               <a:rPr lang="pt-BR" smtClean="0"/>
-              <a:t>16/04/2021</a:t>
+              <a:t>19/04/2021</a:t>
             </a:fld>
             <a:endParaRPr lang="pt-BR"/>
           </a:p>
@@ -830,7 +1426,7 @@
           <a:p>
             <a:fld id="{2E0DF6E3-1D5C-4094-B81B-572E3744A14B}" type="datetimeFigureOut">
               <a:rPr lang="pt-BR" smtClean="0"/>
-              <a:t>16/04/2021</a:t>
+              <a:t>19/04/2021</a:t>
             </a:fld>
             <a:endParaRPr lang="pt-BR"/>
           </a:p>
@@ -1075,7 +1671,7 @@
           <a:p>
             <a:fld id="{2E0DF6E3-1D5C-4094-B81B-572E3744A14B}" type="datetimeFigureOut">
               <a:rPr lang="pt-BR" smtClean="0"/>
-              <a:t>16/04/2021</a:t>
+              <a:t>19/04/2021</a:t>
             </a:fld>
             <a:endParaRPr lang="pt-BR"/>
           </a:p>
@@ -1304,7 +1900,7 @@
           <a:p>
             <a:fld id="{2E0DF6E3-1D5C-4094-B81B-572E3744A14B}" type="datetimeFigureOut">
               <a:rPr lang="pt-BR" smtClean="0"/>
-              <a:t>16/04/2021</a:t>
+              <a:t>19/04/2021</a:t>
             </a:fld>
             <a:endParaRPr lang="pt-BR"/>
           </a:p>
@@ -1668,7 +2264,7 @@
           <a:p>
             <a:fld id="{2E0DF6E3-1D5C-4094-B81B-572E3744A14B}" type="datetimeFigureOut">
               <a:rPr lang="pt-BR" smtClean="0"/>
-              <a:t>16/04/2021</a:t>
+              <a:t>19/04/2021</a:t>
             </a:fld>
             <a:endParaRPr lang="pt-BR"/>
           </a:p>
@@ -1785,7 +2381,7 @@
           <a:p>
             <a:fld id="{2E0DF6E3-1D5C-4094-B81B-572E3744A14B}" type="datetimeFigureOut">
               <a:rPr lang="pt-BR" smtClean="0"/>
-              <a:t>16/04/2021</a:t>
+              <a:t>19/04/2021</a:t>
             </a:fld>
             <a:endParaRPr lang="pt-BR"/>
           </a:p>
@@ -1880,7 +2476,7 @@
           <a:p>
             <a:fld id="{2E0DF6E3-1D5C-4094-B81B-572E3744A14B}" type="datetimeFigureOut">
               <a:rPr lang="pt-BR" smtClean="0"/>
-              <a:t>16/04/2021</a:t>
+              <a:t>19/04/2021</a:t>
             </a:fld>
             <a:endParaRPr lang="pt-BR"/>
           </a:p>
@@ -2155,7 +2751,7 @@
           <a:p>
             <a:fld id="{2E0DF6E3-1D5C-4094-B81B-572E3744A14B}" type="datetimeFigureOut">
               <a:rPr lang="pt-BR" smtClean="0"/>
-              <a:t>16/04/2021</a:t>
+              <a:t>19/04/2021</a:t>
             </a:fld>
             <a:endParaRPr lang="pt-BR"/>
           </a:p>
@@ -2407,7 +3003,7 @@
           <a:p>
             <a:fld id="{2E0DF6E3-1D5C-4094-B81B-572E3744A14B}" type="datetimeFigureOut">
               <a:rPr lang="pt-BR" smtClean="0"/>
-              <a:t>16/04/2021</a:t>
+              <a:t>19/04/2021</a:t>
             </a:fld>
             <a:endParaRPr lang="pt-BR"/>
           </a:p>
@@ -2618,7 +3214,7 @@
           <a:p>
             <a:fld id="{2E0DF6E3-1D5C-4094-B81B-572E3744A14B}" type="datetimeFigureOut">
               <a:rPr lang="pt-BR" smtClean="0"/>
-              <a:t>16/04/2021</a:t>
+              <a:t>19/04/2021</a:t>
             </a:fld>
             <a:endParaRPr lang="pt-BR"/>
           </a:p>
@@ -4479,24 +5075,224 @@
       </p:grpSpPr>
       <p:cxnSp>
         <p:nvCxnSpPr>
-          <p:cNvPr id="24" name="Conector reto 23">
+          <p:cNvPr id="54" name="Conector reto 53">
             <a:extLst>
               <a:ext uri="{FF2B5EF4-FFF2-40B4-BE49-F238E27FC236}">
-                <a16:creationId xmlns:a16="http://schemas.microsoft.com/office/drawing/2014/main" id="{BC6F058D-F013-4529-A509-591C143AB4F9}"/>
+                <a16:creationId xmlns:a16="http://schemas.microsoft.com/office/drawing/2014/main" id="{47D02D32-6D79-4F81-839E-0114FD8879FF}"/>
               </a:ext>
             </a:extLst>
           </p:cNvPr>
           <p:cNvCxnSpPr>
             <a:cxnSpLocks/>
-            <a:stCxn id="8" idx="5"/>
-            <a:endCxn id="23" idx="1"/>
+            <a:stCxn id="23" idx="1"/>
+            <a:endCxn id="8" idx="2"/>
           </p:cNvCxnSpPr>
           <p:nvPr/>
         </p:nvCxnSpPr>
         <p:spPr>
-          <a:xfrm>
-            <a:off x="6241827" y="3350454"/>
-            <a:ext cx="4213962" cy="140121"/>
+          <a:xfrm flipH="1">
+            <a:off x="2601216" y="3318419"/>
+            <a:ext cx="7814083" cy="59730"/>
+          </a:xfrm>
+          <a:prstGeom prst="line">
+            <a:avLst/>
+          </a:prstGeom>
+        </p:spPr>
+        <p:style>
+          <a:lnRef idx="1">
+            <a:schemeClr val="accent1"/>
+          </a:lnRef>
+          <a:fillRef idx="0">
+            <a:schemeClr val="accent1"/>
+          </a:fillRef>
+          <a:effectRef idx="0">
+            <a:schemeClr val="accent1"/>
+          </a:effectRef>
+          <a:fontRef idx="minor">
+            <a:schemeClr val="tx1"/>
+          </a:fontRef>
+        </p:style>
+      </p:cxnSp>
+      <p:cxnSp>
+        <p:nvCxnSpPr>
+          <p:cNvPr id="35" name="Conector reto 34">
+            <a:extLst>
+              <a:ext uri="{FF2B5EF4-FFF2-40B4-BE49-F238E27FC236}">
+                <a16:creationId xmlns:a16="http://schemas.microsoft.com/office/drawing/2014/main" id="{4481DBF3-1968-460F-8349-4AAB8CA937E9}"/>
+              </a:ext>
+            </a:extLst>
+          </p:cNvPr>
+          <p:cNvCxnSpPr>
+            <a:cxnSpLocks/>
+            <a:stCxn id="8" idx="3"/>
+            <a:endCxn id="10" idx="0"/>
+          </p:cNvCxnSpPr>
+          <p:nvPr/>
+        </p:nvCxnSpPr>
+        <p:spPr>
+          <a:xfrm flipH="1">
+            <a:off x="3219505" y="3759094"/>
+            <a:ext cx="391179" cy="800182"/>
+          </a:xfrm>
+          <a:prstGeom prst="line">
+            <a:avLst/>
+          </a:prstGeom>
+        </p:spPr>
+        <p:style>
+          <a:lnRef idx="1">
+            <a:schemeClr val="accent1"/>
+          </a:lnRef>
+          <a:fillRef idx="0">
+            <a:schemeClr val="accent1"/>
+          </a:fillRef>
+          <a:effectRef idx="0">
+            <a:schemeClr val="accent1"/>
+          </a:effectRef>
+          <a:fontRef idx="minor">
+            <a:schemeClr val="tx1"/>
+          </a:fontRef>
+        </p:style>
+      </p:cxnSp>
+      <p:cxnSp>
+        <p:nvCxnSpPr>
+          <p:cNvPr id="43" name="Conector reto 42">
+            <a:extLst>
+              <a:ext uri="{FF2B5EF4-FFF2-40B4-BE49-F238E27FC236}">
+                <a16:creationId xmlns:a16="http://schemas.microsoft.com/office/drawing/2014/main" id="{26A8CE40-4A13-44A5-9998-B6EF1679CF4A}"/>
+              </a:ext>
+            </a:extLst>
+          </p:cNvPr>
+          <p:cNvCxnSpPr>
+            <a:cxnSpLocks/>
+            <a:stCxn id="33" idx="1"/>
+            <a:endCxn id="26" idx="0"/>
+          </p:cNvCxnSpPr>
+          <p:nvPr/>
+        </p:nvCxnSpPr>
+        <p:spPr>
+          <a:xfrm flipH="1">
+            <a:off x="4498453" y="3021311"/>
+            <a:ext cx="1576372" cy="1537965"/>
+          </a:xfrm>
+          <a:prstGeom prst="line">
+            <a:avLst/>
+          </a:prstGeom>
+        </p:spPr>
+        <p:style>
+          <a:lnRef idx="1">
+            <a:schemeClr val="accent1"/>
+          </a:lnRef>
+          <a:fillRef idx="0">
+            <a:schemeClr val="accent1"/>
+          </a:fillRef>
+          <a:effectRef idx="0">
+            <a:schemeClr val="accent1"/>
+          </a:effectRef>
+          <a:fontRef idx="minor">
+            <a:schemeClr val="tx1"/>
+          </a:fontRef>
+        </p:style>
+      </p:cxnSp>
+      <p:cxnSp>
+        <p:nvCxnSpPr>
+          <p:cNvPr id="45" name="Conector reto 44">
+            <a:extLst>
+              <a:ext uri="{FF2B5EF4-FFF2-40B4-BE49-F238E27FC236}">
+                <a16:creationId xmlns:a16="http://schemas.microsoft.com/office/drawing/2014/main" id="{FA9A69FC-7B3F-4FC2-AAE2-A4CB89130EBA}"/>
+              </a:ext>
+            </a:extLst>
+          </p:cNvPr>
+          <p:cNvCxnSpPr>
+            <a:cxnSpLocks/>
+            <a:stCxn id="33" idx="1"/>
+            <a:endCxn id="42" idx="0"/>
+          </p:cNvCxnSpPr>
+          <p:nvPr/>
+        </p:nvCxnSpPr>
+        <p:spPr>
+          <a:xfrm flipH="1">
+            <a:off x="5848350" y="3021311"/>
+            <a:ext cx="226475" cy="1537965"/>
+          </a:xfrm>
+          <a:prstGeom prst="line">
+            <a:avLst/>
+          </a:prstGeom>
+        </p:spPr>
+        <p:style>
+          <a:lnRef idx="1">
+            <a:schemeClr val="accent1"/>
+          </a:lnRef>
+          <a:fillRef idx="0">
+            <a:schemeClr val="accent1"/>
+          </a:fillRef>
+          <a:effectRef idx="0">
+            <a:schemeClr val="accent1"/>
+          </a:effectRef>
+          <a:fontRef idx="minor">
+            <a:schemeClr val="tx1"/>
+          </a:fontRef>
+        </p:style>
+      </p:cxnSp>
+      <p:cxnSp>
+        <p:nvCxnSpPr>
+          <p:cNvPr id="48" name="Conector reto 47">
+            <a:extLst>
+              <a:ext uri="{FF2B5EF4-FFF2-40B4-BE49-F238E27FC236}">
+                <a16:creationId xmlns:a16="http://schemas.microsoft.com/office/drawing/2014/main" id="{A12A400F-D876-4EE7-8194-6A324F468B25}"/>
+              </a:ext>
+            </a:extLst>
+          </p:cNvPr>
+          <p:cNvCxnSpPr>
+            <a:cxnSpLocks/>
+            <a:stCxn id="33" idx="1"/>
+            <a:endCxn id="65" idx="0"/>
+          </p:cNvCxnSpPr>
+          <p:nvPr/>
+        </p:nvCxnSpPr>
+        <p:spPr>
+          <a:xfrm>
+            <a:off x="6074825" y="3021311"/>
+            <a:ext cx="1202767" cy="1534535"/>
+          </a:xfrm>
+          <a:prstGeom prst="line">
+            <a:avLst/>
+          </a:prstGeom>
+        </p:spPr>
+        <p:style>
+          <a:lnRef idx="1">
+            <a:schemeClr val="accent1"/>
+          </a:lnRef>
+          <a:fillRef idx="0">
+            <a:schemeClr val="accent1"/>
+          </a:fillRef>
+          <a:effectRef idx="0">
+            <a:schemeClr val="accent1"/>
+          </a:effectRef>
+          <a:fontRef idx="minor">
+            <a:schemeClr val="tx1"/>
+          </a:fontRef>
+        </p:style>
+      </p:cxnSp>
+      <p:cxnSp>
+        <p:nvCxnSpPr>
+          <p:cNvPr id="51" name="Conector reto 50">
+            <a:extLst>
+              <a:ext uri="{FF2B5EF4-FFF2-40B4-BE49-F238E27FC236}">
+                <a16:creationId xmlns:a16="http://schemas.microsoft.com/office/drawing/2014/main" id="{DD812855-0820-4BDA-BC1F-8C190E9D1031}"/>
+              </a:ext>
+            </a:extLst>
+          </p:cNvPr>
+          <p:cNvCxnSpPr>
+            <a:cxnSpLocks/>
+            <a:stCxn id="13" idx="1"/>
+            <a:endCxn id="17" idx="0"/>
+          </p:cNvCxnSpPr>
+          <p:nvPr/>
+        </p:nvCxnSpPr>
+        <p:spPr>
+          <a:xfrm>
+            <a:off x="8663501" y="3020538"/>
+            <a:ext cx="268240" cy="1535308"/>
           </a:xfrm>
           <a:prstGeom prst="line">
             <a:avLst/>
@@ -4558,7 +5354,7 @@
         </p:nvSpPr>
         <p:spPr>
           <a:xfrm>
-            <a:off x="169627" y="2973328"/>
+            <a:off x="229350" y="2801172"/>
             <a:ext cx="1598940" cy="1034494"/>
           </a:xfrm>
           <a:prstGeom prst="rect">
@@ -4634,15 +5430,13 @@
           <p:cNvPr id="6" name="Conector reto 5"/>
           <p:cNvCxnSpPr>
             <a:cxnSpLocks/>
-            <a:stCxn id="4" idx="3"/>
-            <a:endCxn id="8" idx="2"/>
           </p:cNvCxnSpPr>
           <p:nvPr/>
         </p:nvCxnSpPr>
         <p:spPr>
           <a:xfrm>
-            <a:off x="1768567" y="3490575"/>
-            <a:ext cx="2200361" cy="113842"/>
+            <a:off x="1828290" y="3288554"/>
+            <a:ext cx="772926" cy="59730"/>
           </a:xfrm>
           <a:prstGeom prst="line">
             <a:avLst/>
@@ -4714,84 +5508,105 @@
           </a:p>
         </p:txBody>
       </p:sp>
-      <p:sp>
-        <p:nvSpPr>
-          <p:cNvPr id="8" name="Cubo 7"/>
-          <p:cNvSpPr/>
+      <p:grpSp>
+        <p:nvGrpSpPr>
+          <p:cNvPr id="25" name="Agrupar 24">
+            <a:extLst>
+              <a:ext uri="{FF2B5EF4-FFF2-40B4-BE49-F238E27FC236}">
+                <a16:creationId xmlns:a16="http://schemas.microsoft.com/office/drawing/2014/main" id="{CF9B7922-EE00-4EEB-9228-EA21BFE6FEF8}"/>
+              </a:ext>
+            </a:extLst>
+          </p:cNvPr>
+          <p:cNvGrpSpPr/>
           <p:nvPr/>
-        </p:nvSpPr>
-        <p:spPr>
-          <a:xfrm>
-            <a:off x="3968928" y="2969509"/>
+        </p:nvGrpSpPr>
+        <p:grpSpPr>
+          <a:xfrm>
+            <a:off x="2601216" y="2743241"/>
             <a:ext cx="2272899" cy="1015853"/>
-          </a:xfrm>
-          <a:prstGeom prst="cube">
-            <a:avLst/>
-          </a:prstGeom>
-        </p:spPr>
-        <p:style>
-          <a:lnRef idx="2">
-            <a:schemeClr val="accent4">
-              <a:shade val="50000"/>
-            </a:schemeClr>
-          </a:lnRef>
-          <a:fillRef idx="1">
-            <a:schemeClr val="accent4"/>
-          </a:fillRef>
-          <a:effectRef idx="0">
-            <a:schemeClr val="accent4"/>
-          </a:effectRef>
-          <a:fontRef idx="minor">
-            <a:schemeClr val="lt1"/>
-          </a:fontRef>
-        </p:style>
-        <p:txBody>
-          <a:bodyPr rtlCol="0" anchor="ctr"/>
-          <a:lstStyle/>
-          <a:p>
-            <a:pPr algn="ctr"/>
-            <a:r>
-              <a:rPr lang="pt-BR" sz="1400" dirty="0">
-                <a:latin typeface="Arial" panose="020B0604020202020204" pitchFamily="34" charset="0"/>
-                <a:cs typeface="Arial" panose="020B0604020202020204" pitchFamily="34" charset="0"/>
-              </a:rPr>
-              <a:t>Setor de vendas</a:t>
-            </a:r>
-          </a:p>
-        </p:txBody>
-      </p:sp>
-      <p:sp>
-        <p:nvSpPr>
-          <p:cNvPr id="9" name="CaixaDeTexto 8"/>
-          <p:cNvSpPr txBox="1"/>
-          <p:nvPr/>
-        </p:nvSpPr>
-        <p:spPr>
-          <a:xfrm>
-            <a:off x="4199018" y="3677585"/>
-            <a:ext cx="1547218" cy="307777"/>
-          </a:xfrm>
-          <a:prstGeom prst="rect">
-            <a:avLst/>
-          </a:prstGeom>
-          <a:noFill/>
-        </p:spPr>
-        <p:txBody>
-          <a:bodyPr wrap="none" rtlCol="0">
-            <a:spAutoFit/>
-          </a:bodyPr>
-          <a:lstStyle/>
-          <a:p>
-            <a:r>
-              <a:rPr lang="pt-BR" sz="1400" dirty="0">
-                <a:latin typeface="Arial" panose="020B0604020202020204" pitchFamily="34" charset="0"/>
-                <a:cs typeface="Arial" panose="020B0604020202020204" pitchFamily="34" charset="0"/>
-              </a:rPr>
-              <a:t>(Nó Operacional)</a:t>
-            </a:r>
-          </a:p>
-        </p:txBody>
-      </p:sp>
+            <a:chOff x="2710601" y="2423394"/>
+            <a:chExt cx="2272899" cy="1015853"/>
+          </a:xfrm>
+        </p:grpSpPr>
+        <p:sp>
+          <p:nvSpPr>
+            <p:cNvPr id="8" name="Cubo 7"/>
+            <p:cNvSpPr/>
+            <p:nvPr/>
+          </p:nvSpPr>
+          <p:spPr>
+            <a:xfrm>
+              <a:off x="2710601" y="2423394"/>
+              <a:ext cx="2272899" cy="1015853"/>
+            </a:xfrm>
+            <a:prstGeom prst="cube">
+              <a:avLst/>
+            </a:prstGeom>
+          </p:spPr>
+          <p:style>
+            <a:lnRef idx="2">
+              <a:schemeClr val="accent4">
+                <a:shade val="50000"/>
+              </a:schemeClr>
+            </a:lnRef>
+            <a:fillRef idx="1">
+              <a:schemeClr val="accent4"/>
+            </a:fillRef>
+            <a:effectRef idx="0">
+              <a:schemeClr val="accent4"/>
+            </a:effectRef>
+            <a:fontRef idx="minor">
+              <a:schemeClr val="lt1"/>
+            </a:fontRef>
+          </p:style>
+          <p:txBody>
+            <a:bodyPr rtlCol="0" anchor="ctr"/>
+            <a:lstStyle/>
+            <a:p>
+              <a:pPr algn="ctr"/>
+              <a:r>
+                <a:rPr lang="pt-BR" sz="1400" dirty="0">
+                  <a:latin typeface="Arial" panose="020B0604020202020204" pitchFamily="34" charset="0"/>
+                  <a:cs typeface="Arial" panose="020B0604020202020204" pitchFamily="34" charset="0"/>
+                </a:rPr>
+                <a:t>Setor de vendas</a:t>
+              </a:r>
+            </a:p>
+          </p:txBody>
+        </p:sp>
+        <p:sp>
+          <p:nvSpPr>
+            <p:cNvPr id="9" name="CaixaDeTexto 8"/>
+            <p:cNvSpPr txBox="1"/>
+            <p:nvPr/>
+          </p:nvSpPr>
+          <p:spPr>
+            <a:xfrm>
+              <a:off x="2907293" y="3131470"/>
+              <a:ext cx="1547218" cy="307777"/>
+            </a:xfrm>
+            <a:prstGeom prst="rect">
+              <a:avLst/>
+            </a:prstGeom>
+            <a:noFill/>
+          </p:spPr>
+          <p:txBody>
+            <a:bodyPr wrap="none" rtlCol="0">
+              <a:spAutoFit/>
+            </a:bodyPr>
+            <a:lstStyle/>
+            <a:p>
+              <a:r>
+                <a:rPr lang="pt-BR" sz="1400" dirty="0">
+                  <a:latin typeface="Arial" panose="020B0604020202020204" pitchFamily="34" charset="0"/>
+                  <a:cs typeface="Arial" panose="020B0604020202020204" pitchFamily="34" charset="0"/>
+                </a:rPr>
+                <a:t>(Nó Operacional)</a:t>
+              </a:r>
+            </a:p>
+          </p:txBody>
+        </p:sp>
+      </p:grpSp>
       <p:sp>
         <p:nvSpPr>
           <p:cNvPr id="10" name="Retângulo Arredondado 9"/>
@@ -4862,98 +5677,6 @@
           </a:p>
         </p:txBody>
       </p:sp>
-      <p:cxnSp>
-        <p:nvCxnSpPr>
-          <p:cNvPr id="12" name="Conector reto 11">
-            <a:extLst>
-              <a:ext uri="{FF2B5EF4-FFF2-40B4-BE49-F238E27FC236}">
-                <a16:creationId xmlns:a16="http://schemas.microsoft.com/office/drawing/2014/main" id="{F1B6C749-6105-4250-9D96-3797FCC3AA4C}"/>
-              </a:ext>
-            </a:extLst>
-          </p:cNvPr>
-          <p:cNvCxnSpPr>
-            <a:cxnSpLocks/>
-            <a:stCxn id="9" idx="2"/>
-            <a:endCxn id="10" idx="0"/>
-          </p:cNvCxnSpPr>
-          <p:nvPr/>
-        </p:nvCxnSpPr>
-        <p:spPr>
-          <a:xfrm flipH="1">
-            <a:off x="3219505" y="3985362"/>
-            <a:ext cx="1753122" cy="573914"/>
-          </a:xfrm>
-          <a:prstGeom prst="line">
-            <a:avLst/>
-          </a:prstGeom>
-        </p:spPr>
-        <p:style>
-          <a:lnRef idx="1">
-            <a:schemeClr val="accent1"/>
-          </a:lnRef>
-          <a:fillRef idx="0">
-            <a:schemeClr val="accent1"/>
-          </a:fillRef>
-          <a:effectRef idx="0">
-            <a:schemeClr val="accent1"/>
-          </a:effectRef>
-          <a:fontRef idx="minor">
-            <a:schemeClr val="tx1"/>
-          </a:fontRef>
-        </p:style>
-      </p:cxnSp>
-      <p:sp>
-        <p:nvSpPr>
-          <p:cNvPr id="13" name="Cubo 12">
-            <a:extLst>
-              <a:ext uri="{FF2B5EF4-FFF2-40B4-BE49-F238E27FC236}">
-                <a16:creationId xmlns:a16="http://schemas.microsoft.com/office/drawing/2014/main" id="{E80196AD-6A41-4D1E-B413-2AD1E67D83DA}"/>
-              </a:ext>
-            </a:extLst>
-          </p:cNvPr>
-          <p:cNvSpPr/>
-          <p:nvPr/>
-        </p:nvSpPr>
-        <p:spPr>
-          <a:xfrm>
-            <a:off x="7588696" y="2969508"/>
-            <a:ext cx="2272899" cy="1015853"/>
-          </a:xfrm>
-          <a:prstGeom prst="cube">
-            <a:avLst/>
-          </a:prstGeom>
-        </p:spPr>
-        <p:style>
-          <a:lnRef idx="2">
-            <a:schemeClr val="accent4">
-              <a:shade val="50000"/>
-            </a:schemeClr>
-          </a:lnRef>
-          <a:fillRef idx="1">
-            <a:schemeClr val="accent4"/>
-          </a:fillRef>
-          <a:effectRef idx="0">
-            <a:schemeClr val="accent4"/>
-          </a:effectRef>
-          <a:fontRef idx="minor">
-            <a:schemeClr val="lt1"/>
-          </a:fontRef>
-        </p:style>
-        <p:txBody>
-          <a:bodyPr rtlCol="0" anchor="ctr"/>
-          <a:lstStyle/>
-          <a:p>
-            <a:pPr algn="ctr"/>
-            <a:r>
-              <a:rPr lang="pt-BR" sz="1400" dirty="0">
-                <a:latin typeface="Arial" panose="020B0604020202020204" pitchFamily="34" charset="0"/>
-                <a:cs typeface="Arial" panose="020B0604020202020204" pitchFamily="34" charset="0"/>
-              </a:rPr>
-              <a:t>Setor de Almoxarifado</a:t>
-            </a:r>
-          </a:p>
-        </p:txBody>
-      </p:sp>
       <p:sp>
         <p:nvSpPr>
           <p:cNvPr id="23" name="Retângulo 22">
@@ -4968,7 +5691,7 @@
         </p:nvSpPr>
         <p:spPr>
           <a:xfrm>
-            <a:off x="10455789" y="2973328"/>
+            <a:off x="10415299" y="2801172"/>
             <a:ext cx="1598940" cy="1034494"/>
           </a:xfrm>
           <a:prstGeom prst="rect">
@@ -5082,46 +5805,6 @@
           </a:p>
         </p:txBody>
       </p:sp>
-      <p:cxnSp>
-        <p:nvCxnSpPr>
-          <p:cNvPr id="20" name="Conector reto 19">
-            <a:extLst>
-              <a:ext uri="{FF2B5EF4-FFF2-40B4-BE49-F238E27FC236}">
-                <a16:creationId xmlns:a16="http://schemas.microsoft.com/office/drawing/2014/main" id="{D7E0D70D-5C69-4F74-B808-E63E1825C7D5}"/>
-              </a:ext>
-            </a:extLst>
-          </p:cNvPr>
-          <p:cNvCxnSpPr>
-            <a:cxnSpLocks/>
-            <a:stCxn id="13" idx="3"/>
-            <a:endCxn id="17" idx="0"/>
-          </p:cNvCxnSpPr>
-          <p:nvPr/>
-        </p:nvCxnSpPr>
-        <p:spPr>
-          <a:xfrm>
-            <a:off x="8598164" y="3985361"/>
-            <a:ext cx="333577" cy="570485"/>
-          </a:xfrm>
-          <a:prstGeom prst="line">
-            <a:avLst/>
-          </a:prstGeom>
-        </p:spPr>
-        <p:style>
-          <a:lnRef idx="1">
-            <a:schemeClr val="accent1"/>
-          </a:lnRef>
-          <a:fillRef idx="0">
-            <a:schemeClr val="accent1"/>
-          </a:fillRef>
-          <a:effectRef idx="0">
-            <a:schemeClr val="accent1"/>
-          </a:effectRef>
-          <a:fontRef idx="minor">
-            <a:schemeClr val="tx1"/>
-          </a:fontRef>
-        </p:style>
-      </p:cxnSp>
       <p:sp>
         <p:nvSpPr>
           <p:cNvPr id="26" name="Retângulo Arredondado 9">
@@ -5198,46 +5881,6 @@
           </a:p>
         </p:txBody>
       </p:sp>
-      <p:cxnSp>
-        <p:nvCxnSpPr>
-          <p:cNvPr id="32" name="Conector reto 31">
-            <a:extLst>
-              <a:ext uri="{FF2B5EF4-FFF2-40B4-BE49-F238E27FC236}">
-                <a16:creationId xmlns:a16="http://schemas.microsoft.com/office/drawing/2014/main" id="{A894244B-57F7-4A61-8C54-7C20CC40DE80}"/>
-              </a:ext>
-            </a:extLst>
-          </p:cNvPr>
-          <p:cNvCxnSpPr>
-            <a:cxnSpLocks/>
-            <a:stCxn id="9" idx="2"/>
-            <a:endCxn id="26" idx="0"/>
-          </p:cNvCxnSpPr>
-          <p:nvPr/>
-        </p:nvCxnSpPr>
-        <p:spPr>
-          <a:xfrm flipH="1">
-            <a:off x="4498453" y="3985362"/>
-            <a:ext cx="474174" cy="573914"/>
-          </a:xfrm>
-          <a:prstGeom prst="line">
-            <a:avLst/>
-          </a:prstGeom>
-        </p:spPr>
-        <p:style>
-          <a:lnRef idx="1">
-            <a:schemeClr val="accent1"/>
-          </a:lnRef>
-          <a:fillRef idx="0">
-            <a:schemeClr val="accent1"/>
-          </a:fillRef>
-          <a:effectRef idx="0">
-            <a:schemeClr val="accent1"/>
-          </a:effectRef>
-          <a:fontRef idx="minor">
-            <a:schemeClr val="tx1"/>
-          </a:fontRef>
-        </p:style>
-      </p:cxnSp>
       <p:sp>
         <p:nvSpPr>
           <p:cNvPr id="42" name="Retângulo Arredondado 9">
@@ -5314,46 +5957,6 @@
           </a:p>
         </p:txBody>
       </p:sp>
-      <p:cxnSp>
-        <p:nvCxnSpPr>
-          <p:cNvPr id="57" name="Conector reto 56">
-            <a:extLst>
-              <a:ext uri="{FF2B5EF4-FFF2-40B4-BE49-F238E27FC236}">
-                <a16:creationId xmlns:a16="http://schemas.microsoft.com/office/drawing/2014/main" id="{CD4A593F-9C95-4800-9B7B-958B442C96F7}"/>
-              </a:ext>
-            </a:extLst>
-          </p:cNvPr>
-          <p:cNvCxnSpPr>
-            <a:cxnSpLocks/>
-            <a:stCxn id="9" idx="2"/>
-            <a:endCxn id="42" idx="0"/>
-          </p:cNvCxnSpPr>
-          <p:nvPr/>
-        </p:nvCxnSpPr>
-        <p:spPr>
-          <a:xfrm>
-            <a:off x="4972627" y="3985362"/>
-            <a:ext cx="875723" cy="573914"/>
-          </a:xfrm>
-          <a:prstGeom prst="line">
-            <a:avLst/>
-          </a:prstGeom>
-        </p:spPr>
-        <p:style>
-          <a:lnRef idx="1">
-            <a:schemeClr val="accent1"/>
-          </a:lnRef>
-          <a:fillRef idx="0">
-            <a:schemeClr val="accent1"/>
-          </a:fillRef>
-          <a:effectRef idx="0">
-            <a:schemeClr val="accent1"/>
-          </a:effectRef>
-          <a:fontRef idx="minor">
-            <a:schemeClr val="tx1"/>
-          </a:fontRef>
-        </p:style>
-      </p:cxnSp>
       <p:sp>
         <p:nvSpPr>
           <p:cNvPr id="65" name="Retângulo Arredondado 9">
@@ -5430,209 +6033,263 @@
           </a:p>
         </p:txBody>
       </p:sp>
-      <p:cxnSp>
-        <p:nvCxnSpPr>
-          <p:cNvPr id="67" name="Conector reto 66">
+      <p:grpSp>
+        <p:nvGrpSpPr>
+          <p:cNvPr id="28" name="Agrupar 27">
             <a:extLst>
               <a:ext uri="{FF2B5EF4-FFF2-40B4-BE49-F238E27FC236}">
-                <a16:creationId xmlns:a16="http://schemas.microsoft.com/office/drawing/2014/main" id="{3624F9F1-ADF8-48D2-B891-B344D8F92E1F}"/>
+                <a16:creationId xmlns:a16="http://schemas.microsoft.com/office/drawing/2014/main" id="{978A4ADE-1EFB-4382-89BB-FC6DE20742FA}"/>
               </a:ext>
             </a:extLst>
           </p:cNvPr>
-          <p:cNvCxnSpPr>
-            <a:cxnSpLocks/>
-            <a:stCxn id="9" idx="2"/>
-            <a:endCxn id="65" idx="0"/>
-          </p:cNvCxnSpPr>
+          <p:cNvGrpSpPr/>
           <p:nvPr/>
-        </p:nvCxnSpPr>
-        <p:spPr>
-          <a:xfrm>
-            <a:off x="4972627" y="3985362"/>
-            <a:ext cx="2304965" cy="570484"/>
-          </a:xfrm>
-          <a:prstGeom prst="line">
-            <a:avLst/>
-          </a:prstGeom>
-        </p:spPr>
-        <p:style>
-          <a:lnRef idx="1">
-            <a:schemeClr val="accent1"/>
-          </a:lnRef>
-          <a:fillRef idx="0">
-            <a:schemeClr val="accent1"/>
-          </a:fillRef>
-          <a:effectRef idx="0">
-            <a:schemeClr val="accent1"/>
-          </a:effectRef>
-          <a:fontRef idx="minor">
-            <a:schemeClr val="tx1"/>
-          </a:fontRef>
-        </p:style>
-      </p:cxnSp>
-      <p:sp>
-        <p:nvSpPr>
-          <p:cNvPr id="33" name="Cubo 32">
+        </p:nvGrpSpPr>
+        <p:grpSpPr>
+          <a:xfrm>
+            <a:off x="7654033" y="2766575"/>
+            <a:ext cx="2272899" cy="1069091"/>
+            <a:chOff x="7588696" y="2969508"/>
+            <a:chExt cx="2272899" cy="1069091"/>
+          </a:xfrm>
+        </p:grpSpPr>
+        <p:sp>
+          <p:nvSpPr>
+            <p:cNvPr id="13" name="Cubo 12">
+              <a:extLst>
+                <a:ext uri="{FF2B5EF4-FFF2-40B4-BE49-F238E27FC236}">
+                  <a16:creationId xmlns:a16="http://schemas.microsoft.com/office/drawing/2014/main" id="{E80196AD-6A41-4D1E-B413-2AD1E67D83DA}"/>
+                </a:ext>
+              </a:extLst>
+            </p:cNvPr>
+            <p:cNvSpPr/>
+            <p:nvPr/>
+          </p:nvSpPr>
+          <p:spPr>
+            <a:xfrm>
+              <a:off x="7588696" y="2969508"/>
+              <a:ext cx="2272899" cy="1015853"/>
+            </a:xfrm>
+            <a:prstGeom prst="cube">
+              <a:avLst/>
+            </a:prstGeom>
+          </p:spPr>
+          <p:style>
+            <a:lnRef idx="2">
+              <a:schemeClr val="accent4">
+                <a:shade val="50000"/>
+              </a:schemeClr>
+            </a:lnRef>
+            <a:fillRef idx="1">
+              <a:schemeClr val="accent4"/>
+            </a:fillRef>
+            <a:effectRef idx="0">
+              <a:schemeClr val="accent4"/>
+            </a:effectRef>
+            <a:fontRef idx="minor">
+              <a:schemeClr val="lt1"/>
+            </a:fontRef>
+          </p:style>
+          <p:txBody>
+            <a:bodyPr rtlCol="0" anchor="ctr"/>
+            <a:lstStyle/>
+            <a:p>
+              <a:pPr algn="ctr"/>
+              <a:r>
+                <a:rPr lang="pt-BR" sz="1400" dirty="0">
+                  <a:latin typeface="Arial" panose="020B0604020202020204" pitchFamily="34" charset="0"/>
+                  <a:cs typeface="Arial" panose="020B0604020202020204" pitchFamily="34" charset="0"/>
+                </a:rPr>
+                <a:t>Setor de Almoxarifado</a:t>
+              </a:r>
+            </a:p>
+          </p:txBody>
+        </p:sp>
+        <p:sp>
+          <p:nvSpPr>
+            <p:cNvPr id="36" name="CaixaDeTexto 35">
+              <a:extLst>
+                <a:ext uri="{FF2B5EF4-FFF2-40B4-BE49-F238E27FC236}">
+                  <a16:creationId xmlns:a16="http://schemas.microsoft.com/office/drawing/2014/main" id="{E47DB1F1-C7E7-422C-83CB-4DA85D64E794}"/>
+                </a:ext>
+              </a:extLst>
+            </p:cNvPr>
+            <p:cNvSpPr txBox="1"/>
+            <p:nvPr/>
+          </p:nvSpPr>
+          <p:spPr>
+            <a:xfrm>
+              <a:off x="7928993" y="3730822"/>
+              <a:ext cx="1407758" cy="307777"/>
+            </a:xfrm>
+            <a:prstGeom prst="rect">
+              <a:avLst/>
+            </a:prstGeom>
+            <a:noFill/>
+          </p:spPr>
+          <p:txBody>
+            <a:bodyPr wrap="none" rtlCol="0">
+              <a:spAutoFit/>
+            </a:bodyPr>
+            <a:lstStyle/>
+            <a:p>
+              <a:r>
+                <a:rPr lang="pt-BR" sz="1400" dirty="0">
+                  <a:latin typeface="Arial" panose="020B0604020202020204" pitchFamily="34" charset="0"/>
+                  <a:cs typeface="Arial" panose="020B0604020202020204" pitchFamily="34" charset="0"/>
+                </a:rPr>
+                <a:t>(Nó </a:t>
+              </a:r>
+              <a:r>
+                <a:rPr lang="pt-BR" sz="1200" dirty="0">
+                  <a:latin typeface="Arial" panose="020B0604020202020204" pitchFamily="34" charset="0"/>
+                  <a:cs typeface="Arial" panose="020B0604020202020204" pitchFamily="34" charset="0"/>
+                </a:rPr>
+                <a:t>Operacional</a:t>
+              </a:r>
+              <a:r>
+                <a:rPr lang="pt-BR" sz="1400" dirty="0">
+                  <a:latin typeface="Arial" panose="020B0604020202020204" pitchFamily="34" charset="0"/>
+                  <a:cs typeface="Arial" panose="020B0604020202020204" pitchFamily="34" charset="0"/>
+                </a:rPr>
+                <a:t>)</a:t>
+              </a:r>
+            </a:p>
+          </p:txBody>
+        </p:sp>
+      </p:grpSp>
+      <p:grpSp>
+        <p:nvGrpSpPr>
+          <p:cNvPr id="29" name="Agrupar 28">
             <a:extLst>
               <a:ext uri="{FF2B5EF4-FFF2-40B4-BE49-F238E27FC236}">
-                <a16:creationId xmlns:a16="http://schemas.microsoft.com/office/drawing/2014/main" id="{071D06C6-5DE7-417C-8F38-D2E3DA94DC2B}"/>
+                <a16:creationId xmlns:a16="http://schemas.microsoft.com/office/drawing/2014/main" id="{1F84ECEB-0827-4E04-BB52-FF918D5EAE96}"/>
               </a:ext>
             </a:extLst>
           </p:cNvPr>
-          <p:cNvSpPr/>
+          <p:cNvGrpSpPr/>
           <p:nvPr/>
-        </p:nvSpPr>
-        <p:spPr>
-          <a:xfrm>
-            <a:off x="7362813" y="1659019"/>
-            <a:ext cx="2272899" cy="1015853"/>
-          </a:xfrm>
-          <a:prstGeom prst="cube">
-            <a:avLst/>
-          </a:prstGeom>
-        </p:spPr>
-        <p:style>
-          <a:lnRef idx="2">
-            <a:schemeClr val="accent4">
-              <a:shade val="50000"/>
-            </a:schemeClr>
-          </a:lnRef>
-          <a:fillRef idx="1">
-            <a:schemeClr val="accent4"/>
-          </a:fillRef>
-          <a:effectRef idx="0">
-            <a:schemeClr val="accent4"/>
-          </a:effectRef>
-          <a:fontRef idx="minor">
-            <a:schemeClr val="lt1"/>
-          </a:fontRef>
-        </p:style>
-        <p:txBody>
-          <a:bodyPr rtlCol="0" anchor="ctr"/>
-          <a:lstStyle/>
-          <a:p>
-            <a:pPr algn="ctr"/>
-            <a:r>
-              <a:rPr lang="pt-BR" sz="1400" dirty="0">
+        </p:nvGrpSpPr>
+        <p:grpSpPr>
+          <a:xfrm>
+            <a:off x="5176691" y="2767348"/>
+            <a:ext cx="2050231" cy="1015853"/>
+            <a:chOff x="7362813" y="1659019"/>
+            <a:chExt cx="2272899" cy="1015853"/>
+          </a:xfrm>
+        </p:grpSpPr>
+        <p:sp>
+          <p:nvSpPr>
+            <p:cNvPr id="33" name="Cubo 32">
+              <a:extLst>
+                <a:ext uri="{FF2B5EF4-FFF2-40B4-BE49-F238E27FC236}">
+                  <a16:creationId xmlns:a16="http://schemas.microsoft.com/office/drawing/2014/main" id="{071D06C6-5DE7-417C-8F38-D2E3DA94DC2B}"/>
+                </a:ext>
+              </a:extLst>
+            </p:cNvPr>
+            <p:cNvSpPr/>
+            <p:nvPr/>
+          </p:nvSpPr>
+          <p:spPr>
+            <a:xfrm>
+              <a:off x="7362813" y="1659019"/>
+              <a:ext cx="2272899" cy="1015853"/>
+            </a:xfrm>
+            <a:prstGeom prst="cube">
+              <a:avLst/>
+            </a:prstGeom>
+          </p:spPr>
+          <p:style>
+            <a:lnRef idx="2">
+              <a:schemeClr val="accent4">
+                <a:shade val="50000"/>
+              </a:schemeClr>
+            </a:lnRef>
+            <a:fillRef idx="1">
+              <a:schemeClr val="accent4"/>
+            </a:fillRef>
+            <a:effectRef idx="0">
+              <a:schemeClr val="accent4"/>
+            </a:effectRef>
+            <a:fontRef idx="minor">
+              <a:schemeClr val="lt1"/>
+            </a:fontRef>
+          </p:style>
+          <p:txBody>
+            <a:bodyPr rtlCol="0" anchor="ctr"/>
+            <a:lstStyle/>
+            <a:p>
+              <a:pPr algn="ctr"/>
+              <a:r>
+                <a:rPr lang="pt-BR" sz="1400" dirty="0">
+                  <a:latin typeface="Arial" panose="020B0604020202020204" pitchFamily="34" charset="0"/>
+                  <a:cs typeface="Arial" panose="020B0604020202020204" pitchFamily="34" charset="0"/>
+                </a:rPr>
+                <a:t>Setor de  caixa(financeiro)</a:t>
+              </a:r>
+            </a:p>
+            <a:p>
+              <a:pPr algn="ctr"/>
+              <a:endParaRPr lang="pt-BR" sz="1400" dirty="0">
                 <a:latin typeface="Arial" panose="020B0604020202020204" pitchFamily="34" charset="0"/>
                 <a:cs typeface="Arial" panose="020B0604020202020204" pitchFamily="34" charset="0"/>
-              </a:rPr>
-              <a:t>Setor de  caixa(financeiro)</a:t>
-            </a:r>
-          </a:p>
-          <a:p>
-            <a:pPr algn="ctr"/>
-            <a:endParaRPr lang="pt-BR" sz="1400" dirty="0">
-              <a:latin typeface="Arial" panose="020B0604020202020204" pitchFamily="34" charset="0"/>
-              <a:cs typeface="Arial" panose="020B0604020202020204" pitchFamily="34" charset="0"/>
-            </a:endParaRPr>
-          </a:p>
-        </p:txBody>
-      </p:sp>
-      <p:sp>
-        <p:nvSpPr>
-          <p:cNvPr id="36" name="CaixaDeTexto 35">
-            <a:extLst>
-              <a:ext uri="{FF2B5EF4-FFF2-40B4-BE49-F238E27FC236}">
-                <a16:creationId xmlns:a16="http://schemas.microsoft.com/office/drawing/2014/main" id="{E47DB1F1-C7E7-422C-83CB-4DA85D64E794}"/>
-              </a:ext>
-            </a:extLst>
-          </p:cNvPr>
-          <p:cNvSpPr txBox="1"/>
-          <p:nvPr/>
-        </p:nvSpPr>
-        <p:spPr>
-          <a:xfrm>
-            <a:off x="7928993" y="3730822"/>
-            <a:ext cx="1407758" cy="307777"/>
-          </a:xfrm>
-          <a:prstGeom prst="rect">
-            <a:avLst/>
-          </a:prstGeom>
-          <a:noFill/>
-        </p:spPr>
-        <p:txBody>
-          <a:bodyPr wrap="none" rtlCol="0">
-            <a:spAutoFit/>
-          </a:bodyPr>
-          <a:lstStyle/>
-          <a:p>
-            <a:r>
-              <a:rPr lang="pt-BR" sz="1400" dirty="0">
-                <a:latin typeface="Arial" panose="020B0604020202020204" pitchFamily="34" charset="0"/>
-                <a:cs typeface="Arial" panose="020B0604020202020204" pitchFamily="34" charset="0"/>
-              </a:rPr>
-              <a:t>(Nó </a:t>
-            </a:r>
-            <a:r>
-              <a:rPr lang="pt-BR" sz="1200" dirty="0">
-                <a:latin typeface="Arial" panose="020B0604020202020204" pitchFamily="34" charset="0"/>
-                <a:cs typeface="Arial" panose="020B0604020202020204" pitchFamily="34" charset="0"/>
-              </a:rPr>
-              <a:t>Operacional</a:t>
-            </a:r>
-            <a:r>
-              <a:rPr lang="pt-BR" sz="1400" dirty="0">
-                <a:latin typeface="Arial" panose="020B0604020202020204" pitchFamily="34" charset="0"/>
-                <a:cs typeface="Arial" panose="020B0604020202020204" pitchFamily="34" charset="0"/>
-              </a:rPr>
-              <a:t>)</a:t>
-            </a:r>
-          </a:p>
-        </p:txBody>
-      </p:sp>
-      <p:sp>
-        <p:nvSpPr>
-          <p:cNvPr id="14" name="CaixaDeTexto 13">
-            <a:extLst>
-              <a:ext uri="{FF2B5EF4-FFF2-40B4-BE49-F238E27FC236}">
-                <a16:creationId xmlns:a16="http://schemas.microsoft.com/office/drawing/2014/main" id="{E08A7210-0801-426D-BC7D-7B345C308957}"/>
-              </a:ext>
-            </a:extLst>
-          </p:cNvPr>
-          <p:cNvSpPr txBox="1"/>
-          <p:nvPr/>
-        </p:nvSpPr>
-        <p:spPr>
-          <a:xfrm>
-            <a:off x="7665620" y="2367095"/>
-            <a:ext cx="1407758" cy="307777"/>
-          </a:xfrm>
-          <a:prstGeom prst="rect">
-            <a:avLst/>
-          </a:prstGeom>
-          <a:noFill/>
-        </p:spPr>
-        <p:txBody>
-          <a:bodyPr wrap="none" rtlCol="0">
-            <a:spAutoFit/>
-          </a:bodyPr>
-          <a:lstStyle/>
-          <a:p>
-            <a:r>
-              <a:rPr lang="pt-BR" sz="1400" dirty="0">
-                <a:latin typeface="Arial" panose="020B0604020202020204" pitchFamily="34" charset="0"/>
-                <a:cs typeface="Arial" panose="020B0604020202020204" pitchFamily="34" charset="0"/>
-              </a:rPr>
-              <a:t>(Nó </a:t>
-            </a:r>
-            <a:r>
-              <a:rPr lang="pt-BR" sz="1200" dirty="0">
-                <a:latin typeface="Arial" panose="020B0604020202020204" pitchFamily="34" charset="0"/>
-                <a:cs typeface="Arial" panose="020B0604020202020204" pitchFamily="34" charset="0"/>
-              </a:rPr>
-              <a:t>Operacional</a:t>
-            </a:r>
-            <a:r>
-              <a:rPr lang="pt-BR" sz="1400" dirty="0">
-                <a:latin typeface="Arial" panose="020B0604020202020204" pitchFamily="34" charset="0"/>
-                <a:cs typeface="Arial" panose="020B0604020202020204" pitchFamily="34" charset="0"/>
-              </a:rPr>
-              <a:t>)</a:t>
-            </a:r>
-          </a:p>
-        </p:txBody>
-      </p:sp>
+              </a:endParaRPr>
+            </a:p>
+          </p:txBody>
+        </p:sp>
+        <p:sp>
+          <p:nvSpPr>
+            <p:cNvPr id="14" name="CaixaDeTexto 13">
+              <a:extLst>
+                <a:ext uri="{FF2B5EF4-FFF2-40B4-BE49-F238E27FC236}">
+                  <a16:creationId xmlns:a16="http://schemas.microsoft.com/office/drawing/2014/main" id="{E08A7210-0801-426D-BC7D-7B345C308957}"/>
+                </a:ext>
+              </a:extLst>
+            </p:cNvPr>
+            <p:cNvSpPr txBox="1"/>
+            <p:nvPr/>
+          </p:nvSpPr>
+          <p:spPr>
+            <a:xfrm>
+              <a:off x="7665620" y="2367095"/>
+              <a:ext cx="1407758" cy="307777"/>
+            </a:xfrm>
+            <a:prstGeom prst="rect">
+              <a:avLst/>
+            </a:prstGeom>
+            <a:noFill/>
+          </p:spPr>
+          <p:txBody>
+            <a:bodyPr wrap="none" rtlCol="0">
+              <a:spAutoFit/>
+            </a:bodyPr>
+            <a:lstStyle/>
+            <a:p>
+              <a:r>
+                <a:rPr lang="pt-BR" sz="1400" dirty="0">
+                  <a:latin typeface="Arial" panose="020B0604020202020204" pitchFamily="34" charset="0"/>
+                  <a:cs typeface="Arial" panose="020B0604020202020204" pitchFamily="34" charset="0"/>
+                </a:rPr>
+                <a:t>(Nó </a:t>
+              </a:r>
+              <a:r>
+                <a:rPr lang="pt-BR" sz="1200" dirty="0">
+                  <a:latin typeface="Arial" panose="020B0604020202020204" pitchFamily="34" charset="0"/>
+                  <a:cs typeface="Arial" panose="020B0604020202020204" pitchFamily="34" charset="0"/>
+                </a:rPr>
+                <a:t>Operacional</a:t>
+              </a:r>
+              <a:r>
+                <a:rPr lang="pt-BR" sz="1400" dirty="0">
+                  <a:latin typeface="Arial" panose="020B0604020202020204" pitchFamily="34" charset="0"/>
+                  <a:cs typeface="Arial" panose="020B0604020202020204" pitchFamily="34" charset="0"/>
+                </a:rPr>
+                <a:t>)</a:t>
+              </a:r>
+            </a:p>
+          </p:txBody>
+        </p:sp>
+      </p:grpSp>
     </p:spTree>
     <p:extLst>
       <p:ext uri="{BB962C8B-B14F-4D97-AF65-F5344CB8AC3E}">
@@ -5665,24 +6322,265 @@
       </p:grpSpPr>
       <p:cxnSp>
         <p:nvCxnSpPr>
-          <p:cNvPr id="24" name="Conector reto 23">
+          <p:cNvPr id="55" name="Conector: Angulado 54">
             <a:extLst>
               <a:ext uri="{FF2B5EF4-FFF2-40B4-BE49-F238E27FC236}">
-                <a16:creationId xmlns:a16="http://schemas.microsoft.com/office/drawing/2014/main" id="{BC6F058D-F013-4529-A509-591C143AB4F9}"/>
+                <a16:creationId xmlns:a16="http://schemas.microsoft.com/office/drawing/2014/main" id="{6270E2DF-B01A-4345-B3BA-3B7D71E07620}"/>
               </a:ext>
             </a:extLst>
           </p:cNvPr>
           <p:cNvCxnSpPr>
             <a:cxnSpLocks/>
-            <a:stCxn id="8" idx="5"/>
+            <a:stCxn id="30" idx="2"/>
+            <a:endCxn id="8" idx="5"/>
+          </p:cNvCxnSpPr>
+          <p:nvPr/>
+        </p:nvCxnSpPr>
+        <p:spPr>
+          <a:xfrm rot="5400000">
+            <a:off x="7971171" y="-127547"/>
+            <a:ext cx="154677" cy="6348788"/>
+          </a:xfrm>
+          <a:prstGeom prst="bentConnector2">
+            <a:avLst/>
+          </a:prstGeom>
+        </p:spPr>
+        <p:style>
+          <a:lnRef idx="1">
+            <a:schemeClr val="accent1"/>
+          </a:lnRef>
+          <a:fillRef idx="0">
+            <a:schemeClr val="accent1"/>
+          </a:fillRef>
+          <a:effectRef idx="0">
+            <a:schemeClr val="accent1"/>
+          </a:effectRef>
+          <a:fontRef idx="minor">
+            <a:schemeClr val="tx1"/>
+          </a:fontRef>
+        </p:style>
+      </p:cxnSp>
+      <p:cxnSp>
+        <p:nvCxnSpPr>
+          <p:cNvPr id="21" name="Conector: Angulado 20">
+            <a:extLst>
+              <a:ext uri="{FF2B5EF4-FFF2-40B4-BE49-F238E27FC236}">
+                <a16:creationId xmlns:a16="http://schemas.microsoft.com/office/drawing/2014/main" id="{A3E608CC-4F9E-44AF-B8B8-DC7D11EE4CCD}"/>
+              </a:ext>
+            </a:extLst>
+          </p:cNvPr>
+          <p:cNvCxnSpPr>
+            <a:cxnSpLocks/>
             <a:endCxn id="23" idx="1"/>
           </p:cNvCxnSpPr>
           <p:nvPr/>
         </p:nvCxnSpPr>
         <p:spPr>
-          <a:xfrm flipV="1">
-            <a:off x="6241827" y="2452262"/>
-            <a:ext cx="4181606" cy="898192"/>
+          <a:xfrm>
+            <a:off x="4861025" y="3247579"/>
+            <a:ext cx="5693305" cy="1308267"/>
+          </a:xfrm>
+          <a:prstGeom prst="bentConnector3">
+            <a:avLst>
+              <a:gd name="adj1" fmla="val 96793"/>
+            </a:avLst>
+          </a:prstGeom>
+        </p:spPr>
+        <p:style>
+          <a:lnRef idx="1">
+            <a:schemeClr val="accent1"/>
+          </a:lnRef>
+          <a:fillRef idx="0">
+            <a:schemeClr val="accent1"/>
+          </a:fillRef>
+          <a:effectRef idx="0">
+            <a:schemeClr val="accent1"/>
+          </a:effectRef>
+          <a:fontRef idx="minor">
+            <a:schemeClr val="tx1"/>
+          </a:fontRef>
+        </p:style>
+      </p:cxnSp>
+      <p:cxnSp>
+        <p:nvCxnSpPr>
+          <p:cNvPr id="35" name="Conector reto 34">
+            <a:extLst>
+              <a:ext uri="{FF2B5EF4-FFF2-40B4-BE49-F238E27FC236}">
+                <a16:creationId xmlns:a16="http://schemas.microsoft.com/office/drawing/2014/main" id="{4481DBF3-1968-460F-8349-4AAB8CA937E9}"/>
+              </a:ext>
+            </a:extLst>
+          </p:cNvPr>
+          <p:cNvCxnSpPr>
+            <a:cxnSpLocks/>
+            <a:stCxn id="8" idx="3"/>
+            <a:endCxn id="10" idx="0"/>
+          </p:cNvCxnSpPr>
+          <p:nvPr/>
+        </p:nvCxnSpPr>
+        <p:spPr>
+          <a:xfrm flipH="1">
+            <a:off x="3219505" y="3759094"/>
+            <a:ext cx="391179" cy="800182"/>
+          </a:xfrm>
+          <a:prstGeom prst="line">
+            <a:avLst/>
+          </a:prstGeom>
+        </p:spPr>
+        <p:style>
+          <a:lnRef idx="1">
+            <a:schemeClr val="accent1"/>
+          </a:lnRef>
+          <a:fillRef idx="0">
+            <a:schemeClr val="accent1"/>
+          </a:fillRef>
+          <a:effectRef idx="0">
+            <a:schemeClr val="accent1"/>
+          </a:effectRef>
+          <a:fontRef idx="minor">
+            <a:schemeClr val="tx1"/>
+          </a:fontRef>
+        </p:style>
+      </p:cxnSp>
+      <p:cxnSp>
+        <p:nvCxnSpPr>
+          <p:cNvPr id="43" name="Conector reto 42">
+            <a:extLst>
+              <a:ext uri="{FF2B5EF4-FFF2-40B4-BE49-F238E27FC236}">
+                <a16:creationId xmlns:a16="http://schemas.microsoft.com/office/drawing/2014/main" id="{26A8CE40-4A13-44A5-9998-B6EF1679CF4A}"/>
+              </a:ext>
+            </a:extLst>
+          </p:cNvPr>
+          <p:cNvCxnSpPr>
+            <a:cxnSpLocks/>
+            <a:stCxn id="33" idx="1"/>
+            <a:endCxn id="26" idx="0"/>
+          </p:cNvCxnSpPr>
+          <p:nvPr/>
+        </p:nvCxnSpPr>
+        <p:spPr>
+          <a:xfrm flipH="1">
+            <a:off x="4498453" y="3021311"/>
+            <a:ext cx="1576372" cy="1537965"/>
+          </a:xfrm>
+          <a:prstGeom prst="line">
+            <a:avLst/>
+          </a:prstGeom>
+        </p:spPr>
+        <p:style>
+          <a:lnRef idx="1">
+            <a:schemeClr val="accent1"/>
+          </a:lnRef>
+          <a:fillRef idx="0">
+            <a:schemeClr val="accent1"/>
+          </a:fillRef>
+          <a:effectRef idx="0">
+            <a:schemeClr val="accent1"/>
+          </a:effectRef>
+          <a:fontRef idx="minor">
+            <a:schemeClr val="tx1"/>
+          </a:fontRef>
+        </p:style>
+      </p:cxnSp>
+      <p:cxnSp>
+        <p:nvCxnSpPr>
+          <p:cNvPr id="45" name="Conector reto 44">
+            <a:extLst>
+              <a:ext uri="{FF2B5EF4-FFF2-40B4-BE49-F238E27FC236}">
+                <a16:creationId xmlns:a16="http://schemas.microsoft.com/office/drawing/2014/main" id="{FA9A69FC-7B3F-4FC2-AAE2-A4CB89130EBA}"/>
+              </a:ext>
+            </a:extLst>
+          </p:cNvPr>
+          <p:cNvCxnSpPr>
+            <a:cxnSpLocks/>
+            <a:stCxn id="33" idx="1"/>
+            <a:endCxn id="42" idx="0"/>
+          </p:cNvCxnSpPr>
+          <p:nvPr/>
+        </p:nvCxnSpPr>
+        <p:spPr>
+          <a:xfrm flipH="1">
+            <a:off x="5848350" y="3021311"/>
+            <a:ext cx="226475" cy="1537965"/>
+          </a:xfrm>
+          <a:prstGeom prst="line">
+            <a:avLst/>
+          </a:prstGeom>
+        </p:spPr>
+        <p:style>
+          <a:lnRef idx="1">
+            <a:schemeClr val="accent1"/>
+          </a:lnRef>
+          <a:fillRef idx="0">
+            <a:schemeClr val="accent1"/>
+          </a:fillRef>
+          <a:effectRef idx="0">
+            <a:schemeClr val="accent1"/>
+          </a:effectRef>
+          <a:fontRef idx="minor">
+            <a:schemeClr val="tx1"/>
+          </a:fontRef>
+        </p:style>
+      </p:cxnSp>
+      <p:cxnSp>
+        <p:nvCxnSpPr>
+          <p:cNvPr id="48" name="Conector reto 47">
+            <a:extLst>
+              <a:ext uri="{FF2B5EF4-FFF2-40B4-BE49-F238E27FC236}">
+                <a16:creationId xmlns:a16="http://schemas.microsoft.com/office/drawing/2014/main" id="{A12A400F-D876-4EE7-8194-6A324F468B25}"/>
+              </a:ext>
+            </a:extLst>
+          </p:cNvPr>
+          <p:cNvCxnSpPr>
+            <a:cxnSpLocks/>
+            <a:stCxn id="33" idx="1"/>
+            <a:endCxn id="65" idx="0"/>
+          </p:cNvCxnSpPr>
+          <p:nvPr/>
+        </p:nvCxnSpPr>
+        <p:spPr>
+          <a:xfrm>
+            <a:off x="6074825" y="3021311"/>
+            <a:ext cx="1202767" cy="1534535"/>
+          </a:xfrm>
+          <a:prstGeom prst="line">
+            <a:avLst/>
+          </a:prstGeom>
+        </p:spPr>
+        <p:style>
+          <a:lnRef idx="1">
+            <a:schemeClr val="accent1"/>
+          </a:lnRef>
+          <a:fillRef idx="0">
+            <a:schemeClr val="accent1"/>
+          </a:fillRef>
+          <a:effectRef idx="0">
+            <a:schemeClr val="accent1"/>
+          </a:effectRef>
+          <a:fontRef idx="minor">
+            <a:schemeClr val="tx1"/>
+          </a:fontRef>
+        </p:style>
+      </p:cxnSp>
+      <p:cxnSp>
+        <p:nvCxnSpPr>
+          <p:cNvPr id="51" name="Conector reto 50">
+            <a:extLst>
+              <a:ext uri="{FF2B5EF4-FFF2-40B4-BE49-F238E27FC236}">
+                <a16:creationId xmlns:a16="http://schemas.microsoft.com/office/drawing/2014/main" id="{DD812855-0820-4BDA-BC1F-8C190E9D1031}"/>
+              </a:ext>
+            </a:extLst>
+          </p:cNvPr>
+          <p:cNvCxnSpPr>
+            <a:cxnSpLocks/>
+            <a:stCxn id="13" idx="1"/>
+            <a:endCxn id="17" idx="0"/>
+          </p:cNvCxnSpPr>
+          <p:nvPr/>
+        </p:nvCxnSpPr>
+        <p:spPr>
+          <a:xfrm>
+            <a:off x="8663501" y="3020538"/>
+            <a:ext cx="268240" cy="1535308"/>
           </a:xfrm>
           <a:prstGeom prst="line">
             <a:avLst/>
@@ -5744,7 +6642,7 @@
         </p:nvSpPr>
         <p:spPr>
           <a:xfrm>
-            <a:off x="169627" y="2973328"/>
+            <a:off x="196750" y="2805948"/>
             <a:ext cx="1598940" cy="1034494"/>
           </a:xfrm>
           <a:prstGeom prst="rect">
@@ -5821,14 +6719,13 @@
           <p:cNvCxnSpPr>
             <a:cxnSpLocks/>
             <a:stCxn id="4" idx="3"/>
-            <a:endCxn id="8" idx="2"/>
           </p:cNvCxnSpPr>
           <p:nvPr/>
         </p:nvCxnSpPr>
         <p:spPr>
           <a:xfrm>
-            <a:off x="1768567" y="3490575"/>
-            <a:ext cx="2200361" cy="113842"/>
+            <a:off x="1795690" y="3323195"/>
+            <a:ext cx="832649" cy="0"/>
           </a:xfrm>
           <a:prstGeom prst="line">
             <a:avLst/>
@@ -5900,84 +6797,105 @@
           </a:p>
         </p:txBody>
       </p:sp>
-      <p:sp>
-        <p:nvSpPr>
-          <p:cNvPr id="8" name="Cubo 7"/>
-          <p:cNvSpPr/>
+      <p:grpSp>
+        <p:nvGrpSpPr>
+          <p:cNvPr id="25" name="Agrupar 24">
+            <a:extLst>
+              <a:ext uri="{FF2B5EF4-FFF2-40B4-BE49-F238E27FC236}">
+                <a16:creationId xmlns:a16="http://schemas.microsoft.com/office/drawing/2014/main" id="{CF9B7922-EE00-4EEB-9228-EA21BFE6FEF8}"/>
+              </a:ext>
+            </a:extLst>
+          </p:cNvPr>
+          <p:cNvGrpSpPr/>
           <p:nvPr/>
-        </p:nvSpPr>
-        <p:spPr>
-          <a:xfrm>
-            <a:off x="3968928" y="2969509"/>
+        </p:nvGrpSpPr>
+        <p:grpSpPr>
+          <a:xfrm>
+            <a:off x="2601216" y="2743241"/>
             <a:ext cx="2272899" cy="1015853"/>
-          </a:xfrm>
-          <a:prstGeom prst="cube">
-            <a:avLst/>
-          </a:prstGeom>
-        </p:spPr>
-        <p:style>
-          <a:lnRef idx="2">
-            <a:schemeClr val="accent4">
-              <a:shade val="50000"/>
-            </a:schemeClr>
-          </a:lnRef>
-          <a:fillRef idx="1">
-            <a:schemeClr val="accent4"/>
-          </a:fillRef>
-          <a:effectRef idx="0">
-            <a:schemeClr val="accent4"/>
-          </a:effectRef>
-          <a:fontRef idx="minor">
-            <a:schemeClr val="lt1"/>
-          </a:fontRef>
-        </p:style>
-        <p:txBody>
-          <a:bodyPr rtlCol="0" anchor="ctr"/>
-          <a:lstStyle/>
-          <a:p>
-            <a:pPr algn="ctr"/>
-            <a:r>
-              <a:rPr lang="pt-BR" sz="1400" dirty="0">
-                <a:latin typeface="Arial" panose="020B0604020202020204" pitchFamily="34" charset="0"/>
-                <a:cs typeface="Arial" panose="020B0604020202020204" pitchFamily="34" charset="0"/>
-              </a:rPr>
-              <a:t>Setor de vendas</a:t>
-            </a:r>
-          </a:p>
-        </p:txBody>
-      </p:sp>
-      <p:sp>
-        <p:nvSpPr>
-          <p:cNvPr id="9" name="CaixaDeTexto 8"/>
-          <p:cNvSpPr txBox="1"/>
-          <p:nvPr/>
-        </p:nvSpPr>
-        <p:spPr>
-          <a:xfrm>
-            <a:off x="4199018" y="3677585"/>
-            <a:ext cx="1547218" cy="307777"/>
-          </a:xfrm>
-          <a:prstGeom prst="rect">
-            <a:avLst/>
-          </a:prstGeom>
-          <a:noFill/>
-        </p:spPr>
-        <p:txBody>
-          <a:bodyPr wrap="none" rtlCol="0">
-            <a:spAutoFit/>
-          </a:bodyPr>
-          <a:lstStyle/>
-          <a:p>
-            <a:r>
-              <a:rPr lang="pt-BR" sz="1400" dirty="0">
-                <a:latin typeface="Arial" panose="020B0604020202020204" pitchFamily="34" charset="0"/>
-                <a:cs typeface="Arial" panose="020B0604020202020204" pitchFamily="34" charset="0"/>
-              </a:rPr>
-              <a:t>(Nó Operacional)</a:t>
-            </a:r>
-          </a:p>
-        </p:txBody>
-      </p:sp>
+            <a:chOff x="2710601" y="2423394"/>
+            <a:chExt cx="2272899" cy="1015853"/>
+          </a:xfrm>
+        </p:grpSpPr>
+        <p:sp>
+          <p:nvSpPr>
+            <p:cNvPr id="8" name="Cubo 7"/>
+            <p:cNvSpPr/>
+            <p:nvPr/>
+          </p:nvSpPr>
+          <p:spPr>
+            <a:xfrm>
+              <a:off x="2710601" y="2423394"/>
+              <a:ext cx="2272899" cy="1015853"/>
+            </a:xfrm>
+            <a:prstGeom prst="cube">
+              <a:avLst/>
+            </a:prstGeom>
+          </p:spPr>
+          <p:style>
+            <a:lnRef idx="2">
+              <a:schemeClr val="accent4">
+                <a:shade val="50000"/>
+              </a:schemeClr>
+            </a:lnRef>
+            <a:fillRef idx="1">
+              <a:schemeClr val="accent4"/>
+            </a:fillRef>
+            <a:effectRef idx="0">
+              <a:schemeClr val="accent4"/>
+            </a:effectRef>
+            <a:fontRef idx="minor">
+              <a:schemeClr val="lt1"/>
+            </a:fontRef>
+          </p:style>
+          <p:txBody>
+            <a:bodyPr rtlCol="0" anchor="ctr"/>
+            <a:lstStyle/>
+            <a:p>
+              <a:pPr algn="ctr"/>
+              <a:r>
+                <a:rPr lang="pt-BR" sz="1400" dirty="0">
+                  <a:latin typeface="Arial" panose="020B0604020202020204" pitchFamily="34" charset="0"/>
+                  <a:cs typeface="Arial" panose="020B0604020202020204" pitchFamily="34" charset="0"/>
+                </a:rPr>
+                <a:t>Setor de vendas</a:t>
+              </a:r>
+            </a:p>
+          </p:txBody>
+        </p:sp>
+        <p:sp>
+          <p:nvSpPr>
+            <p:cNvPr id="9" name="CaixaDeTexto 8"/>
+            <p:cNvSpPr txBox="1"/>
+            <p:nvPr/>
+          </p:nvSpPr>
+          <p:spPr>
+            <a:xfrm>
+              <a:off x="2907293" y="3131470"/>
+              <a:ext cx="1547218" cy="307777"/>
+            </a:xfrm>
+            <a:prstGeom prst="rect">
+              <a:avLst/>
+            </a:prstGeom>
+            <a:noFill/>
+          </p:spPr>
+          <p:txBody>
+            <a:bodyPr wrap="none" rtlCol="0">
+              <a:spAutoFit/>
+            </a:bodyPr>
+            <a:lstStyle/>
+            <a:p>
+              <a:r>
+                <a:rPr lang="pt-BR" sz="1400" dirty="0">
+                  <a:latin typeface="Arial" panose="020B0604020202020204" pitchFamily="34" charset="0"/>
+                  <a:cs typeface="Arial" panose="020B0604020202020204" pitchFamily="34" charset="0"/>
+                </a:rPr>
+                <a:t>(Nó Operacional)</a:t>
+              </a:r>
+            </a:p>
+          </p:txBody>
+        </p:sp>
+      </p:grpSp>
       <p:sp>
         <p:nvSpPr>
           <p:cNvPr id="10" name="Retângulo Arredondado 9"/>
@@ -6048,46 +6966,6 @@
           </a:p>
         </p:txBody>
       </p:sp>
-      <p:cxnSp>
-        <p:nvCxnSpPr>
-          <p:cNvPr id="12" name="Conector reto 11">
-            <a:extLst>
-              <a:ext uri="{FF2B5EF4-FFF2-40B4-BE49-F238E27FC236}">
-                <a16:creationId xmlns:a16="http://schemas.microsoft.com/office/drawing/2014/main" id="{F1B6C749-6105-4250-9D96-3797FCC3AA4C}"/>
-              </a:ext>
-            </a:extLst>
-          </p:cNvPr>
-          <p:cNvCxnSpPr>
-            <a:cxnSpLocks/>
-            <a:stCxn id="9" idx="2"/>
-            <a:endCxn id="10" idx="0"/>
-          </p:cNvCxnSpPr>
-          <p:nvPr/>
-        </p:nvCxnSpPr>
-        <p:spPr>
-          <a:xfrm flipH="1">
-            <a:off x="3219505" y="3985362"/>
-            <a:ext cx="1753122" cy="573914"/>
-          </a:xfrm>
-          <a:prstGeom prst="line">
-            <a:avLst/>
-          </a:prstGeom>
-        </p:spPr>
-        <p:style>
-          <a:lnRef idx="1">
-            <a:schemeClr val="accent1"/>
-          </a:lnRef>
-          <a:fillRef idx="0">
-            <a:schemeClr val="accent1"/>
-          </a:fillRef>
-          <a:effectRef idx="0">
-            <a:schemeClr val="accent1"/>
-          </a:effectRef>
-          <a:fontRef idx="minor">
-            <a:schemeClr val="tx1"/>
-          </a:fontRef>
-        </p:style>
-      </p:cxnSp>
       <p:sp>
         <p:nvSpPr>
           <p:cNvPr id="23" name="Retângulo 22">
@@ -6102,7 +6980,7 @@
         </p:nvSpPr>
         <p:spPr>
           <a:xfrm>
-            <a:off x="10423433" y="1935015"/>
+            <a:off x="10554330" y="4038599"/>
             <a:ext cx="1598940" cy="1034494"/>
           </a:xfrm>
           <a:prstGeom prst="rect">
@@ -6135,17 +7013,17 @@
                 <a:latin typeface="Arial" panose="020B0604020202020204" pitchFamily="34" charset="0"/>
                 <a:cs typeface="Arial" panose="020B0604020202020204" pitchFamily="34" charset="0"/>
               </a:rPr>
-              <a:t>Fabricante </a:t>
-            </a:r>
-          </a:p>
-        </p:txBody>
-      </p:sp>
-      <p:sp>
-        <p:nvSpPr>
-          <p:cNvPr id="26" name="Retângulo Arredondado 9">
+              <a:t>Banco </a:t>
+            </a:r>
+          </a:p>
+        </p:txBody>
+      </p:sp>
+      <p:sp>
+        <p:nvSpPr>
+          <p:cNvPr id="17" name="Retângulo Arredondado 9">
             <a:extLst>
               <a:ext uri="{FF2B5EF4-FFF2-40B4-BE49-F238E27FC236}">
-                <a16:creationId xmlns:a16="http://schemas.microsoft.com/office/drawing/2014/main" id="{726AA524-F4CF-470F-BBBD-01356B9C9900}"/>
+                <a16:creationId xmlns:a16="http://schemas.microsoft.com/office/drawing/2014/main" id="{59C2518D-BE03-4C45-BB4B-D6EF1E892629}"/>
               </a:ext>
             </a:extLst>
           </p:cNvPr>
@@ -6154,8 +7032,8 @@
         </p:nvSpPr>
         <p:spPr>
           <a:xfrm>
-            <a:off x="3847051" y="4559276"/>
-            <a:ext cx="1302803" cy="612464"/>
+            <a:off x="8001887" y="4555846"/>
+            <a:ext cx="1859708" cy="612464"/>
           </a:xfrm>
           <a:prstGeom prst="roundRect">
             <a:avLst/>
@@ -6211,57 +7089,17 @@
                 <a:latin typeface="Arial" panose="020B0604020202020204" pitchFamily="34" charset="0"/>
                 <a:cs typeface="Arial" panose="020B0604020202020204" pitchFamily="34" charset="0"/>
               </a:rPr>
-              <a:t>Tratar pagamento em dinheiro   </a:t>
-            </a:r>
-          </a:p>
-        </p:txBody>
-      </p:sp>
-      <p:cxnSp>
-        <p:nvCxnSpPr>
-          <p:cNvPr id="32" name="Conector reto 31">
+              <a:t>Tratar empacotamento   </a:t>
+            </a:r>
+          </a:p>
+        </p:txBody>
+      </p:sp>
+      <p:sp>
+        <p:nvSpPr>
+          <p:cNvPr id="26" name="Retângulo Arredondado 9">
             <a:extLst>
               <a:ext uri="{FF2B5EF4-FFF2-40B4-BE49-F238E27FC236}">
-                <a16:creationId xmlns:a16="http://schemas.microsoft.com/office/drawing/2014/main" id="{A894244B-57F7-4A61-8C54-7C20CC40DE80}"/>
-              </a:ext>
-            </a:extLst>
-          </p:cNvPr>
-          <p:cNvCxnSpPr>
-            <a:cxnSpLocks/>
-            <a:stCxn id="9" idx="2"/>
-            <a:endCxn id="26" idx="0"/>
-          </p:cNvCxnSpPr>
-          <p:nvPr/>
-        </p:nvCxnSpPr>
-        <p:spPr>
-          <a:xfrm flipH="1">
-            <a:off x="4498453" y="3985362"/>
-            <a:ext cx="474174" cy="573914"/>
-          </a:xfrm>
-          <a:prstGeom prst="line">
-            <a:avLst/>
-          </a:prstGeom>
-        </p:spPr>
-        <p:style>
-          <a:lnRef idx="1">
-            <a:schemeClr val="accent1"/>
-          </a:lnRef>
-          <a:fillRef idx="0">
-            <a:schemeClr val="accent1"/>
-          </a:fillRef>
-          <a:effectRef idx="0">
-            <a:schemeClr val="accent1"/>
-          </a:effectRef>
-          <a:fontRef idx="minor">
-            <a:schemeClr val="tx1"/>
-          </a:fontRef>
-        </p:style>
-      </p:cxnSp>
-      <p:sp>
-        <p:nvSpPr>
-          <p:cNvPr id="42" name="Retângulo Arredondado 9">
-            <a:extLst>
-              <a:ext uri="{FF2B5EF4-FFF2-40B4-BE49-F238E27FC236}">
-                <a16:creationId xmlns:a16="http://schemas.microsoft.com/office/drawing/2014/main" id="{530C8E99-B939-4769-A4B3-176418E20FBD}"/>
+                <a16:creationId xmlns:a16="http://schemas.microsoft.com/office/drawing/2014/main" id="{726AA524-F4CF-470F-BBBD-01356B9C9900}"/>
               </a:ext>
             </a:extLst>
           </p:cNvPr>
@@ -6270,7 +7108,7 @@
         </p:nvSpPr>
         <p:spPr>
           <a:xfrm>
-            <a:off x="5196948" y="4559276"/>
+            <a:off x="3847051" y="4559276"/>
             <a:ext cx="1302803" cy="612464"/>
           </a:xfrm>
           <a:prstGeom prst="roundRect">
@@ -6327,57 +7165,17 @@
                 <a:latin typeface="Arial" panose="020B0604020202020204" pitchFamily="34" charset="0"/>
                 <a:cs typeface="Arial" panose="020B0604020202020204" pitchFamily="34" charset="0"/>
               </a:rPr>
-              <a:t>Tratar pagamento em cartão   </a:t>
-            </a:r>
-          </a:p>
-        </p:txBody>
-      </p:sp>
-      <p:cxnSp>
-        <p:nvCxnSpPr>
-          <p:cNvPr id="57" name="Conector reto 56">
+              <a:t>Tratar pagamento em dinheiro   </a:t>
+            </a:r>
+          </a:p>
+        </p:txBody>
+      </p:sp>
+      <p:sp>
+        <p:nvSpPr>
+          <p:cNvPr id="42" name="Retângulo Arredondado 9">
             <a:extLst>
               <a:ext uri="{FF2B5EF4-FFF2-40B4-BE49-F238E27FC236}">
-                <a16:creationId xmlns:a16="http://schemas.microsoft.com/office/drawing/2014/main" id="{CD4A593F-9C95-4800-9B7B-958B442C96F7}"/>
-              </a:ext>
-            </a:extLst>
-          </p:cNvPr>
-          <p:cNvCxnSpPr>
-            <a:cxnSpLocks/>
-            <a:stCxn id="9" idx="2"/>
-            <a:endCxn id="42" idx="0"/>
-          </p:cNvCxnSpPr>
-          <p:nvPr/>
-        </p:nvCxnSpPr>
-        <p:spPr>
-          <a:xfrm>
-            <a:off x="4972627" y="3985362"/>
-            <a:ext cx="875723" cy="573914"/>
-          </a:xfrm>
-          <a:prstGeom prst="line">
-            <a:avLst/>
-          </a:prstGeom>
-        </p:spPr>
-        <p:style>
-          <a:lnRef idx="1">
-            <a:schemeClr val="accent1"/>
-          </a:lnRef>
-          <a:fillRef idx="0">
-            <a:schemeClr val="accent1"/>
-          </a:fillRef>
-          <a:effectRef idx="0">
-            <a:schemeClr val="accent1"/>
-          </a:effectRef>
-          <a:fontRef idx="minor">
-            <a:schemeClr val="tx1"/>
-          </a:fontRef>
-        </p:style>
-      </p:cxnSp>
-      <p:sp>
-        <p:nvSpPr>
-          <p:cNvPr id="65" name="Retângulo Arredondado 9">
-            <a:extLst>
-              <a:ext uri="{FF2B5EF4-FFF2-40B4-BE49-F238E27FC236}">
-                <a16:creationId xmlns:a16="http://schemas.microsoft.com/office/drawing/2014/main" id="{85BC9B38-54EA-4D53-AF3B-CBA65691CEBD}"/>
+                <a16:creationId xmlns:a16="http://schemas.microsoft.com/office/drawing/2014/main" id="{530C8E99-B939-4769-A4B3-176418E20FBD}"/>
               </a:ext>
             </a:extLst>
           </p:cNvPr>
@@ -6386,7 +7184,7 @@
         </p:nvSpPr>
         <p:spPr>
           <a:xfrm>
-            <a:off x="6626190" y="4555846"/>
+            <a:off x="5196948" y="4559276"/>
             <a:ext cx="1302803" cy="612464"/>
           </a:xfrm>
           <a:prstGeom prst="roundRect">
@@ -6443,57 +7241,17 @@
                 <a:latin typeface="Arial" panose="020B0604020202020204" pitchFamily="34" charset="0"/>
                 <a:cs typeface="Arial" panose="020B0604020202020204" pitchFamily="34" charset="0"/>
               </a:rPr>
-              <a:t>Tratar pagamento em Pix   </a:t>
-            </a:r>
-          </a:p>
-        </p:txBody>
-      </p:sp>
-      <p:cxnSp>
-        <p:nvCxnSpPr>
-          <p:cNvPr id="67" name="Conector reto 66">
+              <a:t>Tratar pagamento em cartão   </a:t>
+            </a:r>
+          </a:p>
+        </p:txBody>
+      </p:sp>
+      <p:sp>
+        <p:nvSpPr>
+          <p:cNvPr id="65" name="Retângulo Arredondado 9">
             <a:extLst>
               <a:ext uri="{FF2B5EF4-FFF2-40B4-BE49-F238E27FC236}">
-                <a16:creationId xmlns:a16="http://schemas.microsoft.com/office/drawing/2014/main" id="{3624F9F1-ADF8-48D2-B891-B344D8F92E1F}"/>
-              </a:ext>
-            </a:extLst>
-          </p:cNvPr>
-          <p:cNvCxnSpPr>
-            <a:cxnSpLocks/>
-            <a:stCxn id="9" idx="2"/>
-            <a:endCxn id="65" idx="0"/>
-          </p:cNvCxnSpPr>
-          <p:nvPr/>
-        </p:nvCxnSpPr>
-        <p:spPr>
-          <a:xfrm>
-            <a:off x="4972627" y="3985362"/>
-            <a:ext cx="2304965" cy="570484"/>
-          </a:xfrm>
-          <a:prstGeom prst="line">
-            <a:avLst/>
-          </a:prstGeom>
-        </p:spPr>
-        <p:style>
-          <a:lnRef idx="1">
-            <a:schemeClr val="accent1"/>
-          </a:lnRef>
-          <a:fillRef idx="0">
-            <a:schemeClr val="accent1"/>
-          </a:fillRef>
-          <a:effectRef idx="0">
-            <a:schemeClr val="accent1"/>
-          </a:effectRef>
-          <a:fontRef idx="minor">
-            <a:schemeClr val="tx1"/>
-          </a:fontRef>
-        </p:style>
-      </p:cxnSp>
-      <p:sp>
-        <p:nvSpPr>
-          <p:cNvPr id="19" name="Retângulo 18">
-            <a:extLst>
-              <a:ext uri="{FF2B5EF4-FFF2-40B4-BE49-F238E27FC236}">
-                <a16:creationId xmlns:a16="http://schemas.microsoft.com/office/drawing/2014/main" id="{BE0A355C-7422-4996-8EF7-35BA6DD90936}"/>
+                <a16:creationId xmlns:a16="http://schemas.microsoft.com/office/drawing/2014/main" id="{85BC9B38-54EA-4D53-AF3B-CBA65691CEBD}"/>
               </a:ext>
             </a:extLst>
           </p:cNvPr>
@@ -6502,398 +7260,8 @@
         </p:nvSpPr>
         <p:spPr>
           <a:xfrm>
-            <a:off x="10449322" y="3604417"/>
-            <a:ext cx="1598940" cy="1034494"/>
-          </a:xfrm>
-          <a:prstGeom prst="rect">
-            <a:avLst/>
-          </a:prstGeom>
-        </p:spPr>
-        <p:style>
-          <a:lnRef idx="2">
-            <a:schemeClr val="accent1">
-              <a:shade val="50000"/>
-            </a:schemeClr>
-          </a:lnRef>
-          <a:fillRef idx="1">
-            <a:schemeClr val="accent1"/>
-          </a:fillRef>
-          <a:effectRef idx="0">
-            <a:schemeClr val="accent1"/>
-          </a:effectRef>
-          <a:fontRef idx="minor">
-            <a:schemeClr val="lt1"/>
-          </a:fontRef>
-        </p:style>
-        <p:txBody>
-          <a:bodyPr rtlCol="0" anchor="ctr"/>
-          <a:lstStyle/>
-          <a:p>
-            <a:pPr algn="ctr"/>
-            <a:r>
-              <a:rPr lang="pt-BR" dirty="0">
-                <a:latin typeface="Arial" panose="020B0604020202020204" pitchFamily="34" charset="0"/>
-                <a:cs typeface="Arial" panose="020B0604020202020204" pitchFamily="34" charset="0"/>
-              </a:rPr>
-              <a:t>Banco </a:t>
-            </a:r>
-          </a:p>
-        </p:txBody>
-      </p:sp>
-      <p:cxnSp>
-        <p:nvCxnSpPr>
-          <p:cNvPr id="22" name="Conector reto 21">
-            <a:extLst>
-              <a:ext uri="{FF2B5EF4-FFF2-40B4-BE49-F238E27FC236}">
-                <a16:creationId xmlns:a16="http://schemas.microsoft.com/office/drawing/2014/main" id="{C22207A9-7ABE-49BF-93F5-8354E08A7D8C}"/>
-              </a:ext>
-            </a:extLst>
-          </p:cNvPr>
-          <p:cNvCxnSpPr>
-            <a:cxnSpLocks/>
-            <a:endCxn id="19" idx="1"/>
-          </p:cNvCxnSpPr>
-          <p:nvPr/>
-        </p:nvCxnSpPr>
-        <p:spPr>
-          <a:xfrm>
-            <a:off x="6241827" y="3547496"/>
-            <a:ext cx="4207495" cy="574168"/>
-          </a:xfrm>
-          <a:prstGeom prst="line">
-            <a:avLst/>
-          </a:prstGeom>
-        </p:spPr>
-        <p:style>
-          <a:lnRef idx="1">
-            <a:schemeClr val="accent1"/>
-          </a:lnRef>
-          <a:fillRef idx="0">
-            <a:schemeClr val="accent1"/>
-          </a:fillRef>
-          <a:effectRef idx="0">
-            <a:schemeClr val="accent1"/>
-          </a:effectRef>
-          <a:fontRef idx="minor">
-            <a:schemeClr val="tx1"/>
-          </a:fontRef>
-        </p:style>
-      </p:cxnSp>
-    </p:spTree>
-    <p:extLst>
-      <p:ext uri="{BB962C8B-B14F-4D97-AF65-F5344CB8AC3E}">
-        <p14:creationId xmlns:p14="http://schemas.microsoft.com/office/powerpoint/2010/main" val="2060403710"/>
-      </p:ext>
-    </p:extLst>
-  </p:cSld>
-  <p:clrMapOvr>
-    <a:masterClrMapping/>
-  </p:clrMapOvr>
-</p:sld>
-</file>
-
-<file path=ppt/slides/slide6.xml><?xml version="1.0" encoding="utf-8"?>
-<p:sld xmlns:a="http://schemas.openxmlformats.org/drawingml/2006/main" xmlns:r="http://schemas.openxmlformats.org/officeDocument/2006/relationships" xmlns:p="http://schemas.openxmlformats.org/presentationml/2006/main">
-  <p:cSld>
-    <p:spTree>
-      <p:nvGrpSpPr>
-        <p:cNvPr id="1" name=""/>
-        <p:cNvGrpSpPr/>
-        <p:nvPr/>
-      </p:nvGrpSpPr>
-      <p:grpSpPr>
-        <a:xfrm>
-          <a:off x="0" y="0"/>
-          <a:ext cx="0" cy="0"/>
-          <a:chOff x="0" y="0"/>
-          <a:chExt cx="0" cy="0"/>
-        </a:xfrm>
-      </p:grpSpPr>
-      <p:sp>
-        <p:nvSpPr>
-          <p:cNvPr id="2" name="Título 1"/>
-          <p:cNvSpPr>
-            <a:spLocks noGrp="1"/>
-          </p:cNvSpPr>
-          <p:nvPr>
-            <p:ph type="title"/>
-          </p:nvPr>
-        </p:nvSpPr>
-        <p:spPr>
-          <a:xfrm>
-            <a:off x="254977" y="313372"/>
-            <a:ext cx="11728938" cy="1034826"/>
-          </a:xfrm>
-        </p:spPr>
-        <p:txBody>
-          <a:bodyPr>
-            <a:normAutofit/>
-          </a:bodyPr>
-          <a:lstStyle/>
-          <a:p>
-            <a:r>
-              <a:rPr lang="pt-BR" sz="3600" dirty="0">
-                <a:latin typeface="Arial" panose="020B0604020202020204" pitchFamily="34" charset="0"/>
-                <a:ea typeface="+mn-ea"/>
-                <a:cs typeface="Arial" panose="020B0604020202020204" pitchFamily="34" charset="0"/>
-              </a:rPr>
-              <a:t>Cenário: Solicitar devolução do pedido de formas padrão</a:t>
-            </a:r>
-          </a:p>
-        </p:txBody>
-      </p:sp>
-      <p:sp>
-        <p:nvSpPr>
-          <p:cNvPr id="4" name="Retângulo 3"/>
-          <p:cNvSpPr/>
-          <p:nvPr/>
-        </p:nvSpPr>
-        <p:spPr>
-          <a:xfrm>
-            <a:off x="2018523" y="3218327"/>
-            <a:ext cx="1617784" cy="1177374"/>
-          </a:xfrm>
-          <a:prstGeom prst="rect">
-            <a:avLst/>
-          </a:prstGeom>
-        </p:spPr>
-        <p:style>
-          <a:lnRef idx="2">
-            <a:schemeClr val="accent1">
-              <a:shade val="50000"/>
-            </a:schemeClr>
-          </a:lnRef>
-          <a:fillRef idx="1">
-            <a:schemeClr val="accent1"/>
-          </a:fillRef>
-          <a:effectRef idx="0">
-            <a:schemeClr val="accent1"/>
-          </a:effectRef>
-          <a:fontRef idx="minor">
-            <a:schemeClr val="lt1"/>
-          </a:fontRef>
-        </p:style>
-        <p:txBody>
-          <a:bodyPr rtlCol="0" anchor="ctr"/>
-          <a:lstStyle/>
-          <a:p>
-            <a:pPr algn="ctr"/>
-            <a:r>
-              <a:rPr lang="pt-BR" dirty="0">
-                <a:latin typeface="Arial" panose="020B0604020202020204" pitchFamily="34" charset="0"/>
-                <a:cs typeface="Arial" panose="020B0604020202020204" pitchFamily="34" charset="0"/>
-              </a:rPr>
-              <a:t>Cliente </a:t>
-            </a:r>
-          </a:p>
-        </p:txBody>
-      </p:sp>
-      <p:sp>
-        <p:nvSpPr>
-          <p:cNvPr id="5" name="CaixaDeTexto 4"/>
-          <p:cNvSpPr txBox="1"/>
-          <p:nvPr/>
-        </p:nvSpPr>
-        <p:spPr>
-          <a:xfrm>
-            <a:off x="6901960" y="2575293"/>
-            <a:ext cx="4264271" cy="400110"/>
-          </a:xfrm>
-          <a:prstGeom prst="rect">
-            <a:avLst/>
-          </a:prstGeom>
-          <a:noFill/>
-        </p:spPr>
-        <p:txBody>
-          <a:bodyPr wrap="square" lIns="91440" tIns="45720" rIns="91440" bIns="45720" rtlCol="0" anchor="t">
-            <a:spAutoFit/>
-          </a:bodyPr>
-          <a:lstStyle/>
-          <a:p>
-            <a:pPr algn="ctr"/>
-            <a:r>
-              <a:rPr lang="pt-BR" sz="2000" dirty="0">
-                <a:latin typeface="Arial" panose="020B0604020202020204" pitchFamily="34" charset="0"/>
-                <a:cs typeface="Arial" panose="020B0604020202020204" pitchFamily="34" charset="0"/>
-              </a:rPr>
-              <a:t>Silpan</a:t>
-            </a:r>
-          </a:p>
-        </p:txBody>
-      </p:sp>
-      <p:cxnSp>
-        <p:nvCxnSpPr>
-          <p:cNvPr id="6" name="Conector reto 5"/>
-          <p:cNvCxnSpPr>
-            <a:cxnSpLocks/>
-            <a:stCxn id="4" idx="3"/>
-            <a:endCxn id="8" idx="2"/>
-          </p:cNvCxnSpPr>
-          <p:nvPr/>
-        </p:nvCxnSpPr>
-        <p:spPr>
-          <a:xfrm flipV="1">
-            <a:off x="3636307" y="3795401"/>
-            <a:ext cx="4264271" cy="11613"/>
-          </a:xfrm>
-          <a:prstGeom prst="line">
-            <a:avLst/>
-          </a:prstGeom>
-        </p:spPr>
-        <p:style>
-          <a:lnRef idx="1">
-            <a:schemeClr val="accent1"/>
-          </a:lnRef>
-          <a:fillRef idx="0">
-            <a:schemeClr val="accent1"/>
-          </a:fillRef>
-          <a:effectRef idx="0">
-            <a:schemeClr val="accent1"/>
-          </a:effectRef>
-          <a:fontRef idx="minor">
-            <a:schemeClr val="tx1"/>
-          </a:fontRef>
-        </p:style>
-      </p:cxnSp>
-      <p:sp>
-        <p:nvSpPr>
-          <p:cNvPr id="7" name="Retângulo Arredondado 6"/>
-          <p:cNvSpPr/>
-          <p:nvPr/>
-        </p:nvSpPr>
-        <p:spPr>
-          <a:xfrm>
-            <a:off x="6623540" y="2378717"/>
-            <a:ext cx="4826977" cy="3402623"/>
-          </a:xfrm>
-          <a:prstGeom prst="roundRect">
-            <a:avLst/>
-          </a:prstGeom>
-          <a:noFill/>
-          <a:ln w="9525" cap="flat" cmpd="sng" algn="ctr">
-            <a:solidFill>
-              <a:schemeClr val="dk1"/>
-            </a:solidFill>
-            <a:prstDash val="solid"/>
-            <a:round/>
-            <a:headEnd type="none" w="med" len="med"/>
-            <a:tailEnd type="none" w="med" len="med"/>
-          </a:ln>
-        </p:spPr>
-        <p:style>
-          <a:lnRef idx="0">
-            <a:scrgbClr r="0" g="0" b="0"/>
-          </a:lnRef>
-          <a:fillRef idx="0">
-            <a:scrgbClr r="0" g="0" b="0"/>
-          </a:fillRef>
-          <a:effectRef idx="0">
-            <a:scrgbClr r="0" g="0" b="0"/>
-          </a:effectRef>
-          <a:fontRef idx="minor">
-            <a:schemeClr val="dk1"/>
-          </a:fontRef>
-        </p:style>
-        <p:txBody>
-          <a:bodyPr rtlCol="0" anchor="ctr"/>
-          <a:lstStyle/>
-          <a:p>
-            <a:pPr algn="ctr"/>
-            <a:endParaRPr lang="pt-BR">
-              <a:latin typeface="Arial" panose="020B0604020202020204" pitchFamily="34" charset="0"/>
-              <a:cs typeface="Arial" panose="020B0604020202020204" pitchFamily="34" charset="0"/>
-            </a:endParaRPr>
-          </a:p>
-        </p:txBody>
-      </p:sp>
-      <p:sp>
-        <p:nvSpPr>
-          <p:cNvPr id="8" name="Cubo 7"/>
-          <p:cNvSpPr/>
-          <p:nvPr/>
-        </p:nvSpPr>
-        <p:spPr>
-          <a:xfrm>
-            <a:off x="7900578" y="3160493"/>
-            <a:ext cx="2272899" cy="1015853"/>
-          </a:xfrm>
-          <a:prstGeom prst="cube">
-            <a:avLst/>
-          </a:prstGeom>
-        </p:spPr>
-        <p:style>
-          <a:lnRef idx="2">
-            <a:schemeClr val="accent4">
-              <a:shade val="50000"/>
-            </a:schemeClr>
-          </a:lnRef>
-          <a:fillRef idx="1">
-            <a:schemeClr val="accent4"/>
-          </a:fillRef>
-          <a:effectRef idx="0">
-            <a:schemeClr val="accent4"/>
-          </a:effectRef>
-          <a:fontRef idx="minor">
-            <a:schemeClr val="lt1"/>
-          </a:fontRef>
-        </p:style>
-        <p:txBody>
-          <a:bodyPr rtlCol="0" anchor="ctr"/>
-          <a:lstStyle/>
-          <a:p>
-            <a:pPr algn="ctr"/>
-            <a:r>
-              <a:rPr lang="pt-BR" dirty="0">
-                <a:latin typeface="Arial" panose="020B0604020202020204" pitchFamily="34" charset="0"/>
-                <a:cs typeface="Arial" panose="020B0604020202020204" pitchFamily="34" charset="0"/>
-              </a:rPr>
-              <a:t>Setor de vendas</a:t>
-            </a:r>
-          </a:p>
-        </p:txBody>
-      </p:sp>
-      <p:sp>
-        <p:nvSpPr>
-          <p:cNvPr id="9" name="CaixaDeTexto 8"/>
-          <p:cNvSpPr txBox="1"/>
-          <p:nvPr/>
-        </p:nvSpPr>
-        <p:spPr>
-          <a:xfrm>
-            <a:off x="8166500" y="3843708"/>
-            <a:ext cx="1745991" cy="338554"/>
-          </a:xfrm>
-          <a:prstGeom prst="rect">
-            <a:avLst/>
-          </a:prstGeom>
-          <a:noFill/>
-        </p:spPr>
-        <p:txBody>
-          <a:bodyPr wrap="none" rtlCol="0">
-            <a:spAutoFit/>
-          </a:bodyPr>
-          <a:lstStyle/>
-          <a:p>
-            <a:r>
-              <a:rPr lang="pt-BR" sz="1600" dirty="0">
-                <a:latin typeface="Arial" panose="020B0604020202020204" pitchFamily="34" charset="0"/>
-                <a:cs typeface="Arial" panose="020B0604020202020204" pitchFamily="34" charset="0"/>
-              </a:rPr>
-              <a:t>(Nó Operacional)</a:t>
-            </a:r>
-          </a:p>
-        </p:txBody>
-      </p:sp>
-      <p:sp>
-        <p:nvSpPr>
-          <p:cNvPr id="10" name="Retângulo Arredondado 9"/>
-          <p:cNvSpPr/>
-          <p:nvPr/>
-        </p:nvSpPr>
-        <p:spPr>
-          <a:xfrm>
-            <a:off x="8030606" y="4749665"/>
-            <a:ext cx="2006977" cy="914400"/>
+            <a:off x="6626190" y="4555846"/>
+            <a:ext cx="1302803" cy="612464"/>
           </a:xfrm>
           <a:prstGeom prst="roundRect">
             <a:avLst/>
@@ -6945,35 +7313,374 @@
           <a:p>
             <a:pPr algn="ctr"/>
             <a:r>
+              <a:rPr lang="pt-BR" sz="1400" dirty="0">
+                <a:latin typeface="Arial" panose="020B0604020202020204" pitchFamily="34" charset="0"/>
+                <a:cs typeface="Arial" panose="020B0604020202020204" pitchFamily="34" charset="0"/>
+              </a:rPr>
+              <a:t>Tratar pagamento em Pix   </a:t>
+            </a:r>
+          </a:p>
+        </p:txBody>
+      </p:sp>
+      <p:grpSp>
+        <p:nvGrpSpPr>
+          <p:cNvPr id="28" name="Agrupar 27">
+            <a:extLst>
+              <a:ext uri="{FF2B5EF4-FFF2-40B4-BE49-F238E27FC236}">
+                <a16:creationId xmlns:a16="http://schemas.microsoft.com/office/drawing/2014/main" id="{978A4ADE-1EFB-4382-89BB-FC6DE20742FA}"/>
+              </a:ext>
+            </a:extLst>
+          </p:cNvPr>
+          <p:cNvGrpSpPr/>
+          <p:nvPr/>
+        </p:nvGrpSpPr>
+        <p:grpSpPr>
+          <a:xfrm>
+            <a:off x="7654033" y="2766575"/>
+            <a:ext cx="2272899" cy="1069091"/>
+            <a:chOff x="7588696" y="2969508"/>
+            <a:chExt cx="2272899" cy="1069091"/>
+          </a:xfrm>
+        </p:grpSpPr>
+        <p:sp>
+          <p:nvSpPr>
+            <p:cNvPr id="13" name="Cubo 12">
+              <a:extLst>
+                <a:ext uri="{FF2B5EF4-FFF2-40B4-BE49-F238E27FC236}">
+                  <a16:creationId xmlns:a16="http://schemas.microsoft.com/office/drawing/2014/main" id="{E80196AD-6A41-4D1E-B413-2AD1E67D83DA}"/>
+                </a:ext>
+              </a:extLst>
+            </p:cNvPr>
+            <p:cNvSpPr/>
+            <p:nvPr/>
+          </p:nvSpPr>
+          <p:spPr>
+            <a:xfrm>
+              <a:off x="7588696" y="2969508"/>
+              <a:ext cx="2272899" cy="1015853"/>
+            </a:xfrm>
+            <a:prstGeom prst="cube">
+              <a:avLst/>
+            </a:prstGeom>
+          </p:spPr>
+          <p:style>
+            <a:lnRef idx="2">
+              <a:schemeClr val="accent4">
+                <a:shade val="50000"/>
+              </a:schemeClr>
+            </a:lnRef>
+            <a:fillRef idx="1">
+              <a:schemeClr val="accent4"/>
+            </a:fillRef>
+            <a:effectRef idx="0">
+              <a:schemeClr val="accent4"/>
+            </a:effectRef>
+            <a:fontRef idx="minor">
+              <a:schemeClr val="lt1"/>
+            </a:fontRef>
+          </p:style>
+          <p:txBody>
+            <a:bodyPr rtlCol="0" anchor="ctr"/>
+            <a:lstStyle/>
+            <a:p>
+              <a:pPr algn="ctr"/>
+              <a:r>
+                <a:rPr lang="pt-BR" sz="1400" dirty="0">
+                  <a:latin typeface="Arial" panose="020B0604020202020204" pitchFamily="34" charset="0"/>
+                  <a:cs typeface="Arial" panose="020B0604020202020204" pitchFamily="34" charset="0"/>
+                </a:rPr>
+                <a:t>Setor de Almoxarifado</a:t>
+              </a:r>
+            </a:p>
+          </p:txBody>
+        </p:sp>
+        <p:sp>
+          <p:nvSpPr>
+            <p:cNvPr id="36" name="CaixaDeTexto 35">
+              <a:extLst>
+                <a:ext uri="{FF2B5EF4-FFF2-40B4-BE49-F238E27FC236}">
+                  <a16:creationId xmlns:a16="http://schemas.microsoft.com/office/drawing/2014/main" id="{E47DB1F1-C7E7-422C-83CB-4DA85D64E794}"/>
+                </a:ext>
+              </a:extLst>
+            </p:cNvPr>
+            <p:cNvSpPr txBox="1"/>
+            <p:nvPr/>
+          </p:nvSpPr>
+          <p:spPr>
+            <a:xfrm>
+              <a:off x="7928993" y="3730822"/>
+              <a:ext cx="1407758" cy="307777"/>
+            </a:xfrm>
+            <a:prstGeom prst="rect">
+              <a:avLst/>
+            </a:prstGeom>
+            <a:noFill/>
+          </p:spPr>
+          <p:txBody>
+            <a:bodyPr wrap="none" rtlCol="0">
+              <a:spAutoFit/>
+            </a:bodyPr>
+            <a:lstStyle/>
+            <a:p>
+              <a:r>
+                <a:rPr lang="pt-BR" sz="1400" dirty="0">
+                  <a:latin typeface="Arial" panose="020B0604020202020204" pitchFamily="34" charset="0"/>
+                  <a:cs typeface="Arial" panose="020B0604020202020204" pitchFamily="34" charset="0"/>
+                </a:rPr>
+                <a:t>(Nó </a:t>
+              </a:r>
+              <a:r>
+                <a:rPr lang="pt-BR" sz="1200" dirty="0">
+                  <a:latin typeface="Arial" panose="020B0604020202020204" pitchFamily="34" charset="0"/>
+                  <a:cs typeface="Arial" panose="020B0604020202020204" pitchFamily="34" charset="0"/>
+                </a:rPr>
+                <a:t>Operacional</a:t>
+              </a:r>
+              <a:r>
+                <a:rPr lang="pt-BR" sz="1400" dirty="0">
+                  <a:latin typeface="Arial" panose="020B0604020202020204" pitchFamily="34" charset="0"/>
+                  <a:cs typeface="Arial" panose="020B0604020202020204" pitchFamily="34" charset="0"/>
+                </a:rPr>
+                <a:t>)</a:t>
+              </a:r>
+            </a:p>
+          </p:txBody>
+        </p:sp>
+      </p:grpSp>
+      <p:grpSp>
+        <p:nvGrpSpPr>
+          <p:cNvPr id="29" name="Agrupar 28">
+            <a:extLst>
+              <a:ext uri="{FF2B5EF4-FFF2-40B4-BE49-F238E27FC236}">
+                <a16:creationId xmlns:a16="http://schemas.microsoft.com/office/drawing/2014/main" id="{1F84ECEB-0827-4E04-BB52-FF918D5EAE96}"/>
+              </a:ext>
+            </a:extLst>
+          </p:cNvPr>
+          <p:cNvGrpSpPr/>
+          <p:nvPr/>
+        </p:nvGrpSpPr>
+        <p:grpSpPr>
+          <a:xfrm>
+            <a:off x="5176691" y="2767348"/>
+            <a:ext cx="2050231" cy="1015853"/>
+            <a:chOff x="7362813" y="1659019"/>
+            <a:chExt cx="2272899" cy="1015853"/>
+          </a:xfrm>
+        </p:grpSpPr>
+        <p:sp>
+          <p:nvSpPr>
+            <p:cNvPr id="33" name="Cubo 32">
+              <a:extLst>
+                <a:ext uri="{FF2B5EF4-FFF2-40B4-BE49-F238E27FC236}">
+                  <a16:creationId xmlns:a16="http://schemas.microsoft.com/office/drawing/2014/main" id="{071D06C6-5DE7-417C-8F38-D2E3DA94DC2B}"/>
+                </a:ext>
+              </a:extLst>
+            </p:cNvPr>
+            <p:cNvSpPr/>
+            <p:nvPr/>
+          </p:nvSpPr>
+          <p:spPr>
+            <a:xfrm>
+              <a:off x="7362813" y="1659019"/>
+              <a:ext cx="2272899" cy="1015853"/>
+            </a:xfrm>
+            <a:prstGeom prst="cube">
+              <a:avLst/>
+            </a:prstGeom>
+          </p:spPr>
+          <p:style>
+            <a:lnRef idx="2">
+              <a:schemeClr val="accent4">
+                <a:shade val="50000"/>
+              </a:schemeClr>
+            </a:lnRef>
+            <a:fillRef idx="1">
+              <a:schemeClr val="accent4"/>
+            </a:fillRef>
+            <a:effectRef idx="0">
+              <a:schemeClr val="accent4"/>
+            </a:effectRef>
+            <a:fontRef idx="minor">
+              <a:schemeClr val="lt1"/>
+            </a:fontRef>
+          </p:style>
+          <p:txBody>
+            <a:bodyPr rtlCol="0" anchor="ctr"/>
+            <a:lstStyle/>
+            <a:p>
+              <a:pPr algn="ctr"/>
+              <a:r>
+                <a:rPr lang="pt-BR" sz="1400" dirty="0">
+                  <a:latin typeface="Arial" panose="020B0604020202020204" pitchFamily="34" charset="0"/>
+                  <a:cs typeface="Arial" panose="020B0604020202020204" pitchFamily="34" charset="0"/>
+                </a:rPr>
+                <a:t>Setor de  caixa(financeiro)</a:t>
+              </a:r>
+            </a:p>
+            <a:p>
+              <a:pPr algn="ctr"/>
+              <a:endParaRPr lang="pt-BR" sz="1400" dirty="0">
+                <a:latin typeface="Arial" panose="020B0604020202020204" pitchFamily="34" charset="0"/>
+                <a:cs typeface="Arial" panose="020B0604020202020204" pitchFamily="34" charset="0"/>
+              </a:endParaRPr>
+            </a:p>
+          </p:txBody>
+        </p:sp>
+        <p:sp>
+          <p:nvSpPr>
+            <p:cNvPr id="14" name="CaixaDeTexto 13">
+              <a:extLst>
+                <a:ext uri="{FF2B5EF4-FFF2-40B4-BE49-F238E27FC236}">
+                  <a16:creationId xmlns:a16="http://schemas.microsoft.com/office/drawing/2014/main" id="{E08A7210-0801-426D-BC7D-7B345C308957}"/>
+                </a:ext>
+              </a:extLst>
+            </p:cNvPr>
+            <p:cNvSpPr txBox="1"/>
+            <p:nvPr/>
+          </p:nvSpPr>
+          <p:spPr>
+            <a:xfrm>
+              <a:off x="7665620" y="2367095"/>
+              <a:ext cx="1407758" cy="307777"/>
+            </a:xfrm>
+            <a:prstGeom prst="rect">
+              <a:avLst/>
+            </a:prstGeom>
+            <a:noFill/>
+          </p:spPr>
+          <p:txBody>
+            <a:bodyPr wrap="none" rtlCol="0">
+              <a:spAutoFit/>
+            </a:bodyPr>
+            <a:lstStyle/>
+            <a:p>
+              <a:r>
+                <a:rPr lang="pt-BR" sz="1400" dirty="0">
+                  <a:latin typeface="Arial" panose="020B0604020202020204" pitchFamily="34" charset="0"/>
+                  <a:cs typeface="Arial" panose="020B0604020202020204" pitchFamily="34" charset="0"/>
+                </a:rPr>
+                <a:t>(Nó </a:t>
+              </a:r>
+              <a:r>
+                <a:rPr lang="pt-BR" sz="1200" dirty="0">
+                  <a:latin typeface="Arial" panose="020B0604020202020204" pitchFamily="34" charset="0"/>
+                  <a:cs typeface="Arial" panose="020B0604020202020204" pitchFamily="34" charset="0"/>
+                </a:rPr>
+                <a:t>Operacional</a:t>
+              </a:r>
+              <a:r>
+                <a:rPr lang="pt-BR" sz="1400" dirty="0">
+                  <a:latin typeface="Arial" panose="020B0604020202020204" pitchFamily="34" charset="0"/>
+                  <a:cs typeface="Arial" panose="020B0604020202020204" pitchFamily="34" charset="0"/>
+                </a:rPr>
+                <a:t>)</a:t>
+              </a:r>
+            </a:p>
+          </p:txBody>
+        </p:sp>
+      </p:grpSp>
+      <p:sp>
+        <p:nvSpPr>
+          <p:cNvPr id="30" name="Retângulo 29">
+            <a:extLst>
+              <a:ext uri="{FF2B5EF4-FFF2-40B4-BE49-F238E27FC236}">
+                <a16:creationId xmlns:a16="http://schemas.microsoft.com/office/drawing/2014/main" id="{BB764A1B-41E9-4DF3-A30E-C0ECAAA03AAC}"/>
+              </a:ext>
+            </a:extLst>
+          </p:cNvPr>
+          <p:cNvSpPr/>
+          <p:nvPr/>
+        </p:nvSpPr>
+        <p:spPr>
+          <a:xfrm>
+            <a:off x="10423433" y="1935015"/>
+            <a:ext cx="1598940" cy="1034494"/>
+          </a:xfrm>
+          <a:prstGeom prst="rect">
+            <a:avLst/>
+          </a:prstGeom>
+        </p:spPr>
+        <p:style>
+          <a:lnRef idx="2">
+            <a:schemeClr val="accent1">
+              <a:shade val="50000"/>
+            </a:schemeClr>
+          </a:lnRef>
+          <a:fillRef idx="1">
+            <a:schemeClr val="accent1"/>
+          </a:fillRef>
+          <a:effectRef idx="0">
+            <a:schemeClr val="accent1"/>
+          </a:effectRef>
+          <a:fontRef idx="minor">
+            <a:schemeClr val="lt1"/>
+          </a:fontRef>
+        </p:style>
+        <p:txBody>
+          <a:bodyPr rtlCol="0" anchor="ctr"/>
+          <a:lstStyle/>
+          <a:p>
+            <a:pPr algn="ctr"/>
+            <a:r>
               <a:rPr lang="pt-BR" dirty="0">
                 <a:latin typeface="Arial" panose="020B0604020202020204" pitchFamily="34" charset="0"/>
                 <a:cs typeface="Arial" panose="020B0604020202020204" pitchFamily="34" charset="0"/>
               </a:rPr>
-              <a:t>tratar devolução do pedido</a:t>
-            </a:r>
-          </a:p>
-        </p:txBody>
-      </p:sp>
+              <a:t>Fabricante </a:t>
+            </a:r>
+          </a:p>
+        </p:txBody>
+      </p:sp>
+    </p:spTree>
+    <p:extLst>
+      <p:ext uri="{BB962C8B-B14F-4D97-AF65-F5344CB8AC3E}">
+        <p14:creationId xmlns:p14="http://schemas.microsoft.com/office/powerpoint/2010/main" val="910407705"/>
+      </p:ext>
+    </p:extLst>
+  </p:cSld>
+  <p:clrMapOvr>
+    <a:masterClrMapping/>
+  </p:clrMapOvr>
+</p:sld>
+</file>
+
+<file path=ppt/slides/slide6.xml><?xml version="1.0" encoding="utf-8"?>
+<p:sld xmlns:a="http://schemas.openxmlformats.org/drawingml/2006/main" xmlns:r="http://schemas.openxmlformats.org/officeDocument/2006/relationships" xmlns:p="http://schemas.openxmlformats.org/presentationml/2006/main">
+  <p:cSld>
+    <p:spTree>
+      <p:nvGrpSpPr>
+        <p:cNvPr id="1" name=""/>
+        <p:cNvGrpSpPr/>
+        <p:nvPr/>
+      </p:nvGrpSpPr>
+      <p:grpSpPr>
+        <a:xfrm>
+          <a:off x="0" y="0"/>
+          <a:ext cx="0" cy="0"/>
+          <a:chOff x="0" y="0"/>
+          <a:chExt cx="0" cy="0"/>
+        </a:xfrm>
+      </p:grpSpPr>
       <p:cxnSp>
         <p:nvCxnSpPr>
-          <p:cNvPr id="12" name="Conector reto 11">
+          <p:cNvPr id="47" name="Conector reto 46">
             <a:extLst>
               <a:ext uri="{FF2B5EF4-FFF2-40B4-BE49-F238E27FC236}">
-                <a16:creationId xmlns:a16="http://schemas.microsoft.com/office/drawing/2014/main" id="{F1B6C749-6105-4250-9D96-3797FCC3AA4C}"/>
+                <a16:creationId xmlns:a16="http://schemas.microsoft.com/office/drawing/2014/main" id="{55D8F0B3-47BD-4548-B5E0-A34EA95FCBD8}"/>
               </a:ext>
             </a:extLst>
           </p:cNvPr>
           <p:cNvCxnSpPr>
             <a:cxnSpLocks/>
-            <a:stCxn id="9" idx="2"/>
-            <a:endCxn id="10" idx="0"/>
+            <a:stCxn id="4" idx="3"/>
+            <a:endCxn id="46" idx="1"/>
           </p:cNvCxnSpPr>
           <p:nvPr/>
         </p:nvCxnSpPr>
         <p:spPr>
-          <a:xfrm flipH="1">
-            <a:off x="9034095" y="4182262"/>
-            <a:ext cx="5401" cy="567403"/>
+          <a:xfrm>
+            <a:off x="2211639" y="3531287"/>
+            <a:ext cx="8418364" cy="0"/>
           </a:xfrm>
           <a:prstGeom prst="line">
             <a:avLst/>
@@ -6994,6 +7701,779 @@
           </a:fontRef>
         </p:style>
       </p:cxnSp>
+      <p:cxnSp>
+        <p:nvCxnSpPr>
+          <p:cNvPr id="27" name="Conector reto 26">
+            <a:extLst>
+              <a:ext uri="{FF2B5EF4-FFF2-40B4-BE49-F238E27FC236}">
+                <a16:creationId xmlns:a16="http://schemas.microsoft.com/office/drawing/2014/main" id="{F084CB31-F216-4FC9-AE3F-95BC31694D48}"/>
+              </a:ext>
+            </a:extLst>
+          </p:cNvPr>
+          <p:cNvCxnSpPr>
+            <a:cxnSpLocks/>
+            <a:stCxn id="8" idx="1"/>
+            <a:endCxn id="23" idx="0"/>
+          </p:cNvCxnSpPr>
+          <p:nvPr/>
+        </p:nvCxnSpPr>
+        <p:spPr>
+          <a:xfrm flipH="1">
+            <a:off x="4614409" y="3254168"/>
+            <a:ext cx="759268" cy="1442521"/>
+          </a:xfrm>
+          <a:prstGeom prst="line">
+            <a:avLst/>
+          </a:prstGeom>
+        </p:spPr>
+        <p:style>
+          <a:lnRef idx="1">
+            <a:schemeClr val="accent1"/>
+          </a:lnRef>
+          <a:fillRef idx="0">
+            <a:schemeClr val="accent1"/>
+          </a:fillRef>
+          <a:effectRef idx="0">
+            <a:schemeClr val="accent1"/>
+          </a:effectRef>
+          <a:fontRef idx="minor">
+            <a:schemeClr val="tx1"/>
+          </a:fontRef>
+        </p:style>
+      </p:cxnSp>
+      <p:cxnSp>
+        <p:nvCxnSpPr>
+          <p:cNvPr id="28" name="Conector reto 27">
+            <a:extLst>
+              <a:ext uri="{FF2B5EF4-FFF2-40B4-BE49-F238E27FC236}">
+                <a16:creationId xmlns:a16="http://schemas.microsoft.com/office/drawing/2014/main" id="{980E8476-A5ED-4F40-8F20-FCB9AF6F1C8E}"/>
+              </a:ext>
+            </a:extLst>
+          </p:cNvPr>
+          <p:cNvCxnSpPr>
+            <a:cxnSpLocks/>
+            <a:stCxn id="8" idx="1"/>
+            <a:endCxn id="24" idx="0"/>
+          </p:cNvCxnSpPr>
+          <p:nvPr/>
+        </p:nvCxnSpPr>
+        <p:spPr>
+          <a:xfrm>
+            <a:off x="5373677" y="3254168"/>
+            <a:ext cx="878441" cy="1442523"/>
+          </a:xfrm>
+          <a:prstGeom prst="line">
+            <a:avLst/>
+          </a:prstGeom>
+        </p:spPr>
+        <p:style>
+          <a:lnRef idx="1">
+            <a:schemeClr val="accent1"/>
+          </a:lnRef>
+          <a:fillRef idx="0">
+            <a:schemeClr val="accent1"/>
+          </a:fillRef>
+          <a:effectRef idx="0">
+            <a:schemeClr val="accent1"/>
+          </a:effectRef>
+          <a:fontRef idx="minor">
+            <a:schemeClr val="tx1"/>
+          </a:fontRef>
+        </p:style>
+      </p:cxnSp>
+      <p:cxnSp>
+        <p:nvCxnSpPr>
+          <p:cNvPr id="34" name="Conector reto 33">
+            <a:extLst>
+              <a:ext uri="{FF2B5EF4-FFF2-40B4-BE49-F238E27FC236}">
+                <a16:creationId xmlns:a16="http://schemas.microsoft.com/office/drawing/2014/main" id="{4FB7E432-1D20-4AC7-B749-284D62324249}"/>
+              </a:ext>
+            </a:extLst>
+          </p:cNvPr>
+          <p:cNvCxnSpPr>
+            <a:cxnSpLocks/>
+            <a:stCxn id="18" idx="1"/>
+            <a:endCxn id="25" idx="0"/>
+          </p:cNvCxnSpPr>
+          <p:nvPr/>
+        </p:nvCxnSpPr>
+        <p:spPr>
+          <a:xfrm>
+            <a:off x="8039512" y="3254168"/>
+            <a:ext cx="183710" cy="1442520"/>
+          </a:xfrm>
+          <a:prstGeom prst="line">
+            <a:avLst/>
+          </a:prstGeom>
+        </p:spPr>
+        <p:style>
+          <a:lnRef idx="1">
+            <a:schemeClr val="accent1"/>
+          </a:lnRef>
+          <a:fillRef idx="0">
+            <a:schemeClr val="accent1"/>
+          </a:fillRef>
+          <a:effectRef idx="0">
+            <a:schemeClr val="accent1"/>
+          </a:effectRef>
+          <a:fontRef idx="minor">
+            <a:schemeClr val="tx1"/>
+          </a:fontRef>
+        </p:style>
+      </p:cxnSp>
+      <p:sp>
+        <p:nvSpPr>
+          <p:cNvPr id="2" name="Título 1"/>
+          <p:cNvSpPr>
+            <a:spLocks noGrp="1"/>
+          </p:cNvSpPr>
+          <p:nvPr>
+            <p:ph type="title"/>
+          </p:nvPr>
+        </p:nvSpPr>
+        <p:spPr>
+          <a:xfrm>
+            <a:off x="254977" y="313372"/>
+            <a:ext cx="11728938" cy="1034826"/>
+          </a:xfrm>
+        </p:spPr>
+        <p:txBody>
+          <a:bodyPr>
+            <a:normAutofit/>
+          </a:bodyPr>
+          <a:lstStyle/>
+          <a:p>
+            <a:r>
+              <a:rPr lang="pt-BR" sz="3600" dirty="0">
+                <a:latin typeface="Arial" panose="020B0604020202020204" pitchFamily="34" charset="0"/>
+                <a:ea typeface="+mn-ea"/>
+                <a:cs typeface="Arial" panose="020B0604020202020204" pitchFamily="34" charset="0"/>
+              </a:rPr>
+              <a:t>Cenário: Solicitar devolução do pedido de formas padrão</a:t>
+            </a:r>
+          </a:p>
+        </p:txBody>
+      </p:sp>
+      <p:sp>
+        <p:nvSpPr>
+          <p:cNvPr id="4" name="Retângulo 3"/>
+          <p:cNvSpPr/>
+          <p:nvPr/>
+        </p:nvSpPr>
+        <p:spPr>
+          <a:xfrm>
+            <a:off x="671059" y="3013874"/>
+            <a:ext cx="1540580" cy="1034826"/>
+          </a:xfrm>
+          <a:prstGeom prst="rect">
+            <a:avLst/>
+          </a:prstGeom>
+        </p:spPr>
+        <p:style>
+          <a:lnRef idx="2">
+            <a:schemeClr val="accent1">
+              <a:shade val="50000"/>
+            </a:schemeClr>
+          </a:lnRef>
+          <a:fillRef idx="1">
+            <a:schemeClr val="accent1"/>
+          </a:fillRef>
+          <a:effectRef idx="0">
+            <a:schemeClr val="accent1"/>
+          </a:effectRef>
+          <a:fontRef idx="minor">
+            <a:schemeClr val="lt1"/>
+          </a:fontRef>
+        </p:style>
+        <p:txBody>
+          <a:bodyPr rtlCol="0" anchor="ctr"/>
+          <a:lstStyle/>
+          <a:p>
+            <a:pPr algn="ctr"/>
+            <a:r>
+              <a:rPr lang="pt-BR" dirty="0">
+                <a:latin typeface="Arial" panose="020B0604020202020204" pitchFamily="34" charset="0"/>
+                <a:cs typeface="Arial" panose="020B0604020202020204" pitchFamily="34" charset="0"/>
+              </a:rPr>
+              <a:t>Cliente </a:t>
+            </a:r>
+          </a:p>
+        </p:txBody>
+      </p:sp>
+      <p:sp>
+        <p:nvSpPr>
+          <p:cNvPr id="5" name="CaixaDeTexto 4"/>
+          <p:cNvSpPr txBox="1"/>
+          <p:nvPr/>
+        </p:nvSpPr>
+        <p:spPr>
+          <a:xfrm>
+            <a:off x="3922836" y="2154085"/>
+            <a:ext cx="6620607" cy="400110"/>
+          </a:xfrm>
+          <a:prstGeom prst="rect">
+            <a:avLst/>
+          </a:prstGeom>
+          <a:noFill/>
+        </p:spPr>
+        <p:txBody>
+          <a:bodyPr wrap="square" lIns="91440" tIns="45720" rIns="91440" bIns="45720" rtlCol="0" anchor="t">
+            <a:spAutoFit/>
+          </a:bodyPr>
+          <a:lstStyle/>
+          <a:p>
+            <a:pPr algn="ctr"/>
+            <a:r>
+              <a:rPr lang="pt-BR" sz="2000" dirty="0">
+                <a:latin typeface="Arial" panose="020B0604020202020204" pitchFamily="34" charset="0"/>
+                <a:cs typeface="Arial" panose="020B0604020202020204" pitchFamily="34" charset="0"/>
+              </a:rPr>
+              <a:t>Silpan</a:t>
+            </a:r>
+          </a:p>
+        </p:txBody>
+      </p:sp>
+      <p:sp>
+        <p:nvSpPr>
+          <p:cNvPr id="7" name="Retângulo Arredondado 6"/>
+          <p:cNvSpPr/>
+          <p:nvPr/>
+        </p:nvSpPr>
+        <p:spPr>
+          <a:xfrm>
+            <a:off x="3358096" y="2154085"/>
+            <a:ext cx="6164876" cy="3732163"/>
+          </a:xfrm>
+          <a:prstGeom prst="roundRect">
+            <a:avLst/>
+          </a:prstGeom>
+          <a:noFill/>
+          <a:ln w="9525" cap="flat" cmpd="sng" algn="ctr">
+            <a:solidFill>
+              <a:schemeClr val="dk1"/>
+            </a:solidFill>
+            <a:prstDash val="solid"/>
+            <a:round/>
+            <a:headEnd type="none" w="med" len="med"/>
+            <a:tailEnd type="none" w="med" len="med"/>
+          </a:ln>
+        </p:spPr>
+        <p:style>
+          <a:lnRef idx="0">
+            <a:scrgbClr r="0" g="0" b="0"/>
+          </a:lnRef>
+          <a:fillRef idx="0">
+            <a:scrgbClr r="0" g="0" b="0"/>
+          </a:fillRef>
+          <a:effectRef idx="0">
+            <a:scrgbClr r="0" g="0" b="0"/>
+          </a:effectRef>
+          <a:fontRef idx="minor">
+            <a:schemeClr val="dk1"/>
+          </a:fontRef>
+        </p:style>
+        <p:txBody>
+          <a:bodyPr rtlCol="0" anchor="ctr"/>
+          <a:lstStyle/>
+          <a:p>
+            <a:pPr algn="ctr"/>
+            <a:endParaRPr lang="pt-BR">
+              <a:latin typeface="Arial" panose="020B0604020202020204" pitchFamily="34" charset="0"/>
+              <a:cs typeface="Arial" panose="020B0604020202020204" pitchFamily="34" charset="0"/>
+            </a:endParaRPr>
+          </a:p>
+        </p:txBody>
+      </p:sp>
+      <p:grpSp>
+        <p:nvGrpSpPr>
+          <p:cNvPr id="16" name="Agrupar 15">
+            <a:extLst>
+              <a:ext uri="{FF2B5EF4-FFF2-40B4-BE49-F238E27FC236}">
+                <a16:creationId xmlns:a16="http://schemas.microsoft.com/office/drawing/2014/main" id="{06EA8452-20C2-4DD1-A28E-9219B3645C37}"/>
+              </a:ext>
+            </a:extLst>
+          </p:cNvPr>
+          <p:cNvGrpSpPr/>
+          <p:nvPr/>
+        </p:nvGrpSpPr>
+        <p:grpSpPr>
+          <a:xfrm>
+            <a:off x="4465127" y="3000205"/>
+            <a:ext cx="2071064" cy="1015853"/>
+            <a:chOff x="4845149" y="2837859"/>
+            <a:chExt cx="2272899" cy="1015853"/>
+          </a:xfrm>
+        </p:grpSpPr>
+        <p:sp>
+          <p:nvSpPr>
+            <p:cNvPr id="8" name="Cubo 7"/>
+            <p:cNvSpPr/>
+            <p:nvPr/>
+          </p:nvSpPr>
+          <p:spPr>
+            <a:xfrm>
+              <a:off x="4845149" y="2837859"/>
+              <a:ext cx="2272899" cy="1015853"/>
+            </a:xfrm>
+            <a:prstGeom prst="cube">
+              <a:avLst/>
+            </a:prstGeom>
+          </p:spPr>
+          <p:style>
+            <a:lnRef idx="2">
+              <a:schemeClr val="accent4">
+                <a:shade val="50000"/>
+              </a:schemeClr>
+            </a:lnRef>
+            <a:fillRef idx="1">
+              <a:schemeClr val="accent4"/>
+            </a:fillRef>
+            <a:effectRef idx="0">
+              <a:schemeClr val="accent4"/>
+            </a:effectRef>
+            <a:fontRef idx="minor">
+              <a:schemeClr val="lt1"/>
+            </a:fontRef>
+          </p:style>
+          <p:txBody>
+            <a:bodyPr rtlCol="0" anchor="ctr"/>
+            <a:lstStyle/>
+            <a:p>
+              <a:pPr algn="ctr"/>
+              <a:r>
+                <a:rPr lang="pt-BR" sz="1400" dirty="0">
+                  <a:latin typeface="Arial" panose="020B0604020202020204" pitchFamily="34" charset="0"/>
+                  <a:cs typeface="Arial" panose="020B0604020202020204" pitchFamily="34" charset="0"/>
+                </a:rPr>
+                <a:t>Setor de vendas</a:t>
+              </a:r>
+            </a:p>
+          </p:txBody>
+        </p:sp>
+        <p:sp>
+          <p:nvSpPr>
+            <p:cNvPr id="9" name="CaixaDeTexto 8"/>
+            <p:cNvSpPr txBox="1"/>
+            <p:nvPr/>
+          </p:nvSpPr>
+          <p:spPr>
+            <a:xfrm>
+              <a:off x="5084371" y="3545935"/>
+              <a:ext cx="1547218" cy="307777"/>
+            </a:xfrm>
+            <a:prstGeom prst="rect">
+              <a:avLst/>
+            </a:prstGeom>
+            <a:noFill/>
+          </p:spPr>
+          <p:txBody>
+            <a:bodyPr wrap="none" rtlCol="0">
+              <a:spAutoFit/>
+            </a:bodyPr>
+            <a:lstStyle/>
+            <a:p>
+              <a:r>
+                <a:rPr lang="pt-BR" sz="1400" dirty="0">
+                  <a:latin typeface="Arial" panose="020B0604020202020204" pitchFamily="34" charset="0"/>
+                  <a:cs typeface="Arial" panose="020B0604020202020204" pitchFamily="34" charset="0"/>
+                </a:rPr>
+                <a:t>(Nó Operacional)</a:t>
+              </a:r>
+            </a:p>
+          </p:txBody>
+        </p:sp>
+      </p:grpSp>
+      <p:grpSp>
+        <p:nvGrpSpPr>
+          <p:cNvPr id="37" name="Agrupar 36">
+            <a:extLst>
+              <a:ext uri="{FF2B5EF4-FFF2-40B4-BE49-F238E27FC236}">
+                <a16:creationId xmlns:a16="http://schemas.microsoft.com/office/drawing/2014/main" id="{EFFF5F30-E090-4221-A39E-642479BC267F}"/>
+              </a:ext>
+            </a:extLst>
+          </p:cNvPr>
+          <p:cNvGrpSpPr/>
+          <p:nvPr/>
+        </p:nvGrpSpPr>
+        <p:grpSpPr>
+          <a:xfrm>
+            <a:off x="7043083" y="3000205"/>
+            <a:ext cx="2246822" cy="1020270"/>
+            <a:chOff x="8638593" y="2925500"/>
+            <a:chExt cx="2246822" cy="1020270"/>
+          </a:xfrm>
+        </p:grpSpPr>
+        <p:sp>
+          <p:nvSpPr>
+            <p:cNvPr id="18" name="Cubo 17">
+              <a:extLst>
+                <a:ext uri="{FF2B5EF4-FFF2-40B4-BE49-F238E27FC236}">
+                  <a16:creationId xmlns:a16="http://schemas.microsoft.com/office/drawing/2014/main" id="{CE2FAD5C-CAD8-47DC-A6B6-919B585D2C42}"/>
+                </a:ext>
+              </a:extLst>
+            </p:cNvPr>
+            <p:cNvSpPr/>
+            <p:nvPr/>
+          </p:nvSpPr>
+          <p:spPr>
+            <a:xfrm>
+              <a:off x="8638593" y="2925500"/>
+              <a:ext cx="2246822" cy="1015853"/>
+            </a:xfrm>
+            <a:prstGeom prst="cube">
+              <a:avLst/>
+            </a:prstGeom>
+          </p:spPr>
+          <p:style>
+            <a:lnRef idx="2">
+              <a:schemeClr val="accent4">
+                <a:shade val="50000"/>
+              </a:schemeClr>
+            </a:lnRef>
+            <a:fillRef idx="1">
+              <a:schemeClr val="accent4"/>
+            </a:fillRef>
+            <a:effectRef idx="0">
+              <a:schemeClr val="accent4"/>
+            </a:effectRef>
+            <a:fontRef idx="minor">
+              <a:schemeClr val="lt1"/>
+            </a:fontRef>
+          </p:style>
+          <p:txBody>
+            <a:bodyPr rtlCol="0" anchor="ctr"/>
+            <a:lstStyle/>
+            <a:p>
+              <a:pPr algn="ctr"/>
+              <a:r>
+                <a:rPr lang="pt-BR" sz="1400" dirty="0">
+                  <a:latin typeface="Arial" panose="020B0604020202020204" pitchFamily="34" charset="0"/>
+                  <a:cs typeface="Arial" panose="020B0604020202020204" pitchFamily="34" charset="0"/>
+                </a:rPr>
+                <a:t>Setor de Caixa</a:t>
+              </a:r>
+            </a:p>
+          </p:txBody>
+        </p:sp>
+        <p:sp>
+          <p:nvSpPr>
+            <p:cNvPr id="19" name="CaixaDeTexto 18">
+              <a:extLst>
+                <a:ext uri="{FF2B5EF4-FFF2-40B4-BE49-F238E27FC236}">
+                  <a16:creationId xmlns:a16="http://schemas.microsoft.com/office/drawing/2014/main" id="{CADFC7F1-FBA7-42FC-816D-D9A8DB2E89DC}"/>
+                </a:ext>
+              </a:extLst>
+            </p:cNvPr>
+            <p:cNvSpPr txBox="1"/>
+            <p:nvPr/>
+          </p:nvSpPr>
+          <p:spPr>
+            <a:xfrm>
+              <a:off x="8870288" y="3637993"/>
+              <a:ext cx="1529467" cy="307777"/>
+            </a:xfrm>
+            <a:prstGeom prst="rect">
+              <a:avLst/>
+            </a:prstGeom>
+            <a:noFill/>
+          </p:spPr>
+          <p:txBody>
+            <a:bodyPr wrap="none" rtlCol="0">
+              <a:spAutoFit/>
+            </a:bodyPr>
+            <a:lstStyle/>
+            <a:p>
+              <a:r>
+                <a:rPr lang="pt-BR" sz="1400" dirty="0">
+                  <a:latin typeface="Arial" panose="020B0604020202020204" pitchFamily="34" charset="0"/>
+                  <a:cs typeface="Arial" panose="020B0604020202020204" pitchFamily="34" charset="0"/>
+                </a:rPr>
+                <a:t>(Nó Operacional)</a:t>
+              </a:r>
+            </a:p>
+          </p:txBody>
+        </p:sp>
+      </p:grpSp>
+      <p:sp>
+        <p:nvSpPr>
+          <p:cNvPr id="23" name="Retângulo Arredondado 9">
+            <a:extLst>
+              <a:ext uri="{FF2B5EF4-FFF2-40B4-BE49-F238E27FC236}">
+                <a16:creationId xmlns:a16="http://schemas.microsoft.com/office/drawing/2014/main" id="{91A4513E-4A84-482A-A480-3FD53E09D0F5}"/>
+              </a:ext>
+            </a:extLst>
+          </p:cNvPr>
+          <p:cNvSpPr/>
+          <p:nvPr/>
+        </p:nvSpPr>
+        <p:spPr>
+          <a:xfrm>
+            <a:off x="3840800" y="4696689"/>
+            <a:ext cx="1547218" cy="639175"/>
+          </a:xfrm>
+          <a:prstGeom prst="roundRect">
+            <a:avLst/>
+          </a:prstGeom>
+          <a:gradFill flip="none" rotWithShape="1">
+            <a:gsLst>
+              <a:gs pos="0">
+                <a:schemeClr val="accent6">
+                  <a:lumMod val="67000"/>
+                </a:schemeClr>
+              </a:gs>
+              <a:gs pos="48000">
+                <a:schemeClr val="accent6">
+                  <a:lumMod val="97000"/>
+                  <a:lumOff val="3000"/>
+                </a:schemeClr>
+              </a:gs>
+              <a:gs pos="100000">
+                <a:schemeClr val="accent6">
+                  <a:lumMod val="60000"/>
+                  <a:lumOff val="40000"/>
+                </a:schemeClr>
+              </a:gs>
+            </a:gsLst>
+            <a:lin ang="16200000" scaled="1"/>
+            <a:tileRect/>
+          </a:gradFill>
+          <a:ln>
+            <a:noFill/>
+          </a:ln>
+        </p:spPr>
+        <p:style>
+          <a:lnRef idx="0">
+            <a:scrgbClr r="0" g="0" b="0"/>
+          </a:lnRef>
+          <a:fillRef idx="0">
+            <a:scrgbClr r="0" g="0" b="0"/>
+          </a:fillRef>
+          <a:effectRef idx="0">
+            <a:scrgbClr r="0" g="0" b="0"/>
+          </a:effectRef>
+          <a:fontRef idx="minor">
+            <a:schemeClr val="lt1"/>
+          </a:fontRef>
+        </p:style>
+        <p:txBody>
+          <a:bodyPr rtlCol="0" anchor="ctr"/>
+          <a:lstStyle/>
+          <a:p>
+            <a:pPr algn="ctr"/>
+            <a:r>
+              <a:rPr lang="pt-BR" sz="1400" dirty="0">
+                <a:latin typeface="Arial" panose="020B0604020202020204" pitchFamily="34" charset="0"/>
+                <a:cs typeface="Arial" panose="020B0604020202020204" pitchFamily="34" charset="0"/>
+              </a:rPr>
+              <a:t>tratar devolução do pedido</a:t>
+            </a:r>
+          </a:p>
+        </p:txBody>
+      </p:sp>
+      <p:sp>
+        <p:nvSpPr>
+          <p:cNvPr id="24" name="Retângulo Arredondado 9">
+            <a:extLst>
+              <a:ext uri="{FF2B5EF4-FFF2-40B4-BE49-F238E27FC236}">
+                <a16:creationId xmlns:a16="http://schemas.microsoft.com/office/drawing/2014/main" id="{689AD128-9B12-4797-AAEC-0B16D4392271}"/>
+              </a:ext>
+            </a:extLst>
+          </p:cNvPr>
+          <p:cNvSpPr/>
+          <p:nvPr/>
+        </p:nvSpPr>
+        <p:spPr>
+          <a:xfrm>
+            <a:off x="5478509" y="4696691"/>
+            <a:ext cx="1547218" cy="639175"/>
+          </a:xfrm>
+          <a:prstGeom prst="roundRect">
+            <a:avLst/>
+          </a:prstGeom>
+          <a:gradFill flip="none" rotWithShape="1">
+            <a:gsLst>
+              <a:gs pos="0">
+                <a:schemeClr val="accent6">
+                  <a:lumMod val="67000"/>
+                </a:schemeClr>
+              </a:gs>
+              <a:gs pos="48000">
+                <a:schemeClr val="accent6">
+                  <a:lumMod val="97000"/>
+                  <a:lumOff val="3000"/>
+                </a:schemeClr>
+              </a:gs>
+              <a:gs pos="100000">
+                <a:schemeClr val="accent6">
+                  <a:lumMod val="60000"/>
+                  <a:lumOff val="40000"/>
+                </a:schemeClr>
+              </a:gs>
+            </a:gsLst>
+            <a:lin ang="16200000" scaled="1"/>
+            <a:tileRect/>
+          </a:gradFill>
+          <a:ln>
+            <a:noFill/>
+          </a:ln>
+        </p:spPr>
+        <p:style>
+          <a:lnRef idx="0">
+            <a:scrgbClr r="0" g="0" b="0"/>
+          </a:lnRef>
+          <a:fillRef idx="0">
+            <a:scrgbClr r="0" g="0" b="0"/>
+          </a:fillRef>
+          <a:effectRef idx="0">
+            <a:scrgbClr r="0" g="0" b="0"/>
+          </a:effectRef>
+          <a:fontRef idx="minor">
+            <a:schemeClr val="lt1"/>
+          </a:fontRef>
+        </p:style>
+        <p:txBody>
+          <a:bodyPr rtlCol="0" anchor="ctr"/>
+          <a:lstStyle/>
+          <a:p>
+            <a:pPr algn="ctr"/>
+            <a:r>
+              <a:rPr lang="pt-BR" sz="1400" dirty="0">
+                <a:latin typeface="Arial" panose="020B0604020202020204" pitchFamily="34" charset="0"/>
+                <a:cs typeface="Arial" panose="020B0604020202020204" pitchFamily="34" charset="0"/>
+              </a:rPr>
+              <a:t>Tratar troca do pedido</a:t>
+            </a:r>
+          </a:p>
+        </p:txBody>
+      </p:sp>
+      <p:sp>
+        <p:nvSpPr>
+          <p:cNvPr id="25" name="Retângulo Arredondado 9">
+            <a:extLst>
+              <a:ext uri="{FF2B5EF4-FFF2-40B4-BE49-F238E27FC236}">
+                <a16:creationId xmlns:a16="http://schemas.microsoft.com/office/drawing/2014/main" id="{222ED160-844E-4B81-B39A-12364B59AA9F}"/>
+              </a:ext>
+            </a:extLst>
+          </p:cNvPr>
+          <p:cNvSpPr/>
+          <p:nvPr/>
+        </p:nvSpPr>
+        <p:spPr>
+          <a:xfrm>
+            <a:off x="7449613" y="4696688"/>
+            <a:ext cx="1547218" cy="639175"/>
+          </a:xfrm>
+          <a:prstGeom prst="roundRect">
+            <a:avLst/>
+          </a:prstGeom>
+          <a:gradFill flip="none" rotWithShape="1">
+            <a:gsLst>
+              <a:gs pos="0">
+                <a:schemeClr val="accent6">
+                  <a:lumMod val="67000"/>
+                </a:schemeClr>
+              </a:gs>
+              <a:gs pos="48000">
+                <a:schemeClr val="accent6">
+                  <a:lumMod val="97000"/>
+                  <a:lumOff val="3000"/>
+                </a:schemeClr>
+              </a:gs>
+              <a:gs pos="100000">
+                <a:schemeClr val="accent6">
+                  <a:lumMod val="60000"/>
+                  <a:lumOff val="40000"/>
+                </a:schemeClr>
+              </a:gs>
+            </a:gsLst>
+            <a:lin ang="16200000" scaled="1"/>
+            <a:tileRect/>
+          </a:gradFill>
+          <a:ln>
+            <a:noFill/>
+          </a:ln>
+        </p:spPr>
+        <p:style>
+          <a:lnRef idx="0">
+            <a:scrgbClr r="0" g="0" b="0"/>
+          </a:lnRef>
+          <a:fillRef idx="0">
+            <a:scrgbClr r="0" g="0" b="0"/>
+          </a:fillRef>
+          <a:effectRef idx="0">
+            <a:scrgbClr r="0" g="0" b="0"/>
+          </a:effectRef>
+          <a:fontRef idx="minor">
+            <a:schemeClr val="lt1"/>
+          </a:fontRef>
+        </p:style>
+        <p:txBody>
+          <a:bodyPr rtlCol="0" anchor="ctr"/>
+          <a:lstStyle/>
+          <a:p>
+            <a:pPr algn="ctr"/>
+            <a:r>
+              <a:rPr lang="pt-BR" sz="1400" dirty="0">
+                <a:latin typeface="Arial" panose="020B0604020202020204" pitchFamily="34" charset="0"/>
+                <a:cs typeface="Arial" panose="020B0604020202020204" pitchFamily="34" charset="0"/>
+              </a:rPr>
+              <a:t>Tratar estorno</a:t>
+            </a:r>
+          </a:p>
+        </p:txBody>
+      </p:sp>
+      <p:sp>
+        <p:nvSpPr>
+          <p:cNvPr id="46" name="Retângulo 45">
+            <a:extLst>
+              <a:ext uri="{FF2B5EF4-FFF2-40B4-BE49-F238E27FC236}">
+                <a16:creationId xmlns:a16="http://schemas.microsoft.com/office/drawing/2014/main" id="{BD3F2132-48B4-4FC7-A9D7-99AC790C9D01}"/>
+              </a:ext>
+            </a:extLst>
+          </p:cNvPr>
+          <p:cNvSpPr/>
+          <p:nvPr/>
+        </p:nvSpPr>
+        <p:spPr>
+          <a:xfrm>
+            <a:off x="10630003" y="3013874"/>
+            <a:ext cx="1540580" cy="1034826"/>
+          </a:xfrm>
+          <a:prstGeom prst="rect">
+            <a:avLst/>
+          </a:prstGeom>
+        </p:spPr>
+        <p:style>
+          <a:lnRef idx="2">
+            <a:schemeClr val="accent1">
+              <a:shade val="50000"/>
+            </a:schemeClr>
+          </a:lnRef>
+          <a:fillRef idx="1">
+            <a:schemeClr val="accent1"/>
+          </a:fillRef>
+          <a:effectRef idx="0">
+            <a:schemeClr val="accent1"/>
+          </a:effectRef>
+          <a:fontRef idx="minor">
+            <a:schemeClr val="lt1"/>
+          </a:fontRef>
+        </p:style>
+        <p:txBody>
+          <a:bodyPr rtlCol="0" anchor="ctr"/>
+          <a:lstStyle/>
+          <a:p>
+            <a:pPr algn="ctr"/>
+            <a:r>
+              <a:rPr lang="pt-BR" dirty="0">
+                <a:latin typeface="Arial" panose="020B0604020202020204" pitchFamily="34" charset="0"/>
+                <a:cs typeface="Arial" panose="020B0604020202020204" pitchFamily="34" charset="0"/>
+              </a:rPr>
+              <a:t>Banco </a:t>
+            </a:r>
+          </a:p>
+        </p:txBody>
+      </p:sp>
     </p:spTree>
     <p:extLst>
       <p:ext uri="{BB962C8B-B14F-4D97-AF65-F5344CB8AC3E}">
@@ -7081,8 +8561,8 @@
         </p:nvCxnSpPr>
         <p:spPr>
           <a:xfrm>
-            <a:off x="9324292" y="3870541"/>
-            <a:ext cx="30477" cy="886864"/>
+            <a:off x="9530661" y="3833455"/>
+            <a:ext cx="0" cy="923950"/>
           </a:xfrm>
           <a:prstGeom prst="line">
             <a:avLst/>
@@ -7170,14 +8650,14 @@
           <p:cNvCxnSpPr>
             <a:cxnSpLocks/>
             <a:stCxn id="11" idx="3"/>
-            <a:endCxn id="8" idx="2"/>
+            <a:endCxn id="13" idx="4"/>
           </p:cNvCxnSpPr>
           <p:nvPr/>
         </p:nvCxnSpPr>
         <p:spPr>
-          <a:xfrm>
-            <a:off x="3612497" y="3795401"/>
-            <a:ext cx="2365512" cy="0"/>
+          <a:xfrm flipV="1">
+            <a:off x="3612497" y="3777424"/>
+            <a:ext cx="6957442" cy="17977"/>
           </a:xfrm>
           <a:prstGeom prst="line">
             <a:avLst/>
@@ -7303,8 +8783,8 @@
         </p:nvSpPr>
         <p:spPr>
           <a:xfrm>
-            <a:off x="6065375" y="3843708"/>
-            <a:ext cx="1745991" cy="338554"/>
+            <a:off x="6162293" y="3868569"/>
+            <a:ext cx="1547218" cy="307777"/>
           </a:xfrm>
           <a:prstGeom prst="rect">
             <a:avLst/>
@@ -7318,7 +8798,7 @@
           <a:lstStyle/>
           <a:p>
             <a:r>
-              <a:rPr lang="pt-BR" sz="1600" dirty="0">
+              <a:rPr lang="pt-BR" sz="1400" dirty="0">
                 <a:latin typeface="Arial" panose="020B0604020202020204" pitchFamily="34" charset="0"/>
                 <a:cs typeface="Arial" panose="020B0604020202020204" pitchFamily="34" charset="0"/>
               </a:rPr>
@@ -7461,7 +8941,7 @@
         </p:nvSpPr>
         <p:spPr>
           <a:xfrm>
-            <a:off x="8338274" y="3151701"/>
+            <a:off x="8551003" y="3142516"/>
             <a:ext cx="2272899" cy="1015853"/>
           </a:xfrm>
           <a:prstGeom prst="cube">
@@ -7513,8 +8993,8 @@
         </p:nvSpPr>
         <p:spPr>
           <a:xfrm>
-            <a:off x="8451296" y="3870541"/>
-            <a:ext cx="1745991" cy="338554"/>
+            <a:off x="8757052" y="3833455"/>
+            <a:ext cx="1547218" cy="307777"/>
           </a:xfrm>
           <a:prstGeom prst="rect">
             <a:avLst/>
@@ -7528,7 +9008,7 @@
           <a:lstStyle/>
           <a:p>
             <a:r>
-              <a:rPr lang="pt-BR" sz="1600" dirty="0">
+              <a:rPr lang="pt-BR" sz="1400" dirty="0">
                 <a:latin typeface="Arial" panose="020B0604020202020204" pitchFamily="34" charset="0"/>
                 <a:cs typeface="Arial" panose="020B0604020202020204" pitchFamily="34" charset="0"/>
               </a:rPr>
@@ -7551,7 +9031,7 @@
         </p:nvSpPr>
         <p:spPr>
           <a:xfrm>
-            <a:off x="8338274" y="4757405"/>
+            <a:off x="8514166" y="4757405"/>
             <a:ext cx="2032990" cy="914400"/>
           </a:xfrm>
           <a:prstGeom prst="roundRect">

</xml_diff>

<commit_message>
[Atualização] Art 15. Art. 16 DFD's
</commit_message>
<xml_diff>
--- a/Documentation/15._Arquitetura_de_Negócio_para_cada_Cenário.pptx
+++ b/Documentation/15._Arquitetura_de_Negócio_para_cada_Cenário.pptx
@@ -984,7 +984,7 @@
           <a:p>
             <a:fld id="{2E0DF6E3-1D5C-4094-B81B-572E3744A14B}" type="datetimeFigureOut">
               <a:rPr lang="pt-BR" smtClean="0"/>
-              <a:t>20/04/2021</a:t>
+              <a:t>29/04/2021</a:t>
             </a:fld>
             <a:endParaRPr lang="pt-BR"/>
           </a:p>
@@ -1152,7 +1152,7 @@
           <a:p>
             <a:fld id="{2E0DF6E3-1D5C-4094-B81B-572E3744A14B}" type="datetimeFigureOut">
               <a:rPr lang="pt-BR" smtClean="0"/>
-              <a:t>20/04/2021</a:t>
+              <a:t>29/04/2021</a:t>
             </a:fld>
             <a:endParaRPr lang="pt-BR"/>
           </a:p>
@@ -1330,7 +1330,7 @@
           <a:p>
             <a:fld id="{2E0DF6E3-1D5C-4094-B81B-572E3744A14B}" type="datetimeFigureOut">
               <a:rPr lang="pt-BR" smtClean="0"/>
-              <a:t>20/04/2021</a:t>
+              <a:t>29/04/2021</a:t>
             </a:fld>
             <a:endParaRPr lang="pt-BR"/>
           </a:p>
@@ -1498,7 +1498,7 @@
           <a:p>
             <a:fld id="{2E0DF6E3-1D5C-4094-B81B-572E3744A14B}" type="datetimeFigureOut">
               <a:rPr lang="pt-BR" smtClean="0"/>
-              <a:t>20/04/2021</a:t>
+              <a:t>29/04/2021</a:t>
             </a:fld>
             <a:endParaRPr lang="pt-BR"/>
           </a:p>
@@ -1743,7 +1743,7 @@
           <a:p>
             <a:fld id="{2E0DF6E3-1D5C-4094-B81B-572E3744A14B}" type="datetimeFigureOut">
               <a:rPr lang="pt-BR" smtClean="0"/>
-              <a:t>20/04/2021</a:t>
+              <a:t>29/04/2021</a:t>
             </a:fld>
             <a:endParaRPr lang="pt-BR"/>
           </a:p>
@@ -1972,7 +1972,7 @@
           <a:p>
             <a:fld id="{2E0DF6E3-1D5C-4094-B81B-572E3744A14B}" type="datetimeFigureOut">
               <a:rPr lang="pt-BR" smtClean="0"/>
-              <a:t>20/04/2021</a:t>
+              <a:t>29/04/2021</a:t>
             </a:fld>
             <a:endParaRPr lang="pt-BR"/>
           </a:p>
@@ -2336,7 +2336,7 @@
           <a:p>
             <a:fld id="{2E0DF6E3-1D5C-4094-B81B-572E3744A14B}" type="datetimeFigureOut">
               <a:rPr lang="pt-BR" smtClean="0"/>
-              <a:t>20/04/2021</a:t>
+              <a:t>29/04/2021</a:t>
             </a:fld>
             <a:endParaRPr lang="pt-BR"/>
           </a:p>
@@ -2453,7 +2453,7 @@
           <a:p>
             <a:fld id="{2E0DF6E3-1D5C-4094-B81B-572E3744A14B}" type="datetimeFigureOut">
               <a:rPr lang="pt-BR" smtClean="0"/>
-              <a:t>20/04/2021</a:t>
+              <a:t>29/04/2021</a:t>
             </a:fld>
             <a:endParaRPr lang="pt-BR"/>
           </a:p>
@@ -2548,7 +2548,7 @@
           <a:p>
             <a:fld id="{2E0DF6E3-1D5C-4094-B81B-572E3744A14B}" type="datetimeFigureOut">
               <a:rPr lang="pt-BR" smtClean="0"/>
-              <a:t>20/04/2021</a:t>
+              <a:t>29/04/2021</a:t>
             </a:fld>
             <a:endParaRPr lang="pt-BR"/>
           </a:p>
@@ -2823,7 +2823,7 @@
           <a:p>
             <a:fld id="{2E0DF6E3-1D5C-4094-B81B-572E3744A14B}" type="datetimeFigureOut">
               <a:rPr lang="pt-BR" smtClean="0"/>
-              <a:t>20/04/2021</a:t>
+              <a:t>29/04/2021</a:t>
             </a:fld>
             <a:endParaRPr lang="pt-BR"/>
           </a:p>
@@ -3075,7 +3075,7 @@
           <a:p>
             <a:fld id="{2E0DF6E3-1D5C-4094-B81B-572E3744A14B}" type="datetimeFigureOut">
               <a:rPr lang="pt-BR" smtClean="0"/>
-              <a:t>20/04/2021</a:t>
+              <a:t>29/04/2021</a:t>
             </a:fld>
             <a:endParaRPr lang="pt-BR"/>
           </a:p>
@@ -3286,7 +3286,7 @@
           <a:p>
             <a:fld id="{2E0DF6E3-1D5C-4094-B81B-572E3744A14B}" type="datetimeFigureOut">
               <a:rPr lang="pt-BR" smtClean="0"/>
-              <a:t>20/04/2021</a:t>
+              <a:t>29/04/2021</a:t>
             </a:fld>
             <a:endParaRPr lang="pt-BR"/>
           </a:p>
@@ -3699,7 +3699,7 @@
         </p:nvSpPr>
         <p:spPr>
           <a:xfrm>
-            <a:off x="423862" y="2660474"/>
+            <a:off x="411625" y="2817312"/>
             <a:ext cx="1617784" cy="1177374"/>
           </a:xfrm>
           <a:prstGeom prst="rect">
@@ -3743,8 +3743,8 @@
         </p:nvSpPr>
         <p:spPr>
           <a:xfrm>
-            <a:off x="7940919" y="1947858"/>
-            <a:ext cx="3577735" cy="2209432"/>
+            <a:off x="8232529" y="2082183"/>
+            <a:ext cx="3286125" cy="2031325"/>
           </a:xfrm>
           <a:prstGeom prst="roundRect">
             <a:avLst/>
@@ -3794,7 +3794,7 @@
         </p:nvSpPr>
         <p:spPr>
           <a:xfrm>
-            <a:off x="8086723" y="2660474"/>
+            <a:off x="8205419" y="2817312"/>
             <a:ext cx="3286125" cy="461665"/>
           </a:xfrm>
           <a:prstGeom prst="rect">
@@ -3824,14 +3824,13 @@
           <p:cNvPr id="8" name="Conector reto 7"/>
           <p:cNvCxnSpPr>
             <a:cxnSpLocks/>
-            <a:endCxn id="5" idx="1"/>
           </p:cNvCxnSpPr>
           <p:nvPr/>
         </p:nvCxnSpPr>
         <p:spPr>
-          <a:xfrm>
-            <a:off x="2041646" y="3052574"/>
-            <a:ext cx="5899273" cy="0"/>
+          <a:xfrm flipV="1">
+            <a:off x="2029409" y="3278977"/>
+            <a:ext cx="6176010" cy="1"/>
           </a:xfrm>
           <a:prstGeom prst="line">
             <a:avLst/>
@@ -3860,8 +3859,8 @@
         </p:nvSpPr>
         <p:spPr>
           <a:xfrm>
-            <a:off x="2300654" y="1608286"/>
-            <a:ext cx="5447567" cy="1754326"/>
+            <a:off x="2267499" y="1523880"/>
+            <a:ext cx="5447567" cy="2031325"/>
           </a:xfrm>
           <a:prstGeom prst="rect">
             <a:avLst/>
@@ -3930,7 +3929,7 @@
                 <a:latin typeface="Arial" panose="020B0604020202020204" pitchFamily="34" charset="0"/>
                 <a:cs typeface="Arial" panose="020B0604020202020204" pitchFamily="34" charset="0"/>
               </a:rPr>
-              <a:t>Solicitar devolução do pedido de formas padrão</a:t>
+              <a:t>Solicitar devolução/troca do pedido de formas padrão</a:t>
             </a:r>
           </a:p>
           <a:p>
@@ -4035,14 +4034,13 @@
           <p:cNvCxnSpPr>
             <a:cxnSpLocks/>
             <a:stCxn id="10" idx="0"/>
-            <a:endCxn id="5" idx="2"/>
           </p:cNvCxnSpPr>
           <p:nvPr/>
         </p:nvCxnSpPr>
         <p:spPr>
           <a:xfrm flipV="1">
-            <a:off x="9729787" y="4157290"/>
-            <a:ext cx="0" cy="1419629"/>
+            <a:off x="9729787" y="4113508"/>
+            <a:ext cx="0" cy="1463411"/>
           </a:xfrm>
           <a:prstGeom prst="line">
             <a:avLst/>
@@ -4471,11 +4469,11 @@
           <a:p>
             <a:pPr algn="ctr"/>
             <a:r>
-              <a:rPr lang="pt-BR" dirty="0">
+              <a:rPr lang="pt-BR" sz="1200" dirty="0">
                 <a:latin typeface="Arial" panose="020B0604020202020204" pitchFamily="34" charset="0"/>
                 <a:cs typeface="Arial" panose="020B0604020202020204" pitchFamily="34" charset="0"/>
               </a:rPr>
-              <a:t>tratar orçamento sob medida </a:t>
+              <a:t>Tratar orçamento sob medida </a:t>
             </a:r>
           </a:p>
         </p:txBody>
@@ -4976,11 +4974,11 @@
           <a:p>
             <a:pPr algn="ctr"/>
             <a:r>
-              <a:rPr lang="pt-BR" dirty="0">
+              <a:rPr lang="pt-BR" sz="1200" dirty="0">
                 <a:latin typeface="Arial" panose="020B0604020202020204" pitchFamily="34" charset="0"/>
                 <a:cs typeface="Arial" panose="020B0604020202020204" pitchFamily="34" charset="0"/>
               </a:rPr>
-              <a:t>tratar orçamento</a:t>
+              <a:t>Tratar orçamento</a:t>
             </a:r>
           </a:p>
         </p:txBody>
@@ -5156,15 +5154,13 @@
           </p:cNvPr>
           <p:cNvCxnSpPr>
             <a:cxnSpLocks/>
-            <a:stCxn id="23" idx="1"/>
-            <a:endCxn id="8" idx="2"/>
           </p:cNvCxnSpPr>
           <p:nvPr/>
         </p:nvCxnSpPr>
         <p:spPr>
           <a:xfrm flipH="1">
-            <a:off x="2601216" y="3318419"/>
-            <a:ext cx="7814083" cy="59730"/>
+            <a:off x="2703606" y="2782583"/>
+            <a:ext cx="7844626" cy="211958"/>
           </a:xfrm>
           <a:prstGeom prst="line">
             <a:avLst/>
@@ -5196,15 +5192,14 @@
           </p:cNvPr>
           <p:cNvCxnSpPr>
             <a:cxnSpLocks/>
-            <a:stCxn id="8" idx="3"/>
             <a:endCxn id="10" idx="0"/>
           </p:cNvCxnSpPr>
           <p:nvPr/>
         </p:nvCxnSpPr>
         <p:spPr>
-          <a:xfrm flipH="1">
+          <a:xfrm>
             <a:off x="3219505" y="3759094"/>
-            <a:ext cx="391179" cy="800182"/>
+            <a:ext cx="0" cy="800182"/>
           </a:xfrm>
           <a:prstGeom prst="line">
             <a:avLst/>
@@ -5236,15 +5231,14 @@
           </p:cNvPr>
           <p:cNvCxnSpPr>
             <a:cxnSpLocks/>
-            <a:stCxn id="33" idx="1"/>
             <a:endCxn id="26" idx="0"/>
           </p:cNvCxnSpPr>
           <p:nvPr/>
         </p:nvCxnSpPr>
         <p:spPr>
           <a:xfrm flipH="1">
-            <a:off x="4498453" y="3021311"/>
-            <a:ext cx="1576372" cy="1537965"/>
+            <a:off x="4498453" y="3782428"/>
+            <a:ext cx="951380" cy="776848"/>
           </a:xfrm>
           <a:prstGeom prst="line">
             <a:avLst/>
@@ -5508,7 +5502,7 @@
         <p:spPr>
           <a:xfrm>
             <a:off x="1828290" y="3288554"/>
-            <a:ext cx="772926" cy="59730"/>
+            <a:ext cx="772926" cy="0"/>
           </a:xfrm>
           <a:prstGeom prst="line">
             <a:avLst/>
@@ -5740,7 +5734,7 @@
           <a:p>
             <a:pPr algn="ctr"/>
             <a:r>
-              <a:rPr lang="pt-BR" sz="1400" dirty="0">
+              <a:rPr lang="pt-BR" sz="1200" dirty="0">
                 <a:latin typeface="Arial" panose="020B0604020202020204" pitchFamily="34" charset="0"/>
                 <a:cs typeface="Arial" panose="020B0604020202020204" pitchFamily="34" charset="0"/>
               </a:rPr>
@@ -5763,7 +5757,7 @@
         </p:nvSpPr>
         <p:spPr>
           <a:xfrm>
-            <a:off x="10415299" y="2801172"/>
+            <a:off x="10533782" y="1994289"/>
             <a:ext cx="1598940" cy="1034494"/>
           </a:xfrm>
           <a:prstGeom prst="rect">
@@ -5868,7 +5862,7 @@
           <a:p>
             <a:pPr algn="ctr"/>
             <a:r>
-              <a:rPr lang="pt-BR" sz="1400" dirty="0">
+              <a:rPr lang="pt-BR" sz="1200" dirty="0">
                 <a:latin typeface="Arial" panose="020B0604020202020204" pitchFamily="34" charset="0"/>
                 <a:cs typeface="Arial" panose="020B0604020202020204" pitchFamily="34" charset="0"/>
               </a:rPr>
@@ -5944,7 +5938,7 @@
           <a:p>
             <a:pPr algn="ctr"/>
             <a:r>
-              <a:rPr lang="pt-BR" sz="1400" dirty="0">
+              <a:rPr lang="pt-BR" sz="1200" dirty="0">
                 <a:latin typeface="Arial" panose="020B0604020202020204" pitchFamily="34" charset="0"/>
                 <a:cs typeface="Arial" panose="020B0604020202020204" pitchFamily="34" charset="0"/>
               </a:rPr>
@@ -6020,7 +6014,7 @@
           <a:p>
             <a:pPr algn="ctr"/>
             <a:r>
-              <a:rPr lang="pt-BR" sz="1400" dirty="0">
+              <a:rPr lang="pt-BR" sz="1200" dirty="0">
                 <a:latin typeface="Arial" panose="020B0604020202020204" pitchFamily="34" charset="0"/>
                 <a:cs typeface="Arial" panose="020B0604020202020204" pitchFamily="34" charset="0"/>
               </a:rPr>
@@ -6096,7 +6090,7 @@
           <a:p>
             <a:pPr algn="ctr"/>
             <a:r>
-              <a:rPr lang="pt-BR" sz="1400" dirty="0">
+              <a:rPr lang="pt-BR" sz="1200" dirty="0">
                 <a:latin typeface="Arial" panose="020B0604020202020204" pitchFamily="34" charset="0"/>
                 <a:cs typeface="Arial" panose="020B0604020202020204" pitchFamily="34" charset="0"/>
               </a:rPr>
@@ -6297,7 +6291,7 @@
                   <a:latin typeface="Arial" panose="020B0604020202020204" pitchFamily="34" charset="0"/>
                   <a:cs typeface="Arial" panose="020B0604020202020204" pitchFamily="34" charset="0"/>
                 </a:rPr>
-                <a:t>Setor de  caixa(financeiro)</a:t>
+                <a:t>Setor financeiro</a:t>
               </a:r>
             </a:p>
             <a:p>
@@ -6362,6 +6356,58 @@
           </p:txBody>
         </p:sp>
       </p:grpSp>
+      <p:sp>
+        <p:nvSpPr>
+          <p:cNvPr id="30" name="Retângulo 29">
+            <a:extLst>
+              <a:ext uri="{FF2B5EF4-FFF2-40B4-BE49-F238E27FC236}">
+                <a16:creationId xmlns:a16="http://schemas.microsoft.com/office/drawing/2014/main" id="{FC473C2C-86BD-4EAB-AB4C-365FA004DF10}"/>
+              </a:ext>
+            </a:extLst>
+          </p:cNvPr>
+          <p:cNvSpPr/>
+          <p:nvPr/>
+        </p:nvSpPr>
+        <p:spPr>
+          <a:xfrm>
+            <a:off x="10470997" y="3164530"/>
+            <a:ext cx="1598940" cy="1034494"/>
+          </a:xfrm>
+          <a:prstGeom prst="rect">
+            <a:avLst/>
+          </a:prstGeom>
+        </p:spPr>
+        <p:style>
+          <a:lnRef idx="2">
+            <a:schemeClr val="accent1">
+              <a:shade val="50000"/>
+            </a:schemeClr>
+          </a:lnRef>
+          <a:fillRef idx="1">
+            <a:schemeClr val="accent1"/>
+          </a:fillRef>
+          <a:effectRef idx="0">
+            <a:schemeClr val="accent1"/>
+          </a:effectRef>
+          <a:fontRef idx="minor">
+            <a:schemeClr val="lt1"/>
+          </a:fontRef>
+        </p:style>
+        <p:txBody>
+          <a:bodyPr rtlCol="0" anchor="ctr"/>
+          <a:lstStyle/>
+          <a:p>
+            <a:pPr algn="ctr"/>
+            <a:r>
+              <a:rPr lang="pt-BR" dirty="0">
+                <a:latin typeface="Arial" panose="020B0604020202020204" pitchFamily="34" charset="0"/>
+                <a:cs typeface="Arial" panose="020B0604020202020204" pitchFamily="34" charset="0"/>
+              </a:rPr>
+              <a:t>Emissora  </a:t>
+            </a:r>
+          </a:p>
+        </p:txBody>
+      </p:sp>
     </p:spTree>
     <p:extLst>
       <p:ext uri="{BB962C8B-B14F-4D97-AF65-F5344CB8AC3E}">
@@ -7029,7 +7075,7 @@
           <a:p>
             <a:pPr algn="ctr"/>
             <a:r>
-              <a:rPr lang="pt-BR" sz="1400" dirty="0">
+              <a:rPr lang="pt-BR" sz="1200" dirty="0">
                 <a:latin typeface="Arial" panose="020B0604020202020204" pitchFamily="34" charset="0"/>
                 <a:cs typeface="Arial" panose="020B0604020202020204" pitchFamily="34" charset="0"/>
               </a:rPr>
@@ -7157,7 +7203,7 @@
           <a:p>
             <a:pPr algn="ctr"/>
             <a:r>
-              <a:rPr lang="pt-BR" sz="1400" dirty="0">
+              <a:rPr lang="pt-BR" sz="1200" dirty="0">
                 <a:latin typeface="Arial" panose="020B0604020202020204" pitchFamily="34" charset="0"/>
                 <a:cs typeface="Arial" panose="020B0604020202020204" pitchFamily="34" charset="0"/>
               </a:rPr>
@@ -7233,7 +7279,7 @@
           <a:p>
             <a:pPr algn="ctr"/>
             <a:r>
-              <a:rPr lang="pt-BR" sz="1400" dirty="0">
+              <a:rPr lang="pt-BR" sz="1200" dirty="0">
                 <a:latin typeface="Arial" panose="020B0604020202020204" pitchFamily="34" charset="0"/>
                 <a:cs typeface="Arial" panose="020B0604020202020204" pitchFamily="34" charset="0"/>
               </a:rPr>
@@ -7309,7 +7355,7 @@
           <a:p>
             <a:pPr algn="ctr"/>
             <a:r>
-              <a:rPr lang="pt-BR" sz="1400" dirty="0">
+              <a:rPr lang="pt-BR" sz="1200" dirty="0">
                 <a:latin typeface="Arial" panose="020B0604020202020204" pitchFamily="34" charset="0"/>
                 <a:cs typeface="Arial" panose="020B0604020202020204" pitchFamily="34" charset="0"/>
               </a:rPr>
@@ -7385,7 +7431,7 @@
           <a:p>
             <a:pPr algn="ctr"/>
             <a:r>
-              <a:rPr lang="pt-BR" sz="1400" dirty="0">
+              <a:rPr lang="pt-BR" sz="1200" dirty="0">
                 <a:latin typeface="Arial" panose="020B0604020202020204" pitchFamily="34" charset="0"/>
                 <a:cs typeface="Arial" panose="020B0604020202020204" pitchFamily="34" charset="0"/>
               </a:rPr>
@@ -7461,7 +7507,7 @@
                   <a:latin typeface="Arial" panose="020B0604020202020204" pitchFamily="34" charset="0"/>
                   <a:cs typeface="Arial" panose="020B0604020202020204" pitchFamily="34" charset="0"/>
                 </a:rPr>
-                <a:t>Setor de Almoxarifado</a:t>
+                <a:t>Setor de almoxarifado</a:t>
               </a:r>
             </a:p>
           </p:txBody>
@@ -7586,7 +7632,7 @@
                   <a:latin typeface="Arial" panose="020B0604020202020204" pitchFamily="34" charset="0"/>
                   <a:cs typeface="Arial" panose="020B0604020202020204" pitchFamily="34" charset="0"/>
                 </a:rPr>
-                <a:t>Setor de  caixa(financeiro)</a:t>
+                <a:t>Setor financeiro</a:t>
               </a:r>
             </a:p>
             <a:p>
@@ -7703,6 +7749,58 @@
           </a:p>
         </p:txBody>
       </p:sp>
+      <p:sp>
+        <p:nvSpPr>
+          <p:cNvPr id="32" name="Retângulo 31">
+            <a:extLst>
+              <a:ext uri="{FF2B5EF4-FFF2-40B4-BE49-F238E27FC236}">
+                <a16:creationId xmlns:a16="http://schemas.microsoft.com/office/drawing/2014/main" id="{2669AE9B-2119-4D10-87FD-6C6E87CC8BAC}"/>
+              </a:ext>
+            </a:extLst>
+          </p:cNvPr>
+          <p:cNvSpPr/>
+          <p:nvPr/>
+        </p:nvSpPr>
+        <p:spPr>
+          <a:xfrm>
+            <a:off x="10423433" y="627176"/>
+            <a:ext cx="1598940" cy="1034494"/>
+          </a:xfrm>
+          <a:prstGeom prst="rect">
+            <a:avLst/>
+          </a:prstGeom>
+        </p:spPr>
+        <p:style>
+          <a:lnRef idx="2">
+            <a:schemeClr val="accent1">
+              <a:shade val="50000"/>
+            </a:schemeClr>
+          </a:lnRef>
+          <a:fillRef idx="1">
+            <a:schemeClr val="accent1"/>
+          </a:fillRef>
+          <a:effectRef idx="0">
+            <a:schemeClr val="accent1"/>
+          </a:effectRef>
+          <a:fontRef idx="minor">
+            <a:schemeClr val="lt1"/>
+          </a:fontRef>
+        </p:style>
+        <p:txBody>
+          <a:bodyPr rtlCol="0" anchor="ctr"/>
+          <a:lstStyle/>
+          <a:p>
+            <a:pPr algn="ctr"/>
+            <a:r>
+              <a:rPr lang="pt-BR" dirty="0">
+                <a:latin typeface="Arial" panose="020B0604020202020204" pitchFamily="34" charset="0"/>
+                <a:cs typeface="Arial" panose="020B0604020202020204" pitchFamily="34" charset="0"/>
+              </a:rPr>
+              <a:t>Emissora  </a:t>
+            </a:r>
+          </a:p>
+        </p:txBody>
+      </p:sp>
     </p:spTree>
     <p:extLst>
       <p:ext uri="{BB962C8B-B14F-4D97-AF65-F5344CB8AC3E}">
@@ -7911,7 +8009,7 @@
         </p:spPr>
         <p:txBody>
           <a:bodyPr>
-            <a:normAutofit/>
+            <a:normAutofit fontScale="90000"/>
           </a:bodyPr>
           <a:lstStyle/>
           <a:p>
@@ -7921,7 +8019,7 @@
                 <a:ea typeface="+mn-ea"/>
                 <a:cs typeface="Arial" panose="020B0604020202020204" pitchFamily="34" charset="0"/>
               </a:rPr>
-              <a:t>Cenário: Solicitar devolução do pedido de formas padrão</a:t>
+              <a:t>Cenário: Solicitar devolução/troca do pedido de formas padrão</a:t>
             </a:r>
           </a:p>
         </p:txBody>
@@ -7980,7 +8078,7 @@
         </p:nvSpPr>
         <p:spPr>
           <a:xfrm>
-            <a:off x="3922836" y="2154085"/>
+            <a:off x="3110517" y="2177035"/>
             <a:ext cx="6620607" cy="400110"/>
           </a:xfrm>
           <a:prstGeom prst="rect">
@@ -8222,7 +8320,7 @@
                   <a:latin typeface="Arial" panose="020B0604020202020204" pitchFamily="34" charset="0"/>
                   <a:cs typeface="Arial" panose="020B0604020202020204" pitchFamily="34" charset="0"/>
                 </a:rPr>
-                <a:t>Setor de Caixa</a:t>
+                <a:t>Setor financeiro</a:t>
               </a:r>
             </a:p>
           </p:txBody>
@@ -8333,11 +8431,11 @@
           <a:p>
             <a:pPr algn="ctr"/>
             <a:r>
-              <a:rPr lang="pt-BR" sz="1400" dirty="0">
+              <a:rPr lang="pt-BR" sz="1200" dirty="0">
                 <a:latin typeface="Arial" panose="020B0604020202020204" pitchFamily="34" charset="0"/>
                 <a:cs typeface="Arial" panose="020B0604020202020204" pitchFamily="34" charset="0"/>
               </a:rPr>
-              <a:t>tratar devolução do pedido</a:t>
+              <a:t>Tratar devolução do pedido</a:t>
             </a:r>
           </a:p>
         </p:txBody>
@@ -8409,7 +8507,7 @@
           <a:p>
             <a:pPr algn="ctr"/>
             <a:r>
-              <a:rPr lang="pt-BR" sz="1400" dirty="0">
+              <a:rPr lang="pt-BR" sz="1200" dirty="0">
                 <a:latin typeface="Arial" panose="020B0604020202020204" pitchFamily="34" charset="0"/>
                 <a:cs typeface="Arial" panose="020B0604020202020204" pitchFamily="34" charset="0"/>
               </a:rPr>
@@ -8485,7 +8583,7 @@
           <a:p>
             <a:pPr algn="ctr"/>
             <a:r>
-              <a:rPr lang="pt-BR" sz="1400" dirty="0">
+              <a:rPr lang="pt-BR" sz="1200" dirty="0">
                 <a:latin typeface="Arial" panose="020B0604020202020204" pitchFamily="34" charset="0"/>
                 <a:cs typeface="Arial" panose="020B0604020202020204" pitchFamily="34" charset="0"/>
               </a:rPr>
@@ -8940,7 +9038,7 @@
           <a:p>
             <a:pPr algn="ctr"/>
             <a:r>
-              <a:rPr lang="pt-BR" dirty="0">
+              <a:rPr lang="pt-BR" sz="1200" dirty="0">
                 <a:latin typeface="Arial" panose="020B0604020202020204" pitchFamily="34" charset="0"/>
                 <a:cs typeface="Arial" panose="020B0604020202020204" pitchFamily="34" charset="0"/>
               </a:rPr>
@@ -9046,7 +9144,7 @@
                 <a:latin typeface="Arial" panose="020B0604020202020204" pitchFamily="34" charset="0"/>
                 <a:cs typeface="Arial" panose="020B0604020202020204" pitchFamily="34" charset="0"/>
               </a:rPr>
-              <a:t>Setor de Almoxarifado </a:t>
+              <a:t>Setor de almoxarifado </a:t>
             </a:r>
           </a:p>
         </p:txBody>
@@ -9156,7 +9254,7 @@
           <a:p>
             <a:pPr algn="ctr"/>
             <a:r>
-              <a:rPr lang="pt-BR" dirty="0">
+              <a:rPr lang="pt-BR" sz="1200" dirty="0">
                 <a:latin typeface="Arial" panose="020B0604020202020204" pitchFamily="34" charset="0"/>
                 <a:cs typeface="Arial" panose="020B0604020202020204" pitchFamily="34" charset="0"/>
               </a:rPr>

</xml_diff>